<commit_message>
Added two more slides for C# as Object-oriented language and .NET platform
</commit_message>
<xml_diff>
--- a/C# Basics.pptx
+++ b/C# Basics.pptx
@@ -8,6 +8,8 @@
     <p:sldId id="256" r:id="rId2"/>
     <p:sldId id="258" r:id="rId3"/>
     <p:sldId id="259" r:id="rId4"/>
+    <p:sldId id="260" r:id="rId5"/>
+    <p:sldId id="261" r:id="rId6"/>
   </p:sldIdLst>
   <p:sldSz cx="12192000" cy="6858000"/>
   <p:notesSz cx="6858000" cy="9144000"/>
@@ -13557,28 +13559,21 @@
                 <a:latin typeface="Arial" panose="020B0604020202020204" pitchFamily="34" charset="0"/>
                 <a:cs typeface="Arial" panose="020B0604020202020204" pitchFamily="34" charset="0"/>
               </a:rPr>
-              <a:t>C# can be used for writing of Console, Desktop, </a:t>
-            </a:r>
-            <a:r>
-              <a:rPr lang="en-US" sz="2000" smtClean="0">
-                <a:latin typeface="Arial" panose="020B0604020202020204" pitchFamily="34" charset="0"/>
-                <a:cs typeface="Arial" panose="020B0604020202020204" pitchFamily="34" charset="0"/>
-              </a:rPr>
-              <a:t>Widows </a:t>
-            </a:r>
-            <a:r>
-              <a:rPr lang="en-US" sz="2000" smtClean="0">
-                <a:latin typeface="Arial" panose="020B0604020202020204" pitchFamily="34" charset="0"/>
-                <a:cs typeface="Arial" panose="020B0604020202020204" pitchFamily="34" charset="0"/>
-              </a:rPr>
-              <a:t>Services, </a:t>
+              <a:t>C# can be used for writing of Console, Desktop, Widows Services, Web </a:t>
             </a:r>
             <a:r>
               <a:rPr lang="en-US" sz="2000" dirty="0" smtClean="0">
                 <a:latin typeface="Arial" panose="020B0604020202020204" pitchFamily="34" charset="0"/>
                 <a:cs typeface="Arial" panose="020B0604020202020204" pitchFamily="34" charset="0"/>
               </a:rPr>
-              <a:t>Web applications, Games and much more.</a:t>
+              <a:t>apps, Mobile apps, Games </a:t>
+            </a:r>
+            <a:r>
+              <a:rPr lang="en-US" sz="2000" dirty="0" smtClean="0">
+                <a:latin typeface="Arial" panose="020B0604020202020204" pitchFamily="34" charset="0"/>
+                <a:cs typeface="Arial" panose="020B0604020202020204" pitchFamily="34" charset="0"/>
+              </a:rPr>
+              <a:t>and much more.</a:t>
             </a:r>
           </a:p>
           <a:p>
@@ -13907,6 +13902,177 @@
       </p:par>
     </p:tnLst>
   </p:timing>
+</p:sld>
+</file>
+
+<file path=ppt/slides/slide4.xml><?xml version="1.0" encoding="utf-8"?>
+<p:sld xmlns:a="http://schemas.openxmlformats.org/drawingml/2006/main" xmlns:r="http://schemas.openxmlformats.org/officeDocument/2006/relationships" xmlns:p="http://schemas.openxmlformats.org/presentationml/2006/main">
+  <p:cSld>
+    <p:spTree>
+      <p:nvGrpSpPr>
+        <p:cNvPr id="1" name=""/>
+        <p:cNvGrpSpPr/>
+        <p:nvPr/>
+      </p:nvGrpSpPr>
+      <p:grpSpPr>
+        <a:xfrm>
+          <a:off x="0" y="0"/>
+          <a:ext cx="0" cy="0"/>
+          <a:chOff x="0" y="0"/>
+          <a:chExt cx="0" cy="0"/>
+        </a:xfrm>
+      </p:grpSpPr>
+      <p:sp>
+        <p:nvSpPr>
+          <p:cNvPr id="2" name="Title 1"/>
+          <p:cNvSpPr>
+            <a:spLocks noGrp="1"/>
+          </p:cNvSpPr>
+          <p:nvPr>
+            <p:ph type="title"/>
+          </p:nvPr>
+        </p:nvSpPr>
+        <p:spPr>
+          <a:xfrm>
+            <a:off x="1599405" y="693748"/>
+            <a:ext cx="8761413" cy="1172373"/>
+          </a:xfrm>
+        </p:spPr>
+        <p:txBody>
+          <a:bodyPr/>
+          <a:lstStyle/>
+          <a:p>
+            <a:pPr algn="ctr"/>
+            <a:r>
+              <a:rPr lang="en-US" dirty="0" smtClean="0"/>
+              <a:t>C# is object oriented programming language</a:t>
+            </a:r>
+            <a:endParaRPr lang="en-US" dirty="0"/>
+          </a:p>
+        </p:txBody>
+      </p:sp>
+      <p:pic>
+        <p:nvPicPr>
+          <p:cNvPr id="9" name="Content Placeholder 8"/>
+          <p:cNvPicPr>
+            <a:picLocks noGrp="1" noChangeAspect="1"/>
+          </p:cNvPicPr>
+          <p:nvPr>
+            <p:ph sz="half" idx="2"/>
+          </p:nvPr>
+        </p:nvPicPr>
+        <p:blipFill>
+          <a:blip r:embed="rId2">
+            <a:extLst>
+              <a:ext uri="{28A0092B-C50C-407E-A947-70E740481C1C}">
+                <a14:useLocalDpi xmlns:a14="http://schemas.microsoft.com/office/drawing/2010/main" val="0"/>
+              </a:ext>
+            </a:extLst>
+          </a:blip>
+          <a:stretch>
+            <a:fillRect/>
+          </a:stretch>
+        </p:blipFill>
+        <p:spPr>
+          <a:xfrm>
+            <a:off x="2873829" y="2478887"/>
+            <a:ext cx="6377149" cy="4006586"/>
+          </a:xfrm>
+        </p:spPr>
+      </p:pic>
+    </p:spTree>
+    <p:extLst>
+      <p:ext uri="{BB962C8B-B14F-4D97-AF65-F5344CB8AC3E}">
+        <p14:creationId xmlns:p14="http://schemas.microsoft.com/office/powerpoint/2010/main" val="3952090778"/>
+      </p:ext>
+    </p:extLst>
+  </p:cSld>
+  <p:clrMapOvr>
+    <a:masterClrMapping/>
+  </p:clrMapOvr>
+</p:sld>
+</file>
+
+<file path=ppt/slides/slide5.xml><?xml version="1.0" encoding="utf-8"?>
+<p:sld xmlns:a="http://schemas.openxmlformats.org/drawingml/2006/main" xmlns:r="http://schemas.openxmlformats.org/officeDocument/2006/relationships" xmlns:p="http://schemas.openxmlformats.org/presentationml/2006/main">
+  <p:cSld>
+    <p:spTree>
+      <p:nvGrpSpPr>
+        <p:cNvPr id="1" name=""/>
+        <p:cNvGrpSpPr/>
+        <p:nvPr/>
+      </p:nvGrpSpPr>
+      <p:grpSpPr>
+        <a:xfrm>
+          <a:off x="0" y="0"/>
+          <a:ext cx="0" cy="0"/>
+          <a:chOff x="0" y="0"/>
+          <a:chExt cx="0" cy="0"/>
+        </a:xfrm>
+      </p:grpSpPr>
+      <p:sp>
+        <p:nvSpPr>
+          <p:cNvPr id="2" name="Title 1"/>
+          <p:cNvSpPr>
+            <a:spLocks noGrp="1"/>
+          </p:cNvSpPr>
+          <p:nvPr>
+            <p:ph type="title"/>
+          </p:nvPr>
+        </p:nvSpPr>
+        <p:spPr/>
+        <p:txBody>
+          <a:bodyPr/>
+          <a:lstStyle/>
+          <a:p>
+            <a:pPr algn="ctr"/>
+            <a:r>
+              <a:rPr lang="en-US" dirty="0" smtClean="0"/>
+              <a:t>.NET platform /whole new world/</a:t>
+            </a:r>
+            <a:endParaRPr lang="en-US" dirty="0"/>
+          </a:p>
+        </p:txBody>
+      </p:sp>
+      <p:pic>
+        <p:nvPicPr>
+          <p:cNvPr id="4" name="Content Placeholder 3"/>
+          <p:cNvPicPr>
+            <a:picLocks noGrp="1" noChangeAspect="1"/>
+          </p:cNvPicPr>
+          <p:nvPr>
+            <p:ph idx="1"/>
+          </p:nvPr>
+        </p:nvPicPr>
+        <p:blipFill>
+          <a:blip r:embed="rId2">
+            <a:extLst>
+              <a:ext uri="{28A0092B-C50C-407E-A947-70E740481C1C}">
+                <a14:useLocalDpi xmlns:a14="http://schemas.microsoft.com/office/drawing/2010/main" val="0"/>
+              </a:ext>
+            </a:extLst>
+          </a:blip>
+          <a:stretch>
+            <a:fillRect/>
+          </a:stretch>
+        </p:blipFill>
+        <p:spPr>
+          <a:xfrm>
+            <a:off x="1997526" y="2323581"/>
+            <a:ext cx="7918841" cy="4454348"/>
+          </a:xfrm>
+        </p:spPr>
+      </p:pic>
+    </p:spTree>
+    <p:extLst>
+      <p:ext uri="{BB962C8B-B14F-4D97-AF65-F5344CB8AC3E}">
+        <p14:creationId xmlns:p14="http://schemas.microsoft.com/office/powerpoint/2010/main" val="152368737"/>
+      </p:ext>
+    </p:extLst>
+  </p:cSld>
+  <p:clrMapOvr>
+    <a:masterClrMapping/>
+  </p:clrMapOvr>
 </p:sld>
 </file>
 

</xml_diff>

<commit_message>
Add more slides for .NET, Compiler and .NET Schedule
</commit_message>
<xml_diff>
--- a/C# Basics.pptx
+++ b/C# Basics.pptx
@@ -9,7 +9,13 @@
     <p:sldId id="258" r:id="rId3"/>
     <p:sldId id="259" r:id="rId4"/>
     <p:sldId id="260" r:id="rId5"/>
-    <p:sldId id="261" r:id="rId6"/>
+    <p:sldId id="262" r:id="rId6"/>
+    <p:sldId id="261" r:id="rId7"/>
+    <p:sldId id="263" r:id="rId8"/>
+    <p:sldId id="264" r:id="rId9"/>
+    <p:sldId id="265" r:id="rId10"/>
+    <p:sldId id="266" r:id="rId11"/>
+    <p:sldId id="267" r:id="rId12"/>
   </p:sldIdLst>
   <p:sldSz cx="12192000" cy="6858000"/>
   <p:notesSz cx="6858000" cy="9144000"/>
@@ -13382,6 +13388,493 @@
 </p:sld>
 </file>
 
+<file path=ppt/slides/slide10.xml><?xml version="1.0" encoding="utf-8"?>
+<p:sld xmlns:a="http://schemas.openxmlformats.org/drawingml/2006/main" xmlns:r="http://schemas.openxmlformats.org/officeDocument/2006/relationships" xmlns:p="http://schemas.openxmlformats.org/presentationml/2006/main">
+  <p:cSld>
+    <p:spTree>
+      <p:nvGrpSpPr>
+        <p:cNvPr id="1" name=""/>
+        <p:cNvGrpSpPr/>
+        <p:nvPr/>
+      </p:nvGrpSpPr>
+      <p:grpSpPr>
+        <a:xfrm>
+          <a:off x="0" y="0"/>
+          <a:ext cx="0" cy="0"/>
+          <a:chOff x="0" y="0"/>
+          <a:chExt cx="0" cy="0"/>
+        </a:xfrm>
+      </p:grpSpPr>
+      <p:sp>
+        <p:nvSpPr>
+          <p:cNvPr id="2" name="Title 1"/>
+          <p:cNvSpPr>
+            <a:spLocks noGrp="1"/>
+          </p:cNvSpPr>
+          <p:nvPr>
+            <p:ph type="title"/>
+          </p:nvPr>
+        </p:nvSpPr>
+        <p:spPr/>
+        <p:txBody>
+          <a:bodyPr/>
+          <a:lstStyle/>
+          <a:p>
+            <a:pPr algn="ctr"/>
+            <a:r>
+              <a:rPr lang="en-US" dirty="0" smtClean="0">
+                <a:latin typeface="Arial" panose="020B0604020202020204" pitchFamily="34" charset="0"/>
+                <a:cs typeface="Arial" panose="020B0604020202020204" pitchFamily="34" charset="0"/>
+              </a:rPr>
+              <a:t>What is an IDE?</a:t>
+            </a:r>
+            <a:endParaRPr lang="en-US" dirty="0">
+              <a:latin typeface="Arial" panose="020B0604020202020204" pitchFamily="34" charset="0"/>
+              <a:cs typeface="Arial" panose="020B0604020202020204" pitchFamily="34" charset="0"/>
+            </a:endParaRPr>
+          </a:p>
+        </p:txBody>
+      </p:sp>
+      <p:sp>
+        <p:nvSpPr>
+          <p:cNvPr id="7" name="Content Placeholder 3"/>
+          <p:cNvSpPr>
+            <a:spLocks noGrp="1"/>
+          </p:cNvSpPr>
+          <p:nvPr>
+            <p:ph sz="half" idx="2"/>
+          </p:nvPr>
+        </p:nvSpPr>
+        <p:spPr>
+          <a:xfrm>
+            <a:off x="6196902" y="2327563"/>
+            <a:ext cx="4535753" cy="4054763"/>
+          </a:xfrm>
+        </p:spPr>
+        <p:txBody>
+          <a:bodyPr>
+            <a:normAutofit/>
+          </a:bodyPr>
+          <a:lstStyle/>
+          <a:p>
+            <a:pPr marL="0" indent="0">
+              <a:buNone/>
+            </a:pPr>
+            <a:endParaRPr lang="en-US" sz="1600" dirty="0">
+              <a:latin typeface="Arial" panose="020B0604020202020204" pitchFamily="34" charset="0"/>
+              <a:cs typeface="Arial" panose="020B0604020202020204" pitchFamily="34" charset="0"/>
+            </a:endParaRPr>
+          </a:p>
+          <a:p>
+            <a:endParaRPr lang="en-US" sz="1600" dirty="0">
+              <a:latin typeface="Arial" panose="020B0604020202020204" pitchFamily="34" charset="0"/>
+              <a:cs typeface="Arial" panose="020B0604020202020204" pitchFamily="34" charset="0"/>
+            </a:endParaRPr>
+          </a:p>
+          <a:p>
+            <a:endParaRPr lang="en-US" sz="1600" dirty="0">
+              <a:latin typeface="Arial" panose="020B0604020202020204" pitchFamily="34" charset="0"/>
+              <a:cs typeface="Arial" panose="020B0604020202020204" pitchFamily="34" charset="0"/>
+            </a:endParaRPr>
+          </a:p>
+          <a:p>
+            <a:endParaRPr lang="en-US" dirty="0">
+              <a:latin typeface="Arial" panose="020B0604020202020204" pitchFamily="34" charset="0"/>
+              <a:cs typeface="Arial" panose="020B0604020202020204" pitchFamily="34" charset="0"/>
+            </a:endParaRPr>
+          </a:p>
+          <a:p>
+            <a:endParaRPr lang="en-US" dirty="0">
+              <a:latin typeface="Arial" panose="020B0604020202020204" pitchFamily="34" charset="0"/>
+              <a:cs typeface="Arial" panose="020B0604020202020204" pitchFamily="34" charset="0"/>
+            </a:endParaRPr>
+          </a:p>
+          <a:p>
+            <a:endParaRPr lang="en-US" dirty="0">
+              <a:latin typeface="Arial" panose="020B0604020202020204" pitchFamily="34" charset="0"/>
+              <a:cs typeface="Arial" panose="020B0604020202020204" pitchFamily="34" charset="0"/>
+            </a:endParaRPr>
+          </a:p>
+          <a:p>
+            <a:endParaRPr lang="en-US" dirty="0">
+              <a:latin typeface="Arial" panose="020B0604020202020204" pitchFamily="34" charset="0"/>
+              <a:cs typeface="Arial" panose="020B0604020202020204" pitchFamily="34" charset="0"/>
+            </a:endParaRPr>
+          </a:p>
+          <a:p>
+            <a:endParaRPr lang="en-US" dirty="0"/>
+          </a:p>
+          <a:p>
+            <a:endParaRPr lang="en-US" dirty="0"/>
+          </a:p>
+        </p:txBody>
+      </p:sp>
+      <p:sp>
+        <p:nvSpPr>
+          <p:cNvPr id="4" name="Content Placeholder 3"/>
+          <p:cNvSpPr>
+            <a:spLocks noGrp="1"/>
+          </p:cNvSpPr>
+          <p:nvPr>
+            <p:ph sz="half" idx="2"/>
+          </p:nvPr>
+        </p:nvSpPr>
+        <p:spPr>
+          <a:xfrm>
+            <a:off x="733039" y="2417137"/>
+            <a:ext cx="10927726" cy="2490765"/>
+          </a:xfrm>
+        </p:spPr>
+        <p:txBody>
+          <a:bodyPr>
+            <a:normAutofit/>
+          </a:bodyPr>
+          <a:lstStyle/>
+          <a:p>
+            <a:r>
+              <a:rPr lang="en-US" sz="2000" b="1" dirty="0" smtClean="0">
+                <a:latin typeface="Arial" panose="020B0604020202020204" pitchFamily="34" charset="0"/>
+                <a:cs typeface="Arial" panose="020B0604020202020204" pitchFamily="34" charset="0"/>
+              </a:rPr>
+              <a:t>IDE</a:t>
+            </a:r>
+            <a:r>
+              <a:rPr lang="en-US" sz="2000" dirty="0" smtClean="0">
+                <a:latin typeface="Arial" panose="020B0604020202020204" pitchFamily="34" charset="0"/>
+                <a:cs typeface="Arial" panose="020B0604020202020204" pitchFamily="34" charset="0"/>
+              </a:rPr>
+              <a:t> - </a:t>
+            </a:r>
+            <a:r>
+              <a:rPr lang="en-US" sz="2000" b="1" dirty="0" smtClean="0">
+                <a:latin typeface="Arial" panose="020B0604020202020204" pitchFamily="34" charset="0"/>
+                <a:cs typeface="Arial" panose="020B0604020202020204" pitchFamily="34" charset="0"/>
+              </a:rPr>
+              <a:t>Integrated Development Environment</a:t>
+            </a:r>
+            <a:r>
+              <a:rPr lang="en-US" sz="2000" dirty="0" smtClean="0">
+                <a:latin typeface="Arial" panose="020B0604020202020204" pitchFamily="34" charset="0"/>
+                <a:cs typeface="Arial" panose="020B0604020202020204" pitchFamily="34" charset="0"/>
+              </a:rPr>
+              <a:t> is software that helps us to write/debug/run our source more easily and to create our final programs in better way.</a:t>
+            </a:r>
+          </a:p>
+          <a:p>
+            <a:r>
+              <a:rPr lang="en-US" sz="2000" dirty="0" smtClean="0">
+                <a:latin typeface="Arial" panose="020B0604020202020204" pitchFamily="34" charset="0"/>
+                <a:cs typeface="Arial" panose="020B0604020202020204" pitchFamily="34" charset="0"/>
+              </a:rPr>
+              <a:t>An IDE typically consists of:</a:t>
+            </a:r>
+          </a:p>
+          <a:p>
+            <a:pPr lvl="1"/>
+            <a:r>
+              <a:rPr lang="en-US" sz="1800" dirty="0" smtClean="0">
+                <a:latin typeface="Arial" panose="020B0604020202020204" pitchFamily="34" charset="0"/>
+                <a:cs typeface="Arial" panose="020B0604020202020204" pitchFamily="34" charset="0"/>
+              </a:rPr>
+              <a:t>Source Code Editor</a:t>
+            </a:r>
+          </a:p>
+          <a:p>
+            <a:pPr lvl="1"/>
+            <a:r>
+              <a:rPr lang="en-US" sz="1800" dirty="0" smtClean="0">
+                <a:latin typeface="Arial" panose="020B0604020202020204" pitchFamily="34" charset="0"/>
+                <a:cs typeface="Arial" panose="020B0604020202020204" pitchFamily="34" charset="0"/>
+              </a:rPr>
+              <a:t>Local Build Automation</a:t>
+            </a:r>
+          </a:p>
+          <a:p>
+            <a:pPr lvl="1"/>
+            <a:r>
+              <a:rPr lang="en-US" sz="1800" dirty="0" smtClean="0">
+                <a:latin typeface="Arial" panose="020B0604020202020204" pitchFamily="34" charset="0"/>
+                <a:cs typeface="Arial" panose="020B0604020202020204" pitchFamily="34" charset="0"/>
+              </a:rPr>
+              <a:t>Debugger</a:t>
+            </a:r>
+          </a:p>
+          <a:p>
+            <a:pPr marL="0" indent="0">
+              <a:buNone/>
+            </a:pPr>
+            <a:endParaRPr lang="en-US" sz="2000" dirty="0" smtClean="0">
+              <a:latin typeface="Arial" panose="020B0604020202020204" pitchFamily="34" charset="0"/>
+              <a:cs typeface="Arial" panose="020B0604020202020204" pitchFamily="34" charset="0"/>
+            </a:endParaRPr>
+          </a:p>
+          <a:p>
+            <a:endParaRPr lang="en-US" sz="2000" dirty="0">
+              <a:latin typeface="Arial" panose="020B0604020202020204" pitchFamily="34" charset="0"/>
+              <a:cs typeface="Arial" panose="020B0604020202020204" pitchFamily="34" charset="0"/>
+            </a:endParaRPr>
+          </a:p>
+          <a:p>
+            <a:endParaRPr lang="en-US" sz="2000" dirty="0">
+              <a:latin typeface="Arial" panose="020B0604020202020204" pitchFamily="34" charset="0"/>
+              <a:cs typeface="Arial" panose="020B0604020202020204" pitchFamily="34" charset="0"/>
+            </a:endParaRPr>
+          </a:p>
+          <a:p>
+            <a:pPr marL="0" indent="0">
+              <a:buNone/>
+            </a:pPr>
+            <a:endParaRPr lang="en-US" sz="1600" dirty="0">
+              <a:latin typeface="Arial" panose="020B0604020202020204" pitchFamily="34" charset="0"/>
+              <a:cs typeface="Arial" panose="020B0604020202020204" pitchFamily="34" charset="0"/>
+            </a:endParaRPr>
+          </a:p>
+          <a:p>
+            <a:pPr marL="0" indent="0">
+              <a:buNone/>
+            </a:pPr>
+            <a:endParaRPr lang="en-US" sz="1600" dirty="0">
+              <a:latin typeface="Arial" panose="020B0604020202020204" pitchFamily="34" charset="0"/>
+              <a:cs typeface="Arial" panose="020B0604020202020204" pitchFamily="34" charset="0"/>
+            </a:endParaRPr>
+          </a:p>
+          <a:p>
+            <a:endParaRPr lang="en-US" sz="1600" dirty="0">
+              <a:latin typeface="Arial" panose="020B0604020202020204" pitchFamily="34" charset="0"/>
+              <a:cs typeface="Arial" panose="020B0604020202020204" pitchFamily="34" charset="0"/>
+            </a:endParaRPr>
+          </a:p>
+          <a:p>
+            <a:endParaRPr lang="en-US" dirty="0">
+              <a:latin typeface="Arial" panose="020B0604020202020204" pitchFamily="34" charset="0"/>
+              <a:cs typeface="Arial" panose="020B0604020202020204" pitchFamily="34" charset="0"/>
+            </a:endParaRPr>
+          </a:p>
+          <a:p>
+            <a:endParaRPr lang="en-US" dirty="0">
+              <a:latin typeface="Arial" panose="020B0604020202020204" pitchFamily="34" charset="0"/>
+              <a:cs typeface="Arial" panose="020B0604020202020204" pitchFamily="34" charset="0"/>
+            </a:endParaRPr>
+          </a:p>
+          <a:p>
+            <a:endParaRPr lang="en-US" dirty="0">
+              <a:latin typeface="Arial" panose="020B0604020202020204" pitchFamily="34" charset="0"/>
+              <a:cs typeface="Arial" panose="020B0604020202020204" pitchFamily="34" charset="0"/>
+            </a:endParaRPr>
+          </a:p>
+          <a:p>
+            <a:endParaRPr lang="en-US" dirty="0">
+              <a:latin typeface="Arial" panose="020B0604020202020204" pitchFamily="34" charset="0"/>
+              <a:cs typeface="Arial" panose="020B0604020202020204" pitchFamily="34" charset="0"/>
+            </a:endParaRPr>
+          </a:p>
+          <a:p>
+            <a:endParaRPr lang="en-US" dirty="0"/>
+          </a:p>
+          <a:p>
+            <a:endParaRPr lang="en-US" dirty="0"/>
+          </a:p>
+        </p:txBody>
+      </p:sp>
+      <p:pic>
+        <p:nvPicPr>
+          <p:cNvPr id="3" name="Picture 2"/>
+          <p:cNvPicPr>
+            <a:picLocks noChangeAspect="1"/>
+          </p:cNvPicPr>
+          <p:nvPr/>
+        </p:nvPicPr>
+        <p:blipFill>
+          <a:blip r:embed="rId2">
+            <a:extLst>
+              <a:ext uri="{28A0092B-C50C-407E-A947-70E740481C1C}">
+                <a14:useLocalDpi xmlns:a14="http://schemas.microsoft.com/office/drawing/2010/main" val="0"/>
+              </a:ext>
+            </a:extLst>
+          </a:blip>
+          <a:stretch>
+            <a:fillRect/>
+          </a:stretch>
+        </p:blipFill>
+        <p:spPr>
+          <a:xfrm>
+            <a:off x="3993900" y="3662519"/>
+            <a:ext cx="8073458" cy="2538535"/>
+          </a:xfrm>
+          <a:prstGeom prst="rect">
+            <a:avLst/>
+          </a:prstGeom>
+        </p:spPr>
+      </p:pic>
+    </p:spTree>
+    <p:extLst>
+      <p:ext uri="{BB962C8B-B14F-4D97-AF65-F5344CB8AC3E}">
+        <p14:creationId xmlns:p14="http://schemas.microsoft.com/office/powerpoint/2010/main" val="2469575539"/>
+      </p:ext>
+    </p:extLst>
+  </p:cSld>
+  <p:clrMapOvr>
+    <a:masterClrMapping/>
+  </p:clrMapOvr>
+  <p:timing>
+    <p:tnLst>
+      <p:par>
+        <p:cTn id="1" dur="indefinite" restart="never" nodeType="tmRoot"/>
+      </p:par>
+    </p:tnLst>
+  </p:timing>
+</p:sld>
+</file>
+
+<file path=ppt/slides/slide11.xml><?xml version="1.0" encoding="utf-8"?>
+<p:sld xmlns:a="http://schemas.openxmlformats.org/drawingml/2006/main" xmlns:r="http://schemas.openxmlformats.org/officeDocument/2006/relationships" xmlns:p="http://schemas.openxmlformats.org/presentationml/2006/main">
+  <p:cSld>
+    <p:spTree>
+      <p:nvGrpSpPr>
+        <p:cNvPr id="1" name=""/>
+        <p:cNvGrpSpPr/>
+        <p:nvPr/>
+      </p:nvGrpSpPr>
+      <p:grpSpPr>
+        <a:xfrm>
+          <a:off x="0" y="0"/>
+          <a:ext cx="0" cy="0"/>
+          <a:chOff x="0" y="0"/>
+          <a:chExt cx="0" cy="0"/>
+        </a:xfrm>
+      </p:grpSpPr>
+      <p:sp>
+        <p:nvSpPr>
+          <p:cNvPr id="2" name="Title 1"/>
+          <p:cNvSpPr>
+            <a:spLocks noGrp="1"/>
+          </p:cNvSpPr>
+          <p:nvPr>
+            <p:ph type="title"/>
+          </p:nvPr>
+        </p:nvSpPr>
+        <p:spPr/>
+        <p:txBody>
+          <a:bodyPr/>
+          <a:lstStyle/>
+          <a:p>
+            <a:pPr algn="ctr"/>
+            <a:r>
+              <a:rPr lang="en-US" dirty="0" smtClean="0">
+                <a:latin typeface="Arial" panose="020B0604020202020204" pitchFamily="34" charset="0"/>
+                <a:cs typeface="Arial" panose="020B0604020202020204" pitchFamily="34" charset="0"/>
+              </a:rPr>
+              <a:t>What is compiler?</a:t>
+            </a:r>
+            <a:endParaRPr lang="en-US" dirty="0">
+              <a:latin typeface="Arial" panose="020B0604020202020204" pitchFamily="34" charset="0"/>
+              <a:cs typeface="Arial" panose="020B0604020202020204" pitchFamily="34" charset="0"/>
+            </a:endParaRPr>
+          </a:p>
+        </p:txBody>
+      </p:sp>
+      <p:sp>
+        <p:nvSpPr>
+          <p:cNvPr id="3" name="Content Placeholder 2"/>
+          <p:cNvSpPr>
+            <a:spLocks noGrp="1"/>
+          </p:cNvSpPr>
+          <p:nvPr>
+            <p:ph idx="1"/>
+          </p:nvPr>
+        </p:nvSpPr>
+        <p:spPr>
+          <a:xfrm>
+            <a:off x="1546839" y="2603499"/>
+            <a:ext cx="8825659" cy="4021235"/>
+          </a:xfrm>
+        </p:spPr>
+        <p:txBody>
+          <a:bodyPr/>
+          <a:lstStyle/>
+          <a:p>
+            <a:r>
+              <a:rPr lang="en-US" dirty="0"/>
+              <a:t>A compiler is a special program that translates a programming language's </a:t>
+            </a:r>
+            <a:r>
+              <a:rPr lang="en-US" dirty="0" smtClean="0"/>
+              <a:t>source code into </a:t>
+            </a:r>
+            <a:r>
+              <a:rPr lang="en-US" dirty="0"/>
+              <a:t>machine code, bytecode or another programming language. The source code is typically written in a high-level, human-readable language such as </a:t>
+            </a:r>
+            <a:r>
+              <a:rPr lang="en-US" b="1" dirty="0" smtClean="0"/>
+              <a:t>C#</a:t>
+            </a:r>
+            <a:r>
+              <a:rPr lang="en-US" dirty="0" smtClean="0"/>
+              <a:t>, </a:t>
+            </a:r>
+            <a:r>
+              <a:rPr lang="en-US" b="1" dirty="0" smtClean="0"/>
+              <a:t>Java, C++, etc</a:t>
+            </a:r>
+            <a:r>
+              <a:rPr lang="en-US" dirty="0" smtClean="0"/>
+              <a:t>.</a:t>
+            </a:r>
+            <a:endParaRPr lang="en-US" dirty="0"/>
+          </a:p>
+        </p:txBody>
+      </p:sp>
+      <p:pic>
+        <p:nvPicPr>
+          <p:cNvPr id="5" name="Picture 4"/>
+          <p:cNvPicPr>
+            <a:picLocks noChangeAspect="1"/>
+          </p:cNvPicPr>
+          <p:nvPr/>
+        </p:nvPicPr>
+        <p:blipFill>
+          <a:blip r:embed="rId2">
+            <a:extLst>
+              <a:ext uri="{28A0092B-C50C-407E-A947-70E740481C1C}">
+                <a14:useLocalDpi xmlns:a14="http://schemas.microsoft.com/office/drawing/2010/main" val="0"/>
+              </a:ext>
+            </a:extLst>
+          </a:blip>
+          <a:stretch>
+            <a:fillRect/>
+          </a:stretch>
+        </p:blipFill>
+        <p:spPr>
+          <a:xfrm>
+            <a:off x="1905842" y="3948209"/>
+            <a:ext cx="8010525" cy="2676525"/>
+          </a:xfrm>
+          <a:prstGeom prst="rect">
+            <a:avLst/>
+          </a:prstGeom>
+        </p:spPr>
+      </p:pic>
+    </p:spTree>
+    <p:extLst>
+      <p:ext uri="{BB962C8B-B14F-4D97-AF65-F5344CB8AC3E}">
+        <p14:creationId xmlns:p14="http://schemas.microsoft.com/office/powerpoint/2010/main" val="525679394"/>
+      </p:ext>
+    </p:extLst>
+  </p:cSld>
+  <p:clrMapOvr>
+    <a:masterClrMapping/>
+  </p:clrMapOvr>
+  <p:timing>
+    <p:tnLst>
+      <p:par>
+        <p:cTn id="1" dur="indefinite" restart="never" nodeType="tmRoot"/>
+      </p:par>
+    </p:tnLst>
+  </p:timing>
+</p:sld>
+</file>
+
 <file path=ppt/slides/slide2.xml><?xml version="1.0" encoding="utf-8"?>
 <p:sld xmlns:a="http://schemas.openxmlformats.org/drawingml/2006/main" xmlns:r="http://schemas.openxmlformats.org/officeDocument/2006/relationships" xmlns:p="http://schemas.openxmlformats.org/presentationml/2006/main">
   <p:cSld>
@@ -13415,10 +13908,23 @@
           <a:lstStyle/>
           <a:p>
             <a:r>
-              <a:rPr lang="en-US" dirty="0" smtClean="0"/>
-              <a:t>Introduction to C#</a:t>
-            </a:r>
-            <a:endParaRPr lang="en-US" dirty="0"/>
+              <a:rPr lang="en-US" dirty="0" smtClean="0">
+                <a:latin typeface="Arial" panose="020B0604020202020204" pitchFamily="34" charset="0"/>
+                <a:cs typeface="Arial" panose="020B0604020202020204" pitchFamily="34" charset="0"/>
+              </a:rPr>
+              <a:t>Introduction to C</a:t>
+            </a:r>
+            <a:r>
+              <a:rPr lang="en-US" dirty="0" smtClean="0">
+                <a:latin typeface="Arial" panose="020B0604020202020204" pitchFamily="34" charset="0"/>
+                <a:cs typeface="Arial" panose="020B0604020202020204" pitchFamily="34" charset="0"/>
+              </a:rPr>
+              <a:t># and .NET</a:t>
+            </a:r>
+            <a:endParaRPr lang="en-US" dirty="0">
+              <a:latin typeface="Arial" panose="020B0604020202020204" pitchFamily="34" charset="0"/>
+              <a:cs typeface="Arial" panose="020B0604020202020204" pitchFamily="34" charset="0"/>
+            </a:endParaRPr>
           </a:p>
         </p:txBody>
       </p:sp>
@@ -13550,31 +14056,39 @@
                 <a:latin typeface="Arial" panose="020B0604020202020204" pitchFamily="34" charset="0"/>
                 <a:cs typeface="Arial" panose="020B0604020202020204" pitchFamily="34" charset="0"/>
               </a:rPr>
-              <a:t>C# is used on .NET platform</a:t>
-            </a:r>
-          </a:p>
-          <a:p>
+              <a:t>C# is used on .NET </a:t>
+            </a:r>
             <a:r>
               <a:rPr lang="en-US" sz="2000" dirty="0" smtClean="0">
                 <a:latin typeface="Arial" panose="020B0604020202020204" pitchFamily="34" charset="0"/>
                 <a:cs typeface="Arial" panose="020B0604020202020204" pitchFamily="34" charset="0"/>
               </a:rPr>
-              <a:t>C# can be used for writing of Console, Desktop, Widows Services, Web </a:t>
-            </a:r>
+              <a:t>platform /.NET 6 is the latest version/</a:t>
+            </a:r>
+            <a:endParaRPr lang="en-US" sz="2000" dirty="0" smtClean="0">
+              <a:latin typeface="Arial" panose="020B0604020202020204" pitchFamily="34" charset="0"/>
+              <a:cs typeface="Arial" panose="020B0604020202020204" pitchFamily="34" charset="0"/>
+            </a:endParaRPr>
+          </a:p>
+          <a:p>
             <a:r>
               <a:rPr lang="en-US" sz="2000" dirty="0" smtClean="0">
                 <a:latin typeface="Arial" panose="020B0604020202020204" pitchFamily="34" charset="0"/>
                 <a:cs typeface="Arial" panose="020B0604020202020204" pitchFamily="34" charset="0"/>
               </a:rPr>
-              <a:t>apps, Mobile apps, Games </a:t>
+              <a:t>C# can be used for writing of Console, Desktop, Widows Services, Web apps, Mobile apps, </a:t>
             </a:r>
             <a:r>
               <a:rPr lang="en-US" sz="2000" dirty="0" smtClean="0">
                 <a:latin typeface="Arial" panose="020B0604020202020204" pitchFamily="34" charset="0"/>
                 <a:cs typeface="Arial" panose="020B0604020202020204" pitchFamily="34" charset="0"/>
               </a:rPr>
-              <a:t>and much more.</a:t>
-            </a:r>
+              <a:t>Games and many more.</a:t>
+            </a:r>
+            <a:endParaRPr lang="en-US" sz="2000" dirty="0" smtClean="0">
+              <a:latin typeface="Arial" panose="020B0604020202020204" pitchFamily="34" charset="0"/>
+              <a:cs typeface="Arial" panose="020B0604020202020204" pitchFamily="34" charset="0"/>
+            </a:endParaRPr>
           </a:p>
           <a:p>
             <a:r>
@@ -13826,6 +14340,8 @@
                 <a:solidFill>
                   <a:schemeClr val="bg1"/>
                 </a:solidFill>
+                <a:latin typeface="Arial" panose="020B0604020202020204" pitchFamily="34" charset="0"/>
+                <a:cs typeface="Arial" panose="020B0604020202020204" pitchFamily="34" charset="0"/>
               </a:rPr>
               <a:t>Danish software engineer who co-designed several programming languages and development tools. He is the original author of </a:t>
             </a:r>
@@ -13834,6 +14350,8 @@
                 <a:solidFill>
                   <a:srgbClr val="FFFF00"/>
                 </a:solidFill>
+                <a:latin typeface="Arial" panose="020B0604020202020204" pitchFamily="34" charset="0"/>
+                <a:cs typeface="Arial" panose="020B0604020202020204" pitchFamily="34" charset="0"/>
               </a:rPr>
               <a:t>Turbo Pascal</a:t>
             </a:r>
@@ -13842,6 +14360,8 @@
                 <a:solidFill>
                   <a:schemeClr val="bg1"/>
                 </a:solidFill>
+                <a:latin typeface="Arial" panose="020B0604020202020204" pitchFamily="34" charset="0"/>
+                <a:cs typeface="Arial" panose="020B0604020202020204" pitchFamily="34" charset="0"/>
               </a:rPr>
               <a:t> and co-chief of </a:t>
             </a:r>
@@ -13850,6 +14370,8 @@
                 <a:solidFill>
                   <a:srgbClr val="FFFF00"/>
                 </a:solidFill>
+                <a:latin typeface="Arial" panose="020B0604020202020204" pitchFamily="34" charset="0"/>
+                <a:cs typeface="Arial" panose="020B0604020202020204" pitchFamily="34" charset="0"/>
               </a:rPr>
               <a:t>Delphi</a:t>
             </a:r>
@@ -13858,6 +14380,8 @@
                 <a:solidFill>
                   <a:schemeClr val="bg1"/>
                 </a:solidFill>
+                <a:latin typeface="Arial" panose="020B0604020202020204" pitchFamily="34" charset="0"/>
+                <a:cs typeface="Arial" panose="020B0604020202020204" pitchFamily="34" charset="0"/>
               </a:rPr>
               <a:t>. Currently works in Microsoft as a lead architect and core developer of </a:t>
             </a:r>
@@ -13866,6 +14390,8 @@
                 <a:solidFill>
                   <a:srgbClr val="FFFF00"/>
                 </a:solidFill>
+                <a:latin typeface="Arial" panose="020B0604020202020204" pitchFamily="34" charset="0"/>
+                <a:cs typeface="Arial" panose="020B0604020202020204" pitchFamily="34" charset="0"/>
               </a:rPr>
               <a:t>TypeScript</a:t>
             </a:r>
@@ -13874,6 +14400,8 @@
                 <a:solidFill>
                   <a:schemeClr val="bg1"/>
                 </a:solidFill>
+                <a:latin typeface="Arial" panose="020B0604020202020204" pitchFamily="34" charset="0"/>
+                <a:cs typeface="Arial" panose="020B0604020202020204" pitchFamily="34" charset="0"/>
               </a:rPr>
               <a:t>.</a:t>
             </a:r>
@@ -13881,6 +14409,8 @@
               <a:solidFill>
                 <a:schemeClr val="bg1"/>
               </a:solidFill>
+              <a:latin typeface="Arial" panose="020B0604020202020204" pitchFamily="34" charset="0"/>
+              <a:cs typeface="Arial" panose="020B0604020202020204" pitchFamily="34" charset="0"/>
             </a:endParaRPr>
           </a:p>
         </p:txBody>
@@ -13944,10 +14474,16 @@
           <a:p>
             <a:pPr algn="ctr"/>
             <a:r>
-              <a:rPr lang="en-US" dirty="0" smtClean="0"/>
+              <a:rPr lang="en-US" dirty="0" smtClean="0">
+                <a:latin typeface="Arial" panose="020B0604020202020204" pitchFamily="34" charset="0"/>
+                <a:cs typeface="Arial" panose="020B0604020202020204" pitchFamily="34" charset="0"/>
+              </a:rPr>
               <a:t>C# is object oriented programming language</a:t>
             </a:r>
-            <a:endParaRPr lang="en-US" dirty="0"/>
+            <a:endParaRPr lang="en-US" dirty="0">
+              <a:latin typeface="Arial" panose="020B0604020202020204" pitchFamily="34" charset="0"/>
+              <a:cs typeface="Arial" panose="020B0604020202020204" pitchFamily="34" charset="0"/>
+            </a:endParaRPr>
           </a:p>
         </p:txBody>
       </p:sp>
@@ -13990,6 +14526,13 @@
   <p:clrMapOvr>
     <a:masterClrMapping/>
   </p:clrMapOvr>
+  <p:timing>
+    <p:tnLst>
+      <p:par>
+        <p:cTn id="1" dur="indefinite" restart="never" nodeType="tmRoot"/>
+      </p:par>
+    </p:tnLst>
+  </p:timing>
 </p:sld>
 </file>
 
@@ -14027,16 +14570,381 @@
           <a:p>
             <a:pPr algn="ctr"/>
             <a:r>
-              <a:rPr lang="en-US" dirty="0" smtClean="0"/>
-              <a:t>.NET platform /whole new world/</a:t>
-            </a:r>
+              <a:rPr lang="en-US" dirty="0" smtClean="0">
+                <a:latin typeface="Arial" panose="020B0604020202020204" pitchFamily="34" charset="0"/>
+                <a:cs typeface="Arial" panose="020B0604020202020204" pitchFamily="34" charset="0"/>
+              </a:rPr>
+              <a:t>What is .NET?</a:t>
+            </a:r>
+            <a:endParaRPr lang="en-US" dirty="0">
+              <a:latin typeface="Arial" panose="020B0604020202020204" pitchFamily="34" charset="0"/>
+              <a:cs typeface="Arial" panose="020B0604020202020204" pitchFamily="34" charset="0"/>
+            </a:endParaRPr>
+          </a:p>
+        </p:txBody>
+      </p:sp>
+      <p:sp>
+        <p:nvSpPr>
+          <p:cNvPr id="3" name="Content Placeholder 2"/>
+          <p:cNvSpPr>
+            <a:spLocks noGrp="1"/>
+          </p:cNvSpPr>
+          <p:nvPr>
+            <p:ph idx="1"/>
+          </p:nvPr>
+        </p:nvSpPr>
+        <p:spPr>
+          <a:xfrm>
+            <a:off x="1154954" y="2603500"/>
+            <a:ext cx="9575250" cy="2456025"/>
+          </a:xfrm>
+        </p:spPr>
+        <p:txBody>
+          <a:bodyPr>
+            <a:normAutofit/>
+          </a:bodyPr>
+          <a:lstStyle/>
+          <a:p>
+            <a:r>
+              <a:rPr lang="en-US" sz="2000" b="1" dirty="0">
+                <a:latin typeface="Arial" panose="020B0604020202020204" pitchFamily="34" charset="0"/>
+                <a:cs typeface="Arial" panose="020B0604020202020204" pitchFamily="34" charset="0"/>
+              </a:rPr>
+              <a:t>.NET </a:t>
+            </a:r>
+            <a:r>
+              <a:rPr lang="en-US" sz="2000" dirty="0">
+                <a:latin typeface="Arial" panose="020B0604020202020204" pitchFamily="34" charset="0"/>
+                <a:cs typeface="Arial" panose="020B0604020202020204" pitchFamily="34" charset="0"/>
+              </a:rPr>
+              <a:t>is a free, cross-platform, open source developer platform for building many different types of applications</a:t>
+            </a:r>
+            <a:r>
+              <a:rPr lang="en-US" sz="2000" dirty="0" smtClean="0">
+                <a:latin typeface="Arial" panose="020B0604020202020204" pitchFamily="34" charset="0"/>
+                <a:cs typeface="Arial" panose="020B0604020202020204" pitchFamily="34" charset="0"/>
+              </a:rPr>
+              <a:t>.</a:t>
+            </a:r>
+          </a:p>
+          <a:p>
+            <a:r>
+              <a:rPr lang="en-US" sz="2000" dirty="0">
+                <a:latin typeface="Arial" panose="020B0604020202020204" pitchFamily="34" charset="0"/>
+                <a:cs typeface="Arial" panose="020B0604020202020204" pitchFamily="34" charset="0"/>
+              </a:rPr>
+              <a:t>With </a:t>
+            </a:r>
+            <a:r>
+              <a:rPr lang="en-US" sz="2000" b="1" dirty="0">
+                <a:latin typeface="Arial" panose="020B0604020202020204" pitchFamily="34" charset="0"/>
+                <a:cs typeface="Arial" panose="020B0604020202020204" pitchFamily="34" charset="0"/>
+              </a:rPr>
+              <a:t>.NET</a:t>
+            </a:r>
+            <a:r>
+              <a:rPr lang="en-US" sz="2000" dirty="0">
+                <a:latin typeface="Arial" panose="020B0604020202020204" pitchFamily="34" charset="0"/>
+                <a:cs typeface="Arial" panose="020B0604020202020204" pitchFamily="34" charset="0"/>
+              </a:rPr>
+              <a:t>, you can use multiple languages, editors, and libraries to build for web, mobile, desktop, games, and </a:t>
+            </a:r>
+            <a:r>
+              <a:rPr lang="en-US" sz="2000" dirty="0" err="1">
+                <a:latin typeface="Arial" panose="020B0604020202020204" pitchFamily="34" charset="0"/>
+                <a:cs typeface="Arial" panose="020B0604020202020204" pitchFamily="34" charset="0"/>
+              </a:rPr>
+              <a:t>IoT</a:t>
+            </a:r>
+            <a:r>
+              <a:rPr lang="en-US" sz="2000" dirty="0" smtClean="0">
+                <a:latin typeface="Arial" panose="020B0604020202020204" pitchFamily="34" charset="0"/>
+                <a:cs typeface="Arial" panose="020B0604020202020204" pitchFamily="34" charset="0"/>
+              </a:rPr>
+              <a:t>.</a:t>
+            </a:r>
+          </a:p>
+          <a:p>
+            <a:r>
+              <a:rPr lang="en-US" sz="2000" dirty="0">
+                <a:latin typeface="Arial" panose="020B0604020202020204" pitchFamily="34" charset="0"/>
+                <a:cs typeface="Arial" panose="020B0604020202020204" pitchFamily="34" charset="0"/>
+              </a:rPr>
+              <a:t>The two main components of .</a:t>
+            </a:r>
+            <a:r>
+              <a:rPr lang="en-US" sz="2000" b="1" dirty="0">
+                <a:latin typeface="Arial" panose="020B0604020202020204" pitchFamily="34" charset="0"/>
+                <a:cs typeface="Arial" panose="020B0604020202020204" pitchFamily="34" charset="0"/>
+              </a:rPr>
+              <a:t>NET</a:t>
+            </a:r>
+            <a:r>
+              <a:rPr lang="en-US" sz="2000" dirty="0">
+                <a:latin typeface="Arial" panose="020B0604020202020204" pitchFamily="34" charset="0"/>
+                <a:cs typeface="Arial" panose="020B0604020202020204" pitchFamily="34" charset="0"/>
+              </a:rPr>
+              <a:t> are </a:t>
+            </a:r>
+            <a:r>
+              <a:rPr lang="en-US" sz="2000" b="1" dirty="0" err="1">
+                <a:latin typeface="Arial" panose="020B0604020202020204" pitchFamily="34" charset="0"/>
+                <a:cs typeface="Arial" panose="020B0604020202020204" pitchFamily="34" charset="0"/>
+              </a:rPr>
+              <a:t>CoreCLR</a:t>
+            </a:r>
+            <a:r>
+              <a:rPr lang="en-US" sz="2000" dirty="0">
+                <a:latin typeface="Arial" panose="020B0604020202020204" pitchFamily="34" charset="0"/>
+                <a:cs typeface="Arial" panose="020B0604020202020204" pitchFamily="34" charset="0"/>
+              </a:rPr>
+              <a:t> and </a:t>
+            </a:r>
+            <a:r>
+              <a:rPr lang="en-US" sz="2000" b="1" dirty="0" err="1" smtClean="0">
+                <a:latin typeface="Arial" panose="020B0604020202020204" pitchFamily="34" charset="0"/>
+                <a:cs typeface="Arial" panose="020B0604020202020204" pitchFamily="34" charset="0"/>
+              </a:rPr>
+              <a:t>CoreFX</a:t>
+            </a:r>
+            <a:endParaRPr lang="en-US" sz="2000" dirty="0" smtClean="0">
+              <a:latin typeface="Arial" panose="020B0604020202020204" pitchFamily="34" charset="0"/>
+              <a:cs typeface="Arial" panose="020B0604020202020204" pitchFamily="34" charset="0"/>
+            </a:endParaRPr>
+          </a:p>
+          <a:p>
+            <a:r>
+              <a:rPr lang="en-US" sz="2000" dirty="0" smtClean="0">
+                <a:latin typeface="Arial" panose="020B0604020202020204" pitchFamily="34" charset="0"/>
+                <a:cs typeface="Arial" panose="020B0604020202020204" pitchFamily="34" charset="0"/>
+              </a:rPr>
+              <a:t>You can write on </a:t>
+            </a:r>
+            <a:r>
+              <a:rPr lang="en-US" sz="2000" b="1" dirty="0" smtClean="0">
+                <a:latin typeface="Arial" panose="020B0604020202020204" pitchFamily="34" charset="0"/>
+                <a:cs typeface="Arial" panose="020B0604020202020204" pitchFamily="34" charset="0"/>
+              </a:rPr>
+              <a:t>C#</a:t>
+            </a:r>
+            <a:r>
+              <a:rPr lang="en-US" sz="2000" dirty="0" smtClean="0">
+                <a:latin typeface="Arial" panose="020B0604020202020204" pitchFamily="34" charset="0"/>
+                <a:cs typeface="Arial" panose="020B0604020202020204" pitchFamily="34" charset="0"/>
+              </a:rPr>
+              <a:t>, </a:t>
+            </a:r>
+            <a:r>
+              <a:rPr lang="en-US" sz="2000" b="1" dirty="0" smtClean="0">
+                <a:latin typeface="Arial" panose="020B0604020202020204" pitchFamily="34" charset="0"/>
+                <a:cs typeface="Arial" panose="020B0604020202020204" pitchFamily="34" charset="0"/>
+              </a:rPr>
+              <a:t>F#</a:t>
+            </a:r>
+            <a:r>
+              <a:rPr lang="en-US" sz="2000" dirty="0" smtClean="0">
+                <a:latin typeface="Arial" panose="020B0604020202020204" pitchFamily="34" charset="0"/>
+                <a:cs typeface="Arial" panose="020B0604020202020204" pitchFamily="34" charset="0"/>
+              </a:rPr>
+              <a:t>, </a:t>
+            </a:r>
+            <a:r>
+              <a:rPr lang="en-US" sz="2000" b="1" dirty="0" smtClean="0">
+                <a:latin typeface="Arial" panose="020B0604020202020204" pitchFamily="34" charset="0"/>
+                <a:cs typeface="Arial" panose="020B0604020202020204" pitchFamily="34" charset="0"/>
+              </a:rPr>
+              <a:t>Visual Basic </a:t>
+            </a:r>
+            <a:r>
+              <a:rPr lang="en-US" sz="2000" dirty="0" smtClean="0">
+                <a:latin typeface="Arial" panose="020B0604020202020204" pitchFamily="34" charset="0"/>
+                <a:cs typeface="Arial" panose="020B0604020202020204" pitchFamily="34" charset="0"/>
+              </a:rPr>
+              <a:t>and other programming languages.</a:t>
+            </a:r>
+          </a:p>
+          <a:p>
+            <a:endParaRPr lang="en-US" dirty="0" smtClean="0"/>
+          </a:p>
+          <a:p>
             <a:endParaRPr lang="en-US" dirty="0"/>
           </a:p>
         </p:txBody>
       </p:sp>
       <p:pic>
         <p:nvPicPr>
-          <p:cNvPr id="4" name="Content Placeholder 3"/>
+          <p:cNvPr id="5" name="Picture 4"/>
+          <p:cNvPicPr>
+            <a:picLocks noChangeAspect="1"/>
+          </p:cNvPicPr>
+          <p:nvPr/>
+        </p:nvPicPr>
+        <p:blipFill>
+          <a:blip r:embed="rId2" cstate="print">
+            <a:extLst>
+              <a:ext uri="{28A0092B-C50C-407E-A947-70E740481C1C}">
+                <a14:useLocalDpi xmlns:a14="http://schemas.microsoft.com/office/drawing/2010/main" val="0"/>
+              </a:ext>
+            </a:extLst>
+          </a:blip>
+          <a:stretch>
+            <a:fillRect/>
+          </a:stretch>
+        </p:blipFill>
+        <p:spPr>
+          <a:xfrm>
+            <a:off x="3485472" y="5116979"/>
+            <a:ext cx="1464128" cy="1464128"/>
+          </a:xfrm>
+          <a:prstGeom prst="rect">
+            <a:avLst/>
+          </a:prstGeom>
+        </p:spPr>
+      </p:pic>
+      <p:pic>
+        <p:nvPicPr>
+          <p:cNvPr id="6" name="Picture 5"/>
+          <p:cNvPicPr>
+            <a:picLocks noChangeAspect="1"/>
+          </p:cNvPicPr>
+          <p:nvPr/>
+        </p:nvPicPr>
+        <p:blipFill>
+          <a:blip r:embed="rId3">
+            <a:extLst>
+              <a:ext uri="{28A0092B-C50C-407E-A947-70E740481C1C}">
+                <a14:useLocalDpi xmlns:a14="http://schemas.microsoft.com/office/drawing/2010/main" val="0"/>
+              </a:ext>
+            </a:extLst>
+          </a:blip>
+          <a:stretch>
+            <a:fillRect/>
+          </a:stretch>
+        </p:blipFill>
+        <p:spPr>
+          <a:xfrm>
+            <a:off x="7047435" y="5287885"/>
+            <a:ext cx="1056202" cy="1056202"/>
+          </a:xfrm>
+          <a:prstGeom prst="rect">
+            <a:avLst/>
+          </a:prstGeom>
+        </p:spPr>
+      </p:pic>
+      <p:pic>
+        <p:nvPicPr>
+          <p:cNvPr id="7" name="Picture 6"/>
+          <p:cNvPicPr>
+            <a:picLocks noChangeAspect="1"/>
+          </p:cNvPicPr>
+          <p:nvPr/>
+        </p:nvPicPr>
+        <p:blipFill>
+          <a:blip r:embed="rId4">
+            <a:extLst>
+              <a:ext uri="{28A0092B-C50C-407E-A947-70E740481C1C}">
+                <a14:useLocalDpi xmlns:a14="http://schemas.microsoft.com/office/drawing/2010/main" val="0"/>
+              </a:ext>
+            </a:extLst>
+          </a:blip>
+          <a:stretch>
+            <a:fillRect/>
+          </a:stretch>
+        </p:blipFill>
+        <p:spPr>
+          <a:xfrm>
+            <a:off x="5324721" y="5296544"/>
+            <a:ext cx="1104997" cy="1104997"/>
+          </a:xfrm>
+          <a:prstGeom prst="rect">
+            <a:avLst/>
+          </a:prstGeom>
+        </p:spPr>
+      </p:pic>
+    </p:spTree>
+    <p:extLst>
+      <p:ext uri="{BB962C8B-B14F-4D97-AF65-F5344CB8AC3E}">
+        <p14:creationId xmlns:p14="http://schemas.microsoft.com/office/powerpoint/2010/main" val="1242203891"/>
+      </p:ext>
+    </p:extLst>
+  </p:cSld>
+  <p:clrMapOvr>
+    <a:masterClrMapping/>
+  </p:clrMapOvr>
+  <p:timing>
+    <p:tnLst>
+      <p:par>
+        <p:cTn id="1" dur="indefinite" restart="never" nodeType="tmRoot"/>
+      </p:par>
+    </p:tnLst>
+  </p:timing>
+</p:sld>
+</file>
+
+<file path=ppt/slides/slide6.xml><?xml version="1.0" encoding="utf-8"?>
+<p:sld xmlns:a="http://schemas.openxmlformats.org/drawingml/2006/main" xmlns:r="http://schemas.openxmlformats.org/officeDocument/2006/relationships" xmlns:p="http://schemas.openxmlformats.org/presentationml/2006/main">
+  <p:cSld>
+    <p:spTree>
+      <p:nvGrpSpPr>
+        <p:cNvPr id="1" name=""/>
+        <p:cNvGrpSpPr/>
+        <p:nvPr/>
+      </p:nvGrpSpPr>
+      <p:grpSpPr>
+        <a:xfrm>
+          <a:off x="0" y="0"/>
+          <a:ext cx="0" cy="0"/>
+          <a:chOff x="0" y="0"/>
+          <a:chExt cx="0" cy="0"/>
+        </a:xfrm>
+      </p:grpSpPr>
+      <p:sp>
+        <p:nvSpPr>
+          <p:cNvPr id="2" name="Title 1"/>
+          <p:cNvSpPr>
+            <a:spLocks noGrp="1"/>
+          </p:cNvSpPr>
+          <p:nvPr>
+            <p:ph type="title"/>
+          </p:nvPr>
+        </p:nvSpPr>
+        <p:spPr/>
+        <p:txBody>
+          <a:bodyPr/>
+          <a:lstStyle/>
+          <a:p>
+            <a:pPr algn="ctr"/>
+            <a:r>
+              <a:rPr lang="en-US" dirty="0" smtClean="0">
+                <a:latin typeface="Arial" panose="020B0604020202020204" pitchFamily="34" charset="0"/>
+                <a:cs typeface="Arial" panose="020B0604020202020204" pitchFamily="34" charset="0"/>
+              </a:rPr>
+              <a:t>.NET platform </a:t>
+            </a:r>
+            <a:r>
+              <a:rPr lang="en-US" dirty="0" smtClean="0">
+                <a:latin typeface="Arial" panose="020B0604020202020204" pitchFamily="34" charset="0"/>
+                <a:cs typeface="Arial" panose="020B0604020202020204" pitchFamily="34" charset="0"/>
+              </a:rPr>
+              <a:t>/whole </a:t>
+            </a:r>
+            <a:r>
+              <a:rPr lang="en-US" dirty="0" smtClean="0">
+                <a:latin typeface="Arial" panose="020B0604020202020204" pitchFamily="34" charset="0"/>
+                <a:cs typeface="Arial" panose="020B0604020202020204" pitchFamily="34" charset="0"/>
+              </a:rPr>
+              <a:t>new world/</a:t>
+            </a:r>
+            <a:endParaRPr lang="en-US" dirty="0">
+              <a:latin typeface="Arial" panose="020B0604020202020204" pitchFamily="34" charset="0"/>
+              <a:cs typeface="Arial" panose="020B0604020202020204" pitchFamily="34" charset="0"/>
+            </a:endParaRPr>
+          </a:p>
+        </p:txBody>
+      </p:sp>
+      <p:pic>
+        <p:nvPicPr>
+          <p:cNvPr id="5" name="Content Placeholder 4"/>
           <p:cNvPicPr>
             <a:picLocks noGrp="1" noChangeAspect="1"/>
           </p:cNvPicPr>
@@ -14058,8 +14966,8 @@
         </p:blipFill>
         <p:spPr>
           <a:xfrm>
-            <a:off x="1997526" y="2323581"/>
-            <a:ext cx="7918841" cy="4454348"/>
+            <a:off x="1081055" y="2539452"/>
+            <a:ext cx="10107301" cy="3674736"/>
           </a:xfrm>
         </p:spPr>
       </p:pic>
@@ -14073,6 +14981,389 @@
   <p:clrMapOvr>
     <a:masterClrMapping/>
   </p:clrMapOvr>
+  <p:timing>
+    <p:tnLst>
+      <p:par>
+        <p:cTn id="1" dur="indefinite" restart="never" nodeType="tmRoot"/>
+      </p:par>
+    </p:tnLst>
+  </p:timing>
+</p:sld>
+</file>
+
+<file path=ppt/slides/slide7.xml><?xml version="1.0" encoding="utf-8"?>
+<p:sld xmlns:a="http://schemas.openxmlformats.org/drawingml/2006/main" xmlns:r="http://schemas.openxmlformats.org/officeDocument/2006/relationships" xmlns:p="http://schemas.openxmlformats.org/presentationml/2006/main">
+  <p:cSld>
+    <p:spTree>
+      <p:nvGrpSpPr>
+        <p:cNvPr id="1" name=""/>
+        <p:cNvGrpSpPr/>
+        <p:nvPr/>
+      </p:nvGrpSpPr>
+      <p:grpSpPr>
+        <a:xfrm>
+          <a:off x="0" y="0"/>
+          <a:ext cx="0" cy="0"/>
+          <a:chOff x="0" y="0"/>
+          <a:chExt cx="0" cy="0"/>
+        </a:xfrm>
+      </p:grpSpPr>
+      <p:sp>
+        <p:nvSpPr>
+          <p:cNvPr id="2" name="Title 1"/>
+          <p:cNvSpPr>
+            <a:spLocks noGrp="1"/>
+          </p:cNvSpPr>
+          <p:nvPr>
+            <p:ph type="title"/>
+          </p:nvPr>
+        </p:nvSpPr>
+        <p:spPr/>
+        <p:txBody>
+          <a:bodyPr/>
+          <a:lstStyle/>
+          <a:p>
+            <a:pPr algn="ctr"/>
+            <a:r>
+              <a:rPr lang="en-US" dirty="0" smtClean="0">
+                <a:latin typeface="Arial" panose="020B0604020202020204" pitchFamily="34" charset="0"/>
+                <a:cs typeface="Arial" panose="020B0604020202020204" pitchFamily="34" charset="0"/>
+              </a:rPr>
+              <a:t>.NET ecosystem</a:t>
+            </a:r>
+            <a:endParaRPr lang="en-US" dirty="0">
+              <a:latin typeface="Arial" panose="020B0604020202020204" pitchFamily="34" charset="0"/>
+              <a:cs typeface="Arial" panose="020B0604020202020204" pitchFamily="34" charset="0"/>
+            </a:endParaRPr>
+          </a:p>
+        </p:txBody>
+      </p:sp>
+      <p:pic>
+        <p:nvPicPr>
+          <p:cNvPr id="13" name="Content Placeholder 12"/>
+          <p:cNvPicPr>
+            <a:picLocks noGrp="1" noChangeAspect="1"/>
+          </p:cNvPicPr>
+          <p:nvPr>
+            <p:ph sz="half" idx="2"/>
+          </p:nvPr>
+        </p:nvPicPr>
+        <p:blipFill>
+          <a:blip r:embed="rId2">
+            <a:extLst>
+              <a:ext uri="{28A0092B-C50C-407E-A947-70E740481C1C}">
+                <a14:useLocalDpi xmlns:a14="http://schemas.microsoft.com/office/drawing/2010/main" val="0"/>
+              </a:ext>
+            </a:extLst>
+          </a:blip>
+          <a:stretch>
+            <a:fillRect/>
+          </a:stretch>
+        </p:blipFill>
+        <p:spPr>
+          <a:xfrm>
+            <a:off x="1370303" y="2325996"/>
+            <a:ext cx="9117304" cy="4308069"/>
+          </a:xfrm>
+          <a:prstGeom prst="roundRect">
+            <a:avLst>
+              <a:gd name="adj" fmla="val 16667"/>
+            </a:avLst>
+          </a:prstGeom>
+          <a:ln>
+            <a:noFill/>
+          </a:ln>
+          <a:effectLst>
+            <a:outerShdw blurRad="152400" dist="12000" dir="900000" sy="98000" kx="110000" ky="200000" algn="tl" rotWithShape="0">
+              <a:srgbClr val="000000">
+                <a:alpha val="30000"/>
+              </a:srgbClr>
+            </a:outerShdw>
+          </a:effectLst>
+          <a:scene3d>
+            <a:camera prst="perspectiveRelaxed">
+              <a:rot lat="19800000" lon="1200000" rev="20820000"/>
+            </a:camera>
+            <a:lightRig rig="threePt" dir="t"/>
+          </a:scene3d>
+          <a:sp3d contourW="6350" prstMaterial="matte">
+            <a:bevelT w="101600" h="101600"/>
+            <a:contourClr>
+              <a:srgbClr val="969696"/>
+            </a:contourClr>
+          </a:sp3d>
+        </p:spPr>
+      </p:pic>
+    </p:spTree>
+    <p:extLst>
+      <p:ext uri="{BB962C8B-B14F-4D97-AF65-F5344CB8AC3E}">
+        <p14:creationId xmlns:p14="http://schemas.microsoft.com/office/powerpoint/2010/main" val="2571713889"/>
+      </p:ext>
+    </p:extLst>
+  </p:cSld>
+  <p:clrMapOvr>
+    <a:masterClrMapping/>
+  </p:clrMapOvr>
+  <p:timing>
+    <p:tnLst>
+      <p:par>
+        <p:cTn id="1" dur="indefinite" restart="never" nodeType="tmRoot"/>
+      </p:par>
+    </p:tnLst>
+  </p:timing>
+</p:sld>
+</file>
+
+<file path=ppt/slides/slide8.xml><?xml version="1.0" encoding="utf-8"?>
+<p:sld xmlns:a="http://schemas.openxmlformats.org/drawingml/2006/main" xmlns:r="http://schemas.openxmlformats.org/officeDocument/2006/relationships" xmlns:p="http://schemas.openxmlformats.org/presentationml/2006/main">
+  <p:cSld>
+    <p:spTree>
+      <p:nvGrpSpPr>
+        <p:cNvPr id="1" name=""/>
+        <p:cNvGrpSpPr/>
+        <p:nvPr/>
+      </p:nvGrpSpPr>
+      <p:grpSpPr>
+        <a:xfrm>
+          <a:off x="0" y="0"/>
+          <a:ext cx="0" cy="0"/>
+          <a:chOff x="0" y="0"/>
+          <a:chExt cx="0" cy="0"/>
+        </a:xfrm>
+      </p:grpSpPr>
+      <p:sp>
+        <p:nvSpPr>
+          <p:cNvPr id="2" name="Title 1"/>
+          <p:cNvSpPr>
+            <a:spLocks noGrp="1"/>
+          </p:cNvSpPr>
+          <p:nvPr>
+            <p:ph type="title"/>
+          </p:nvPr>
+        </p:nvSpPr>
+        <p:spPr/>
+        <p:txBody>
+          <a:bodyPr/>
+          <a:lstStyle/>
+          <a:p>
+            <a:pPr algn="ctr"/>
+            <a:r>
+              <a:rPr lang="en-US" dirty="0" smtClean="0">
+                <a:latin typeface="Arial" panose="020B0604020202020204" pitchFamily="34" charset="0"/>
+                <a:cs typeface="Arial" panose="020B0604020202020204" pitchFamily="34" charset="0"/>
+              </a:rPr>
+              <a:t>.NET = The Ecosystem</a:t>
+            </a:r>
+            <a:endParaRPr lang="en-US" dirty="0">
+              <a:latin typeface="Arial" panose="020B0604020202020204" pitchFamily="34" charset="0"/>
+              <a:cs typeface="Arial" panose="020B0604020202020204" pitchFamily="34" charset="0"/>
+            </a:endParaRPr>
+          </a:p>
+        </p:txBody>
+      </p:sp>
+      <p:sp>
+        <p:nvSpPr>
+          <p:cNvPr id="3" name="Content Placeholder 2"/>
+          <p:cNvSpPr>
+            <a:spLocks noGrp="1"/>
+          </p:cNvSpPr>
+          <p:nvPr>
+            <p:ph idx="1"/>
+          </p:nvPr>
+        </p:nvSpPr>
+        <p:spPr>
+          <a:xfrm>
+            <a:off x="1154954" y="2603499"/>
+            <a:ext cx="2903862" cy="3349431"/>
+          </a:xfrm>
+        </p:spPr>
+        <p:txBody>
+          <a:bodyPr>
+            <a:normAutofit/>
+          </a:bodyPr>
+          <a:lstStyle/>
+          <a:p>
+            <a:r>
+              <a:rPr lang="en-US" sz="3200" dirty="0" smtClean="0"/>
+              <a:t>Languages</a:t>
+            </a:r>
+          </a:p>
+          <a:p>
+            <a:r>
+              <a:rPr lang="en-US" sz="3200" dirty="0" smtClean="0"/>
+              <a:t>Runtimes</a:t>
+            </a:r>
+          </a:p>
+          <a:p>
+            <a:r>
+              <a:rPr lang="en-US" sz="3200" dirty="0" smtClean="0"/>
+              <a:t>Libraries</a:t>
+            </a:r>
+            <a:endParaRPr lang="en-US" sz="3200" dirty="0"/>
+          </a:p>
+        </p:txBody>
+      </p:sp>
+      <p:pic>
+        <p:nvPicPr>
+          <p:cNvPr id="4" name="Picture 3"/>
+          <p:cNvPicPr>
+            <a:picLocks noChangeAspect="1"/>
+          </p:cNvPicPr>
+          <p:nvPr/>
+        </p:nvPicPr>
+        <p:blipFill>
+          <a:blip r:embed="rId2">
+            <a:extLst>
+              <a:ext uri="{28A0092B-C50C-407E-A947-70E740481C1C}">
+                <a14:useLocalDpi xmlns:a14="http://schemas.microsoft.com/office/drawing/2010/main" val="0"/>
+              </a:ext>
+            </a:extLst>
+          </a:blip>
+          <a:stretch>
+            <a:fillRect/>
+          </a:stretch>
+        </p:blipFill>
+        <p:spPr>
+          <a:xfrm>
+            <a:off x="5897308" y="2435652"/>
+            <a:ext cx="4140358" cy="4140358"/>
+          </a:xfrm>
+          <a:prstGeom prst="roundRect">
+            <a:avLst>
+              <a:gd name="adj" fmla="val 16667"/>
+            </a:avLst>
+          </a:prstGeom>
+          <a:ln>
+            <a:noFill/>
+          </a:ln>
+          <a:effectLst>
+            <a:outerShdw blurRad="152400" dist="12000" dir="900000" sy="98000" kx="110000" ky="200000" algn="tl" rotWithShape="0">
+              <a:srgbClr val="000000">
+                <a:alpha val="30000"/>
+              </a:srgbClr>
+            </a:outerShdw>
+          </a:effectLst>
+          <a:scene3d>
+            <a:camera prst="perspectiveRelaxed">
+              <a:rot lat="19800000" lon="1200000" rev="20820000"/>
+            </a:camera>
+            <a:lightRig rig="threePt" dir="t"/>
+          </a:scene3d>
+          <a:sp3d contourW="6350" prstMaterial="matte">
+            <a:bevelT w="101600" h="101600"/>
+            <a:contourClr>
+              <a:srgbClr val="969696"/>
+            </a:contourClr>
+          </a:sp3d>
+        </p:spPr>
+      </p:pic>
+    </p:spTree>
+    <p:extLst>
+      <p:ext uri="{BB962C8B-B14F-4D97-AF65-F5344CB8AC3E}">
+        <p14:creationId xmlns:p14="http://schemas.microsoft.com/office/powerpoint/2010/main" val="1619143915"/>
+      </p:ext>
+    </p:extLst>
+  </p:cSld>
+  <p:clrMapOvr>
+    <a:masterClrMapping/>
+  </p:clrMapOvr>
+  <p:timing>
+    <p:tnLst>
+      <p:par>
+        <p:cTn id="1" dur="indefinite" restart="never" nodeType="tmRoot"/>
+      </p:par>
+    </p:tnLst>
+  </p:timing>
+</p:sld>
+</file>
+
+<file path=ppt/slides/slide9.xml><?xml version="1.0" encoding="utf-8"?>
+<p:sld xmlns:a="http://schemas.openxmlformats.org/drawingml/2006/main" xmlns:r="http://schemas.openxmlformats.org/officeDocument/2006/relationships" xmlns:p="http://schemas.openxmlformats.org/presentationml/2006/main">
+  <p:cSld>
+    <p:spTree>
+      <p:nvGrpSpPr>
+        <p:cNvPr id="1" name=""/>
+        <p:cNvGrpSpPr/>
+        <p:nvPr/>
+      </p:nvGrpSpPr>
+      <p:grpSpPr>
+        <a:xfrm>
+          <a:off x="0" y="0"/>
+          <a:ext cx="0" cy="0"/>
+          <a:chOff x="0" y="0"/>
+          <a:chExt cx="0" cy="0"/>
+        </a:xfrm>
+      </p:grpSpPr>
+      <p:sp>
+        <p:nvSpPr>
+          <p:cNvPr id="2" name="Title 1"/>
+          <p:cNvSpPr>
+            <a:spLocks noGrp="1"/>
+          </p:cNvSpPr>
+          <p:nvPr>
+            <p:ph type="title"/>
+          </p:nvPr>
+        </p:nvSpPr>
+        <p:spPr/>
+        <p:txBody>
+          <a:bodyPr/>
+          <a:lstStyle/>
+          <a:p>
+            <a:pPr algn="ctr"/>
+            <a:r>
+              <a:rPr lang="en-US" dirty="0" smtClean="0"/>
+              <a:t>.NET Schedule</a:t>
+            </a:r>
+            <a:endParaRPr lang="en-US" dirty="0"/>
+          </a:p>
+        </p:txBody>
+      </p:sp>
+      <p:pic>
+        <p:nvPicPr>
+          <p:cNvPr id="4" name="Content Placeholder 3"/>
+          <p:cNvPicPr>
+            <a:picLocks noGrp="1" noChangeAspect="1"/>
+          </p:cNvPicPr>
+          <p:nvPr>
+            <p:ph idx="1"/>
+          </p:nvPr>
+        </p:nvPicPr>
+        <p:blipFill>
+          <a:blip r:embed="rId2" cstate="print">
+            <a:extLst>
+              <a:ext uri="{28A0092B-C50C-407E-A947-70E740481C1C}">
+                <a14:useLocalDpi xmlns:a14="http://schemas.microsoft.com/office/drawing/2010/main" val="0"/>
+              </a:ext>
+            </a:extLst>
+          </a:blip>
+          <a:stretch>
+            <a:fillRect/>
+          </a:stretch>
+        </p:blipFill>
+        <p:spPr>
+          <a:xfrm>
+            <a:off x="2542823" y="2510194"/>
+            <a:ext cx="7011724" cy="3934658"/>
+          </a:xfrm>
+        </p:spPr>
+      </p:pic>
+    </p:spTree>
+    <p:extLst>
+      <p:ext uri="{BB962C8B-B14F-4D97-AF65-F5344CB8AC3E}">
+        <p14:creationId xmlns:p14="http://schemas.microsoft.com/office/powerpoint/2010/main" val="1234884613"/>
+      </p:ext>
+    </p:extLst>
+  </p:cSld>
+  <p:clrMapOvr>
+    <a:masterClrMapping/>
+  </p:clrMapOvr>
+  <p:timing>
+    <p:tnLst>
+      <p:par>
+        <p:cTn id="1" dur="indefinite" restart="never" nodeType="tmRoot"/>
+      </p:par>
+    </p:tnLst>
+  </p:timing>
 </p:sld>
 </file>
 

</xml_diff>

<commit_message>
Add slides with source examples
</commit_message>
<xml_diff>
--- a/C# Basics.pptx
+++ b/C# Basics.pptx
@@ -4,18 +4,28 @@
   <p:sldMasterIdLst>
     <p:sldMasterId id="2147483707" r:id="rId1"/>
   </p:sldMasterIdLst>
+  <p:notesMasterIdLst>
+    <p:notesMasterId r:id="rId20"/>
+  </p:notesMasterIdLst>
   <p:sldIdLst>
     <p:sldId id="256" r:id="rId2"/>
     <p:sldId id="258" r:id="rId3"/>
     <p:sldId id="259" r:id="rId4"/>
     <p:sldId id="260" r:id="rId5"/>
     <p:sldId id="262" r:id="rId6"/>
-    <p:sldId id="261" r:id="rId7"/>
+    <p:sldId id="264" r:id="rId7"/>
     <p:sldId id="263" r:id="rId8"/>
-    <p:sldId id="264" r:id="rId9"/>
+    <p:sldId id="261" r:id="rId9"/>
     <p:sldId id="265" r:id="rId10"/>
-    <p:sldId id="266" r:id="rId11"/>
-    <p:sldId id="267" r:id="rId12"/>
+    <p:sldId id="267" r:id="rId11"/>
+    <p:sldId id="266" r:id="rId12"/>
+    <p:sldId id="269" r:id="rId13"/>
+    <p:sldId id="268" r:id="rId14"/>
+    <p:sldId id="270" r:id="rId15"/>
+    <p:sldId id="271" r:id="rId16"/>
+    <p:sldId id="272" r:id="rId17"/>
+    <p:sldId id="273" r:id="rId18"/>
+    <p:sldId id="274" r:id="rId19"/>
   </p:sldIdLst>
   <p:sldSz cx="12192000" cy="6858000"/>
   <p:notesSz cx="6858000" cy="9144000"/>
@@ -122,6 +132,356 @@
 </p:presentation>
 </file>
 
+<file path=ppt/notesMasters/notesMaster1.xml><?xml version="1.0" encoding="utf-8"?>
+<p:notesMaster xmlns:a="http://schemas.openxmlformats.org/drawingml/2006/main" xmlns:r="http://schemas.openxmlformats.org/officeDocument/2006/relationships" xmlns:p="http://schemas.openxmlformats.org/presentationml/2006/main">
+  <p:cSld>
+    <p:bg>
+      <p:bgRef idx="1001">
+        <a:schemeClr val="bg1"/>
+      </p:bgRef>
+    </p:bg>
+    <p:spTree>
+      <p:nvGrpSpPr>
+        <p:cNvPr id="1" name=""/>
+        <p:cNvGrpSpPr/>
+        <p:nvPr/>
+      </p:nvGrpSpPr>
+      <p:grpSpPr>
+        <a:xfrm>
+          <a:off x="0" y="0"/>
+          <a:ext cx="0" cy="0"/>
+          <a:chOff x="0" y="0"/>
+          <a:chExt cx="0" cy="0"/>
+        </a:xfrm>
+      </p:grpSpPr>
+      <p:sp>
+        <p:nvSpPr>
+          <p:cNvPr id="2" name="Header Placeholder 1"/>
+          <p:cNvSpPr>
+            <a:spLocks noGrp="1"/>
+          </p:cNvSpPr>
+          <p:nvPr>
+            <p:ph type="hdr" sz="quarter"/>
+          </p:nvPr>
+        </p:nvSpPr>
+        <p:spPr>
+          <a:xfrm>
+            <a:off x="0" y="0"/>
+            <a:ext cx="2971800" cy="458788"/>
+          </a:xfrm>
+          <a:prstGeom prst="rect">
+            <a:avLst/>
+          </a:prstGeom>
+        </p:spPr>
+        <p:txBody>
+          <a:bodyPr vert="horz" lIns="91440" tIns="45720" rIns="91440" bIns="45720" rtlCol="0"/>
+          <a:lstStyle>
+            <a:lvl1pPr algn="l">
+              <a:defRPr sz="1200"/>
+            </a:lvl1pPr>
+          </a:lstStyle>
+          <a:p>
+            <a:endParaRPr lang="en-US"/>
+          </a:p>
+        </p:txBody>
+      </p:sp>
+      <p:sp>
+        <p:nvSpPr>
+          <p:cNvPr id="3" name="Date Placeholder 2"/>
+          <p:cNvSpPr>
+            <a:spLocks noGrp="1"/>
+          </p:cNvSpPr>
+          <p:nvPr>
+            <p:ph type="dt" idx="1"/>
+          </p:nvPr>
+        </p:nvSpPr>
+        <p:spPr>
+          <a:xfrm>
+            <a:off x="3884613" y="0"/>
+            <a:ext cx="2971800" cy="458788"/>
+          </a:xfrm>
+          <a:prstGeom prst="rect">
+            <a:avLst/>
+          </a:prstGeom>
+        </p:spPr>
+        <p:txBody>
+          <a:bodyPr vert="horz" lIns="91440" tIns="45720" rIns="91440" bIns="45720" rtlCol="0"/>
+          <a:lstStyle>
+            <a:lvl1pPr algn="r">
+              <a:defRPr sz="1200"/>
+            </a:lvl1pPr>
+          </a:lstStyle>
+          <a:p>
+            <a:fld id="{068E3771-71AF-4AE2-9E86-BE935DBF2B0E}" type="datetimeFigureOut">
+              <a:rPr lang="en-US" smtClean="0"/>
+              <a:t>5/15/2022</a:t>
+            </a:fld>
+            <a:endParaRPr lang="en-US"/>
+          </a:p>
+        </p:txBody>
+      </p:sp>
+      <p:sp>
+        <p:nvSpPr>
+          <p:cNvPr id="4" name="Slide Image Placeholder 3"/>
+          <p:cNvSpPr>
+            <a:spLocks noGrp="1" noRot="1" noChangeAspect="1"/>
+          </p:cNvSpPr>
+          <p:nvPr>
+            <p:ph type="sldImg" idx="2"/>
+          </p:nvPr>
+        </p:nvSpPr>
+        <p:spPr>
+          <a:xfrm>
+            <a:off x="685800" y="1143000"/>
+            <a:ext cx="5486400" cy="3086100"/>
+          </a:xfrm>
+          <a:prstGeom prst="rect">
+            <a:avLst/>
+          </a:prstGeom>
+          <a:noFill/>
+          <a:ln w="12700">
+            <a:solidFill>
+              <a:prstClr val="black"/>
+            </a:solidFill>
+          </a:ln>
+        </p:spPr>
+        <p:txBody>
+          <a:bodyPr vert="horz" lIns="91440" tIns="45720" rIns="91440" bIns="45720" rtlCol="0" anchor="ctr"/>
+          <a:lstStyle/>
+          <a:p>
+            <a:endParaRPr lang="en-US"/>
+          </a:p>
+        </p:txBody>
+      </p:sp>
+      <p:sp>
+        <p:nvSpPr>
+          <p:cNvPr id="5" name="Notes Placeholder 4"/>
+          <p:cNvSpPr>
+            <a:spLocks noGrp="1"/>
+          </p:cNvSpPr>
+          <p:nvPr>
+            <p:ph type="body" sz="quarter" idx="3"/>
+          </p:nvPr>
+        </p:nvSpPr>
+        <p:spPr>
+          <a:xfrm>
+            <a:off x="685800" y="4400550"/>
+            <a:ext cx="5486400" cy="3600450"/>
+          </a:xfrm>
+          <a:prstGeom prst="rect">
+            <a:avLst/>
+          </a:prstGeom>
+        </p:spPr>
+        <p:txBody>
+          <a:bodyPr vert="horz" lIns="91440" tIns="45720" rIns="91440" bIns="45720" rtlCol="0"/>
+          <a:lstStyle/>
+          <a:p>
+            <a:pPr lvl="0"/>
+            <a:r>
+              <a:rPr lang="en-US" smtClean="0"/>
+              <a:t>Edit Master text styles</a:t>
+            </a:r>
+          </a:p>
+          <a:p>
+            <a:pPr lvl="1"/>
+            <a:r>
+              <a:rPr lang="en-US" smtClean="0"/>
+              <a:t>Second level</a:t>
+            </a:r>
+          </a:p>
+          <a:p>
+            <a:pPr lvl="2"/>
+            <a:r>
+              <a:rPr lang="en-US" smtClean="0"/>
+              <a:t>Third level</a:t>
+            </a:r>
+          </a:p>
+          <a:p>
+            <a:pPr lvl="3"/>
+            <a:r>
+              <a:rPr lang="en-US" smtClean="0"/>
+              <a:t>Fourth level</a:t>
+            </a:r>
+          </a:p>
+          <a:p>
+            <a:pPr lvl="4"/>
+            <a:r>
+              <a:rPr lang="en-US" smtClean="0"/>
+              <a:t>Fifth level</a:t>
+            </a:r>
+            <a:endParaRPr lang="en-US"/>
+          </a:p>
+        </p:txBody>
+      </p:sp>
+      <p:sp>
+        <p:nvSpPr>
+          <p:cNvPr id="6" name="Footer Placeholder 5"/>
+          <p:cNvSpPr>
+            <a:spLocks noGrp="1"/>
+          </p:cNvSpPr>
+          <p:nvPr>
+            <p:ph type="ftr" sz="quarter" idx="4"/>
+          </p:nvPr>
+        </p:nvSpPr>
+        <p:spPr>
+          <a:xfrm>
+            <a:off x="0" y="8685213"/>
+            <a:ext cx="2971800" cy="458787"/>
+          </a:xfrm>
+          <a:prstGeom prst="rect">
+            <a:avLst/>
+          </a:prstGeom>
+        </p:spPr>
+        <p:txBody>
+          <a:bodyPr vert="horz" lIns="91440" tIns="45720" rIns="91440" bIns="45720" rtlCol="0" anchor="b"/>
+          <a:lstStyle>
+            <a:lvl1pPr algn="l">
+              <a:defRPr sz="1200"/>
+            </a:lvl1pPr>
+          </a:lstStyle>
+          <a:p>
+            <a:endParaRPr lang="en-US"/>
+          </a:p>
+        </p:txBody>
+      </p:sp>
+      <p:sp>
+        <p:nvSpPr>
+          <p:cNvPr id="7" name="Slide Number Placeholder 6"/>
+          <p:cNvSpPr>
+            <a:spLocks noGrp="1"/>
+          </p:cNvSpPr>
+          <p:nvPr>
+            <p:ph type="sldNum" sz="quarter" idx="5"/>
+          </p:nvPr>
+        </p:nvSpPr>
+        <p:spPr>
+          <a:xfrm>
+            <a:off x="3884613" y="8685213"/>
+            <a:ext cx="2971800" cy="458787"/>
+          </a:xfrm>
+          <a:prstGeom prst="rect">
+            <a:avLst/>
+          </a:prstGeom>
+        </p:spPr>
+        <p:txBody>
+          <a:bodyPr vert="horz" lIns="91440" tIns="45720" rIns="91440" bIns="45720" rtlCol="0" anchor="b"/>
+          <a:lstStyle>
+            <a:lvl1pPr algn="r">
+              <a:defRPr sz="1200"/>
+            </a:lvl1pPr>
+          </a:lstStyle>
+          <a:p>
+            <a:fld id="{36B48ACA-3A5E-4529-A083-72FC92DB8FBE}" type="slidenum">
+              <a:rPr lang="en-US" smtClean="0"/>
+              <a:t>‹#›</a:t>
+            </a:fld>
+            <a:endParaRPr lang="en-US"/>
+          </a:p>
+        </p:txBody>
+      </p:sp>
+    </p:spTree>
+    <p:extLst>
+      <p:ext uri="{BB962C8B-B14F-4D97-AF65-F5344CB8AC3E}">
+        <p14:creationId xmlns:p14="http://schemas.microsoft.com/office/powerpoint/2010/main" val="3611691889"/>
+      </p:ext>
+    </p:extLst>
+  </p:cSld>
+  <p:clrMap bg1="lt1" tx1="dk1" bg2="lt2" tx2="dk2" accent1="accent1" accent2="accent2" accent3="accent3" accent4="accent4" accent5="accent5" accent6="accent6" hlink="hlink" folHlink="folHlink"/>
+  <p:notesStyle>
+    <a:lvl1pPr marL="0" algn="l" defTabSz="914400" rtl="0" eaLnBrk="1" latinLnBrk="0" hangingPunct="1">
+      <a:defRPr sz="1200" kern="1200">
+        <a:solidFill>
+          <a:schemeClr val="tx1"/>
+        </a:solidFill>
+        <a:latin typeface="+mn-lt"/>
+        <a:ea typeface="+mn-ea"/>
+        <a:cs typeface="+mn-cs"/>
+      </a:defRPr>
+    </a:lvl1pPr>
+    <a:lvl2pPr marL="457200" algn="l" defTabSz="914400" rtl="0" eaLnBrk="1" latinLnBrk="0" hangingPunct="1">
+      <a:defRPr sz="1200" kern="1200">
+        <a:solidFill>
+          <a:schemeClr val="tx1"/>
+        </a:solidFill>
+        <a:latin typeface="+mn-lt"/>
+        <a:ea typeface="+mn-ea"/>
+        <a:cs typeface="+mn-cs"/>
+      </a:defRPr>
+    </a:lvl2pPr>
+    <a:lvl3pPr marL="914400" algn="l" defTabSz="914400" rtl="0" eaLnBrk="1" latinLnBrk="0" hangingPunct="1">
+      <a:defRPr sz="1200" kern="1200">
+        <a:solidFill>
+          <a:schemeClr val="tx1"/>
+        </a:solidFill>
+        <a:latin typeface="+mn-lt"/>
+        <a:ea typeface="+mn-ea"/>
+        <a:cs typeface="+mn-cs"/>
+      </a:defRPr>
+    </a:lvl3pPr>
+    <a:lvl4pPr marL="1371600" algn="l" defTabSz="914400" rtl="0" eaLnBrk="1" latinLnBrk="0" hangingPunct="1">
+      <a:defRPr sz="1200" kern="1200">
+        <a:solidFill>
+          <a:schemeClr val="tx1"/>
+        </a:solidFill>
+        <a:latin typeface="+mn-lt"/>
+        <a:ea typeface="+mn-ea"/>
+        <a:cs typeface="+mn-cs"/>
+      </a:defRPr>
+    </a:lvl4pPr>
+    <a:lvl5pPr marL="1828800" algn="l" defTabSz="914400" rtl="0" eaLnBrk="1" latinLnBrk="0" hangingPunct="1">
+      <a:defRPr sz="1200" kern="1200">
+        <a:solidFill>
+          <a:schemeClr val="tx1"/>
+        </a:solidFill>
+        <a:latin typeface="+mn-lt"/>
+        <a:ea typeface="+mn-ea"/>
+        <a:cs typeface="+mn-cs"/>
+      </a:defRPr>
+    </a:lvl5pPr>
+    <a:lvl6pPr marL="2286000" algn="l" defTabSz="914400" rtl="0" eaLnBrk="1" latinLnBrk="0" hangingPunct="1">
+      <a:defRPr sz="1200" kern="1200">
+        <a:solidFill>
+          <a:schemeClr val="tx1"/>
+        </a:solidFill>
+        <a:latin typeface="+mn-lt"/>
+        <a:ea typeface="+mn-ea"/>
+        <a:cs typeface="+mn-cs"/>
+      </a:defRPr>
+    </a:lvl6pPr>
+    <a:lvl7pPr marL="2743200" algn="l" defTabSz="914400" rtl="0" eaLnBrk="1" latinLnBrk="0" hangingPunct="1">
+      <a:defRPr sz="1200" kern="1200">
+        <a:solidFill>
+          <a:schemeClr val="tx1"/>
+        </a:solidFill>
+        <a:latin typeface="+mn-lt"/>
+        <a:ea typeface="+mn-ea"/>
+        <a:cs typeface="+mn-cs"/>
+      </a:defRPr>
+    </a:lvl7pPr>
+    <a:lvl8pPr marL="3200400" algn="l" defTabSz="914400" rtl="0" eaLnBrk="1" latinLnBrk="0" hangingPunct="1">
+      <a:defRPr sz="1200" kern="1200">
+        <a:solidFill>
+          <a:schemeClr val="tx1"/>
+        </a:solidFill>
+        <a:latin typeface="+mn-lt"/>
+        <a:ea typeface="+mn-ea"/>
+        <a:cs typeface="+mn-cs"/>
+      </a:defRPr>
+    </a:lvl8pPr>
+    <a:lvl9pPr marL="3657600" algn="l" defTabSz="914400" rtl="0" eaLnBrk="1" latinLnBrk="0" hangingPunct="1">
+      <a:defRPr sz="1200" kern="1200">
+        <a:solidFill>
+          <a:schemeClr val="tx1"/>
+        </a:solidFill>
+        <a:latin typeface="+mn-lt"/>
+        <a:ea typeface="+mn-ea"/>
+        <a:cs typeface="+mn-cs"/>
+      </a:defRPr>
+    </a:lvl9pPr>
+  </p:notesStyle>
+</p:notesMaster>
+</file>
+
 <file path=ppt/slideLayouts/slideLayout1.xml><?xml version="1.0" encoding="utf-8"?>
 <p:sldLayout xmlns:a="http://schemas.openxmlformats.org/drawingml/2006/main" xmlns:r="http://schemas.openxmlformats.org/officeDocument/2006/relationships" xmlns:p="http://schemas.openxmlformats.org/presentationml/2006/main" showMasterSp="0" type="title" preserve="1">
   <p:cSld name="Title Slide">
@@ -457,7 +817,7 @@
           <a:p>
             <a:fld id="{C0A3DACC-474D-44ED-8DF0-6B6BA2CE3243}" type="datetimeFigureOut">
               <a:rPr lang="en-US" smtClean="0"/>
-              <a:t>5/14/2022</a:t>
+              <a:t>5/15/2022</a:t>
             </a:fld>
             <a:endParaRPr lang="en-US"/>
           </a:p>
@@ -1545,7 +1905,7 @@
           <a:p>
             <a:fld id="{C0A3DACC-474D-44ED-8DF0-6B6BA2CE3243}" type="datetimeFigureOut">
               <a:rPr lang="en-US" smtClean="0"/>
-              <a:t>5/14/2022</a:t>
+              <a:t>5/15/2022</a:t>
             </a:fld>
             <a:endParaRPr lang="en-US"/>
           </a:p>
@@ -2525,7 +2885,7 @@
           <a:p>
             <a:fld id="{C0A3DACC-474D-44ED-8DF0-6B6BA2CE3243}" type="datetimeFigureOut">
               <a:rPr lang="en-US" smtClean="0"/>
-              <a:t>5/14/2022</a:t>
+              <a:t>5/15/2022</a:t>
             </a:fld>
             <a:endParaRPr lang="en-US"/>
           </a:p>
@@ -3659,7 +4019,7 @@
           <a:p>
             <a:fld id="{C0A3DACC-474D-44ED-8DF0-6B6BA2CE3243}" type="datetimeFigureOut">
               <a:rPr lang="en-US" smtClean="0"/>
-              <a:t>5/14/2022</a:t>
+              <a:t>5/15/2022</a:t>
             </a:fld>
             <a:endParaRPr lang="en-US"/>
           </a:p>
@@ -4692,7 +5052,7 @@
           <a:p>
             <a:fld id="{C0A3DACC-474D-44ED-8DF0-6B6BA2CE3243}" type="datetimeFigureOut">
               <a:rPr lang="en-US" smtClean="0"/>
-              <a:t>5/14/2022</a:t>
+              <a:t>5/15/2022</a:t>
             </a:fld>
             <a:endParaRPr lang="en-US"/>
           </a:p>
@@ -5352,7 +5712,7 @@
           <a:p>
             <a:fld id="{C0A3DACC-474D-44ED-8DF0-6B6BA2CE3243}" type="datetimeFigureOut">
               <a:rPr lang="en-US" smtClean="0"/>
-              <a:t>5/14/2022</a:t>
+              <a:t>5/15/2022</a:t>
             </a:fld>
             <a:endParaRPr lang="en-US"/>
           </a:p>
@@ -6213,7 +6573,7 @@
           <a:p>
             <a:fld id="{C0A3DACC-474D-44ED-8DF0-6B6BA2CE3243}" type="datetimeFigureOut">
               <a:rPr lang="en-US" smtClean="0"/>
-              <a:t>5/14/2022</a:t>
+              <a:t>5/15/2022</a:t>
             </a:fld>
             <a:endParaRPr lang="en-US"/>
           </a:p>
@@ -6403,7 +6763,7 @@
           <a:p>
             <a:fld id="{C0A3DACC-474D-44ED-8DF0-6B6BA2CE3243}" type="datetimeFigureOut">
               <a:rPr lang="en-US" smtClean="0"/>
-              <a:t>5/14/2022</a:t>
+              <a:t>5/15/2022</a:t>
             </a:fld>
             <a:endParaRPr lang="en-US"/>
           </a:p>
@@ -7375,7 +7735,7 @@
           <a:p>
             <a:fld id="{C0A3DACC-474D-44ED-8DF0-6B6BA2CE3243}" type="datetimeFigureOut">
               <a:rPr lang="en-US" smtClean="0"/>
-              <a:t>5/14/2022</a:t>
+              <a:t>5/15/2022</a:t>
             </a:fld>
             <a:endParaRPr lang="en-US"/>
           </a:p>
@@ -7586,7 +7946,7 @@
           <a:p>
             <a:fld id="{C0A3DACC-474D-44ED-8DF0-6B6BA2CE3243}" type="datetimeFigureOut">
               <a:rPr lang="en-US" smtClean="0"/>
-              <a:t>5/14/2022</a:t>
+              <a:t>5/15/2022</a:t>
             </a:fld>
             <a:endParaRPr lang="en-US"/>
           </a:p>
@@ -8620,7 +8980,7 @@
           <a:p>
             <a:fld id="{C0A3DACC-474D-44ED-8DF0-6B6BA2CE3243}" type="datetimeFigureOut">
               <a:rPr lang="en-US" smtClean="0"/>
-              <a:t>5/14/2022</a:t>
+              <a:t>5/15/2022</a:t>
             </a:fld>
             <a:endParaRPr lang="en-US"/>
           </a:p>
@@ -8892,7 +9252,7 @@
           <a:p>
             <a:fld id="{C0A3DACC-474D-44ED-8DF0-6B6BA2CE3243}" type="datetimeFigureOut">
               <a:rPr lang="en-US" smtClean="0"/>
-              <a:t>5/14/2022</a:t>
+              <a:t>5/15/2022</a:t>
             </a:fld>
             <a:endParaRPr lang="en-US"/>
           </a:p>
@@ -9302,7 +9662,7 @@
           <a:p>
             <a:fld id="{C0A3DACC-474D-44ED-8DF0-6B6BA2CE3243}" type="datetimeFigureOut">
               <a:rPr lang="en-US" smtClean="0"/>
-              <a:t>5/14/2022</a:t>
+              <a:t>5/15/2022</a:t>
             </a:fld>
             <a:endParaRPr lang="en-US"/>
           </a:p>
@@ -9429,7 +9789,7 @@
           <a:p>
             <a:fld id="{C0A3DACC-474D-44ED-8DF0-6B6BA2CE3243}" type="datetimeFigureOut">
               <a:rPr lang="en-US" smtClean="0"/>
-              <a:t>5/14/2022</a:t>
+              <a:t>5/15/2022</a:t>
             </a:fld>
             <a:endParaRPr lang="en-US"/>
           </a:p>
@@ -9524,7 +9884,7 @@
           <a:p>
             <a:fld id="{C0A3DACC-474D-44ED-8DF0-6B6BA2CE3243}" type="datetimeFigureOut">
               <a:rPr lang="en-US" smtClean="0"/>
-              <a:t>5/14/2022</a:t>
+              <a:t>5/15/2022</a:t>
             </a:fld>
             <a:endParaRPr lang="en-US"/>
           </a:p>
@@ -10605,7 +10965,7 @@
           <a:p>
             <a:fld id="{C0A3DACC-474D-44ED-8DF0-6B6BA2CE3243}" type="datetimeFigureOut">
               <a:rPr lang="en-US" smtClean="0"/>
-              <a:t>5/14/2022</a:t>
+              <a:t>5/15/2022</a:t>
             </a:fld>
             <a:endParaRPr lang="en-US"/>
           </a:p>
@@ -11713,7 +12073,7 @@
           <a:p>
             <a:fld id="{C0A3DACC-474D-44ED-8DF0-6B6BA2CE3243}" type="datetimeFigureOut">
               <a:rPr lang="en-US" smtClean="0"/>
-              <a:t>5/14/2022</a:t>
+              <a:t>5/15/2022</a:t>
             </a:fld>
             <a:endParaRPr lang="en-US"/>
           </a:p>
@@ -12710,7 +13070,7 @@
           <a:p>
             <a:fld id="{C0A3DACC-474D-44ED-8DF0-6B6BA2CE3243}" type="datetimeFigureOut">
               <a:rPr lang="en-US" smtClean="0"/>
-              <a:t>5/14/2022</a:t>
+              <a:t>5/15/2022</a:t>
             </a:fld>
             <a:endParaRPr lang="en-US"/>
           </a:p>
@@ -13426,6 +13786,155 @@
                 <a:latin typeface="Arial" panose="020B0604020202020204" pitchFamily="34" charset="0"/>
                 <a:cs typeface="Arial" panose="020B0604020202020204" pitchFamily="34" charset="0"/>
               </a:rPr>
+              <a:t>What is compiler?</a:t>
+            </a:r>
+            <a:endParaRPr lang="en-US" dirty="0">
+              <a:latin typeface="Arial" panose="020B0604020202020204" pitchFamily="34" charset="0"/>
+              <a:cs typeface="Arial" panose="020B0604020202020204" pitchFamily="34" charset="0"/>
+            </a:endParaRPr>
+          </a:p>
+        </p:txBody>
+      </p:sp>
+      <p:sp>
+        <p:nvSpPr>
+          <p:cNvPr id="3" name="Content Placeholder 2"/>
+          <p:cNvSpPr>
+            <a:spLocks noGrp="1"/>
+          </p:cNvSpPr>
+          <p:nvPr>
+            <p:ph idx="1"/>
+          </p:nvPr>
+        </p:nvSpPr>
+        <p:spPr>
+          <a:xfrm>
+            <a:off x="1546839" y="2603499"/>
+            <a:ext cx="8825659" cy="4021235"/>
+          </a:xfrm>
+        </p:spPr>
+        <p:txBody>
+          <a:bodyPr/>
+          <a:lstStyle/>
+          <a:p>
+            <a:r>
+              <a:rPr lang="en-US" dirty="0"/>
+              <a:t>A compiler is a special program that translates a programming language's </a:t>
+            </a:r>
+            <a:r>
+              <a:rPr lang="en-US" dirty="0" smtClean="0"/>
+              <a:t>source code into </a:t>
+            </a:r>
+            <a:r>
+              <a:rPr lang="en-US" dirty="0"/>
+              <a:t>machine code, bytecode or another programming language. The source code is typically written in a high-level, human-readable language such as </a:t>
+            </a:r>
+            <a:r>
+              <a:rPr lang="en-US" b="1" dirty="0" smtClean="0"/>
+              <a:t>C#</a:t>
+            </a:r>
+            <a:r>
+              <a:rPr lang="en-US" dirty="0" smtClean="0"/>
+              <a:t>, </a:t>
+            </a:r>
+            <a:r>
+              <a:rPr lang="en-US" b="1" dirty="0" smtClean="0"/>
+              <a:t>Java, C++, etc</a:t>
+            </a:r>
+            <a:r>
+              <a:rPr lang="en-US" dirty="0" smtClean="0"/>
+              <a:t>.</a:t>
+            </a:r>
+            <a:endParaRPr lang="en-US" dirty="0"/>
+          </a:p>
+        </p:txBody>
+      </p:sp>
+      <p:pic>
+        <p:nvPicPr>
+          <p:cNvPr id="5" name="Picture 4"/>
+          <p:cNvPicPr>
+            <a:picLocks noChangeAspect="1"/>
+          </p:cNvPicPr>
+          <p:nvPr/>
+        </p:nvPicPr>
+        <p:blipFill>
+          <a:blip r:embed="rId2">
+            <a:extLst>
+              <a:ext uri="{28A0092B-C50C-407E-A947-70E740481C1C}">
+                <a14:useLocalDpi xmlns:a14="http://schemas.microsoft.com/office/drawing/2010/main" val="0"/>
+              </a:ext>
+            </a:extLst>
+          </a:blip>
+          <a:stretch>
+            <a:fillRect/>
+          </a:stretch>
+        </p:blipFill>
+        <p:spPr>
+          <a:xfrm>
+            <a:off x="1905842" y="3948209"/>
+            <a:ext cx="8010525" cy="2676525"/>
+          </a:xfrm>
+          <a:prstGeom prst="rect">
+            <a:avLst/>
+          </a:prstGeom>
+        </p:spPr>
+      </p:pic>
+    </p:spTree>
+    <p:extLst>
+      <p:ext uri="{BB962C8B-B14F-4D97-AF65-F5344CB8AC3E}">
+        <p14:creationId xmlns:p14="http://schemas.microsoft.com/office/powerpoint/2010/main" val="525679394"/>
+      </p:ext>
+    </p:extLst>
+  </p:cSld>
+  <p:clrMapOvr>
+    <a:masterClrMapping/>
+  </p:clrMapOvr>
+  <p:timing>
+    <p:tnLst>
+      <p:par>
+        <p:cTn id="1" dur="indefinite" restart="never" nodeType="tmRoot"/>
+      </p:par>
+    </p:tnLst>
+  </p:timing>
+</p:sld>
+</file>
+
+<file path=ppt/slides/slide11.xml><?xml version="1.0" encoding="utf-8"?>
+<p:sld xmlns:a="http://schemas.openxmlformats.org/drawingml/2006/main" xmlns:r="http://schemas.openxmlformats.org/officeDocument/2006/relationships" xmlns:p="http://schemas.openxmlformats.org/presentationml/2006/main">
+  <p:cSld>
+    <p:spTree>
+      <p:nvGrpSpPr>
+        <p:cNvPr id="1" name=""/>
+        <p:cNvGrpSpPr/>
+        <p:nvPr/>
+      </p:nvGrpSpPr>
+      <p:grpSpPr>
+        <a:xfrm>
+          <a:off x="0" y="0"/>
+          <a:ext cx="0" cy="0"/>
+          <a:chOff x="0" y="0"/>
+          <a:chExt cx="0" cy="0"/>
+        </a:xfrm>
+      </p:grpSpPr>
+      <p:sp>
+        <p:nvSpPr>
+          <p:cNvPr id="2" name="Title 1"/>
+          <p:cNvSpPr>
+            <a:spLocks noGrp="1"/>
+          </p:cNvSpPr>
+          <p:nvPr>
+            <p:ph type="title"/>
+          </p:nvPr>
+        </p:nvSpPr>
+        <p:spPr/>
+        <p:txBody>
+          <a:bodyPr/>
+          <a:lstStyle/>
+          <a:p>
+            <a:pPr algn="ctr"/>
+            <a:r>
+              <a:rPr lang="en-US" dirty="0" smtClean="0">
+                <a:latin typeface="Arial" panose="020B0604020202020204" pitchFamily="34" charset="0"/>
+                <a:cs typeface="Arial" panose="020B0604020202020204" pitchFamily="34" charset="0"/>
+              </a:rPr>
               <a:t>What is an IDE?</a:t>
             </a:r>
             <a:endParaRPr lang="en-US" dirty="0">
@@ -13726,7 +14235,7 @@
 </p:sld>
 </file>
 
-<file path=ppt/slides/slide11.xml><?xml version="1.0" encoding="utf-8"?>
+<file path=ppt/slides/slide12.xml><?xml version="1.0" encoding="utf-8"?>
 <p:sld xmlns:a="http://schemas.openxmlformats.org/drawingml/2006/main" xmlns:r="http://schemas.openxmlformats.org/officeDocument/2006/relationships" xmlns:p="http://schemas.openxmlformats.org/presentationml/2006/main">
   <p:cSld>
     <p:spTree>
@@ -13760,66 +14269,16 @@
           <a:p>
             <a:pPr algn="ctr"/>
             <a:r>
-              <a:rPr lang="en-US" dirty="0" smtClean="0">
-                <a:latin typeface="Arial" panose="020B0604020202020204" pitchFamily="34" charset="0"/>
-                <a:cs typeface="Arial" panose="020B0604020202020204" pitchFamily="34" charset="0"/>
-              </a:rPr>
-              <a:t>What is compiler?</a:t>
-            </a:r>
-            <a:endParaRPr lang="en-US" dirty="0">
-              <a:latin typeface="Arial" panose="020B0604020202020204" pitchFamily="34" charset="0"/>
-              <a:cs typeface="Arial" panose="020B0604020202020204" pitchFamily="34" charset="0"/>
-            </a:endParaRPr>
-          </a:p>
-        </p:txBody>
-      </p:sp>
-      <p:sp>
-        <p:nvSpPr>
-          <p:cNvPr id="3" name="Content Placeholder 2"/>
-          <p:cNvSpPr>
-            <a:spLocks noGrp="1"/>
-          </p:cNvSpPr>
-          <p:nvPr>
-            <p:ph idx="1"/>
-          </p:nvPr>
-        </p:nvSpPr>
-        <p:spPr>
-          <a:xfrm>
-            <a:off x="1546839" y="2603499"/>
-            <a:ext cx="8825659" cy="4021235"/>
-          </a:xfrm>
-        </p:spPr>
-        <p:txBody>
-          <a:bodyPr/>
-          <a:lstStyle/>
-          <a:p>
-            <a:r>
-              <a:rPr lang="en-US" dirty="0"/>
-              <a:t>A compiler is a special program that translates a programming language's </a:t>
-            </a:r>
-            <a:r>
               <a:rPr lang="en-US" dirty="0" smtClean="0"/>
-              <a:t>source code into </a:t>
-            </a:r>
-            <a:r>
-              <a:rPr lang="en-US" dirty="0"/>
-              <a:t>machine code, bytecode or another programming language. The source code is typically written in a high-level, human-readable language such as </a:t>
-            </a:r>
-            <a:r>
-              <a:rPr lang="en-US" b="1" dirty="0" smtClean="0"/>
-              <a:t>C#</a:t>
+              <a:t>Visual Studio</a:t>
+            </a:r>
+            <a:r>
+              <a:rPr lang="bg-BG" dirty="0" smtClean="0"/>
+              <a:t> 2022</a:t>
             </a:r>
             <a:r>
               <a:rPr lang="en-US" dirty="0" smtClean="0"/>
-              <a:t>, </a:t>
-            </a:r>
-            <a:r>
-              <a:rPr lang="en-US" b="1" dirty="0" smtClean="0"/>
-              <a:t>Java, C++, etc</a:t>
-            </a:r>
-            <a:r>
-              <a:rPr lang="en-US" dirty="0" smtClean="0"/>
-              <a:t>.</a:t>
+              <a:t> /installation/</a:t>
             </a:r>
             <a:endParaRPr lang="en-US" dirty="0"/>
           </a:p>
@@ -13827,11 +14286,13 @@
       </p:sp>
       <p:pic>
         <p:nvPicPr>
-          <p:cNvPr id="5" name="Picture 4"/>
+          <p:cNvPr id="4" name="Content Placeholder 3"/>
           <p:cNvPicPr>
-            <a:picLocks noChangeAspect="1"/>
+            <a:picLocks noGrp="1" noChangeAspect="1"/>
           </p:cNvPicPr>
-          <p:nvPr/>
+          <p:nvPr>
+            <p:ph idx="1"/>
+          </p:nvPr>
         </p:nvPicPr>
         <p:blipFill>
           <a:blip r:embed="rId2">
@@ -13847,8 +14308,726 @@
         </p:blipFill>
         <p:spPr>
           <a:xfrm>
-            <a:off x="1905842" y="3948209"/>
-            <a:ext cx="8010525" cy="2676525"/>
+            <a:off x="2484792" y="2407556"/>
+            <a:ext cx="7051094" cy="3966241"/>
+          </a:xfrm>
+        </p:spPr>
+      </p:pic>
+    </p:spTree>
+    <p:extLst>
+      <p:ext uri="{BB962C8B-B14F-4D97-AF65-F5344CB8AC3E}">
+        <p14:creationId xmlns:p14="http://schemas.microsoft.com/office/powerpoint/2010/main" val="1144952382"/>
+      </p:ext>
+    </p:extLst>
+  </p:cSld>
+  <p:clrMapOvr>
+    <a:masterClrMapping/>
+  </p:clrMapOvr>
+</p:sld>
+</file>
+
+<file path=ppt/slides/slide13.xml><?xml version="1.0" encoding="utf-8"?>
+<p:sld xmlns:a="http://schemas.openxmlformats.org/drawingml/2006/main" xmlns:r="http://schemas.openxmlformats.org/officeDocument/2006/relationships" xmlns:p="http://schemas.openxmlformats.org/presentationml/2006/main">
+  <p:cSld>
+    <p:spTree>
+      <p:nvGrpSpPr>
+        <p:cNvPr id="1" name=""/>
+        <p:cNvGrpSpPr/>
+        <p:nvPr/>
+      </p:nvGrpSpPr>
+      <p:grpSpPr>
+        <a:xfrm>
+          <a:off x="0" y="0"/>
+          <a:ext cx="0" cy="0"/>
+          <a:chOff x="0" y="0"/>
+          <a:chExt cx="0" cy="0"/>
+        </a:xfrm>
+      </p:grpSpPr>
+      <p:sp>
+        <p:nvSpPr>
+          <p:cNvPr id="2" name="Title 1"/>
+          <p:cNvSpPr>
+            <a:spLocks noGrp="1"/>
+          </p:cNvSpPr>
+          <p:nvPr>
+            <p:ph type="title"/>
+          </p:nvPr>
+        </p:nvSpPr>
+        <p:spPr/>
+        <p:txBody>
+          <a:bodyPr/>
+          <a:lstStyle/>
+          <a:p>
+            <a:pPr algn="ctr"/>
+            <a:r>
+              <a:rPr lang="en-US" dirty="0" smtClean="0">
+                <a:latin typeface="Arial" panose="020B0604020202020204" pitchFamily="34" charset="0"/>
+                <a:cs typeface="Arial" panose="020B0604020202020204" pitchFamily="34" charset="0"/>
+              </a:rPr>
+              <a:t>C# variables</a:t>
+            </a:r>
+            <a:endParaRPr lang="en-US" dirty="0">
+              <a:latin typeface="Arial" panose="020B0604020202020204" pitchFamily="34" charset="0"/>
+              <a:cs typeface="Arial" panose="020B0604020202020204" pitchFamily="34" charset="0"/>
+            </a:endParaRPr>
+          </a:p>
+        </p:txBody>
+      </p:sp>
+      <p:sp>
+        <p:nvSpPr>
+          <p:cNvPr id="3" name="Content Placeholder 2"/>
+          <p:cNvSpPr>
+            <a:spLocks noGrp="1"/>
+          </p:cNvSpPr>
+          <p:nvPr>
+            <p:ph idx="1"/>
+          </p:nvPr>
+        </p:nvSpPr>
+        <p:spPr/>
+        <p:txBody>
+          <a:bodyPr/>
+          <a:lstStyle/>
+          <a:p>
+            <a:r>
+              <a:rPr lang="en-US" dirty="0" smtClean="0"/>
+              <a:t>Variables are containers for storing of data values.</a:t>
+            </a:r>
+          </a:p>
+          <a:p>
+            <a:r>
+              <a:rPr lang="en-US" dirty="0" smtClean="0"/>
+              <a:t>In </a:t>
+            </a:r>
+            <a:r>
+              <a:rPr lang="en-US" b="1" dirty="0" smtClean="0"/>
+              <a:t>C#</a:t>
+            </a:r>
+            <a:r>
+              <a:rPr lang="en-US" dirty="0" smtClean="0"/>
+              <a:t>, there are different types of variables (defined with different keywords), for example:</a:t>
+            </a:r>
+          </a:p>
+          <a:p>
+            <a:pPr lvl="1"/>
+            <a:r>
+              <a:rPr lang="en-US" b="1" dirty="0" err="1" smtClean="0"/>
+              <a:t>Int</a:t>
+            </a:r>
+            <a:r>
+              <a:rPr lang="en-US" dirty="0" smtClean="0"/>
+              <a:t> – stores integers (whole numbers), without decimals, such </a:t>
+            </a:r>
+            <a:r>
+              <a:rPr lang="en-US" b="1" dirty="0" smtClean="0"/>
+              <a:t>127</a:t>
+            </a:r>
+            <a:r>
+              <a:rPr lang="en-US" dirty="0" smtClean="0"/>
+              <a:t> or -</a:t>
+            </a:r>
+            <a:r>
+              <a:rPr lang="en-US" b="1" dirty="0" smtClean="0"/>
+              <a:t>127</a:t>
+            </a:r>
+          </a:p>
+          <a:p>
+            <a:pPr lvl="1"/>
+            <a:r>
+              <a:rPr lang="en-US" b="1" dirty="0"/>
+              <a:t>d</a:t>
+            </a:r>
+            <a:r>
+              <a:rPr lang="en-US" b="1" dirty="0" smtClean="0"/>
+              <a:t>ouble</a:t>
+            </a:r>
+            <a:r>
+              <a:rPr lang="en-US" dirty="0" smtClean="0"/>
+              <a:t> – stores floating point numbers, with decimals, such </a:t>
+            </a:r>
+            <a:r>
+              <a:rPr lang="en-US" b="1" dirty="0" smtClean="0"/>
+              <a:t>19.99</a:t>
+            </a:r>
+            <a:r>
+              <a:rPr lang="en-US" dirty="0" smtClean="0"/>
+              <a:t> or </a:t>
+            </a:r>
+            <a:r>
+              <a:rPr lang="en-US" b="1" dirty="0" smtClean="0"/>
+              <a:t>-19.99</a:t>
+            </a:r>
+          </a:p>
+          <a:p>
+            <a:pPr lvl="1"/>
+            <a:r>
+              <a:rPr lang="en-US" b="1" dirty="0"/>
+              <a:t>c</a:t>
+            </a:r>
+            <a:r>
+              <a:rPr lang="en-US" b="1" dirty="0" smtClean="0"/>
+              <a:t>har</a:t>
+            </a:r>
+            <a:r>
+              <a:rPr lang="en-US" dirty="0" smtClean="0"/>
+              <a:t> – stores single characters, such as </a:t>
+            </a:r>
+            <a:r>
+              <a:rPr lang="en-US" b="1" dirty="0" smtClean="0"/>
+              <a:t>‘a’</a:t>
+            </a:r>
+            <a:r>
+              <a:rPr lang="en-US" dirty="0" smtClean="0"/>
+              <a:t> or </a:t>
+            </a:r>
+            <a:r>
+              <a:rPr lang="en-US" b="1" dirty="0" smtClean="0"/>
+              <a:t>‘B’</a:t>
+            </a:r>
+            <a:r>
+              <a:rPr lang="en-US" dirty="0" smtClean="0"/>
+              <a:t>. Char values are surrounded by single quotes.</a:t>
+            </a:r>
+          </a:p>
+          <a:p>
+            <a:pPr lvl="1"/>
+            <a:r>
+              <a:rPr lang="en-US" b="1" dirty="0"/>
+              <a:t>s</a:t>
+            </a:r>
+            <a:r>
+              <a:rPr lang="en-US" b="1" dirty="0" smtClean="0"/>
+              <a:t>tring</a:t>
+            </a:r>
+            <a:r>
+              <a:rPr lang="en-US" dirty="0" smtClean="0"/>
+              <a:t> – stores text, such </a:t>
+            </a:r>
+            <a:r>
+              <a:rPr lang="en-US" b="1" dirty="0" smtClean="0"/>
+              <a:t>“Hello World”</a:t>
+            </a:r>
+            <a:r>
+              <a:rPr lang="en-US" dirty="0" smtClean="0"/>
+              <a:t>. String values are surrounded by double quotes.</a:t>
+            </a:r>
+          </a:p>
+          <a:p>
+            <a:pPr lvl="1"/>
+            <a:r>
+              <a:rPr lang="en-US" b="1" dirty="0"/>
+              <a:t>b</a:t>
+            </a:r>
+            <a:r>
+              <a:rPr lang="en-US" b="1" dirty="0" smtClean="0"/>
+              <a:t>ool</a:t>
+            </a:r>
+            <a:r>
+              <a:rPr lang="en-US" dirty="0" smtClean="0"/>
+              <a:t> – stores values with two states: </a:t>
+            </a:r>
+            <a:r>
+              <a:rPr lang="en-US" b="1" dirty="0" smtClean="0"/>
+              <a:t>true</a:t>
+            </a:r>
+            <a:r>
+              <a:rPr lang="en-US" dirty="0" smtClean="0"/>
+              <a:t> or </a:t>
+            </a:r>
+            <a:r>
+              <a:rPr lang="en-US" b="1" dirty="0" smtClean="0"/>
+              <a:t>false</a:t>
+            </a:r>
+            <a:endParaRPr lang="en-US" b="1" dirty="0"/>
+          </a:p>
+        </p:txBody>
+      </p:sp>
+    </p:spTree>
+    <p:extLst>
+      <p:ext uri="{BB962C8B-B14F-4D97-AF65-F5344CB8AC3E}">
+        <p14:creationId xmlns:p14="http://schemas.microsoft.com/office/powerpoint/2010/main" val="644180142"/>
+      </p:ext>
+    </p:extLst>
+  </p:cSld>
+  <p:clrMapOvr>
+    <a:masterClrMapping/>
+  </p:clrMapOvr>
+</p:sld>
+</file>
+
+<file path=ppt/slides/slide14.xml><?xml version="1.0" encoding="utf-8"?>
+<p:sld xmlns:a="http://schemas.openxmlformats.org/drawingml/2006/main" xmlns:r="http://schemas.openxmlformats.org/officeDocument/2006/relationships" xmlns:p="http://schemas.openxmlformats.org/presentationml/2006/main">
+  <p:cSld>
+    <p:spTree>
+      <p:nvGrpSpPr>
+        <p:cNvPr id="1" name=""/>
+        <p:cNvGrpSpPr/>
+        <p:nvPr/>
+      </p:nvGrpSpPr>
+      <p:grpSpPr>
+        <a:xfrm>
+          <a:off x="0" y="0"/>
+          <a:ext cx="0" cy="0"/>
+          <a:chOff x="0" y="0"/>
+          <a:chExt cx="0" cy="0"/>
+        </a:xfrm>
+      </p:grpSpPr>
+      <p:sp>
+        <p:nvSpPr>
+          <p:cNvPr id="2" name="Title 1"/>
+          <p:cNvSpPr>
+            <a:spLocks noGrp="1"/>
+          </p:cNvSpPr>
+          <p:nvPr>
+            <p:ph type="title"/>
+          </p:nvPr>
+        </p:nvSpPr>
+        <p:spPr/>
+        <p:txBody>
+          <a:bodyPr/>
+          <a:lstStyle/>
+          <a:p>
+            <a:pPr algn="ctr"/>
+            <a:r>
+              <a:rPr lang="en-US" dirty="0" smtClean="0">
+                <a:latin typeface="Arial" panose="020B0604020202020204" pitchFamily="34" charset="0"/>
+                <a:cs typeface="Arial" panose="020B0604020202020204" pitchFamily="34" charset="0"/>
+              </a:rPr>
+              <a:t>Conditional logic (</a:t>
+            </a:r>
+            <a:r>
+              <a:rPr lang="en-US" dirty="0" smtClean="0">
+                <a:solidFill>
+                  <a:srgbClr val="FFFF00"/>
+                </a:solidFill>
+                <a:latin typeface="Arial" panose="020B0604020202020204" pitchFamily="34" charset="0"/>
+                <a:cs typeface="Arial" panose="020B0604020202020204" pitchFamily="34" charset="0"/>
+              </a:rPr>
+              <a:t>if/else if/else</a:t>
+            </a:r>
+            <a:r>
+              <a:rPr lang="en-US" dirty="0" smtClean="0">
+                <a:latin typeface="Arial" panose="020B0604020202020204" pitchFamily="34" charset="0"/>
+                <a:cs typeface="Arial" panose="020B0604020202020204" pitchFamily="34" charset="0"/>
+              </a:rPr>
+              <a:t>)</a:t>
+            </a:r>
+            <a:endParaRPr lang="en-US" dirty="0">
+              <a:latin typeface="Arial" panose="020B0604020202020204" pitchFamily="34" charset="0"/>
+              <a:cs typeface="Arial" panose="020B0604020202020204" pitchFamily="34" charset="0"/>
+            </a:endParaRPr>
+          </a:p>
+        </p:txBody>
+      </p:sp>
+      <p:pic>
+        <p:nvPicPr>
+          <p:cNvPr id="4" name="Content Placeholder 3"/>
+          <p:cNvPicPr>
+            <a:picLocks noGrp="1" noChangeAspect="1"/>
+          </p:cNvPicPr>
+          <p:nvPr>
+            <p:ph idx="1"/>
+          </p:nvPr>
+        </p:nvPicPr>
+        <p:blipFill>
+          <a:blip r:embed="rId2">
+            <a:extLst>
+              <a:ext uri="{28A0092B-C50C-407E-A947-70E740481C1C}">
+                <a14:useLocalDpi xmlns:a14="http://schemas.microsoft.com/office/drawing/2010/main" val="0"/>
+              </a:ext>
+            </a:extLst>
+          </a:blip>
+          <a:stretch>
+            <a:fillRect/>
+          </a:stretch>
+        </p:blipFill>
+        <p:spPr>
+          <a:xfrm>
+            <a:off x="2453053" y="2632449"/>
+            <a:ext cx="6569649" cy="3650809"/>
+          </a:xfrm>
+        </p:spPr>
+      </p:pic>
+    </p:spTree>
+    <p:extLst>
+      <p:ext uri="{BB962C8B-B14F-4D97-AF65-F5344CB8AC3E}">
+        <p14:creationId xmlns:p14="http://schemas.microsoft.com/office/powerpoint/2010/main" val="2584292962"/>
+      </p:ext>
+    </p:extLst>
+  </p:cSld>
+  <p:clrMapOvr>
+    <a:masterClrMapping/>
+  </p:clrMapOvr>
+</p:sld>
+</file>
+
+<file path=ppt/slides/slide15.xml><?xml version="1.0" encoding="utf-8"?>
+<p:sld xmlns:a="http://schemas.openxmlformats.org/drawingml/2006/main" xmlns:r="http://schemas.openxmlformats.org/officeDocument/2006/relationships" xmlns:p="http://schemas.openxmlformats.org/presentationml/2006/main">
+  <p:cSld>
+    <p:spTree>
+      <p:nvGrpSpPr>
+        <p:cNvPr id="1" name=""/>
+        <p:cNvGrpSpPr/>
+        <p:nvPr/>
+      </p:nvGrpSpPr>
+      <p:grpSpPr>
+        <a:xfrm>
+          <a:off x="0" y="0"/>
+          <a:ext cx="0" cy="0"/>
+          <a:chOff x="0" y="0"/>
+          <a:chExt cx="0" cy="0"/>
+        </a:xfrm>
+      </p:grpSpPr>
+      <p:sp>
+        <p:nvSpPr>
+          <p:cNvPr id="2" name="Title 1"/>
+          <p:cNvSpPr>
+            <a:spLocks noGrp="1"/>
+          </p:cNvSpPr>
+          <p:nvPr>
+            <p:ph type="title"/>
+          </p:nvPr>
+        </p:nvSpPr>
+        <p:spPr/>
+        <p:txBody>
+          <a:bodyPr/>
+          <a:lstStyle/>
+          <a:p>
+            <a:pPr algn="ctr"/>
+            <a:r>
+              <a:rPr lang="en-US" dirty="0">
+                <a:solidFill>
+                  <a:srgbClr val="FFFF00"/>
+                </a:solidFill>
+                <a:latin typeface="Arial" panose="020B0604020202020204" pitchFamily="34" charset="0"/>
+                <a:cs typeface="Arial" panose="020B0604020202020204" pitchFamily="34" charset="0"/>
+              </a:rPr>
+              <a:t>s</a:t>
+            </a:r>
+            <a:r>
+              <a:rPr lang="en-US" dirty="0" smtClean="0">
+                <a:solidFill>
+                  <a:srgbClr val="FFFF00"/>
+                </a:solidFill>
+                <a:latin typeface="Arial" panose="020B0604020202020204" pitchFamily="34" charset="0"/>
+                <a:cs typeface="Arial" panose="020B0604020202020204" pitchFamily="34" charset="0"/>
+              </a:rPr>
+              <a:t>witch/case</a:t>
+            </a:r>
+            <a:r>
+              <a:rPr lang="en-US" dirty="0" smtClean="0">
+                <a:latin typeface="Arial" panose="020B0604020202020204" pitchFamily="34" charset="0"/>
+                <a:cs typeface="Arial" panose="020B0604020202020204" pitchFamily="34" charset="0"/>
+              </a:rPr>
+              <a:t> logic</a:t>
+            </a:r>
+            <a:endParaRPr lang="en-US" dirty="0">
+              <a:latin typeface="Arial" panose="020B0604020202020204" pitchFamily="34" charset="0"/>
+              <a:cs typeface="Arial" panose="020B0604020202020204" pitchFamily="34" charset="0"/>
+            </a:endParaRPr>
+          </a:p>
+        </p:txBody>
+      </p:sp>
+      <p:pic>
+        <p:nvPicPr>
+          <p:cNvPr id="4" name="Content Placeholder 3"/>
+          <p:cNvPicPr>
+            <a:picLocks noGrp="1" noChangeAspect="1"/>
+          </p:cNvPicPr>
+          <p:nvPr>
+            <p:ph idx="1"/>
+          </p:nvPr>
+        </p:nvPicPr>
+        <p:blipFill>
+          <a:blip r:embed="rId2">
+            <a:extLst>
+              <a:ext uri="{28A0092B-C50C-407E-A947-70E740481C1C}">
+                <a14:useLocalDpi xmlns:a14="http://schemas.microsoft.com/office/drawing/2010/main" val="0"/>
+              </a:ext>
+            </a:extLst>
+          </a:blip>
+          <a:stretch>
+            <a:fillRect/>
+          </a:stretch>
+        </p:blipFill>
+        <p:spPr>
+          <a:xfrm>
+            <a:off x="2518536" y="2491532"/>
+            <a:ext cx="6597472" cy="4082595"/>
+          </a:xfrm>
+        </p:spPr>
+      </p:pic>
+    </p:spTree>
+    <p:extLst>
+      <p:ext uri="{BB962C8B-B14F-4D97-AF65-F5344CB8AC3E}">
+        <p14:creationId xmlns:p14="http://schemas.microsoft.com/office/powerpoint/2010/main" val="1873394619"/>
+      </p:ext>
+    </p:extLst>
+  </p:cSld>
+  <p:clrMapOvr>
+    <a:masterClrMapping/>
+  </p:clrMapOvr>
+</p:sld>
+</file>
+
+<file path=ppt/slides/slide16.xml><?xml version="1.0" encoding="utf-8"?>
+<p:sld xmlns:a="http://schemas.openxmlformats.org/drawingml/2006/main" xmlns:r="http://schemas.openxmlformats.org/officeDocument/2006/relationships" xmlns:p="http://schemas.openxmlformats.org/presentationml/2006/main">
+  <p:cSld>
+    <p:spTree>
+      <p:nvGrpSpPr>
+        <p:cNvPr id="1" name=""/>
+        <p:cNvGrpSpPr/>
+        <p:nvPr/>
+      </p:nvGrpSpPr>
+      <p:grpSpPr>
+        <a:xfrm>
+          <a:off x="0" y="0"/>
+          <a:ext cx="0" cy="0"/>
+          <a:chOff x="0" y="0"/>
+          <a:chExt cx="0" cy="0"/>
+        </a:xfrm>
+      </p:grpSpPr>
+      <p:sp>
+        <p:nvSpPr>
+          <p:cNvPr id="2" name="Title 1"/>
+          <p:cNvSpPr>
+            <a:spLocks noGrp="1"/>
+          </p:cNvSpPr>
+          <p:nvPr>
+            <p:ph type="title"/>
+          </p:nvPr>
+        </p:nvSpPr>
+        <p:spPr/>
+        <p:txBody>
+          <a:bodyPr/>
+          <a:lstStyle/>
+          <a:p>
+            <a:pPr algn="ctr"/>
+            <a:r>
+              <a:rPr lang="en-US" dirty="0" smtClean="0">
+                <a:latin typeface="Arial" panose="020B0604020202020204" pitchFamily="34" charset="0"/>
+                <a:cs typeface="Arial" panose="020B0604020202020204" pitchFamily="34" charset="0"/>
+              </a:rPr>
+              <a:t>Loops (</a:t>
+            </a:r>
+            <a:r>
+              <a:rPr lang="en-US" dirty="0" smtClean="0">
+                <a:solidFill>
+                  <a:srgbClr val="FFFF00"/>
+                </a:solidFill>
+                <a:latin typeface="Arial" panose="020B0604020202020204" pitchFamily="34" charset="0"/>
+                <a:cs typeface="Arial" panose="020B0604020202020204" pitchFamily="34" charset="0"/>
+              </a:rPr>
+              <a:t>for</a:t>
+            </a:r>
+            <a:r>
+              <a:rPr lang="en-US" dirty="0" smtClean="0">
+                <a:latin typeface="Arial" panose="020B0604020202020204" pitchFamily="34" charset="0"/>
+                <a:cs typeface="Arial" panose="020B0604020202020204" pitchFamily="34" charset="0"/>
+              </a:rPr>
+              <a:t> loop)</a:t>
+            </a:r>
+            <a:endParaRPr lang="en-US" dirty="0">
+              <a:latin typeface="Arial" panose="020B0604020202020204" pitchFamily="34" charset="0"/>
+              <a:cs typeface="Arial" panose="020B0604020202020204" pitchFamily="34" charset="0"/>
+            </a:endParaRPr>
+          </a:p>
+        </p:txBody>
+      </p:sp>
+      <p:pic>
+        <p:nvPicPr>
+          <p:cNvPr id="4" name="Content Placeholder 3"/>
+          <p:cNvPicPr>
+            <a:picLocks noGrp="1" noChangeAspect="1"/>
+          </p:cNvPicPr>
+          <p:nvPr>
+            <p:ph idx="1"/>
+          </p:nvPr>
+        </p:nvPicPr>
+        <p:blipFill>
+          <a:blip r:embed="rId2">
+            <a:extLst>
+              <a:ext uri="{28A0092B-C50C-407E-A947-70E740481C1C}">
+                <a14:useLocalDpi xmlns:a14="http://schemas.microsoft.com/office/drawing/2010/main" val="0"/>
+              </a:ext>
+            </a:extLst>
+          </a:blip>
+          <a:stretch>
+            <a:fillRect/>
+          </a:stretch>
+        </p:blipFill>
+        <p:spPr>
+          <a:xfrm>
+            <a:off x="7127689" y="4979254"/>
+            <a:ext cx="3977467" cy="1365561"/>
+          </a:xfrm>
+        </p:spPr>
+      </p:pic>
+      <p:sp>
+        <p:nvSpPr>
+          <p:cNvPr id="5" name="TextBox 4"/>
+          <p:cNvSpPr txBox="1"/>
+          <p:nvPr/>
+        </p:nvSpPr>
+        <p:spPr>
+          <a:xfrm>
+            <a:off x="979714" y="2593910"/>
+            <a:ext cx="5756988" cy="3139321"/>
+          </a:xfrm>
+          <a:prstGeom prst="rect">
+            <a:avLst/>
+          </a:prstGeom>
+          <a:noFill/>
+        </p:spPr>
+        <p:txBody>
+          <a:bodyPr wrap="square" rtlCol="0">
+            <a:spAutoFit/>
+          </a:bodyPr>
+          <a:lstStyle/>
+          <a:p>
+            <a:r>
+              <a:rPr lang="en-US" dirty="0" smtClean="0">
+                <a:latin typeface="Arial" panose="020B0604020202020204" pitchFamily="34" charset="0"/>
+                <a:cs typeface="Arial" panose="020B0604020202020204" pitchFamily="34" charset="0"/>
+              </a:rPr>
+              <a:t>For loop is one of the most used loops in the programming.</a:t>
+            </a:r>
+          </a:p>
+          <a:p>
+            <a:endParaRPr lang="en-US" dirty="0" smtClean="0">
+              <a:latin typeface="Arial" panose="020B0604020202020204" pitchFamily="34" charset="0"/>
+              <a:cs typeface="Arial" panose="020B0604020202020204" pitchFamily="34" charset="0"/>
+            </a:endParaRPr>
+          </a:p>
+          <a:p>
+            <a:r>
+              <a:rPr lang="en-US" dirty="0" smtClean="0">
+                <a:latin typeface="Arial" panose="020B0604020202020204" pitchFamily="34" charset="0"/>
+                <a:cs typeface="Arial" panose="020B0604020202020204" pitchFamily="34" charset="0"/>
+              </a:rPr>
+              <a:t>It contains three parts:</a:t>
+            </a:r>
+          </a:p>
+          <a:p>
+            <a:endParaRPr lang="en-US" dirty="0" smtClean="0"/>
+          </a:p>
+          <a:p>
+            <a:pPr marL="742950" lvl="1" indent="-285750">
+              <a:buFont typeface="Arial" panose="020B0604020202020204" pitchFamily="34" charset="0"/>
+              <a:buChar char="•"/>
+            </a:pPr>
+            <a:r>
+              <a:rPr lang="en-US" b="1" dirty="0" smtClean="0">
+                <a:latin typeface="Arial" panose="020B0604020202020204" pitchFamily="34" charset="0"/>
+                <a:cs typeface="Arial" panose="020B0604020202020204" pitchFamily="34" charset="0"/>
+              </a:rPr>
+              <a:t>statement </a:t>
+            </a:r>
+            <a:r>
+              <a:rPr lang="en-US" b="1" dirty="0">
+                <a:latin typeface="Arial" panose="020B0604020202020204" pitchFamily="34" charset="0"/>
+                <a:cs typeface="Arial" panose="020B0604020202020204" pitchFamily="34" charset="0"/>
+              </a:rPr>
+              <a:t>1</a:t>
+            </a:r>
+            <a:r>
+              <a:rPr lang="en-US" dirty="0">
+                <a:latin typeface="Arial" panose="020B0604020202020204" pitchFamily="34" charset="0"/>
+                <a:cs typeface="Arial" panose="020B0604020202020204" pitchFamily="34" charset="0"/>
+              </a:rPr>
+              <a:t> is executed (one time) before the execution of the code block.</a:t>
+            </a:r>
+          </a:p>
+          <a:p>
+            <a:pPr marL="742950" lvl="1" indent="-285750">
+              <a:buFont typeface="Arial" panose="020B0604020202020204" pitchFamily="34" charset="0"/>
+              <a:buChar char="•"/>
+            </a:pPr>
+            <a:r>
+              <a:rPr lang="en-US" b="1" dirty="0" smtClean="0">
+                <a:latin typeface="Arial" panose="020B0604020202020204" pitchFamily="34" charset="0"/>
+                <a:cs typeface="Arial" panose="020B0604020202020204" pitchFamily="34" charset="0"/>
+              </a:rPr>
+              <a:t>statement </a:t>
+            </a:r>
+            <a:r>
+              <a:rPr lang="en-US" b="1" dirty="0">
+                <a:latin typeface="Arial" panose="020B0604020202020204" pitchFamily="34" charset="0"/>
+                <a:cs typeface="Arial" panose="020B0604020202020204" pitchFamily="34" charset="0"/>
+              </a:rPr>
+              <a:t>2</a:t>
+            </a:r>
+            <a:r>
+              <a:rPr lang="en-US" dirty="0">
+                <a:latin typeface="Arial" panose="020B0604020202020204" pitchFamily="34" charset="0"/>
+                <a:cs typeface="Arial" panose="020B0604020202020204" pitchFamily="34" charset="0"/>
+              </a:rPr>
+              <a:t> defines the condition for executing the code block.</a:t>
+            </a:r>
+          </a:p>
+          <a:p>
+            <a:pPr marL="742950" lvl="1" indent="-285750">
+              <a:buFont typeface="Arial" panose="020B0604020202020204" pitchFamily="34" charset="0"/>
+              <a:buChar char="•"/>
+            </a:pPr>
+            <a:r>
+              <a:rPr lang="en-US" b="1" dirty="0" smtClean="0">
+                <a:latin typeface="Arial" panose="020B0604020202020204" pitchFamily="34" charset="0"/>
+                <a:cs typeface="Arial" panose="020B0604020202020204" pitchFamily="34" charset="0"/>
+              </a:rPr>
+              <a:t>statement </a:t>
+            </a:r>
+            <a:r>
+              <a:rPr lang="en-US" b="1" dirty="0">
+                <a:latin typeface="Arial" panose="020B0604020202020204" pitchFamily="34" charset="0"/>
+                <a:cs typeface="Arial" panose="020B0604020202020204" pitchFamily="34" charset="0"/>
+              </a:rPr>
+              <a:t>3</a:t>
+            </a:r>
+            <a:r>
+              <a:rPr lang="en-US" dirty="0">
+                <a:latin typeface="Arial" panose="020B0604020202020204" pitchFamily="34" charset="0"/>
+                <a:cs typeface="Arial" panose="020B0604020202020204" pitchFamily="34" charset="0"/>
+              </a:rPr>
+              <a:t> is executed (every time) after the code block has been executed</a:t>
+            </a:r>
+            <a:r>
+              <a:rPr lang="en-US" dirty="0" smtClean="0">
+                <a:latin typeface="Arial" panose="020B0604020202020204" pitchFamily="34" charset="0"/>
+                <a:cs typeface="Arial" panose="020B0604020202020204" pitchFamily="34" charset="0"/>
+              </a:rPr>
+              <a:t>.</a:t>
+            </a:r>
+            <a:endParaRPr lang="en-US" dirty="0">
+              <a:latin typeface="Arial" panose="020B0604020202020204" pitchFamily="34" charset="0"/>
+              <a:cs typeface="Arial" panose="020B0604020202020204" pitchFamily="34" charset="0"/>
+            </a:endParaRPr>
+          </a:p>
+        </p:txBody>
+      </p:sp>
+      <p:pic>
+        <p:nvPicPr>
+          <p:cNvPr id="6" name="Picture 5"/>
+          <p:cNvPicPr>
+            <a:picLocks noChangeAspect="1"/>
+          </p:cNvPicPr>
+          <p:nvPr/>
+        </p:nvPicPr>
+        <p:blipFill>
+          <a:blip r:embed="rId3">
+            <a:extLst>
+              <a:ext uri="{28A0092B-C50C-407E-A947-70E740481C1C}">
+                <a14:useLocalDpi xmlns:a14="http://schemas.microsoft.com/office/drawing/2010/main" val="0"/>
+              </a:ext>
+            </a:extLst>
+          </a:blip>
+          <a:stretch>
+            <a:fillRect/>
+          </a:stretch>
+        </p:blipFill>
+        <p:spPr>
+          <a:xfrm>
+            <a:off x="7039247" y="2803089"/>
+            <a:ext cx="4306485" cy="1360481"/>
           </a:xfrm>
           <a:prstGeom prst="rect">
             <a:avLst/>
@@ -13858,20 +15037,371 @@
     </p:spTree>
     <p:extLst>
       <p:ext uri="{BB962C8B-B14F-4D97-AF65-F5344CB8AC3E}">
-        <p14:creationId xmlns:p14="http://schemas.microsoft.com/office/powerpoint/2010/main" val="525679394"/>
+        <p14:creationId xmlns:p14="http://schemas.microsoft.com/office/powerpoint/2010/main" val="3511445357"/>
       </p:ext>
     </p:extLst>
   </p:cSld>
   <p:clrMapOvr>
     <a:masterClrMapping/>
   </p:clrMapOvr>
-  <p:timing>
-    <p:tnLst>
-      <p:par>
-        <p:cTn id="1" dur="indefinite" restart="never" nodeType="tmRoot"/>
-      </p:par>
-    </p:tnLst>
-  </p:timing>
+</p:sld>
+</file>
+
+<file path=ppt/slides/slide17.xml><?xml version="1.0" encoding="utf-8"?>
+<p:sld xmlns:a="http://schemas.openxmlformats.org/drawingml/2006/main" xmlns:r="http://schemas.openxmlformats.org/officeDocument/2006/relationships" xmlns:p="http://schemas.openxmlformats.org/presentationml/2006/main">
+  <p:cSld>
+    <p:spTree>
+      <p:nvGrpSpPr>
+        <p:cNvPr id="1" name=""/>
+        <p:cNvGrpSpPr/>
+        <p:nvPr/>
+      </p:nvGrpSpPr>
+      <p:grpSpPr>
+        <a:xfrm>
+          <a:off x="0" y="0"/>
+          <a:ext cx="0" cy="0"/>
+          <a:chOff x="0" y="0"/>
+          <a:chExt cx="0" cy="0"/>
+        </a:xfrm>
+      </p:grpSpPr>
+      <p:sp>
+        <p:nvSpPr>
+          <p:cNvPr id="2" name="Title 1"/>
+          <p:cNvSpPr>
+            <a:spLocks noGrp="1"/>
+          </p:cNvSpPr>
+          <p:nvPr>
+            <p:ph type="title"/>
+          </p:nvPr>
+        </p:nvSpPr>
+        <p:spPr/>
+        <p:txBody>
+          <a:bodyPr/>
+          <a:lstStyle/>
+          <a:p>
+            <a:pPr algn="ctr"/>
+            <a:r>
+              <a:rPr lang="en-US" dirty="0" smtClean="0">
+                <a:latin typeface="Arial" panose="020B0604020202020204" pitchFamily="34" charset="0"/>
+                <a:cs typeface="Arial" panose="020B0604020202020204" pitchFamily="34" charset="0"/>
+              </a:rPr>
+              <a:t>Loops (</a:t>
+            </a:r>
+            <a:r>
+              <a:rPr lang="en-US" dirty="0" smtClean="0">
+                <a:solidFill>
+                  <a:srgbClr val="FFFF00"/>
+                </a:solidFill>
+                <a:latin typeface="Arial" panose="020B0604020202020204" pitchFamily="34" charset="0"/>
+                <a:cs typeface="Arial" panose="020B0604020202020204" pitchFamily="34" charset="0"/>
+              </a:rPr>
+              <a:t>while</a:t>
+            </a:r>
+            <a:r>
+              <a:rPr lang="en-US" dirty="0" smtClean="0">
+                <a:latin typeface="Arial" panose="020B0604020202020204" pitchFamily="34" charset="0"/>
+                <a:cs typeface="Arial" panose="020B0604020202020204" pitchFamily="34" charset="0"/>
+              </a:rPr>
+              <a:t> loop)</a:t>
+            </a:r>
+            <a:endParaRPr lang="en-US" dirty="0">
+              <a:latin typeface="Arial" panose="020B0604020202020204" pitchFamily="34" charset="0"/>
+              <a:cs typeface="Arial" panose="020B0604020202020204" pitchFamily="34" charset="0"/>
+            </a:endParaRPr>
+          </a:p>
+        </p:txBody>
+      </p:sp>
+      <p:pic>
+        <p:nvPicPr>
+          <p:cNvPr id="4" name="Content Placeholder 3"/>
+          <p:cNvPicPr>
+            <a:picLocks noGrp="1" noChangeAspect="1"/>
+          </p:cNvPicPr>
+          <p:nvPr>
+            <p:ph idx="1"/>
+          </p:nvPr>
+        </p:nvPicPr>
+        <p:blipFill>
+          <a:blip r:embed="rId2">
+            <a:extLst>
+              <a:ext uri="{28A0092B-C50C-407E-A947-70E740481C1C}">
+                <a14:useLocalDpi xmlns:a14="http://schemas.microsoft.com/office/drawing/2010/main" val="0"/>
+              </a:ext>
+            </a:extLst>
+          </a:blip>
+          <a:stretch>
+            <a:fillRect/>
+          </a:stretch>
+        </p:blipFill>
+        <p:spPr>
+          <a:xfrm>
+            <a:off x="6179078" y="4897027"/>
+            <a:ext cx="5530841" cy="1682599"/>
+          </a:xfrm>
+        </p:spPr>
+      </p:pic>
+      <p:sp>
+        <p:nvSpPr>
+          <p:cNvPr id="5" name="TextBox 4"/>
+          <p:cNvSpPr txBox="1"/>
+          <p:nvPr/>
+        </p:nvSpPr>
+        <p:spPr>
+          <a:xfrm>
+            <a:off x="646419" y="3710668"/>
+            <a:ext cx="5054585" cy="1384995"/>
+          </a:xfrm>
+          <a:prstGeom prst="rect">
+            <a:avLst/>
+          </a:prstGeom>
+          <a:noFill/>
+        </p:spPr>
+        <p:txBody>
+          <a:bodyPr wrap="square" rtlCol="0">
+            <a:spAutoFit/>
+          </a:bodyPr>
+          <a:lstStyle/>
+          <a:p>
+            <a:r>
+              <a:rPr lang="en-US" sz="2800" dirty="0" smtClean="0">
+                <a:latin typeface="Arial" panose="020B0604020202020204" pitchFamily="34" charset="0"/>
+                <a:cs typeface="Arial" panose="020B0604020202020204" pitchFamily="34" charset="0"/>
+              </a:rPr>
+              <a:t>The </a:t>
+            </a:r>
+            <a:r>
+              <a:rPr lang="en-US" sz="2800" dirty="0" smtClean="0">
+                <a:solidFill>
+                  <a:srgbClr val="00B050"/>
+                </a:solidFill>
+                <a:latin typeface="Arial" panose="020B0604020202020204" pitchFamily="34" charset="0"/>
+                <a:cs typeface="Arial" panose="020B0604020202020204" pitchFamily="34" charset="0"/>
+              </a:rPr>
+              <a:t>while</a:t>
+            </a:r>
+            <a:r>
+              <a:rPr lang="en-US" sz="2800" dirty="0" smtClean="0">
+                <a:latin typeface="Arial" panose="020B0604020202020204" pitchFamily="34" charset="0"/>
+                <a:cs typeface="Arial" panose="020B0604020202020204" pitchFamily="34" charset="0"/>
+              </a:rPr>
+              <a:t> loop loops through a block of code as long as a specified condition is </a:t>
+            </a:r>
+            <a:r>
+              <a:rPr lang="en-US" sz="2800" dirty="0" smtClean="0">
+                <a:solidFill>
+                  <a:srgbClr val="002060"/>
+                </a:solidFill>
+                <a:latin typeface="Arial" panose="020B0604020202020204" pitchFamily="34" charset="0"/>
+                <a:cs typeface="Arial" panose="020B0604020202020204" pitchFamily="34" charset="0"/>
+              </a:rPr>
+              <a:t>True</a:t>
+            </a:r>
+            <a:r>
+              <a:rPr lang="en-US" sz="2800" dirty="0" smtClean="0">
+                <a:latin typeface="Arial" panose="020B0604020202020204" pitchFamily="34" charset="0"/>
+                <a:cs typeface="Arial" panose="020B0604020202020204" pitchFamily="34" charset="0"/>
+              </a:rPr>
+              <a:t>.</a:t>
+            </a:r>
+            <a:endParaRPr lang="en-US" sz="2800" dirty="0">
+              <a:latin typeface="Arial" panose="020B0604020202020204" pitchFamily="34" charset="0"/>
+              <a:cs typeface="Arial" panose="020B0604020202020204" pitchFamily="34" charset="0"/>
+            </a:endParaRPr>
+          </a:p>
+        </p:txBody>
+      </p:sp>
+      <p:pic>
+        <p:nvPicPr>
+          <p:cNvPr id="7" name="Picture 6"/>
+          <p:cNvPicPr>
+            <a:picLocks noChangeAspect="1"/>
+          </p:cNvPicPr>
+          <p:nvPr/>
+        </p:nvPicPr>
+        <p:blipFill>
+          <a:blip r:embed="rId3">
+            <a:extLst>
+              <a:ext uri="{28A0092B-C50C-407E-A947-70E740481C1C}">
+                <a14:useLocalDpi xmlns:a14="http://schemas.microsoft.com/office/drawing/2010/main" val="0"/>
+              </a:ext>
+            </a:extLst>
+          </a:blip>
+          <a:stretch>
+            <a:fillRect/>
+          </a:stretch>
+        </p:blipFill>
+        <p:spPr>
+          <a:xfrm>
+            <a:off x="6350491" y="2799183"/>
+            <a:ext cx="3857197" cy="1603983"/>
+          </a:xfrm>
+          <a:prstGeom prst="rect">
+            <a:avLst/>
+          </a:prstGeom>
+        </p:spPr>
+      </p:pic>
+    </p:spTree>
+    <p:extLst>
+      <p:ext uri="{BB962C8B-B14F-4D97-AF65-F5344CB8AC3E}">
+        <p14:creationId xmlns:p14="http://schemas.microsoft.com/office/powerpoint/2010/main" val="715386277"/>
+      </p:ext>
+    </p:extLst>
+  </p:cSld>
+  <p:clrMapOvr>
+    <a:masterClrMapping/>
+  </p:clrMapOvr>
+</p:sld>
+</file>
+
+<file path=ppt/slides/slide18.xml><?xml version="1.0" encoding="utf-8"?>
+<p:sld xmlns:a="http://schemas.openxmlformats.org/drawingml/2006/main" xmlns:r="http://schemas.openxmlformats.org/officeDocument/2006/relationships" xmlns:p="http://schemas.openxmlformats.org/presentationml/2006/main">
+  <p:cSld>
+    <p:spTree>
+      <p:nvGrpSpPr>
+        <p:cNvPr id="1" name=""/>
+        <p:cNvGrpSpPr/>
+        <p:nvPr/>
+      </p:nvGrpSpPr>
+      <p:grpSpPr>
+        <a:xfrm>
+          <a:off x="0" y="0"/>
+          <a:ext cx="0" cy="0"/>
+          <a:chOff x="0" y="0"/>
+          <a:chExt cx="0" cy="0"/>
+        </a:xfrm>
+      </p:grpSpPr>
+      <p:sp>
+        <p:nvSpPr>
+          <p:cNvPr id="2" name="Title 1"/>
+          <p:cNvSpPr>
+            <a:spLocks noGrp="1"/>
+          </p:cNvSpPr>
+          <p:nvPr>
+            <p:ph type="title"/>
+          </p:nvPr>
+        </p:nvSpPr>
+        <p:spPr/>
+        <p:txBody>
+          <a:bodyPr/>
+          <a:lstStyle/>
+          <a:p>
+            <a:pPr algn="ctr"/>
+            <a:r>
+              <a:rPr lang="en-US" dirty="0" smtClean="0">
+                <a:latin typeface="Arial" panose="020B0604020202020204" pitchFamily="34" charset="0"/>
+                <a:cs typeface="Arial" panose="020B0604020202020204" pitchFamily="34" charset="0"/>
+              </a:rPr>
+              <a:t>Using of “</a:t>
+            </a:r>
+            <a:r>
+              <a:rPr lang="en-US" dirty="0" smtClean="0">
+                <a:solidFill>
+                  <a:srgbClr val="FFFF00"/>
+                </a:solidFill>
+                <a:latin typeface="Arial" panose="020B0604020202020204" pitchFamily="34" charset="0"/>
+                <a:cs typeface="Arial" panose="020B0604020202020204" pitchFamily="34" charset="0"/>
+              </a:rPr>
+              <a:t>break</a:t>
+            </a:r>
+            <a:r>
+              <a:rPr lang="en-US" dirty="0" smtClean="0">
+                <a:latin typeface="Arial" panose="020B0604020202020204" pitchFamily="34" charset="0"/>
+                <a:cs typeface="Arial" panose="020B0604020202020204" pitchFamily="34" charset="0"/>
+              </a:rPr>
+              <a:t>”</a:t>
+            </a:r>
+            <a:endParaRPr lang="en-US" dirty="0">
+              <a:latin typeface="Arial" panose="020B0604020202020204" pitchFamily="34" charset="0"/>
+              <a:cs typeface="Arial" panose="020B0604020202020204" pitchFamily="34" charset="0"/>
+            </a:endParaRPr>
+          </a:p>
+        </p:txBody>
+      </p:sp>
+      <p:pic>
+        <p:nvPicPr>
+          <p:cNvPr id="4" name="Content Placeholder 3"/>
+          <p:cNvPicPr>
+            <a:picLocks noGrp="1" noChangeAspect="1"/>
+          </p:cNvPicPr>
+          <p:nvPr>
+            <p:ph idx="1"/>
+          </p:nvPr>
+        </p:nvPicPr>
+        <p:blipFill>
+          <a:blip r:embed="rId2">
+            <a:extLst>
+              <a:ext uri="{28A0092B-C50C-407E-A947-70E740481C1C}">
+                <a14:useLocalDpi xmlns:a14="http://schemas.microsoft.com/office/drawing/2010/main" val="0"/>
+              </a:ext>
+            </a:extLst>
+          </a:blip>
+          <a:stretch>
+            <a:fillRect/>
+          </a:stretch>
+        </p:blipFill>
+        <p:spPr>
+          <a:xfrm>
+            <a:off x="6259783" y="2510192"/>
+            <a:ext cx="4843645" cy="4126687"/>
+          </a:xfrm>
+        </p:spPr>
+      </p:pic>
+      <p:sp>
+        <p:nvSpPr>
+          <p:cNvPr id="5" name="TextBox 4"/>
+          <p:cNvSpPr txBox="1"/>
+          <p:nvPr/>
+        </p:nvSpPr>
+        <p:spPr>
+          <a:xfrm>
+            <a:off x="683741" y="3788228"/>
+            <a:ext cx="5054585" cy="954107"/>
+          </a:xfrm>
+          <a:prstGeom prst="rect">
+            <a:avLst/>
+          </a:prstGeom>
+          <a:noFill/>
+        </p:spPr>
+        <p:txBody>
+          <a:bodyPr wrap="square" rtlCol="0">
+            <a:spAutoFit/>
+          </a:bodyPr>
+          <a:lstStyle/>
+          <a:p>
+            <a:r>
+              <a:rPr lang="en-US" sz="2800" dirty="0" smtClean="0">
+                <a:solidFill>
+                  <a:srgbClr val="002060"/>
+                </a:solidFill>
+                <a:latin typeface="Arial" panose="020B0604020202020204" pitchFamily="34" charset="0"/>
+                <a:cs typeface="Arial" panose="020B0604020202020204" pitchFamily="34" charset="0"/>
+              </a:rPr>
+              <a:t>Break</a:t>
+            </a:r>
+            <a:r>
+              <a:rPr lang="en-US" sz="2800" dirty="0" smtClean="0">
+                <a:latin typeface="Arial" panose="020B0604020202020204" pitchFamily="34" charset="0"/>
+                <a:cs typeface="Arial" panose="020B0604020202020204" pitchFamily="34" charset="0"/>
+              </a:rPr>
+              <a:t> terminates the loop if condition is satisfied.</a:t>
+            </a:r>
+            <a:endParaRPr lang="en-US" sz="2800" dirty="0">
+              <a:latin typeface="Arial" panose="020B0604020202020204" pitchFamily="34" charset="0"/>
+              <a:cs typeface="Arial" panose="020B0604020202020204" pitchFamily="34" charset="0"/>
+            </a:endParaRPr>
+          </a:p>
+        </p:txBody>
+      </p:sp>
+    </p:spTree>
+    <p:extLst>
+      <p:ext uri="{BB962C8B-B14F-4D97-AF65-F5344CB8AC3E}">
+        <p14:creationId xmlns:p14="http://schemas.microsoft.com/office/powerpoint/2010/main" val="1064126904"/>
+      </p:ext>
+    </p:extLst>
+  </p:cSld>
+  <p:clrMapOvr>
+    <a:masterClrMapping/>
+  </p:clrMapOvr>
 </p:sld>
 </file>
 
@@ -13912,14 +15442,7 @@
                 <a:latin typeface="Arial" panose="020B0604020202020204" pitchFamily="34" charset="0"/>
                 <a:cs typeface="Arial" panose="020B0604020202020204" pitchFamily="34" charset="0"/>
               </a:rPr>
-              <a:t>Introduction to C</a:t>
-            </a:r>
-            <a:r>
-              <a:rPr lang="en-US" dirty="0" smtClean="0">
-                <a:latin typeface="Arial" panose="020B0604020202020204" pitchFamily="34" charset="0"/>
-                <a:cs typeface="Arial" panose="020B0604020202020204" pitchFamily="34" charset="0"/>
-              </a:rPr>
-              <a:t># and .NET</a:t>
+              <a:t>Introduction to C# and .NET</a:t>
             </a:r>
             <a:endParaRPr lang="en-US" dirty="0">
               <a:latin typeface="Arial" panose="020B0604020202020204" pitchFamily="34" charset="0"/>
@@ -14056,14 +15579,23 @@
                 <a:latin typeface="Arial" panose="020B0604020202020204" pitchFamily="34" charset="0"/>
                 <a:cs typeface="Arial" panose="020B0604020202020204" pitchFamily="34" charset="0"/>
               </a:rPr>
-              <a:t>C# is used on .NET </a:t>
-            </a:r>
+              <a:t>C# is used on .NET platform /.NET 6 is the latest version/</a:t>
+            </a:r>
+          </a:p>
+          <a:p>
             <a:r>
               <a:rPr lang="en-US" sz="2000" dirty="0" smtClean="0">
                 <a:latin typeface="Arial" panose="020B0604020202020204" pitchFamily="34" charset="0"/>
                 <a:cs typeface="Arial" panose="020B0604020202020204" pitchFamily="34" charset="0"/>
               </a:rPr>
-              <a:t>platform /.NET 6 is the latest version/</a:t>
+              <a:t>C# can be used for writing of Console, Desktop, Widows Services, Web apps, Mobile apps, Games and </a:t>
+            </a:r>
+            <a:r>
+              <a:rPr lang="en-US" sz="2000" dirty="0" err="1" smtClean="0">
+                <a:latin typeface="Arial" panose="020B0604020202020204" pitchFamily="34" charset="0"/>
+                <a:cs typeface="Arial" panose="020B0604020202020204" pitchFamily="34" charset="0"/>
+              </a:rPr>
+              <a:t>IoT</a:t>
             </a:r>
             <a:endParaRPr lang="en-US" sz="2000" dirty="0" smtClean="0">
               <a:latin typeface="Arial" panose="020B0604020202020204" pitchFamily="34" charset="0"/>
@@ -14076,27 +15608,14 @@
                 <a:latin typeface="Arial" panose="020B0604020202020204" pitchFamily="34" charset="0"/>
                 <a:cs typeface="Arial" panose="020B0604020202020204" pitchFamily="34" charset="0"/>
               </a:rPr>
-              <a:t>C# can be used for writing of Console, Desktop, Widows Services, Web apps, Mobile apps, </a:t>
+              <a:t>C# supports static typing, functional programming, generics and more </a:t>
             </a:r>
             <a:r>
               <a:rPr lang="en-US" sz="2000" dirty="0" smtClean="0">
                 <a:latin typeface="Arial" panose="020B0604020202020204" pitchFamily="34" charset="0"/>
                 <a:cs typeface="Arial" panose="020B0604020202020204" pitchFamily="34" charset="0"/>
               </a:rPr>
-              <a:t>Games and many more.</a:t>
-            </a:r>
-            <a:endParaRPr lang="en-US" sz="2000" dirty="0" smtClean="0">
-              <a:latin typeface="Arial" panose="020B0604020202020204" pitchFamily="34" charset="0"/>
-              <a:cs typeface="Arial" panose="020B0604020202020204" pitchFamily="34" charset="0"/>
-            </a:endParaRPr>
-          </a:p>
-          <a:p>
-            <a:r>
-              <a:rPr lang="en-US" sz="2000" dirty="0" smtClean="0">
-                <a:latin typeface="Arial" panose="020B0604020202020204" pitchFamily="34" charset="0"/>
-                <a:cs typeface="Arial" panose="020B0604020202020204" pitchFamily="34" charset="0"/>
-              </a:rPr>
-              <a:t>C# supports static typing, functional programming, generics and more features</a:t>
+              <a:t>features</a:t>
             </a:r>
             <a:endParaRPr lang="bg-BG" sz="2000" dirty="0" smtClean="0">
               <a:latin typeface="Arial" panose="020B0604020202020204" pitchFamily="34" charset="0"/>
@@ -14489,7 +16008,7 @@
       </p:sp>
       <p:pic>
         <p:nvPicPr>
-          <p:cNvPr id="9" name="Content Placeholder 8"/>
+          <p:cNvPr id="4" name="Content Placeholder 3"/>
           <p:cNvPicPr>
             <a:picLocks noGrp="1" noChangeAspect="1"/>
           </p:cNvPicPr>
@@ -14511,8 +16030,8 @@
         </p:blipFill>
         <p:spPr>
           <a:xfrm>
-            <a:off x="2873829" y="2478887"/>
-            <a:ext cx="6377149" cy="4006586"/>
+            <a:off x="3293707" y="2510194"/>
+            <a:ext cx="4890660" cy="3993216"/>
           </a:xfrm>
         </p:spPr>
       </p:pic>
@@ -14919,21 +16438,7 @@
                 <a:latin typeface="Arial" panose="020B0604020202020204" pitchFamily="34" charset="0"/>
                 <a:cs typeface="Arial" panose="020B0604020202020204" pitchFamily="34" charset="0"/>
               </a:rPr>
-              <a:t>.NET platform </a:t>
-            </a:r>
-            <a:r>
-              <a:rPr lang="en-US" dirty="0" smtClean="0">
-                <a:latin typeface="Arial" panose="020B0604020202020204" pitchFamily="34" charset="0"/>
-                <a:cs typeface="Arial" panose="020B0604020202020204" pitchFamily="34" charset="0"/>
-              </a:rPr>
-              <a:t>/whole </a:t>
-            </a:r>
-            <a:r>
-              <a:rPr lang="en-US" dirty="0" smtClean="0">
-                <a:latin typeface="Arial" panose="020B0604020202020204" pitchFamily="34" charset="0"/>
-                <a:cs typeface="Arial" panose="020B0604020202020204" pitchFamily="34" charset="0"/>
-              </a:rPr>
-              <a:t>new world/</a:t>
+              <a:t>.NET = The Ecosystem</a:t>
             </a:r>
             <a:endParaRPr lang="en-US" dirty="0">
               <a:latin typeface="Arial" panose="020B0604020202020204" pitchFamily="34" charset="0"/>
@@ -14942,15 +16447,55 @@
           </a:p>
         </p:txBody>
       </p:sp>
-      <p:pic>
-        <p:nvPicPr>
-          <p:cNvPr id="5" name="Content Placeholder 4"/>
-          <p:cNvPicPr>
-            <a:picLocks noGrp="1" noChangeAspect="1"/>
-          </p:cNvPicPr>
+      <p:sp>
+        <p:nvSpPr>
+          <p:cNvPr id="3" name="Content Placeholder 2"/>
+          <p:cNvSpPr>
+            <a:spLocks noGrp="1"/>
+          </p:cNvSpPr>
           <p:nvPr>
             <p:ph idx="1"/>
           </p:nvPr>
+        </p:nvSpPr>
+        <p:spPr>
+          <a:xfrm>
+            <a:off x="1154954" y="2603499"/>
+            <a:ext cx="2903862" cy="3349431"/>
+          </a:xfrm>
+        </p:spPr>
+        <p:txBody>
+          <a:bodyPr>
+            <a:normAutofit/>
+          </a:bodyPr>
+          <a:lstStyle/>
+          <a:p>
+            <a:r>
+              <a:rPr lang="en-US" sz="3200" dirty="0" smtClean="0"/>
+              <a:t>Languages</a:t>
+            </a:r>
+          </a:p>
+          <a:p>
+            <a:r>
+              <a:rPr lang="en-US" sz="3200" dirty="0" smtClean="0"/>
+              <a:t>Runtimes</a:t>
+            </a:r>
+          </a:p>
+          <a:p>
+            <a:r>
+              <a:rPr lang="en-US" sz="3200" dirty="0" smtClean="0"/>
+              <a:t>Libraries</a:t>
+            </a:r>
+            <a:endParaRPr lang="en-US" sz="3200" dirty="0"/>
+          </a:p>
+        </p:txBody>
+      </p:sp>
+      <p:pic>
+        <p:nvPicPr>
+          <p:cNvPr id="4" name="Picture 3"/>
+          <p:cNvPicPr>
+            <a:picLocks noChangeAspect="1"/>
+          </p:cNvPicPr>
+          <p:nvPr/>
         </p:nvPicPr>
         <p:blipFill>
           <a:blip r:embed="rId2">
@@ -14966,15 +16511,42 @@
         </p:blipFill>
         <p:spPr>
           <a:xfrm>
-            <a:off x="1081055" y="2539452"/>
-            <a:ext cx="10107301" cy="3674736"/>
+            <a:off x="5897308" y="2435652"/>
+            <a:ext cx="4140358" cy="4140358"/>
           </a:xfrm>
+          <a:prstGeom prst="roundRect">
+            <a:avLst>
+              <a:gd name="adj" fmla="val 16667"/>
+            </a:avLst>
+          </a:prstGeom>
+          <a:ln>
+            <a:noFill/>
+          </a:ln>
+          <a:effectLst>
+            <a:outerShdw blurRad="152400" dist="12000" dir="900000" sy="98000" kx="110000" ky="200000" algn="tl" rotWithShape="0">
+              <a:srgbClr val="000000">
+                <a:alpha val="30000"/>
+              </a:srgbClr>
+            </a:outerShdw>
+          </a:effectLst>
+          <a:scene3d>
+            <a:camera prst="perspectiveRelaxed">
+              <a:rot lat="19800000" lon="1200000" rev="20820000"/>
+            </a:camera>
+            <a:lightRig rig="threePt" dir="t"/>
+          </a:scene3d>
+          <a:sp3d contourW="6350" prstMaterial="matte">
+            <a:bevelT w="101600" h="101600"/>
+            <a:contourClr>
+              <a:srgbClr val="969696"/>
+            </a:contourClr>
+          </a:sp3d>
         </p:spPr>
       </p:pic>
     </p:spTree>
     <p:extLst>
       <p:ext uri="{BB962C8B-B14F-4D97-AF65-F5344CB8AC3E}">
-        <p14:creationId xmlns:p14="http://schemas.microsoft.com/office/powerpoint/2010/main" val="152368737"/>
+        <p14:creationId xmlns:p14="http://schemas.microsoft.com/office/powerpoint/2010/main" val="1619143915"/>
       </p:ext>
     </p:extLst>
   </p:cSld>
@@ -15152,7 +16724,7 @@
                 <a:latin typeface="Arial" panose="020B0604020202020204" pitchFamily="34" charset="0"/>
                 <a:cs typeface="Arial" panose="020B0604020202020204" pitchFamily="34" charset="0"/>
               </a:rPr>
-              <a:t>.NET = The Ecosystem</a:t>
+              <a:t>.NET platform /whole new world/</a:t>
             </a:r>
             <a:endParaRPr lang="en-US" dirty="0">
               <a:latin typeface="Arial" panose="020B0604020202020204" pitchFamily="34" charset="0"/>
@@ -15161,55 +16733,15 @@
           </a:p>
         </p:txBody>
       </p:sp>
-      <p:sp>
-        <p:nvSpPr>
-          <p:cNvPr id="3" name="Content Placeholder 2"/>
-          <p:cNvSpPr>
-            <a:spLocks noGrp="1"/>
-          </p:cNvSpPr>
+      <p:pic>
+        <p:nvPicPr>
+          <p:cNvPr id="5" name="Content Placeholder 4"/>
+          <p:cNvPicPr>
+            <a:picLocks noGrp="1" noChangeAspect="1"/>
+          </p:cNvPicPr>
           <p:nvPr>
             <p:ph idx="1"/>
           </p:nvPr>
-        </p:nvSpPr>
-        <p:spPr>
-          <a:xfrm>
-            <a:off x="1154954" y="2603499"/>
-            <a:ext cx="2903862" cy="3349431"/>
-          </a:xfrm>
-        </p:spPr>
-        <p:txBody>
-          <a:bodyPr>
-            <a:normAutofit/>
-          </a:bodyPr>
-          <a:lstStyle/>
-          <a:p>
-            <a:r>
-              <a:rPr lang="en-US" sz="3200" dirty="0" smtClean="0"/>
-              <a:t>Languages</a:t>
-            </a:r>
-          </a:p>
-          <a:p>
-            <a:r>
-              <a:rPr lang="en-US" sz="3200" dirty="0" smtClean="0"/>
-              <a:t>Runtimes</a:t>
-            </a:r>
-          </a:p>
-          <a:p>
-            <a:r>
-              <a:rPr lang="en-US" sz="3200" dirty="0" smtClean="0"/>
-              <a:t>Libraries</a:t>
-            </a:r>
-            <a:endParaRPr lang="en-US" sz="3200" dirty="0"/>
-          </a:p>
-        </p:txBody>
-      </p:sp>
-      <p:pic>
-        <p:nvPicPr>
-          <p:cNvPr id="4" name="Picture 3"/>
-          <p:cNvPicPr>
-            <a:picLocks noChangeAspect="1"/>
-          </p:cNvPicPr>
-          <p:nvPr/>
         </p:nvPicPr>
         <p:blipFill>
           <a:blip r:embed="rId2">
@@ -15225,42 +16757,15 @@
         </p:blipFill>
         <p:spPr>
           <a:xfrm>
-            <a:off x="5897308" y="2435652"/>
-            <a:ext cx="4140358" cy="4140358"/>
+            <a:off x="1081055" y="2539452"/>
+            <a:ext cx="10107301" cy="3674736"/>
           </a:xfrm>
-          <a:prstGeom prst="roundRect">
-            <a:avLst>
-              <a:gd name="adj" fmla="val 16667"/>
-            </a:avLst>
-          </a:prstGeom>
-          <a:ln>
-            <a:noFill/>
-          </a:ln>
-          <a:effectLst>
-            <a:outerShdw blurRad="152400" dist="12000" dir="900000" sy="98000" kx="110000" ky="200000" algn="tl" rotWithShape="0">
-              <a:srgbClr val="000000">
-                <a:alpha val="30000"/>
-              </a:srgbClr>
-            </a:outerShdw>
-          </a:effectLst>
-          <a:scene3d>
-            <a:camera prst="perspectiveRelaxed">
-              <a:rot lat="19800000" lon="1200000" rev="20820000"/>
-            </a:camera>
-            <a:lightRig rig="threePt" dir="t"/>
-          </a:scene3d>
-          <a:sp3d contourW="6350" prstMaterial="matte">
-            <a:bevelT w="101600" h="101600"/>
-            <a:contourClr>
-              <a:srgbClr val="969696"/>
-            </a:contourClr>
-          </a:sp3d>
         </p:spPr>
       </p:pic>
     </p:spTree>
     <p:extLst>
       <p:ext uri="{BB962C8B-B14F-4D97-AF65-F5344CB8AC3E}">
-        <p14:creationId xmlns:p14="http://schemas.microsoft.com/office/powerpoint/2010/main" val="1619143915"/>
+        <p14:creationId xmlns:p14="http://schemas.microsoft.com/office/powerpoint/2010/main" val="152368737"/>
       </p:ext>
     </p:extLst>
   </p:cSld>
@@ -15629,4 +17134,265 @@
     </a:ext>
   </a:extLst>
 </a:theme>
+</file>
+
+<file path=ppt/theme/theme2.xml><?xml version="1.0" encoding="utf-8"?>
+<a:theme xmlns:a="http://schemas.openxmlformats.org/drawingml/2006/main" name="Office Theme">
+  <a:themeElements>
+    <a:clrScheme name="Office">
+      <a:dk1>
+        <a:sysClr val="windowText" lastClr="000000"/>
+      </a:dk1>
+      <a:lt1>
+        <a:sysClr val="window" lastClr="FFFFFF"/>
+      </a:lt1>
+      <a:dk2>
+        <a:srgbClr val="44546A"/>
+      </a:dk2>
+      <a:lt2>
+        <a:srgbClr val="E7E6E6"/>
+      </a:lt2>
+      <a:accent1>
+        <a:srgbClr val="5B9BD5"/>
+      </a:accent1>
+      <a:accent2>
+        <a:srgbClr val="ED7D31"/>
+      </a:accent2>
+      <a:accent3>
+        <a:srgbClr val="A5A5A5"/>
+      </a:accent3>
+      <a:accent4>
+        <a:srgbClr val="FFC000"/>
+      </a:accent4>
+      <a:accent5>
+        <a:srgbClr val="4472C4"/>
+      </a:accent5>
+      <a:accent6>
+        <a:srgbClr val="70AD47"/>
+      </a:accent6>
+      <a:hlink>
+        <a:srgbClr val="0563C1"/>
+      </a:hlink>
+      <a:folHlink>
+        <a:srgbClr val="954F72"/>
+      </a:folHlink>
+    </a:clrScheme>
+    <a:fontScheme name="Office">
+      <a:majorFont>
+        <a:latin typeface="Calibri Light" panose="020F0302020204030204"/>
+        <a:ea typeface=""/>
+        <a:cs typeface=""/>
+        <a:font script="Jpan" typeface="游ゴシック Light"/>
+        <a:font script="Hang" typeface="맑은 고딕"/>
+        <a:font script="Hans" typeface="等线 Light"/>
+        <a:font script="Hant" typeface="新細明體"/>
+        <a:font script="Arab" typeface="Times New Roman"/>
+        <a:font script="Hebr" typeface="Times New Roman"/>
+        <a:font script="Thai" typeface="Angsana New"/>
+        <a:font script="Ethi" typeface="Nyala"/>
+        <a:font script="Beng" typeface="Vrinda"/>
+        <a:font script="Gujr" typeface="Shruti"/>
+        <a:font script="Khmr" typeface="MoolBoran"/>
+        <a:font script="Knda" typeface="Tunga"/>
+        <a:font script="Guru" typeface="Raavi"/>
+        <a:font script="Cans" typeface="Euphemia"/>
+        <a:font script="Cher" typeface="Plantagenet Cherokee"/>
+        <a:font script="Yiii" typeface="Microsoft Yi Baiti"/>
+        <a:font script="Tibt" typeface="Microsoft Himalaya"/>
+        <a:font script="Thaa" typeface="MV Boli"/>
+        <a:font script="Deva" typeface="Mangal"/>
+        <a:font script="Telu" typeface="Gautami"/>
+        <a:font script="Taml" typeface="Latha"/>
+        <a:font script="Syrc" typeface="Estrangelo Edessa"/>
+        <a:font script="Orya" typeface="Kalinga"/>
+        <a:font script="Mlym" typeface="Kartika"/>
+        <a:font script="Laoo" typeface="DokChampa"/>
+        <a:font script="Sinh" typeface="Iskoola Pota"/>
+        <a:font script="Mong" typeface="Mongolian Baiti"/>
+        <a:font script="Viet" typeface="Times New Roman"/>
+        <a:font script="Uigh" typeface="Microsoft Uighur"/>
+        <a:font script="Geor" typeface="Sylfaen"/>
+      </a:majorFont>
+      <a:minorFont>
+        <a:latin typeface="Calibri" panose="020F0502020204030204"/>
+        <a:ea typeface=""/>
+        <a:cs typeface=""/>
+        <a:font script="Jpan" typeface="游ゴシック"/>
+        <a:font script="Hang" typeface="맑은 고딕"/>
+        <a:font script="Hans" typeface="等线"/>
+        <a:font script="Hant" typeface="新細明體"/>
+        <a:font script="Arab" typeface="Arial"/>
+        <a:font script="Hebr" typeface="Arial"/>
+        <a:font script="Thai" typeface="Cordia New"/>
+        <a:font script="Ethi" typeface="Nyala"/>
+        <a:font script="Beng" typeface="Vrinda"/>
+        <a:font script="Gujr" typeface="Shruti"/>
+        <a:font script="Khmr" typeface="DaunPenh"/>
+        <a:font script="Knda" typeface="Tunga"/>
+        <a:font script="Guru" typeface="Raavi"/>
+        <a:font script="Cans" typeface="Euphemia"/>
+        <a:font script="Cher" typeface="Plantagenet Cherokee"/>
+        <a:font script="Yiii" typeface="Microsoft Yi Baiti"/>
+        <a:font script="Tibt" typeface="Microsoft Himalaya"/>
+        <a:font script="Thaa" typeface="MV Boli"/>
+        <a:font script="Deva" typeface="Mangal"/>
+        <a:font script="Telu" typeface="Gautami"/>
+        <a:font script="Taml" typeface="Latha"/>
+        <a:font script="Syrc" typeface="Estrangelo Edessa"/>
+        <a:font script="Orya" typeface="Kalinga"/>
+        <a:font script="Mlym" typeface="Kartika"/>
+        <a:font script="Laoo" typeface="DokChampa"/>
+        <a:font script="Sinh" typeface="Iskoola Pota"/>
+        <a:font script="Mong" typeface="Mongolian Baiti"/>
+        <a:font script="Viet" typeface="Arial"/>
+        <a:font script="Uigh" typeface="Microsoft Uighur"/>
+        <a:font script="Geor" typeface="Sylfaen"/>
+      </a:minorFont>
+    </a:fontScheme>
+    <a:fmtScheme name="Office">
+      <a:fillStyleLst>
+        <a:solidFill>
+          <a:schemeClr val="phClr"/>
+        </a:solidFill>
+        <a:gradFill rotWithShape="1">
+          <a:gsLst>
+            <a:gs pos="0">
+              <a:schemeClr val="phClr">
+                <a:lumMod val="110000"/>
+                <a:satMod val="105000"/>
+                <a:tint val="67000"/>
+              </a:schemeClr>
+            </a:gs>
+            <a:gs pos="50000">
+              <a:schemeClr val="phClr">
+                <a:lumMod val="105000"/>
+                <a:satMod val="103000"/>
+                <a:tint val="73000"/>
+              </a:schemeClr>
+            </a:gs>
+            <a:gs pos="100000">
+              <a:schemeClr val="phClr">
+                <a:lumMod val="105000"/>
+                <a:satMod val="109000"/>
+                <a:tint val="81000"/>
+              </a:schemeClr>
+            </a:gs>
+          </a:gsLst>
+          <a:lin ang="5400000" scaled="0"/>
+        </a:gradFill>
+        <a:gradFill rotWithShape="1">
+          <a:gsLst>
+            <a:gs pos="0">
+              <a:schemeClr val="phClr">
+                <a:satMod val="103000"/>
+                <a:lumMod val="102000"/>
+                <a:tint val="94000"/>
+              </a:schemeClr>
+            </a:gs>
+            <a:gs pos="50000">
+              <a:schemeClr val="phClr">
+                <a:satMod val="110000"/>
+                <a:lumMod val="100000"/>
+                <a:shade val="100000"/>
+              </a:schemeClr>
+            </a:gs>
+            <a:gs pos="100000">
+              <a:schemeClr val="phClr">
+                <a:lumMod val="99000"/>
+                <a:satMod val="120000"/>
+                <a:shade val="78000"/>
+              </a:schemeClr>
+            </a:gs>
+          </a:gsLst>
+          <a:lin ang="5400000" scaled="0"/>
+        </a:gradFill>
+      </a:fillStyleLst>
+      <a:lnStyleLst>
+        <a:ln w="6350" cap="flat" cmpd="sng" algn="ctr">
+          <a:solidFill>
+            <a:schemeClr val="phClr"/>
+          </a:solidFill>
+          <a:prstDash val="solid"/>
+          <a:miter lim="800000"/>
+        </a:ln>
+        <a:ln w="12700" cap="flat" cmpd="sng" algn="ctr">
+          <a:solidFill>
+            <a:schemeClr val="phClr"/>
+          </a:solidFill>
+          <a:prstDash val="solid"/>
+          <a:miter lim="800000"/>
+        </a:ln>
+        <a:ln w="19050" cap="flat" cmpd="sng" algn="ctr">
+          <a:solidFill>
+            <a:schemeClr val="phClr"/>
+          </a:solidFill>
+          <a:prstDash val="solid"/>
+          <a:miter lim="800000"/>
+        </a:ln>
+      </a:lnStyleLst>
+      <a:effectStyleLst>
+        <a:effectStyle>
+          <a:effectLst/>
+        </a:effectStyle>
+        <a:effectStyle>
+          <a:effectLst/>
+        </a:effectStyle>
+        <a:effectStyle>
+          <a:effectLst>
+            <a:outerShdw blurRad="57150" dist="19050" dir="5400000" algn="ctr" rotWithShape="0">
+              <a:srgbClr val="000000">
+                <a:alpha val="63000"/>
+              </a:srgbClr>
+            </a:outerShdw>
+          </a:effectLst>
+        </a:effectStyle>
+      </a:effectStyleLst>
+      <a:bgFillStyleLst>
+        <a:solidFill>
+          <a:schemeClr val="phClr"/>
+        </a:solidFill>
+        <a:solidFill>
+          <a:schemeClr val="phClr">
+            <a:tint val="95000"/>
+            <a:satMod val="170000"/>
+          </a:schemeClr>
+        </a:solidFill>
+        <a:gradFill rotWithShape="1">
+          <a:gsLst>
+            <a:gs pos="0">
+              <a:schemeClr val="phClr">
+                <a:tint val="93000"/>
+                <a:satMod val="150000"/>
+                <a:shade val="98000"/>
+                <a:lumMod val="102000"/>
+              </a:schemeClr>
+            </a:gs>
+            <a:gs pos="50000">
+              <a:schemeClr val="phClr">
+                <a:tint val="98000"/>
+                <a:satMod val="130000"/>
+                <a:shade val="90000"/>
+                <a:lumMod val="103000"/>
+              </a:schemeClr>
+            </a:gs>
+            <a:gs pos="100000">
+              <a:schemeClr val="phClr">
+                <a:shade val="63000"/>
+                <a:satMod val="120000"/>
+              </a:schemeClr>
+            </a:gs>
+          </a:gsLst>
+          <a:lin ang="5400000" scaled="0"/>
+        </a:gradFill>
+      </a:bgFillStyleLst>
+    </a:fmtScheme>
+  </a:themeElements>
+  <a:objectDefaults/>
+  <a:extraClrSchemeLst/>
+  <a:extLst>
+    <a:ext uri="{05A4C25C-085E-4340-85A3-A5531E510DB2}">
+      <thm15:themeFamily xmlns:thm15="http://schemas.microsoft.com/office/thememl/2012/main" name="Office Theme" id="{62F939B6-93AF-4DB8-9C6B-D6C7DFDC589F}" vid="{4A3C46E8-61CC-4603-A589-7422A47A8E4A}"/>
+    </a:ext>
+  </a:extLst>
+</a:theme>
 </file>
</xml_diff>

<commit_message>
Adding of new slides + corrections in existing ones
</commit_message>
<xml_diff>
--- a/C# Basics.pptx
+++ b/C# Basics.pptx
@@ -5,27 +5,32 @@
     <p:sldMasterId id="2147483707" r:id="rId1"/>
   </p:sldMasterIdLst>
   <p:notesMasterIdLst>
-    <p:notesMasterId r:id="rId20"/>
+    <p:notesMasterId r:id="rId25"/>
   </p:notesMasterIdLst>
   <p:sldIdLst>
     <p:sldId id="256" r:id="rId2"/>
     <p:sldId id="258" r:id="rId3"/>
     <p:sldId id="259" r:id="rId4"/>
-    <p:sldId id="260" r:id="rId5"/>
-    <p:sldId id="262" r:id="rId6"/>
-    <p:sldId id="264" r:id="rId7"/>
-    <p:sldId id="263" r:id="rId8"/>
-    <p:sldId id="261" r:id="rId9"/>
-    <p:sldId id="265" r:id="rId10"/>
-    <p:sldId id="267" r:id="rId11"/>
-    <p:sldId id="266" r:id="rId12"/>
-    <p:sldId id="269" r:id="rId13"/>
-    <p:sldId id="268" r:id="rId14"/>
-    <p:sldId id="270" r:id="rId15"/>
-    <p:sldId id="271" r:id="rId16"/>
-    <p:sldId id="272" r:id="rId17"/>
-    <p:sldId id="273" r:id="rId18"/>
-    <p:sldId id="274" r:id="rId19"/>
+    <p:sldId id="262" r:id="rId5"/>
+    <p:sldId id="264" r:id="rId6"/>
+    <p:sldId id="263" r:id="rId7"/>
+    <p:sldId id="261" r:id="rId8"/>
+    <p:sldId id="265" r:id="rId9"/>
+    <p:sldId id="267" r:id="rId10"/>
+    <p:sldId id="266" r:id="rId11"/>
+    <p:sldId id="269" r:id="rId12"/>
+    <p:sldId id="268" r:id="rId13"/>
+    <p:sldId id="279" r:id="rId14"/>
+    <p:sldId id="280" r:id="rId15"/>
+    <p:sldId id="278" r:id="rId16"/>
+    <p:sldId id="270" r:id="rId17"/>
+    <p:sldId id="271" r:id="rId18"/>
+    <p:sldId id="272" r:id="rId19"/>
+    <p:sldId id="273" r:id="rId20"/>
+    <p:sldId id="276" r:id="rId21"/>
+    <p:sldId id="277" r:id="rId22"/>
+    <p:sldId id="274" r:id="rId23"/>
+    <p:sldId id="275" r:id="rId24"/>
   </p:sldIdLst>
   <p:sldSz cx="12192000" cy="6858000"/>
   <p:notesSz cx="6858000" cy="9144000"/>
@@ -214,7 +219,7 @@
           <a:p>
             <a:fld id="{068E3771-71AF-4AE2-9E86-BE935DBF2B0E}" type="datetimeFigureOut">
               <a:rPr lang="en-US" smtClean="0"/>
-              <a:t>5/15/2022</a:t>
+              <a:t>5/24/2022</a:t>
             </a:fld>
             <a:endParaRPr lang="en-US"/>
           </a:p>
@@ -817,7 +822,7 @@
           <a:p>
             <a:fld id="{C0A3DACC-474D-44ED-8DF0-6B6BA2CE3243}" type="datetimeFigureOut">
               <a:rPr lang="en-US" smtClean="0"/>
-              <a:t>5/15/2022</a:t>
+              <a:t>5/24/2022</a:t>
             </a:fld>
             <a:endParaRPr lang="en-US"/>
           </a:p>
@@ -1905,7 +1910,7 @@
           <a:p>
             <a:fld id="{C0A3DACC-474D-44ED-8DF0-6B6BA2CE3243}" type="datetimeFigureOut">
               <a:rPr lang="en-US" smtClean="0"/>
-              <a:t>5/15/2022</a:t>
+              <a:t>5/24/2022</a:t>
             </a:fld>
             <a:endParaRPr lang="en-US"/>
           </a:p>
@@ -2885,7 +2890,7 @@
           <a:p>
             <a:fld id="{C0A3DACC-474D-44ED-8DF0-6B6BA2CE3243}" type="datetimeFigureOut">
               <a:rPr lang="en-US" smtClean="0"/>
-              <a:t>5/15/2022</a:t>
+              <a:t>5/24/2022</a:t>
             </a:fld>
             <a:endParaRPr lang="en-US"/>
           </a:p>
@@ -4019,7 +4024,7 @@
           <a:p>
             <a:fld id="{C0A3DACC-474D-44ED-8DF0-6B6BA2CE3243}" type="datetimeFigureOut">
               <a:rPr lang="en-US" smtClean="0"/>
-              <a:t>5/15/2022</a:t>
+              <a:t>5/24/2022</a:t>
             </a:fld>
             <a:endParaRPr lang="en-US"/>
           </a:p>
@@ -5052,7 +5057,7 @@
           <a:p>
             <a:fld id="{C0A3DACC-474D-44ED-8DF0-6B6BA2CE3243}" type="datetimeFigureOut">
               <a:rPr lang="en-US" smtClean="0"/>
-              <a:t>5/15/2022</a:t>
+              <a:t>5/24/2022</a:t>
             </a:fld>
             <a:endParaRPr lang="en-US"/>
           </a:p>
@@ -5712,7 +5717,7 @@
           <a:p>
             <a:fld id="{C0A3DACC-474D-44ED-8DF0-6B6BA2CE3243}" type="datetimeFigureOut">
               <a:rPr lang="en-US" smtClean="0"/>
-              <a:t>5/15/2022</a:t>
+              <a:t>5/24/2022</a:t>
             </a:fld>
             <a:endParaRPr lang="en-US"/>
           </a:p>
@@ -6573,7 +6578,7 @@
           <a:p>
             <a:fld id="{C0A3DACC-474D-44ED-8DF0-6B6BA2CE3243}" type="datetimeFigureOut">
               <a:rPr lang="en-US" smtClean="0"/>
-              <a:t>5/15/2022</a:t>
+              <a:t>5/24/2022</a:t>
             </a:fld>
             <a:endParaRPr lang="en-US"/>
           </a:p>
@@ -6763,7 +6768,7 @@
           <a:p>
             <a:fld id="{C0A3DACC-474D-44ED-8DF0-6B6BA2CE3243}" type="datetimeFigureOut">
               <a:rPr lang="en-US" smtClean="0"/>
-              <a:t>5/15/2022</a:t>
+              <a:t>5/24/2022</a:t>
             </a:fld>
             <a:endParaRPr lang="en-US"/>
           </a:p>
@@ -7735,7 +7740,7 @@
           <a:p>
             <a:fld id="{C0A3DACC-474D-44ED-8DF0-6B6BA2CE3243}" type="datetimeFigureOut">
               <a:rPr lang="en-US" smtClean="0"/>
-              <a:t>5/15/2022</a:t>
+              <a:t>5/24/2022</a:t>
             </a:fld>
             <a:endParaRPr lang="en-US"/>
           </a:p>
@@ -7946,7 +7951,7 @@
           <a:p>
             <a:fld id="{C0A3DACC-474D-44ED-8DF0-6B6BA2CE3243}" type="datetimeFigureOut">
               <a:rPr lang="en-US" smtClean="0"/>
-              <a:t>5/15/2022</a:t>
+              <a:t>5/24/2022</a:t>
             </a:fld>
             <a:endParaRPr lang="en-US"/>
           </a:p>
@@ -8980,7 +8985,7 @@
           <a:p>
             <a:fld id="{C0A3DACC-474D-44ED-8DF0-6B6BA2CE3243}" type="datetimeFigureOut">
               <a:rPr lang="en-US" smtClean="0"/>
-              <a:t>5/15/2022</a:t>
+              <a:t>5/24/2022</a:t>
             </a:fld>
             <a:endParaRPr lang="en-US"/>
           </a:p>
@@ -9252,7 +9257,7 @@
           <a:p>
             <a:fld id="{C0A3DACC-474D-44ED-8DF0-6B6BA2CE3243}" type="datetimeFigureOut">
               <a:rPr lang="en-US" smtClean="0"/>
-              <a:t>5/15/2022</a:t>
+              <a:t>5/24/2022</a:t>
             </a:fld>
             <a:endParaRPr lang="en-US"/>
           </a:p>
@@ -9662,7 +9667,7 @@
           <a:p>
             <a:fld id="{C0A3DACC-474D-44ED-8DF0-6B6BA2CE3243}" type="datetimeFigureOut">
               <a:rPr lang="en-US" smtClean="0"/>
-              <a:t>5/15/2022</a:t>
+              <a:t>5/24/2022</a:t>
             </a:fld>
             <a:endParaRPr lang="en-US"/>
           </a:p>
@@ -9789,7 +9794,7 @@
           <a:p>
             <a:fld id="{C0A3DACC-474D-44ED-8DF0-6B6BA2CE3243}" type="datetimeFigureOut">
               <a:rPr lang="en-US" smtClean="0"/>
-              <a:t>5/15/2022</a:t>
+              <a:t>5/24/2022</a:t>
             </a:fld>
             <a:endParaRPr lang="en-US"/>
           </a:p>
@@ -9884,7 +9889,7 @@
           <a:p>
             <a:fld id="{C0A3DACC-474D-44ED-8DF0-6B6BA2CE3243}" type="datetimeFigureOut">
               <a:rPr lang="en-US" smtClean="0"/>
-              <a:t>5/15/2022</a:t>
+              <a:t>5/24/2022</a:t>
             </a:fld>
             <a:endParaRPr lang="en-US"/>
           </a:p>
@@ -10965,7 +10970,7 @@
           <a:p>
             <a:fld id="{C0A3DACC-474D-44ED-8DF0-6B6BA2CE3243}" type="datetimeFigureOut">
               <a:rPr lang="en-US" smtClean="0"/>
-              <a:t>5/15/2022</a:t>
+              <a:t>5/24/2022</a:t>
             </a:fld>
             <a:endParaRPr lang="en-US"/>
           </a:p>
@@ -12073,7 +12078,7 @@
           <a:p>
             <a:fld id="{C0A3DACC-474D-44ED-8DF0-6B6BA2CE3243}" type="datetimeFigureOut">
               <a:rPr lang="en-US" smtClean="0"/>
-              <a:t>5/15/2022</a:t>
+              <a:t>5/24/2022</a:t>
             </a:fld>
             <a:endParaRPr lang="en-US"/>
           </a:p>
@@ -13070,7 +13075,7 @@
           <a:p>
             <a:fld id="{C0A3DACC-474D-44ED-8DF0-6B6BA2CE3243}" type="datetimeFigureOut">
               <a:rPr lang="en-US" smtClean="0"/>
-              <a:t>5/15/2022</a:t>
+              <a:t>5/24/2022</a:t>
             </a:fld>
             <a:endParaRPr lang="en-US"/>
           </a:p>
@@ -13655,6 +13660,8 @@
                 <a:solidFill>
                   <a:schemeClr val="bg1"/>
                 </a:solidFill>
+                <a:latin typeface="Arial" panose="020B0604020202020204" pitchFamily="34" charset="0"/>
+                <a:cs typeface="Arial" panose="020B0604020202020204" pitchFamily="34" charset="0"/>
               </a:rPr>
               <a:t>C# Basics</a:t>
             </a:r>
@@ -13662,6 +13669,8 @@
               <a:solidFill>
                 <a:schemeClr val="bg1"/>
               </a:solidFill>
+              <a:latin typeface="Arial" panose="020B0604020202020204" pitchFamily="34" charset="0"/>
+              <a:cs typeface="Arial" panose="020B0604020202020204" pitchFamily="34" charset="0"/>
             </a:endParaRPr>
           </a:p>
         </p:txBody>
@@ -13786,155 +13795,6 @@
                 <a:latin typeface="Arial" panose="020B0604020202020204" pitchFamily="34" charset="0"/>
                 <a:cs typeface="Arial" panose="020B0604020202020204" pitchFamily="34" charset="0"/>
               </a:rPr>
-              <a:t>What is compiler?</a:t>
-            </a:r>
-            <a:endParaRPr lang="en-US" dirty="0">
-              <a:latin typeface="Arial" panose="020B0604020202020204" pitchFamily="34" charset="0"/>
-              <a:cs typeface="Arial" panose="020B0604020202020204" pitchFamily="34" charset="0"/>
-            </a:endParaRPr>
-          </a:p>
-        </p:txBody>
-      </p:sp>
-      <p:sp>
-        <p:nvSpPr>
-          <p:cNvPr id="3" name="Content Placeholder 2"/>
-          <p:cNvSpPr>
-            <a:spLocks noGrp="1"/>
-          </p:cNvSpPr>
-          <p:nvPr>
-            <p:ph idx="1"/>
-          </p:nvPr>
-        </p:nvSpPr>
-        <p:spPr>
-          <a:xfrm>
-            <a:off x="1546839" y="2603499"/>
-            <a:ext cx="8825659" cy="4021235"/>
-          </a:xfrm>
-        </p:spPr>
-        <p:txBody>
-          <a:bodyPr/>
-          <a:lstStyle/>
-          <a:p>
-            <a:r>
-              <a:rPr lang="en-US" dirty="0"/>
-              <a:t>A compiler is a special program that translates a programming language's </a:t>
-            </a:r>
-            <a:r>
-              <a:rPr lang="en-US" dirty="0" smtClean="0"/>
-              <a:t>source code into </a:t>
-            </a:r>
-            <a:r>
-              <a:rPr lang="en-US" dirty="0"/>
-              <a:t>machine code, bytecode or another programming language. The source code is typically written in a high-level, human-readable language such as </a:t>
-            </a:r>
-            <a:r>
-              <a:rPr lang="en-US" b="1" dirty="0" smtClean="0"/>
-              <a:t>C#</a:t>
-            </a:r>
-            <a:r>
-              <a:rPr lang="en-US" dirty="0" smtClean="0"/>
-              <a:t>, </a:t>
-            </a:r>
-            <a:r>
-              <a:rPr lang="en-US" b="1" dirty="0" smtClean="0"/>
-              <a:t>Java, C++, etc</a:t>
-            </a:r>
-            <a:r>
-              <a:rPr lang="en-US" dirty="0" smtClean="0"/>
-              <a:t>.</a:t>
-            </a:r>
-            <a:endParaRPr lang="en-US" dirty="0"/>
-          </a:p>
-        </p:txBody>
-      </p:sp>
-      <p:pic>
-        <p:nvPicPr>
-          <p:cNvPr id="5" name="Picture 4"/>
-          <p:cNvPicPr>
-            <a:picLocks noChangeAspect="1"/>
-          </p:cNvPicPr>
-          <p:nvPr/>
-        </p:nvPicPr>
-        <p:blipFill>
-          <a:blip r:embed="rId2">
-            <a:extLst>
-              <a:ext uri="{28A0092B-C50C-407E-A947-70E740481C1C}">
-                <a14:useLocalDpi xmlns:a14="http://schemas.microsoft.com/office/drawing/2010/main" val="0"/>
-              </a:ext>
-            </a:extLst>
-          </a:blip>
-          <a:stretch>
-            <a:fillRect/>
-          </a:stretch>
-        </p:blipFill>
-        <p:spPr>
-          <a:xfrm>
-            <a:off x="1905842" y="3948209"/>
-            <a:ext cx="8010525" cy="2676525"/>
-          </a:xfrm>
-          <a:prstGeom prst="rect">
-            <a:avLst/>
-          </a:prstGeom>
-        </p:spPr>
-      </p:pic>
-    </p:spTree>
-    <p:extLst>
-      <p:ext uri="{BB962C8B-B14F-4D97-AF65-F5344CB8AC3E}">
-        <p14:creationId xmlns:p14="http://schemas.microsoft.com/office/powerpoint/2010/main" val="525679394"/>
-      </p:ext>
-    </p:extLst>
-  </p:cSld>
-  <p:clrMapOvr>
-    <a:masterClrMapping/>
-  </p:clrMapOvr>
-  <p:timing>
-    <p:tnLst>
-      <p:par>
-        <p:cTn id="1" dur="indefinite" restart="never" nodeType="tmRoot"/>
-      </p:par>
-    </p:tnLst>
-  </p:timing>
-</p:sld>
-</file>
-
-<file path=ppt/slides/slide11.xml><?xml version="1.0" encoding="utf-8"?>
-<p:sld xmlns:a="http://schemas.openxmlformats.org/drawingml/2006/main" xmlns:r="http://schemas.openxmlformats.org/officeDocument/2006/relationships" xmlns:p="http://schemas.openxmlformats.org/presentationml/2006/main">
-  <p:cSld>
-    <p:spTree>
-      <p:nvGrpSpPr>
-        <p:cNvPr id="1" name=""/>
-        <p:cNvGrpSpPr/>
-        <p:nvPr/>
-      </p:nvGrpSpPr>
-      <p:grpSpPr>
-        <a:xfrm>
-          <a:off x="0" y="0"/>
-          <a:ext cx="0" cy="0"/>
-          <a:chOff x="0" y="0"/>
-          <a:chExt cx="0" cy="0"/>
-        </a:xfrm>
-      </p:grpSpPr>
-      <p:sp>
-        <p:nvSpPr>
-          <p:cNvPr id="2" name="Title 1"/>
-          <p:cNvSpPr>
-            <a:spLocks noGrp="1"/>
-          </p:cNvSpPr>
-          <p:nvPr>
-            <p:ph type="title"/>
-          </p:nvPr>
-        </p:nvSpPr>
-        <p:spPr/>
-        <p:txBody>
-          <a:bodyPr/>
-          <a:lstStyle/>
-          <a:p>
-            <a:pPr algn="ctr"/>
-            <a:r>
-              <a:rPr lang="en-US" dirty="0" smtClean="0">
-                <a:latin typeface="Arial" panose="020B0604020202020204" pitchFamily="34" charset="0"/>
-                <a:cs typeface="Arial" panose="020B0604020202020204" pitchFamily="34" charset="0"/>
-              </a:rPr>
               <a:t>What is an IDE?</a:t>
             </a:r>
             <a:endParaRPr lang="en-US" dirty="0">
@@ -14235,7 +14095,7 @@
 </p:sld>
 </file>
 
-<file path=ppt/slides/slide12.xml><?xml version="1.0" encoding="utf-8"?>
+<file path=ppt/slides/slide11.xml><?xml version="1.0" encoding="utf-8"?>
 <p:sld xmlns:a="http://schemas.openxmlformats.org/drawingml/2006/main" xmlns:r="http://schemas.openxmlformats.org/officeDocument/2006/relationships" xmlns:p="http://schemas.openxmlformats.org/presentationml/2006/main">
   <p:cSld>
     <p:spTree>
@@ -14323,6 +14183,462 @@
   <p:clrMapOvr>
     <a:masterClrMapping/>
   </p:clrMapOvr>
+  <p:timing>
+    <p:tnLst>
+      <p:par>
+        <p:cTn id="1" dur="indefinite" restart="never" nodeType="tmRoot"/>
+      </p:par>
+    </p:tnLst>
+  </p:timing>
+</p:sld>
+</file>
+
+<file path=ppt/slides/slide12.xml><?xml version="1.0" encoding="utf-8"?>
+<p:sld xmlns:a="http://schemas.openxmlformats.org/drawingml/2006/main" xmlns:r="http://schemas.openxmlformats.org/officeDocument/2006/relationships" xmlns:p="http://schemas.openxmlformats.org/presentationml/2006/main">
+  <p:cSld>
+    <p:spTree>
+      <p:nvGrpSpPr>
+        <p:cNvPr id="1" name=""/>
+        <p:cNvGrpSpPr/>
+        <p:nvPr/>
+      </p:nvGrpSpPr>
+      <p:grpSpPr>
+        <a:xfrm>
+          <a:off x="0" y="0"/>
+          <a:ext cx="0" cy="0"/>
+          <a:chOff x="0" y="0"/>
+          <a:chExt cx="0" cy="0"/>
+        </a:xfrm>
+      </p:grpSpPr>
+      <p:sp>
+        <p:nvSpPr>
+          <p:cNvPr id="2" name="Title 1"/>
+          <p:cNvSpPr>
+            <a:spLocks noGrp="1"/>
+          </p:cNvSpPr>
+          <p:nvPr>
+            <p:ph type="title"/>
+          </p:nvPr>
+        </p:nvSpPr>
+        <p:spPr/>
+        <p:txBody>
+          <a:bodyPr/>
+          <a:lstStyle/>
+          <a:p>
+            <a:pPr algn="ctr"/>
+            <a:r>
+              <a:rPr lang="en-US" dirty="0" smtClean="0">
+                <a:latin typeface="Arial" panose="020B0604020202020204" pitchFamily="34" charset="0"/>
+                <a:cs typeface="Arial" panose="020B0604020202020204" pitchFamily="34" charset="0"/>
+              </a:rPr>
+              <a:t>C# </a:t>
+            </a:r>
+            <a:r>
+              <a:rPr lang="en-US" dirty="0" smtClean="0">
+                <a:solidFill>
+                  <a:srgbClr val="FFFF00"/>
+                </a:solidFill>
+                <a:latin typeface="Arial" panose="020B0604020202020204" pitchFamily="34" charset="0"/>
+                <a:cs typeface="Arial" panose="020B0604020202020204" pitchFamily="34" charset="0"/>
+              </a:rPr>
+              <a:t>variables</a:t>
+            </a:r>
+            <a:endParaRPr lang="en-US" dirty="0">
+              <a:solidFill>
+                <a:srgbClr val="FFFF00"/>
+              </a:solidFill>
+              <a:latin typeface="Arial" panose="020B0604020202020204" pitchFamily="34" charset="0"/>
+              <a:cs typeface="Arial" panose="020B0604020202020204" pitchFamily="34" charset="0"/>
+            </a:endParaRPr>
+          </a:p>
+        </p:txBody>
+      </p:sp>
+      <p:sp>
+        <p:nvSpPr>
+          <p:cNvPr id="3" name="Content Placeholder 2"/>
+          <p:cNvSpPr>
+            <a:spLocks noGrp="1"/>
+          </p:cNvSpPr>
+          <p:nvPr>
+            <p:ph idx="1"/>
+          </p:nvPr>
+        </p:nvSpPr>
+        <p:spPr>
+          <a:xfrm>
+            <a:off x="763069" y="2855427"/>
+            <a:ext cx="6893274" cy="3651648"/>
+          </a:xfrm>
+        </p:spPr>
+        <p:txBody>
+          <a:bodyPr/>
+          <a:lstStyle/>
+          <a:p>
+            <a:r>
+              <a:rPr lang="en-US" sz="2000" dirty="0" smtClean="0">
+                <a:latin typeface="Arial" panose="020B0604020202020204" pitchFamily="34" charset="0"/>
+                <a:cs typeface="Arial" panose="020B0604020202020204" pitchFamily="34" charset="0"/>
+              </a:rPr>
+              <a:t>Variables are containers for storing of data values.</a:t>
+            </a:r>
+          </a:p>
+          <a:p>
+            <a:r>
+              <a:rPr lang="en-US" sz="2000" dirty="0" smtClean="0">
+                <a:latin typeface="Arial" panose="020B0604020202020204" pitchFamily="34" charset="0"/>
+                <a:cs typeface="Arial" panose="020B0604020202020204" pitchFamily="34" charset="0"/>
+              </a:rPr>
+              <a:t>In </a:t>
+            </a:r>
+            <a:r>
+              <a:rPr lang="en-US" sz="2000" b="1" dirty="0" smtClean="0">
+                <a:latin typeface="Arial" panose="020B0604020202020204" pitchFamily="34" charset="0"/>
+                <a:cs typeface="Arial" panose="020B0604020202020204" pitchFamily="34" charset="0"/>
+              </a:rPr>
+              <a:t>C#</a:t>
+            </a:r>
+            <a:r>
+              <a:rPr lang="en-US" sz="2000" dirty="0" smtClean="0">
+                <a:latin typeface="Arial" panose="020B0604020202020204" pitchFamily="34" charset="0"/>
+                <a:cs typeface="Arial" panose="020B0604020202020204" pitchFamily="34" charset="0"/>
+              </a:rPr>
+              <a:t>, there are different types of variables (defined with different keywords</a:t>
+            </a:r>
+            <a:r>
+              <a:rPr lang="en-US" sz="2000" dirty="0" smtClean="0">
+                <a:latin typeface="Arial" panose="020B0604020202020204" pitchFamily="34" charset="0"/>
+                <a:cs typeface="Arial" panose="020B0604020202020204" pitchFamily="34" charset="0"/>
+              </a:rPr>
+              <a:t>).</a:t>
+            </a:r>
+          </a:p>
+          <a:p>
+            <a:r>
+              <a:rPr lang="en-US" sz="2000" dirty="0" smtClean="0">
+                <a:latin typeface="Arial" panose="020B0604020202020204" pitchFamily="34" charset="0"/>
+                <a:cs typeface="Arial" panose="020B0604020202020204" pitchFamily="34" charset="0"/>
+              </a:rPr>
+              <a:t>Examples for variables:</a:t>
+            </a:r>
+          </a:p>
+          <a:p>
+            <a:pPr marL="457200" lvl="1" indent="0">
+              <a:buNone/>
+            </a:pPr>
+            <a:r>
+              <a:rPr lang="en-US" sz="1800" b="1" dirty="0">
+                <a:latin typeface="Arial" panose="020B0604020202020204" pitchFamily="34" charset="0"/>
+                <a:cs typeface="Arial" panose="020B0604020202020204" pitchFamily="34" charset="0"/>
+              </a:rPr>
+              <a:t>s</a:t>
+            </a:r>
+            <a:r>
+              <a:rPr lang="en-US" sz="1800" b="1" dirty="0" smtClean="0">
+                <a:latin typeface="Arial" panose="020B0604020202020204" pitchFamily="34" charset="0"/>
+                <a:cs typeface="Arial" panose="020B0604020202020204" pitchFamily="34" charset="0"/>
+              </a:rPr>
+              <a:t>tring</a:t>
+            </a:r>
+            <a:r>
+              <a:rPr lang="en-US" sz="1800" dirty="0" smtClean="0">
+                <a:latin typeface="Arial" panose="020B0604020202020204" pitchFamily="34" charset="0"/>
+                <a:cs typeface="Arial" panose="020B0604020202020204" pitchFamily="34" charset="0"/>
+              </a:rPr>
+              <a:t> </a:t>
+            </a:r>
+            <a:r>
+              <a:rPr lang="en-US" sz="1800" dirty="0" err="1" smtClean="0">
+                <a:solidFill>
+                  <a:srgbClr val="00B050"/>
+                </a:solidFill>
+                <a:latin typeface="Arial" panose="020B0604020202020204" pitchFamily="34" charset="0"/>
+                <a:cs typeface="Arial" panose="020B0604020202020204" pitchFamily="34" charset="0"/>
+              </a:rPr>
+              <a:t>firstName</a:t>
+            </a:r>
+            <a:r>
+              <a:rPr lang="en-US" sz="1800" dirty="0" smtClean="0">
+                <a:latin typeface="Arial" panose="020B0604020202020204" pitchFamily="34" charset="0"/>
+                <a:cs typeface="Arial" panose="020B0604020202020204" pitchFamily="34" charset="0"/>
+              </a:rPr>
+              <a:t> = “</a:t>
+            </a:r>
+            <a:r>
+              <a:rPr lang="en-US" sz="1800" dirty="0" err="1" smtClean="0">
+                <a:latin typeface="Arial" panose="020B0604020202020204" pitchFamily="34" charset="0"/>
+                <a:cs typeface="Arial" panose="020B0604020202020204" pitchFamily="34" charset="0"/>
+              </a:rPr>
+              <a:t>Velizar</a:t>
+            </a:r>
+            <a:r>
+              <a:rPr lang="en-US" sz="1800" dirty="0" smtClean="0">
+                <a:latin typeface="Arial" panose="020B0604020202020204" pitchFamily="34" charset="0"/>
+                <a:cs typeface="Arial" panose="020B0604020202020204" pitchFamily="34" charset="0"/>
+              </a:rPr>
+              <a:t>”;  //valid variable name</a:t>
+            </a:r>
+          </a:p>
+          <a:p>
+            <a:pPr marL="457200" lvl="1" indent="0">
+              <a:buNone/>
+            </a:pPr>
+            <a:r>
+              <a:rPr lang="en-US" sz="1800" b="1" dirty="0">
+                <a:latin typeface="Arial" panose="020B0604020202020204" pitchFamily="34" charset="0"/>
+                <a:cs typeface="Arial" panose="020B0604020202020204" pitchFamily="34" charset="0"/>
+              </a:rPr>
+              <a:t>s</a:t>
+            </a:r>
+            <a:r>
+              <a:rPr lang="en-US" sz="1800" b="1" dirty="0" smtClean="0">
+                <a:latin typeface="Arial" panose="020B0604020202020204" pitchFamily="34" charset="0"/>
+                <a:cs typeface="Arial" panose="020B0604020202020204" pitchFamily="34" charset="0"/>
+              </a:rPr>
+              <a:t>tring</a:t>
+            </a:r>
+            <a:r>
+              <a:rPr lang="en-US" sz="1800" dirty="0" smtClean="0">
+                <a:latin typeface="Arial" panose="020B0604020202020204" pitchFamily="34" charset="0"/>
+                <a:cs typeface="Arial" panose="020B0604020202020204" pitchFamily="34" charset="0"/>
+              </a:rPr>
+              <a:t> </a:t>
+            </a:r>
+            <a:r>
+              <a:rPr lang="en-US" sz="1800" dirty="0" smtClean="0">
+                <a:solidFill>
+                  <a:srgbClr val="FF0000"/>
+                </a:solidFill>
+                <a:latin typeface="Arial" panose="020B0604020202020204" pitchFamily="34" charset="0"/>
+                <a:cs typeface="Arial" panose="020B0604020202020204" pitchFamily="34" charset="0"/>
+              </a:rPr>
+              <a:t>12Test</a:t>
+            </a:r>
+            <a:r>
+              <a:rPr lang="en-US" sz="1800" dirty="0" smtClean="0">
+                <a:latin typeface="Arial" panose="020B0604020202020204" pitchFamily="34" charset="0"/>
+                <a:cs typeface="Arial" panose="020B0604020202020204" pitchFamily="34" charset="0"/>
+              </a:rPr>
+              <a:t> = “test”;  //Invalid: cannot starts with number</a:t>
+            </a:r>
+          </a:p>
+          <a:p>
+            <a:pPr marL="457200" lvl="1" indent="0">
+              <a:buNone/>
+            </a:pPr>
+            <a:r>
+              <a:rPr lang="en-US" sz="1800" b="1" dirty="0" err="1">
+                <a:latin typeface="Arial" panose="020B0604020202020204" pitchFamily="34" charset="0"/>
+                <a:cs typeface="Arial" panose="020B0604020202020204" pitchFamily="34" charset="0"/>
+              </a:rPr>
+              <a:t>i</a:t>
+            </a:r>
+            <a:r>
+              <a:rPr lang="en-US" sz="1800" b="1" dirty="0" err="1" smtClean="0">
+                <a:latin typeface="Arial" panose="020B0604020202020204" pitchFamily="34" charset="0"/>
+                <a:cs typeface="Arial" panose="020B0604020202020204" pitchFamily="34" charset="0"/>
+              </a:rPr>
+              <a:t>nt</a:t>
+            </a:r>
+            <a:r>
+              <a:rPr lang="en-US" sz="1800" dirty="0" smtClean="0">
+                <a:latin typeface="Arial" panose="020B0604020202020204" pitchFamily="34" charset="0"/>
+                <a:cs typeface="Arial" panose="020B0604020202020204" pitchFamily="34" charset="0"/>
+              </a:rPr>
+              <a:t> </a:t>
+            </a:r>
+            <a:r>
+              <a:rPr lang="en-US" sz="1800" dirty="0" smtClean="0">
+                <a:solidFill>
+                  <a:srgbClr val="FF0000"/>
+                </a:solidFill>
+                <a:latin typeface="Arial" panose="020B0604020202020204" pitchFamily="34" charset="0"/>
+                <a:cs typeface="Arial" panose="020B0604020202020204" pitchFamily="34" charset="0"/>
+              </a:rPr>
+              <a:t>my Number</a:t>
+            </a:r>
+            <a:r>
+              <a:rPr lang="en-US" sz="1800" dirty="0" smtClean="0">
+                <a:latin typeface="Arial" panose="020B0604020202020204" pitchFamily="34" charset="0"/>
+                <a:cs typeface="Arial" panose="020B0604020202020204" pitchFamily="34" charset="0"/>
+              </a:rPr>
+              <a:t> = 2; //Invalid: cannot include whitespace</a:t>
+            </a:r>
+          </a:p>
+          <a:p>
+            <a:pPr marL="457200" lvl="1" indent="0">
+              <a:buNone/>
+            </a:pPr>
+            <a:r>
+              <a:rPr lang="en-US" sz="1800" b="1" dirty="0">
+                <a:latin typeface="Arial" panose="020B0604020202020204" pitchFamily="34" charset="0"/>
+                <a:cs typeface="Arial" panose="020B0604020202020204" pitchFamily="34" charset="0"/>
+              </a:rPr>
+              <a:t>s</a:t>
+            </a:r>
+            <a:r>
+              <a:rPr lang="en-US" sz="1800" b="1" dirty="0" smtClean="0">
+                <a:latin typeface="Arial" panose="020B0604020202020204" pitchFamily="34" charset="0"/>
+                <a:cs typeface="Arial" panose="020B0604020202020204" pitchFamily="34" charset="0"/>
+              </a:rPr>
+              <a:t>tring</a:t>
+            </a:r>
+            <a:r>
+              <a:rPr lang="en-US" sz="1800" dirty="0" smtClean="0">
+                <a:latin typeface="Arial" panose="020B0604020202020204" pitchFamily="34" charset="0"/>
+                <a:cs typeface="Arial" panose="020B0604020202020204" pitchFamily="34" charset="0"/>
+              </a:rPr>
+              <a:t> </a:t>
+            </a:r>
+            <a:r>
+              <a:rPr lang="en-US" sz="1800" dirty="0" smtClean="0">
+                <a:solidFill>
+                  <a:srgbClr val="FFC000"/>
+                </a:solidFill>
+                <a:latin typeface="Arial" panose="020B0604020202020204" pitchFamily="34" charset="0"/>
+                <a:cs typeface="Arial" panose="020B0604020202020204" pitchFamily="34" charset="0"/>
+              </a:rPr>
+              <a:t>ln</a:t>
+            </a:r>
+            <a:r>
+              <a:rPr lang="en-US" sz="1800" dirty="0" smtClean="0">
+                <a:latin typeface="Arial" panose="020B0604020202020204" pitchFamily="34" charset="0"/>
+                <a:cs typeface="Arial" panose="020B0604020202020204" pitchFamily="34" charset="0"/>
+              </a:rPr>
+              <a:t> = “</a:t>
+            </a:r>
+            <a:r>
+              <a:rPr lang="en-US" sz="1800" dirty="0" err="1" smtClean="0">
+                <a:latin typeface="Arial" panose="020B0604020202020204" pitchFamily="34" charset="0"/>
+                <a:cs typeface="Arial" panose="020B0604020202020204" pitchFamily="34" charset="0"/>
+              </a:rPr>
+              <a:t>Gerasimov</a:t>
+            </a:r>
+            <a:r>
+              <a:rPr lang="en-US" sz="1800" dirty="0" smtClean="0">
+                <a:latin typeface="Arial" panose="020B0604020202020204" pitchFamily="34" charset="0"/>
+                <a:cs typeface="Arial" panose="020B0604020202020204" pitchFamily="34" charset="0"/>
+              </a:rPr>
+              <a:t>”; //</a:t>
+            </a:r>
+            <a:r>
+              <a:rPr lang="en-US" sz="1800" dirty="0" smtClean="0">
+                <a:solidFill>
+                  <a:srgbClr val="FFC000"/>
+                </a:solidFill>
+                <a:latin typeface="Arial" panose="020B0604020202020204" pitchFamily="34" charset="0"/>
+                <a:cs typeface="Arial" panose="020B0604020202020204" pitchFamily="34" charset="0"/>
+              </a:rPr>
+              <a:t>Valid</a:t>
+            </a:r>
+            <a:r>
+              <a:rPr lang="en-US" sz="1800" dirty="0" smtClean="0">
+                <a:latin typeface="Arial" panose="020B0604020202020204" pitchFamily="34" charset="0"/>
+                <a:cs typeface="Arial" panose="020B0604020202020204" pitchFamily="34" charset="0"/>
+              </a:rPr>
+              <a:t>, but </a:t>
+            </a:r>
+            <a:r>
+              <a:rPr lang="en-US" sz="1800" dirty="0">
+                <a:solidFill>
+                  <a:srgbClr val="FF0000"/>
+                </a:solidFill>
+                <a:latin typeface="Arial" panose="020B0604020202020204" pitchFamily="34" charset="0"/>
+                <a:cs typeface="Arial" panose="020B0604020202020204" pitchFamily="34" charset="0"/>
+              </a:rPr>
+              <a:t>N</a:t>
+            </a:r>
+            <a:r>
+              <a:rPr lang="en-US" sz="1800" dirty="0" smtClean="0">
+                <a:solidFill>
+                  <a:srgbClr val="FF0000"/>
+                </a:solidFill>
+                <a:latin typeface="Arial" panose="020B0604020202020204" pitchFamily="34" charset="0"/>
+                <a:cs typeface="Arial" panose="020B0604020202020204" pitchFamily="34" charset="0"/>
+              </a:rPr>
+              <a:t>ot</a:t>
+            </a:r>
+            <a:r>
+              <a:rPr lang="en-US" sz="1800" dirty="0" smtClean="0">
+                <a:latin typeface="Arial" panose="020B0604020202020204" pitchFamily="34" charset="0"/>
+                <a:cs typeface="Arial" panose="020B0604020202020204" pitchFamily="34" charset="0"/>
+              </a:rPr>
+              <a:t> recommended! Instead of that should be </a:t>
+            </a:r>
+            <a:r>
+              <a:rPr lang="en-US" sz="1800" dirty="0" err="1" smtClean="0">
+                <a:solidFill>
+                  <a:srgbClr val="00B050"/>
+                </a:solidFill>
+                <a:latin typeface="Arial" panose="020B0604020202020204" pitchFamily="34" charset="0"/>
+                <a:cs typeface="Arial" panose="020B0604020202020204" pitchFamily="34" charset="0"/>
+              </a:rPr>
+              <a:t>lastName</a:t>
+            </a:r>
+            <a:r>
+              <a:rPr lang="en-US" sz="1800" dirty="0" smtClean="0">
+                <a:latin typeface="Arial" panose="020B0604020202020204" pitchFamily="34" charset="0"/>
+                <a:cs typeface="Arial" panose="020B0604020202020204" pitchFamily="34" charset="0"/>
+              </a:rPr>
+              <a:t> because is meaningful.</a:t>
+            </a:r>
+          </a:p>
+          <a:p>
+            <a:pPr marL="457200" lvl="1" indent="0">
+              <a:buNone/>
+            </a:pPr>
+            <a:endParaRPr lang="en-US" sz="1800" dirty="0">
+              <a:latin typeface="Arial" panose="020B0604020202020204" pitchFamily="34" charset="0"/>
+              <a:cs typeface="Arial" panose="020B0604020202020204" pitchFamily="34" charset="0"/>
+            </a:endParaRPr>
+          </a:p>
+        </p:txBody>
+      </p:sp>
+      <p:pic>
+        <p:nvPicPr>
+          <p:cNvPr id="4" name="Picture 3"/>
+          <p:cNvPicPr>
+            <a:picLocks noChangeAspect="1"/>
+          </p:cNvPicPr>
+          <p:nvPr/>
+        </p:nvPicPr>
+        <p:blipFill>
+          <a:blip r:embed="rId2">
+            <a:extLst>
+              <a:ext uri="{28A0092B-C50C-407E-A947-70E740481C1C}">
+                <a14:useLocalDpi xmlns:a14="http://schemas.microsoft.com/office/drawing/2010/main" val="0"/>
+              </a:ext>
+            </a:extLst>
+          </a:blip>
+          <a:stretch>
+            <a:fillRect/>
+          </a:stretch>
+        </p:blipFill>
+        <p:spPr>
+          <a:xfrm>
+            <a:off x="7656343" y="2855427"/>
+            <a:ext cx="3671020" cy="3651648"/>
+          </a:xfrm>
+          <a:prstGeom prst="rect">
+            <a:avLst/>
+          </a:prstGeom>
+        </p:spPr>
+      </p:pic>
+    </p:spTree>
+    <p:extLst>
+      <p:ext uri="{BB962C8B-B14F-4D97-AF65-F5344CB8AC3E}">
+        <p14:creationId xmlns:p14="http://schemas.microsoft.com/office/powerpoint/2010/main" val="644180142"/>
+      </p:ext>
+    </p:extLst>
+  </p:cSld>
+  <p:clrMapOvr>
+    <a:masterClrMapping/>
+  </p:clrMapOvr>
+  <p:timing>
+    <p:tnLst>
+      <p:par>
+        <p:cTn id="1" dur="indefinite" restart="never" nodeType="tmRoot"/>
+      </p:par>
+    </p:tnLst>
+  </p:timing>
 </p:sld>
 </file>
 
@@ -14361,26 +14677,325 @@
             <a:pPr algn="ctr"/>
             <a:r>
               <a:rPr lang="en-US" dirty="0" smtClean="0">
+                <a:solidFill>
+                  <a:schemeClr val="bg1"/>
+                </a:solidFill>
                 <a:latin typeface="Arial" panose="020B0604020202020204" pitchFamily="34" charset="0"/>
                 <a:cs typeface="Arial" panose="020B0604020202020204" pitchFamily="34" charset="0"/>
               </a:rPr>
-              <a:t>C# variables</a:t>
+              <a:t>C# </a:t>
+            </a:r>
+            <a:r>
+              <a:rPr lang="en-US" dirty="0" smtClean="0">
+                <a:solidFill>
+                  <a:srgbClr val="FFFF00"/>
+                </a:solidFill>
+                <a:latin typeface="Arial" panose="020B0604020202020204" pitchFamily="34" charset="0"/>
+                <a:cs typeface="Arial" panose="020B0604020202020204" pitchFamily="34" charset="0"/>
+              </a:rPr>
+              <a:t>constants</a:t>
             </a:r>
             <a:endParaRPr lang="en-US" dirty="0">
+              <a:solidFill>
+                <a:srgbClr val="FFFF00"/>
+              </a:solidFill>
               <a:latin typeface="Arial" panose="020B0604020202020204" pitchFamily="34" charset="0"/>
               <a:cs typeface="Arial" panose="020B0604020202020204" pitchFamily="34" charset="0"/>
             </a:endParaRPr>
           </a:p>
         </p:txBody>
       </p:sp>
+      <p:pic>
+        <p:nvPicPr>
+          <p:cNvPr id="4" name="Content Placeholder 3"/>
+          <p:cNvPicPr>
+            <a:picLocks noGrp="1" noChangeAspect="1"/>
+          </p:cNvPicPr>
+          <p:nvPr>
+            <p:ph idx="1"/>
+          </p:nvPr>
+        </p:nvPicPr>
+        <p:blipFill>
+          <a:blip r:embed="rId2">
+            <a:extLst>
+              <a:ext uri="{28A0092B-C50C-407E-A947-70E740481C1C}">
+                <a14:useLocalDpi xmlns:a14="http://schemas.microsoft.com/office/drawing/2010/main" val="0"/>
+              </a:ext>
+            </a:extLst>
+          </a:blip>
+          <a:stretch>
+            <a:fillRect/>
+          </a:stretch>
+        </p:blipFill>
+        <p:spPr>
+          <a:xfrm>
+            <a:off x="7154537" y="3624807"/>
+            <a:ext cx="4088850" cy="1074846"/>
+          </a:xfrm>
+        </p:spPr>
+      </p:pic>
       <p:sp>
         <p:nvSpPr>
-          <p:cNvPr id="3" name="Content Placeholder 2"/>
+          <p:cNvPr id="5" name="TextBox 4"/>
+          <p:cNvSpPr txBox="1"/>
+          <p:nvPr/>
+        </p:nvSpPr>
+        <p:spPr>
+          <a:xfrm>
+            <a:off x="886408" y="2565918"/>
+            <a:ext cx="5840963" cy="3416320"/>
+          </a:xfrm>
+          <a:prstGeom prst="rect">
+            <a:avLst/>
+          </a:prstGeom>
+          <a:noFill/>
+        </p:spPr>
+        <p:txBody>
+          <a:bodyPr wrap="square" rtlCol="0">
+            <a:spAutoFit/>
+          </a:bodyPr>
+          <a:lstStyle/>
+          <a:p>
+            <a:r>
+              <a:rPr lang="en-US" dirty="0" smtClean="0"/>
+              <a:t>Naming conventions for </a:t>
+            </a:r>
+            <a:r>
+              <a:rPr lang="en-US" dirty="0" smtClean="0">
+                <a:solidFill>
+                  <a:srgbClr val="0070C0"/>
+                </a:solidFill>
+              </a:rPr>
+              <a:t>variables</a:t>
+            </a:r>
+            <a:r>
+              <a:rPr lang="en-US" dirty="0" smtClean="0"/>
+              <a:t> and </a:t>
+            </a:r>
+            <a:r>
+              <a:rPr lang="en-US" dirty="0" smtClean="0">
+                <a:solidFill>
+                  <a:schemeClr val="accent2">
+                    <a:lumMod val="75000"/>
+                  </a:schemeClr>
+                </a:solidFill>
+              </a:rPr>
+              <a:t>constants</a:t>
+            </a:r>
+            <a:r>
+              <a:rPr lang="en-US" dirty="0" smtClean="0"/>
+              <a:t>:</a:t>
+            </a:r>
+          </a:p>
+          <a:p>
+            <a:endParaRPr lang="en-US" dirty="0"/>
+          </a:p>
+          <a:p>
+            <a:r>
+              <a:rPr lang="en-US" dirty="0" smtClean="0"/>
+              <a:t>For </a:t>
+            </a:r>
+            <a:r>
+              <a:rPr lang="en-US" dirty="0" smtClean="0">
+                <a:solidFill>
+                  <a:srgbClr val="0070C0"/>
+                </a:solidFill>
+              </a:rPr>
+              <a:t>variables</a:t>
+            </a:r>
+            <a:r>
+              <a:rPr lang="en-US" dirty="0" smtClean="0"/>
+              <a:t>: 	</a:t>
+            </a:r>
+            <a:r>
+              <a:rPr lang="en-US" dirty="0" err="1" smtClean="0">
+                <a:solidFill>
+                  <a:srgbClr val="0070C0"/>
+                </a:solidFill>
+              </a:rPr>
+              <a:t>camelCase</a:t>
+            </a:r>
+            <a:endParaRPr lang="en-US" dirty="0" smtClean="0">
+              <a:solidFill>
+                <a:srgbClr val="0070C0"/>
+              </a:solidFill>
+            </a:endParaRPr>
+          </a:p>
+          <a:p>
+            <a:r>
+              <a:rPr lang="en-US" dirty="0" smtClean="0"/>
+              <a:t>For </a:t>
+            </a:r>
+            <a:r>
+              <a:rPr lang="en-US" dirty="0" smtClean="0">
+                <a:solidFill>
+                  <a:schemeClr val="accent2">
+                    <a:lumMod val="75000"/>
+                  </a:schemeClr>
+                </a:solidFill>
+              </a:rPr>
+              <a:t>constants</a:t>
+            </a:r>
+            <a:r>
+              <a:rPr lang="en-US" dirty="0" smtClean="0"/>
+              <a:t>: 	</a:t>
+            </a:r>
+            <a:r>
+              <a:rPr lang="en-US" dirty="0" err="1" smtClean="0">
+                <a:solidFill>
+                  <a:schemeClr val="accent2">
+                    <a:lumMod val="75000"/>
+                  </a:schemeClr>
+                </a:solidFill>
+              </a:rPr>
+              <a:t>PascalCase</a:t>
+            </a:r>
+            <a:endParaRPr lang="en-US" dirty="0" smtClean="0">
+              <a:solidFill>
+                <a:schemeClr val="accent2">
+                  <a:lumMod val="75000"/>
+                </a:schemeClr>
+              </a:solidFill>
+            </a:endParaRPr>
+          </a:p>
+          <a:p>
+            <a:endParaRPr lang="en-US" dirty="0" smtClean="0">
+              <a:solidFill>
+                <a:schemeClr val="accent2">
+                  <a:lumMod val="75000"/>
+                </a:schemeClr>
+              </a:solidFill>
+            </a:endParaRPr>
+          </a:p>
+          <a:p>
+            <a:endParaRPr lang="en-US" dirty="0">
+              <a:solidFill>
+                <a:schemeClr val="accent2">
+                  <a:lumMod val="75000"/>
+                </a:schemeClr>
+              </a:solidFill>
+            </a:endParaRPr>
+          </a:p>
+          <a:p>
+            <a:r>
+              <a:rPr lang="en-US" b="1" i="1" u="sng" dirty="0" smtClean="0"/>
+              <a:t>Note: </a:t>
+            </a:r>
+            <a:r>
+              <a:rPr lang="en-US" dirty="0" smtClean="0"/>
+              <a:t>In C# is </a:t>
+            </a:r>
+            <a:r>
+              <a:rPr lang="en-US" b="1" dirty="0" smtClean="0"/>
+              <a:t>Not</a:t>
+            </a:r>
+            <a:r>
+              <a:rPr lang="en-US" dirty="0" smtClean="0"/>
+              <a:t> recommended to be used </a:t>
+            </a:r>
+            <a:r>
+              <a:rPr lang="en-US" dirty="0" smtClean="0">
+                <a:solidFill>
+                  <a:srgbClr val="FF0000"/>
+                </a:solidFill>
+              </a:rPr>
+              <a:t>Hungarian Notation</a:t>
+            </a:r>
+            <a:r>
+              <a:rPr lang="en-US" dirty="0" smtClean="0"/>
+              <a:t>.</a:t>
+            </a:r>
+          </a:p>
+          <a:p>
+            <a:endParaRPr lang="en-US" dirty="0"/>
+          </a:p>
+          <a:p>
+            <a:r>
+              <a:rPr lang="en-US" b="1" dirty="0"/>
+              <a:t>s</a:t>
+            </a:r>
+            <a:r>
+              <a:rPr lang="en-US" b="1" dirty="0" smtClean="0"/>
+              <a:t>tring</a:t>
+            </a:r>
+            <a:r>
+              <a:rPr lang="en-US" dirty="0" smtClean="0"/>
+              <a:t> </a:t>
+            </a:r>
+            <a:r>
+              <a:rPr lang="en-US" dirty="0" err="1" smtClean="0">
+                <a:solidFill>
+                  <a:srgbClr val="C00000"/>
+                </a:solidFill>
+              </a:rPr>
+              <a:t>strFirstName</a:t>
+            </a:r>
+            <a:r>
+              <a:rPr lang="en-US" dirty="0" smtClean="0"/>
+              <a:t> = “</a:t>
+            </a:r>
+            <a:r>
+              <a:rPr lang="en-US" dirty="0" err="1" smtClean="0"/>
+              <a:t>Velizar</a:t>
+            </a:r>
+            <a:r>
+              <a:rPr lang="en-US" dirty="0" smtClean="0"/>
+              <a:t>”;</a:t>
+            </a:r>
+          </a:p>
+          <a:p>
+            <a:endParaRPr lang="en-US" dirty="0" smtClean="0"/>
+          </a:p>
+          <a:p>
+            <a:endParaRPr lang="en-US" dirty="0"/>
+          </a:p>
+        </p:txBody>
+      </p:sp>
+    </p:spTree>
+    <p:extLst>
+      <p:ext uri="{BB962C8B-B14F-4D97-AF65-F5344CB8AC3E}">
+        <p14:creationId xmlns:p14="http://schemas.microsoft.com/office/powerpoint/2010/main" val="2568291402"/>
+      </p:ext>
+    </p:extLst>
+  </p:cSld>
+  <p:clrMapOvr>
+    <a:masterClrMapping/>
+  </p:clrMapOvr>
+  <p:timing>
+    <p:tnLst>
+      <p:par>
+        <p:cTn id="1" dur="indefinite" restart="never" nodeType="tmRoot"/>
+      </p:par>
+    </p:tnLst>
+  </p:timing>
+</p:sld>
+</file>
+
+<file path=ppt/slides/slide14.xml><?xml version="1.0" encoding="utf-8"?>
+<p:sld xmlns:a="http://schemas.openxmlformats.org/drawingml/2006/main" xmlns:r="http://schemas.openxmlformats.org/officeDocument/2006/relationships" xmlns:p="http://schemas.openxmlformats.org/presentationml/2006/main">
+  <p:cSld>
+    <p:spTree>
+      <p:nvGrpSpPr>
+        <p:cNvPr id="1" name=""/>
+        <p:cNvGrpSpPr/>
+        <p:nvPr/>
+      </p:nvGrpSpPr>
+      <p:grpSpPr>
+        <a:xfrm>
+          <a:off x="0" y="0"/>
+          <a:ext cx="0" cy="0"/>
+          <a:chOff x="0" y="0"/>
+          <a:chExt cx="0" cy="0"/>
+        </a:xfrm>
+      </p:grpSpPr>
+      <p:sp>
+        <p:nvSpPr>
+          <p:cNvPr id="2" name="Title 1"/>
           <p:cNvSpPr>
             <a:spLocks noGrp="1"/>
           </p:cNvSpPr>
           <p:nvPr>
-            <p:ph idx="1"/>
+            <p:ph type="title"/>
           </p:nvPr>
         </p:nvSpPr>
         <p:spPr/>
@@ -14388,163 +15003,236 @@
           <a:bodyPr/>
           <a:lstStyle/>
           <a:p>
-            <a:r>
-              <a:rPr lang="en-US" dirty="0" smtClean="0"/>
-              <a:t>Variables are containers for storing of data values.</a:t>
-            </a:r>
-          </a:p>
-          <a:p>
-            <a:r>
-              <a:rPr lang="en-US" dirty="0" smtClean="0"/>
-              <a:t>In </a:t>
-            </a:r>
-            <a:r>
-              <a:rPr lang="en-US" b="1" dirty="0" smtClean="0"/>
-              <a:t>C#</a:t>
-            </a:r>
-            <a:r>
-              <a:rPr lang="en-US" dirty="0" smtClean="0"/>
-              <a:t>, there are different types of variables (defined with different keywords), for example:</a:t>
-            </a:r>
-          </a:p>
-          <a:p>
-            <a:pPr lvl="1"/>
-            <a:r>
-              <a:rPr lang="en-US" b="1" dirty="0" err="1" smtClean="0"/>
-              <a:t>Int</a:t>
-            </a:r>
-            <a:r>
-              <a:rPr lang="en-US" dirty="0" smtClean="0"/>
-              <a:t> – stores integers (whole numbers), without decimals, such </a:t>
-            </a:r>
-            <a:r>
-              <a:rPr lang="en-US" b="1" dirty="0" smtClean="0"/>
-              <a:t>127</a:t>
-            </a:r>
-            <a:r>
-              <a:rPr lang="en-US" dirty="0" smtClean="0"/>
-              <a:t> or -</a:t>
-            </a:r>
-            <a:r>
-              <a:rPr lang="en-US" b="1" dirty="0" smtClean="0"/>
-              <a:t>127</a:t>
-            </a:r>
-          </a:p>
-          <a:p>
-            <a:pPr lvl="1"/>
-            <a:r>
-              <a:rPr lang="en-US" b="1" dirty="0"/>
-              <a:t>d</a:t>
-            </a:r>
-            <a:r>
-              <a:rPr lang="en-US" b="1" dirty="0" smtClean="0"/>
-              <a:t>ouble</a:t>
-            </a:r>
-            <a:r>
-              <a:rPr lang="en-US" dirty="0" smtClean="0"/>
-              <a:t> – stores floating point numbers, with decimals, such </a:t>
-            </a:r>
-            <a:r>
-              <a:rPr lang="en-US" b="1" dirty="0" smtClean="0"/>
-              <a:t>19.99</a:t>
-            </a:r>
-            <a:r>
-              <a:rPr lang="en-US" dirty="0" smtClean="0"/>
-              <a:t> or </a:t>
-            </a:r>
-            <a:r>
-              <a:rPr lang="en-US" b="1" dirty="0" smtClean="0"/>
-              <a:t>-19.99</a:t>
-            </a:r>
-          </a:p>
-          <a:p>
-            <a:pPr lvl="1"/>
-            <a:r>
-              <a:rPr lang="en-US" b="1" dirty="0"/>
-              <a:t>c</a:t>
-            </a:r>
-            <a:r>
-              <a:rPr lang="en-US" b="1" dirty="0" smtClean="0"/>
-              <a:t>har</a:t>
-            </a:r>
-            <a:r>
-              <a:rPr lang="en-US" dirty="0" smtClean="0"/>
-              <a:t> – stores single characters, such as </a:t>
-            </a:r>
-            <a:r>
-              <a:rPr lang="en-US" b="1" dirty="0" smtClean="0"/>
-              <a:t>‘a’</a:t>
-            </a:r>
-            <a:r>
-              <a:rPr lang="en-US" dirty="0" smtClean="0"/>
-              <a:t> or </a:t>
-            </a:r>
-            <a:r>
-              <a:rPr lang="en-US" b="1" dirty="0" smtClean="0"/>
-              <a:t>‘B’</a:t>
-            </a:r>
-            <a:r>
-              <a:rPr lang="en-US" dirty="0" smtClean="0"/>
-              <a:t>. Char values are surrounded by single quotes.</a:t>
-            </a:r>
-          </a:p>
-          <a:p>
-            <a:pPr lvl="1"/>
-            <a:r>
-              <a:rPr lang="en-US" b="1" dirty="0"/>
-              <a:t>s</a:t>
-            </a:r>
-            <a:r>
-              <a:rPr lang="en-US" b="1" dirty="0" smtClean="0"/>
-              <a:t>tring</a:t>
-            </a:r>
-            <a:r>
-              <a:rPr lang="en-US" dirty="0" smtClean="0"/>
-              <a:t> – stores text, such </a:t>
-            </a:r>
-            <a:r>
-              <a:rPr lang="en-US" b="1" dirty="0" smtClean="0"/>
-              <a:t>“Hello World”</a:t>
-            </a:r>
-            <a:r>
-              <a:rPr lang="en-US" dirty="0" smtClean="0"/>
-              <a:t>. String values are surrounded by double quotes.</a:t>
-            </a:r>
-          </a:p>
-          <a:p>
-            <a:pPr lvl="1"/>
-            <a:r>
-              <a:rPr lang="en-US" b="1" dirty="0"/>
-              <a:t>b</a:t>
-            </a:r>
-            <a:r>
-              <a:rPr lang="en-US" b="1" dirty="0" smtClean="0"/>
-              <a:t>ool</a:t>
-            </a:r>
-            <a:r>
-              <a:rPr lang="en-US" dirty="0" smtClean="0"/>
-              <a:t> – stores values with two states: </a:t>
-            </a:r>
-            <a:r>
-              <a:rPr lang="en-US" b="1" dirty="0" smtClean="0"/>
-              <a:t>true</a:t>
-            </a:r>
-            <a:r>
-              <a:rPr lang="en-US" dirty="0" smtClean="0"/>
-              <a:t> or </a:t>
-            </a:r>
-            <a:r>
-              <a:rPr lang="en-US" b="1" dirty="0" smtClean="0"/>
-              <a:t>false</a:t>
-            </a:r>
-            <a:endParaRPr lang="en-US" b="1" dirty="0"/>
+            <a:pPr algn="ctr"/>
+            <a:r>
+              <a:rPr lang="en-US" dirty="0" smtClean="0">
+                <a:latin typeface="Arial" panose="020B0604020202020204" pitchFamily="34" charset="0"/>
+                <a:cs typeface="Arial" panose="020B0604020202020204" pitchFamily="34" charset="0"/>
+              </a:rPr>
+              <a:t>C# </a:t>
+            </a:r>
+            <a:r>
+              <a:rPr lang="en-US" dirty="0" smtClean="0">
+                <a:solidFill>
+                  <a:srgbClr val="FFFF00"/>
+                </a:solidFill>
+                <a:latin typeface="Arial" panose="020B0604020202020204" pitchFamily="34" charset="0"/>
+                <a:cs typeface="Arial" panose="020B0604020202020204" pitchFamily="34" charset="0"/>
+              </a:rPr>
+              <a:t>data types</a:t>
+            </a:r>
+            <a:endParaRPr lang="en-US" dirty="0">
+              <a:solidFill>
+                <a:srgbClr val="FFFF00"/>
+              </a:solidFill>
+              <a:latin typeface="Arial" panose="020B0604020202020204" pitchFamily="34" charset="0"/>
+              <a:cs typeface="Arial" panose="020B0604020202020204" pitchFamily="34" charset="0"/>
+            </a:endParaRPr>
           </a:p>
         </p:txBody>
       </p:sp>
+      <p:pic>
+        <p:nvPicPr>
+          <p:cNvPr id="6" name="Content Placeholder 5"/>
+          <p:cNvPicPr>
+            <a:picLocks noGrp="1" noChangeAspect="1"/>
+          </p:cNvPicPr>
+          <p:nvPr>
+            <p:ph idx="1"/>
+          </p:nvPr>
+        </p:nvPicPr>
+        <p:blipFill>
+          <a:blip r:embed="rId2">
+            <a:extLst>
+              <a:ext uri="{28A0092B-C50C-407E-A947-70E740481C1C}">
+                <a14:useLocalDpi xmlns:a14="http://schemas.microsoft.com/office/drawing/2010/main" val="0"/>
+              </a:ext>
+            </a:extLst>
+          </a:blip>
+          <a:stretch>
+            <a:fillRect/>
+          </a:stretch>
+        </p:blipFill>
+        <p:spPr>
+          <a:xfrm>
+            <a:off x="458700" y="2407556"/>
+            <a:ext cx="5942099" cy="4164017"/>
+          </a:xfrm>
+        </p:spPr>
+      </p:pic>
+      <p:pic>
+        <p:nvPicPr>
+          <p:cNvPr id="7" name="Picture 6"/>
+          <p:cNvPicPr>
+            <a:picLocks noChangeAspect="1"/>
+          </p:cNvPicPr>
+          <p:nvPr/>
+        </p:nvPicPr>
+        <p:blipFill>
+          <a:blip r:embed="rId3">
+            <a:extLst>
+              <a:ext uri="{28A0092B-C50C-407E-A947-70E740481C1C}">
+                <a14:useLocalDpi xmlns:a14="http://schemas.microsoft.com/office/drawing/2010/main" val="0"/>
+              </a:ext>
+            </a:extLst>
+          </a:blip>
+          <a:stretch>
+            <a:fillRect/>
+          </a:stretch>
+        </p:blipFill>
+        <p:spPr>
+          <a:xfrm>
+            <a:off x="6501271" y="2407556"/>
+            <a:ext cx="5031365" cy="4074924"/>
+          </a:xfrm>
+          <a:prstGeom prst="rect">
+            <a:avLst/>
+          </a:prstGeom>
+        </p:spPr>
+      </p:pic>
     </p:spTree>
     <p:extLst>
       <p:ext uri="{BB962C8B-B14F-4D97-AF65-F5344CB8AC3E}">
-        <p14:creationId xmlns:p14="http://schemas.microsoft.com/office/powerpoint/2010/main" val="644180142"/>
+        <p14:creationId xmlns:p14="http://schemas.microsoft.com/office/powerpoint/2010/main" val="179078265"/>
+      </p:ext>
+    </p:extLst>
+  </p:cSld>
+  <p:clrMapOvr>
+    <a:masterClrMapping/>
+  </p:clrMapOvr>
+  <p:timing>
+    <p:tnLst>
+      <p:par>
+        <p:cTn id="1" dur="indefinite" restart="never" nodeType="tmRoot"/>
+      </p:par>
+    </p:tnLst>
+  </p:timing>
+</p:sld>
+</file>
+
+<file path=ppt/slides/slide15.xml><?xml version="1.0" encoding="utf-8"?>
+<p:sld xmlns:a="http://schemas.openxmlformats.org/drawingml/2006/main" xmlns:r="http://schemas.openxmlformats.org/officeDocument/2006/relationships" xmlns:p="http://schemas.openxmlformats.org/presentationml/2006/main">
+  <p:cSld>
+    <p:spTree>
+      <p:nvGrpSpPr>
+        <p:cNvPr id="1" name=""/>
+        <p:cNvGrpSpPr/>
+        <p:nvPr/>
+      </p:nvGrpSpPr>
+      <p:grpSpPr>
+        <a:xfrm>
+          <a:off x="0" y="0"/>
+          <a:ext cx="0" cy="0"/>
+          <a:chOff x="0" y="0"/>
+          <a:chExt cx="0" cy="0"/>
+        </a:xfrm>
+      </p:grpSpPr>
+      <p:sp>
+        <p:nvSpPr>
+          <p:cNvPr id="2" name="Title 1"/>
+          <p:cNvSpPr>
+            <a:spLocks noGrp="1"/>
+          </p:cNvSpPr>
+          <p:nvPr>
+            <p:ph type="title"/>
+          </p:nvPr>
+        </p:nvSpPr>
+        <p:spPr/>
+        <p:txBody>
+          <a:bodyPr/>
+          <a:lstStyle/>
+          <a:p>
+            <a:pPr algn="ctr"/>
+            <a:r>
+              <a:rPr lang="en-US" dirty="0" smtClean="0">
+                <a:latin typeface="Arial" panose="020B0604020202020204" pitchFamily="34" charset="0"/>
+                <a:cs typeface="Arial" panose="020B0604020202020204" pitchFamily="34" charset="0"/>
+              </a:rPr>
+              <a:t>C# Console </a:t>
+            </a:r>
+            <a:r>
+              <a:rPr lang="en-US" dirty="0" err="1" smtClean="0">
+                <a:solidFill>
+                  <a:srgbClr val="FFFF00"/>
+                </a:solidFill>
+                <a:latin typeface="Arial" panose="020B0604020202020204" pitchFamily="34" charset="0"/>
+                <a:cs typeface="Arial" panose="020B0604020202020204" pitchFamily="34" charset="0"/>
+              </a:rPr>
+              <a:t>Input/Output</a:t>
+            </a:r>
+            <a:endParaRPr lang="en-US" dirty="0">
+              <a:solidFill>
+                <a:srgbClr val="FFFF00"/>
+              </a:solidFill>
+              <a:latin typeface="Arial" panose="020B0604020202020204" pitchFamily="34" charset="0"/>
+              <a:cs typeface="Arial" panose="020B0604020202020204" pitchFamily="34" charset="0"/>
+            </a:endParaRPr>
+          </a:p>
+        </p:txBody>
+      </p:sp>
+      <p:pic>
+        <p:nvPicPr>
+          <p:cNvPr id="4" name="Content Placeholder 3"/>
+          <p:cNvPicPr>
+            <a:picLocks noGrp="1" noChangeAspect="1"/>
+          </p:cNvPicPr>
+          <p:nvPr>
+            <p:ph idx="1"/>
+          </p:nvPr>
+        </p:nvPicPr>
+        <p:blipFill>
+          <a:blip r:embed="rId2">
+            <a:extLst>
+              <a:ext uri="{28A0092B-C50C-407E-A947-70E740481C1C}">
+                <a14:useLocalDpi xmlns:a14="http://schemas.microsoft.com/office/drawing/2010/main" val="0"/>
+              </a:ext>
+            </a:extLst>
+          </a:blip>
+          <a:stretch>
+            <a:fillRect/>
+          </a:stretch>
+        </p:blipFill>
+        <p:spPr>
+          <a:xfrm>
+            <a:off x="657848" y="3505610"/>
+            <a:ext cx="5472366" cy="1115840"/>
+          </a:xfrm>
+        </p:spPr>
+      </p:pic>
+      <p:pic>
+        <p:nvPicPr>
+          <p:cNvPr id="5" name="Picture 4"/>
+          <p:cNvPicPr>
+            <a:picLocks noChangeAspect="1"/>
+          </p:cNvPicPr>
+          <p:nvPr/>
+        </p:nvPicPr>
+        <p:blipFill>
+          <a:blip r:embed="rId3">
+            <a:extLst>
+              <a:ext uri="{28A0092B-C50C-407E-A947-70E740481C1C}">
+                <a14:useLocalDpi xmlns:a14="http://schemas.microsoft.com/office/drawing/2010/main" val="0"/>
+              </a:ext>
+            </a:extLst>
+          </a:blip>
+          <a:stretch>
+            <a:fillRect/>
+          </a:stretch>
+        </p:blipFill>
+        <p:spPr>
+          <a:xfrm>
+            <a:off x="6555064" y="3049436"/>
+            <a:ext cx="5030445" cy="3144028"/>
+          </a:xfrm>
+          <a:prstGeom prst="rect">
+            <a:avLst/>
+          </a:prstGeom>
+        </p:spPr>
+      </p:pic>
+    </p:spTree>
+    <p:extLst>
+      <p:ext uri="{BB962C8B-B14F-4D97-AF65-F5344CB8AC3E}">
+        <p14:creationId xmlns:p14="http://schemas.microsoft.com/office/powerpoint/2010/main" val="2929456280"/>
       </p:ext>
     </p:extLst>
   </p:cSld>
@@ -14554,7 +15242,7 @@
 </p:sld>
 </file>
 
-<file path=ppt/slides/slide14.xml><?xml version="1.0" encoding="utf-8"?>
+<file path=ppt/slides/slide16.xml><?xml version="1.0" encoding="utf-8"?>
 <p:sld xmlns:a="http://schemas.openxmlformats.org/drawingml/2006/main" xmlns:r="http://schemas.openxmlformats.org/officeDocument/2006/relationships" xmlns:p="http://schemas.openxmlformats.org/presentationml/2006/main">
   <p:cSld>
     <p:spTree>
@@ -14657,10 +15345,17 @@
   <p:clrMapOvr>
     <a:masterClrMapping/>
   </p:clrMapOvr>
+  <p:timing>
+    <p:tnLst>
+      <p:par>
+        <p:cTn id="1" dur="indefinite" restart="never" nodeType="tmRoot"/>
+      </p:par>
+    </p:tnLst>
+  </p:timing>
 </p:sld>
 </file>
 
-<file path=ppt/slides/slide15.xml><?xml version="1.0" encoding="utf-8"?>
+<file path=ppt/slides/slide17.xml><?xml version="1.0" encoding="utf-8"?>
 <p:sld xmlns:a="http://schemas.openxmlformats.org/drawingml/2006/main" xmlns:r="http://schemas.openxmlformats.org/officeDocument/2006/relationships" xmlns:p="http://schemas.openxmlformats.org/presentationml/2006/main">
   <p:cSld>
     <p:spTree>
@@ -14766,10 +15461,17 @@
   <p:clrMapOvr>
     <a:masterClrMapping/>
   </p:clrMapOvr>
+  <p:timing>
+    <p:tnLst>
+      <p:par>
+        <p:cTn id="1" dur="indefinite" restart="never" nodeType="tmRoot"/>
+      </p:par>
+    </p:tnLst>
+  </p:timing>
 </p:sld>
 </file>
 
-<file path=ppt/slides/slide16.xml><?xml version="1.0" encoding="utf-8"?>
+<file path=ppt/slides/slide18.xml><?xml version="1.0" encoding="utf-8"?>
 <p:sld xmlns:a="http://schemas.openxmlformats.org/drawingml/2006/main" xmlns:r="http://schemas.openxmlformats.org/officeDocument/2006/relationships" xmlns:p="http://schemas.openxmlformats.org/presentationml/2006/main">
   <p:cSld>
     <p:spTree>
@@ -15044,10 +15746,17 @@
   <p:clrMapOvr>
     <a:masterClrMapping/>
   </p:clrMapOvr>
+  <p:timing>
+    <p:tnLst>
+      <p:par>
+        <p:cTn id="1" dur="indefinite" restart="never" nodeType="tmRoot"/>
+      </p:par>
+    </p:tnLst>
+  </p:timing>
 </p:sld>
 </file>
 
-<file path=ppt/slides/slide17.xml><?xml version="1.0" encoding="utf-8"?>
+<file path=ppt/slides/slide19.xml><?xml version="1.0" encoding="utf-8"?>
 <p:sld xmlns:a="http://schemas.openxmlformats.org/drawingml/2006/main" xmlns:r="http://schemas.openxmlformats.org/officeDocument/2006/relationships" xmlns:p="http://schemas.openxmlformats.org/presentationml/2006/main">
   <p:cSld>
     <p:spTree>
@@ -15232,7 +15941,7 @@
         </p:blipFill>
         <p:spPr>
           <a:xfrm>
-            <a:off x="6350491" y="2799183"/>
+            <a:off x="6179078" y="2799182"/>
             <a:ext cx="3857197" cy="1603983"/>
           </a:xfrm>
           <a:prstGeom prst="rect">
@@ -15250,10 +15959,774 @@
   <p:clrMapOvr>
     <a:masterClrMapping/>
   </p:clrMapOvr>
+  <p:timing>
+    <p:tnLst>
+      <p:par>
+        <p:cTn id="1" dur="indefinite" restart="never" nodeType="tmRoot"/>
+      </p:par>
+    </p:tnLst>
+  </p:timing>
 </p:sld>
 </file>
 
-<file path=ppt/slides/slide18.xml><?xml version="1.0" encoding="utf-8"?>
+<file path=ppt/slides/slide2.xml><?xml version="1.0" encoding="utf-8"?>
+<p:sld xmlns:a="http://schemas.openxmlformats.org/drawingml/2006/main" xmlns:r="http://schemas.openxmlformats.org/officeDocument/2006/relationships" xmlns:p="http://schemas.openxmlformats.org/presentationml/2006/main">
+  <p:cSld>
+    <p:spTree>
+      <p:nvGrpSpPr>
+        <p:cNvPr id="1" name=""/>
+        <p:cNvGrpSpPr/>
+        <p:nvPr/>
+      </p:nvGrpSpPr>
+      <p:grpSpPr>
+        <a:xfrm>
+          <a:off x="0" y="0"/>
+          <a:ext cx="0" cy="0"/>
+          <a:chOff x="0" y="0"/>
+          <a:chExt cx="0" cy="0"/>
+        </a:xfrm>
+      </p:grpSpPr>
+      <p:sp>
+        <p:nvSpPr>
+          <p:cNvPr id="2" name="Title 1"/>
+          <p:cNvSpPr>
+            <a:spLocks noGrp="1"/>
+          </p:cNvSpPr>
+          <p:nvPr>
+            <p:ph type="title"/>
+          </p:nvPr>
+        </p:nvSpPr>
+        <p:spPr/>
+        <p:txBody>
+          <a:bodyPr/>
+          <a:lstStyle/>
+          <a:p>
+            <a:r>
+              <a:rPr lang="en-US" dirty="0" smtClean="0">
+                <a:latin typeface="Arial" panose="020B0604020202020204" pitchFamily="34" charset="0"/>
+                <a:cs typeface="Arial" panose="020B0604020202020204" pitchFamily="34" charset="0"/>
+              </a:rPr>
+              <a:t>Introduction to C# and .NET</a:t>
+            </a:r>
+            <a:endParaRPr lang="en-US" dirty="0">
+              <a:latin typeface="Arial" panose="020B0604020202020204" pitchFamily="34" charset="0"/>
+              <a:cs typeface="Arial" panose="020B0604020202020204" pitchFamily="34" charset="0"/>
+            </a:endParaRPr>
+          </a:p>
+        </p:txBody>
+      </p:sp>
+      <p:sp>
+        <p:nvSpPr>
+          <p:cNvPr id="7" name="Content Placeholder 3"/>
+          <p:cNvSpPr>
+            <a:spLocks noGrp="1"/>
+          </p:cNvSpPr>
+          <p:nvPr>
+            <p:ph sz="half" idx="2"/>
+          </p:nvPr>
+        </p:nvSpPr>
+        <p:spPr>
+          <a:xfrm>
+            <a:off x="6196902" y="2327563"/>
+            <a:ext cx="4535753" cy="4054763"/>
+          </a:xfrm>
+        </p:spPr>
+        <p:txBody>
+          <a:bodyPr>
+            <a:normAutofit/>
+          </a:bodyPr>
+          <a:lstStyle/>
+          <a:p>
+            <a:pPr marL="0" indent="0">
+              <a:buNone/>
+            </a:pPr>
+            <a:endParaRPr lang="en-US" sz="1600" dirty="0">
+              <a:latin typeface="Arial" panose="020B0604020202020204" pitchFamily="34" charset="0"/>
+              <a:cs typeface="Arial" panose="020B0604020202020204" pitchFamily="34" charset="0"/>
+            </a:endParaRPr>
+          </a:p>
+          <a:p>
+            <a:endParaRPr lang="en-US" sz="1600" dirty="0">
+              <a:latin typeface="Arial" panose="020B0604020202020204" pitchFamily="34" charset="0"/>
+              <a:cs typeface="Arial" panose="020B0604020202020204" pitchFamily="34" charset="0"/>
+            </a:endParaRPr>
+          </a:p>
+          <a:p>
+            <a:endParaRPr lang="en-US" sz="1600" dirty="0">
+              <a:latin typeface="Arial" panose="020B0604020202020204" pitchFamily="34" charset="0"/>
+              <a:cs typeface="Arial" panose="020B0604020202020204" pitchFamily="34" charset="0"/>
+            </a:endParaRPr>
+          </a:p>
+          <a:p>
+            <a:endParaRPr lang="en-US" dirty="0">
+              <a:latin typeface="Arial" panose="020B0604020202020204" pitchFamily="34" charset="0"/>
+              <a:cs typeface="Arial" panose="020B0604020202020204" pitchFamily="34" charset="0"/>
+            </a:endParaRPr>
+          </a:p>
+          <a:p>
+            <a:endParaRPr lang="en-US" dirty="0">
+              <a:latin typeface="Arial" panose="020B0604020202020204" pitchFamily="34" charset="0"/>
+              <a:cs typeface="Arial" panose="020B0604020202020204" pitchFamily="34" charset="0"/>
+            </a:endParaRPr>
+          </a:p>
+          <a:p>
+            <a:endParaRPr lang="en-US" dirty="0">
+              <a:latin typeface="Arial" panose="020B0604020202020204" pitchFamily="34" charset="0"/>
+              <a:cs typeface="Arial" panose="020B0604020202020204" pitchFamily="34" charset="0"/>
+            </a:endParaRPr>
+          </a:p>
+          <a:p>
+            <a:endParaRPr lang="en-US" dirty="0">
+              <a:latin typeface="Arial" panose="020B0604020202020204" pitchFamily="34" charset="0"/>
+              <a:cs typeface="Arial" panose="020B0604020202020204" pitchFamily="34" charset="0"/>
+            </a:endParaRPr>
+          </a:p>
+          <a:p>
+            <a:endParaRPr lang="en-US" dirty="0"/>
+          </a:p>
+          <a:p>
+            <a:endParaRPr lang="en-US" dirty="0"/>
+          </a:p>
+        </p:txBody>
+      </p:sp>
+      <p:sp>
+        <p:nvSpPr>
+          <p:cNvPr id="4" name="Content Placeholder 3"/>
+          <p:cNvSpPr>
+            <a:spLocks noGrp="1"/>
+          </p:cNvSpPr>
+          <p:nvPr>
+            <p:ph sz="half" idx="2"/>
+          </p:nvPr>
+        </p:nvSpPr>
+        <p:spPr>
+          <a:xfrm>
+            <a:off x="782192" y="2771700"/>
+            <a:ext cx="10927726" cy="3713076"/>
+          </a:xfrm>
+        </p:spPr>
+        <p:txBody>
+          <a:bodyPr>
+            <a:normAutofit lnSpcReduction="10000"/>
+          </a:bodyPr>
+          <a:lstStyle/>
+          <a:p>
+            <a:r>
+              <a:rPr lang="en-US" sz="2000" dirty="0" smtClean="0">
+                <a:latin typeface="Arial" panose="020B0604020202020204" pitchFamily="34" charset="0"/>
+                <a:cs typeface="Arial" panose="020B0604020202020204" pitchFamily="34" charset="0"/>
+              </a:rPr>
+              <a:t>C# is designed by Anders Hejlsberg from Microsoft in 2000</a:t>
+            </a:r>
+          </a:p>
+          <a:p>
+            <a:r>
+              <a:rPr lang="en-US" sz="2000" dirty="0" smtClean="0">
+                <a:latin typeface="Arial" panose="020B0604020202020204" pitchFamily="34" charset="0"/>
+                <a:cs typeface="Arial" panose="020B0604020202020204" pitchFamily="34" charset="0"/>
+              </a:rPr>
+              <a:t>C# is general purpose programming language</a:t>
+            </a:r>
+          </a:p>
+          <a:p>
+            <a:r>
+              <a:rPr lang="en-US" sz="2000" dirty="0" smtClean="0">
+                <a:latin typeface="Arial" panose="020B0604020202020204" pitchFamily="34" charset="0"/>
+                <a:cs typeface="Arial" panose="020B0604020202020204" pitchFamily="34" charset="0"/>
+              </a:rPr>
+              <a:t>C# is object oriented (class-based) programming language</a:t>
+            </a:r>
+          </a:p>
+          <a:p>
+            <a:r>
+              <a:rPr lang="en-US" sz="2000" dirty="0" smtClean="0">
+                <a:latin typeface="Arial" panose="020B0604020202020204" pitchFamily="34" charset="0"/>
+                <a:cs typeface="Arial" panose="020B0604020202020204" pitchFamily="34" charset="0"/>
+              </a:rPr>
+              <a:t>C# is used on .NET platform /.NET 6 is the latest version/</a:t>
+            </a:r>
+          </a:p>
+          <a:p>
+            <a:r>
+              <a:rPr lang="en-US" sz="2000" dirty="0" smtClean="0">
+                <a:latin typeface="Arial" panose="020B0604020202020204" pitchFamily="34" charset="0"/>
+                <a:cs typeface="Arial" panose="020B0604020202020204" pitchFamily="34" charset="0"/>
+              </a:rPr>
+              <a:t>C# can be used for writing of Console, Desktop, Widows Services, Web apps, Mobile apps, Games and </a:t>
+            </a:r>
+            <a:r>
+              <a:rPr lang="en-US" sz="2000" dirty="0" err="1" smtClean="0">
+                <a:latin typeface="Arial" panose="020B0604020202020204" pitchFamily="34" charset="0"/>
+                <a:cs typeface="Arial" panose="020B0604020202020204" pitchFamily="34" charset="0"/>
+              </a:rPr>
+              <a:t>IoT</a:t>
+            </a:r>
+            <a:endParaRPr lang="en-US" sz="2000" dirty="0" smtClean="0">
+              <a:latin typeface="Arial" panose="020B0604020202020204" pitchFamily="34" charset="0"/>
+              <a:cs typeface="Arial" panose="020B0604020202020204" pitchFamily="34" charset="0"/>
+            </a:endParaRPr>
+          </a:p>
+          <a:p>
+            <a:r>
+              <a:rPr lang="en-US" sz="2000" dirty="0" smtClean="0">
+                <a:latin typeface="Arial" panose="020B0604020202020204" pitchFamily="34" charset="0"/>
+                <a:cs typeface="Arial" panose="020B0604020202020204" pitchFamily="34" charset="0"/>
+              </a:rPr>
+              <a:t>C# supports static typing, functional programming, generics and more features</a:t>
+            </a:r>
+            <a:endParaRPr lang="bg-BG" sz="2000" dirty="0" smtClean="0">
+              <a:latin typeface="Arial" panose="020B0604020202020204" pitchFamily="34" charset="0"/>
+              <a:cs typeface="Arial" panose="020B0604020202020204" pitchFamily="34" charset="0"/>
+            </a:endParaRPr>
+          </a:p>
+          <a:p>
+            <a:r>
+              <a:rPr lang="en-US" sz="2000" dirty="0" smtClean="0">
+                <a:latin typeface="Arial" panose="020B0604020202020204" pitchFamily="34" charset="0"/>
+                <a:cs typeface="Arial" panose="020B0604020202020204" pitchFamily="34" charset="0"/>
+              </a:rPr>
+              <a:t>C# and Microsoft documentation are generally quite good</a:t>
+            </a:r>
+          </a:p>
+          <a:p>
+            <a:r>
+              <a:rPr lang="en-US" sz="2000" dirty="0" smtClean="0">
+                <a:latin typeface="Arial" panose="020B0604020202020204" pitchFamily="34" charset="0"/>
+                <a:cs typeface="Arial" panose="020B0604020202020204" pitchFamily="34" charset="0"/>
+              </a:rPr>
+              <a:t>C</a:t>
+            </a:r>
+            <a:r>
+              <a:rPr lang="en-US" sz="2000" dirty="0" smtClean="0">
+                <a:latin typeface="Arial" panose="020B0604020202020204" pitchFamily="34" charset="0"/>
+                <a:cs typeface="Arial" panose="020B0604020202020204" pitchFamily="34" charset="0"/>
+              </a:rPr>
+              <a:t># documentation</a:t>
+            </a:r>
+            <a:r>
+              <a:rPr lang="en-US" sz="2000" dirty="0">
+                <a:latin typeface="Arial" panose="020B0604020202020204" pitchFamily="34" charset="0"/>
+                <a:cs typeface="Arial" panose="020B0604020202020204" pitchFamily="34" charset="0"/>
+              </a:rPr>
+              <a:t>: </a:t>
+            </a:r>
+            <a:r>
+              <a:rPr lang="en-US" sz="2000" dirty="0">
+                <a:solidFill>
+                  <a:srgbClr val="0070C0"/>
+                </a:solidFill>
+                <a:latin typeface="Arial" panose="020B0604020202020204" pitchFamily="34" charset="0"/>
+                <a:cs typeface="Arial" panose="020B0604020202020204" pitchFamily="34" charset="0"/>
+              </a:rPr>
+              <a:t>https://docs.microsoft.com/en-us/dotnet/csharp/</a:t>
+            </a:r>
+            <a:endParaRPr lang="en-US" sz="2000" dirty="0" smtClean="0">
+              <a:solidFill>
+                <a:srgbClr val="0070C0"/>
+              </a:solidFill>
+              <a:latin typeface="Arial" panose="020B0604020202020204" pitchFamily="34" charset="0"/>
+              <a:cs typeface="Arial" panose="020B0604020202020204" pitchFamily="34" charset="0"/>
+            </a:endParaRPr>
+          </a:p>
+          <a:p>
+            <a:endParaRPr lang="en-US" sz="2000" dirty="0" smtClean="0">
+              <a:latin typeface="Arial" panose="020B0604020202020204" pitchFamily="34" charset="0"/>
+              <a:cs typeface="Arial" panose="020B0604020202020204" pitchFamily="34" charset="0"/>
+            </a:endParaRPr>
+          </a:p>
+          <a:p>
+            <a:endParaRPr lang="en-US" sz="2000" dirty="0">
+              <a:latin typeface="Arial" panose="020B0604020202020204" pitchFamily="34" charset="0"/>
+              <a:cs typeface="Arial" panose="020B0604020202020204" pitchFamily="34" charset="0"/>
+            </a:endParaRPr>
+          </a:p>
+          <a:p>
+            <a:endParaRPr lang="en-US" sz="2000" dirty="0">
+              <a:latin typeface="Arial" panose="020B0604020202020204" pitchFamily="34" charset="0"/>
+              <a:cs typeface="Arial" panose="020B0604020202020204" pitchFamily="34" charset="0"/>
+            </a:endParaRPr>
+          </a:p>
+          <a:p>
+            <a:pPr marL="0" indent="0">
+              <a:buNone/>
+            </a:pPr>
+            <a:endParaRPr lang="en-US" sz="1600" dirty="0">
+              <a:latin typeface="Arial" panose="020B0604020202020204" pitchFamily="34" charset="0"/>
+              <a:cs typeface="Arial" panose="020B0604020202020204" pitchFamily="34" charset="0"/>
+            </a:endParaRPr>
+          </a:p>
+          <a:p>
+            <a:endParaRPr lang="en-US" sz="1600" dirty="0">
+              <a:latin typeface="Arial" panose="020B0604020202020204" pitchFamily="34" charset="0"/>
+              <a:cs typeface="Arial" panose="020B0604020202020204" pitchFamily="34" charset="0"/>
+            </a:endParaRPr>
+          </a:p>
+          <a:p>
+            <a:endParaRPr lang="en-US" sz="1600" dirty="0">
+              <a:latin typeface="Arial" panose="020B0604020202020204" pitchFamily="34" charset="0"/>
+              <a:cs typeface="Arial" panose="020B0604020202020204" pitchFamily="34" charset="0"/>
+            </a:endParaRPr>
+          </a:p>
+          <a:p>
+            <a:endParaRPr lang="en-US" dirty="0">
+              <a:latin typeface="Arial" panose="020B0604020202020204" pitchFamily="34" charset="0"/>
+              <a:cs typeface="Arial" panose="020B0604020202020204" pitchFamily="34" charset="0"/>
+            </a:endParaRPr>
+          </a:p>
+          <a:p>
+            <a:endParaRPr lang="en-US" dirty="0">
+              <a:latin typeface="Arial" panose="020B0604020202020204" pitchFamily="34" charset="0"/>
+              <a:cs typeface="Arial" panose="020B0604020202020204" pitchFamily="34" charset="0"/>
+            </a:endParaRPr>
+          </a:p>
+          <a:p>
+            <a:endParaRPr lang="en-US" dirty="0">
+              <a:latin typeface="Arial" panose="020B0604020202020204" pitchFamily="34" charset="0"/>
+              <a:cs typeface="Arial" panose="020B0604020202020204" pitchFamily="34" charset="0"/>
+            </a:endParaRPr>
+          </a:p>
+          <a:p>
+            <a:endParaRPr lang="en-US" dirty="0">
+              <a:latin typeface="Arial" panose="020B0604020202020204" pitchFamily="34" charset="0"/>
+              <a:cs typeface="Arial" panose="020B0604020202020204" pitchFamily="34" charset="0"/>
+            </a:endParaRPr>
+          </a:p>
+          <a:p>
+            <a:endParaRPr lang="en-US" dirty="0"/>
+          </a:p>
+          <a:p>
+            <a:endParaRPr lang="en-US" dirty="0"/>
+          </a:p>
+        </p:txBody>
+      </p:sp>
+    </p:spTree>
+    <p:extLst>
+      <p:ext uri="{BB962C8B-B14F-4D97-AF65-F5344CB8AC3E}">
+        <p14:creationId xmlns:p14="http://schemas.microsoft.com/office/powerpoint/2010/main" val="927372469"/>
+      </p:ext>
+    </p:extLst>
+  </p:cSld>
+  <p:clrMapOvr>
+    <a:masterClrMapping/>
+  </p:clrMapOvr>
+  <p:timing>
+    <p:tnLst>
+      <p:par>
+        <p:cTn id="1" dur="indefinite" restart="never" nodeType="tmRoot"/>
+      </p:par>
+    </p:tnLst>
+  </p:timing>
+</p:sld>
+</file>
+
+<file path=ppt/slides/slide20.xml><?xml version="1.0" encoding="utf-8"?>
+<p:sld xmlns:a="http://schemas.openxmlformats.org/drawingml/2006/main" xmlns:r="http://schemas.openxmlformats.org/officeDocument/2006/relationships" xmlns:p="http://schemas.openxmlformats.org/presentationml/2006/main">
+  <p:cSld>
+    <p:spTree>
+      <p:nvGrpSpPr>
+        <p:cNvPr id="1" name=""/>
+        <p:cNvGrpSpPr/>
+        <p:nvPr/>
+      </p:nvGrpSpPr>
+      <p:grpSpPr>
+        <a:xfrm>
+          <a:off x="0" y="0"/>
+          <a:ext cx="0" cy="0"/>
+          <a:chOff x="0" y="0"/>
+          <a:chExt cx="0" cy="0"/>
+        </a:xfrm>
+      </p:grpSpPr>
+      <p:sp>
+        <p:nvSpPr>
+          <p:cNvPr id="2" name="Title 1"/>
+          <p:cNvSpPr>
+            <a:spLocks noGrp="1"/>
+          </p:cNvSpPr>
+          <p:nvPr>
+            <p:ph type="title"/>
+          </p:nvPr>
+        </p:nvSpPr>
+        <p:spPr/>
+        <p:txBody>
+          <a:bodyPr/>
+          <a:lstStyle/>
+          <a:p>
+            <a:pPr algn="ctr"/>
+            <a:r>
+              <a:rPr lang="en-US" dirty="0">
+                <a:latin typeface="Arial" panose="020B0604020202020204" pitchFamily="34" charset="0"/>
+                <a:cs typeface="Arial" panose="020B0604020202020204" pitchFamily="34" charset="0"/>
+              </a:rPr>
+              <a:t>Loops </a:t>
+            </a:r>
+            <a:r>
+              <a:rPr lang="en-US" dirty="0" smtClean="0">
+                <a:latin typeface="Arial" panose="020B0604020202020204" pitchFamily="34" charset="0"/>
+                <a:cs typeface="Arial" panose="020B0604020202020204" pitchFamily="34" charset="0"/>
+              </a:rPr>
+              <a:t>(</a:t>
+            </a:r>
+            <a:r>
+              <a:rPr lang="en-US" dirty="0" smtClean="0">
+                <a:solidFill>
+                  <a:srgbClr val="FFFF00"/>
+                </a:solidFill>
+                <a:latin typeface="Arial" panose="020B0604020202020204" pitchFamily="34" charset="0"/>
+                <a:cs typeface="Arial" panose="020B0604020202020204" pitchFamily="34" charset="0"/>
+              </a:rPr>
+              <a:t>do/while</a:t>
+            </a:r>
+            <a:r>
+              <a:rPr lang="en-US" dirty="0" smtClean="0">
+                <a:latin typeface="Arial" panose="020B0604020202020204" pitchFamily="34" charset="0"/>
+                <a:cs typeface="Arial" panose="020B0604020202020204" pitchFamily="34" charset="0"/>
+              </a:rPr>
+              <a:t> </a:t>
+            </a:r>
+            <a:r>
+              <a:rPr lang="en-US" dirty="0">
+                <a:latin typeface="Arial" panose="020B0604020202020204" pitchFamily="34" charset="0"/>
+                <a:cs typeface="Arial" panose="020B0604020202020204" pitchFamily="34" charset="0"/>
+              </a:rPr>
+              <a:t>loop)</a:t>
+            </a:r>
+            <a:endParaRPr lang="en-US" dirty="0"/>
+          </a:p>
+        </p:txBody>
+      </p:sp>
+      <p:pic>
+        <p:nvPicPr>
+          <p:cNvPr id="4" name="Content Placeholder 3"/>
+          <p:cNvPicPr>
+            <a:picLocks noGrp="1" noChangeAspect="1"/>
+          </p:cNvPicPr>
+          <p:nvPr>
+            <p:ph idx="1"/>
+          </p:nvPr>
+        </p:nvPicPr>
+        <p:blipFill>
+          <a:blip r:embed="rId2">
+            <a:extLst>
+              <a:ext uri="{28A0092B-C50C-407E-A947-70E740481C1C}">
+                <a14:useLocalDpi xmlns:a14="http://schemas.microsoft.com/office/drawing/2010/main" val="0"/>
+              </a:ext>
+            </a:extLst>
+          </a:blip>
+          <a:stretch>
+            <a:fillRect/>
+          </a:stretch>
+        </p:blipFill>
+        <p:spPr>
+          <a:xfrm>
+            <a:off x="6847460" y="4592749"/>
+            <a:ext cx="4614093" cy="1393243"/>
+          </a:xfrm>
+        </p:spPr>
+      </p:pic>
+      <p:pic>
+        <p:nvPicPr>
+          <p:cNvPr id="5" name="Picture 4"/>
+          <p:cNvPicPr>
+            <a:picLocks noChangeAspect="1"/>
+          </p:cNvPicPr>
+          <p:nvPr/>
+        </p:nvPicPr>
+        <p:blipFill>
+          <a:blip r:embed="rId3">
+            <a:extLst>
+              <a:ext uri="{28A0092B-C50C-407E-A947-70E740481C1C}">
+                <a14:useLocalDpi xmlns:a14="http://schemas.microsoft.com/office/drawing/2010/main" val="0"/>
+              </a:ext>
+            </a:extLst>
+          </a:blip>
+          <a:stretch>
+            <a:fillRect/>
+          </a:stretch>
+        </p:blipFill>
+        <p:spPr>
+          <a:xfrm>
+            <a:off x="6959428" y="2637375"/>
+            <a:ext cx="3481527" cy="1695253"/>
+          </a:xfrm>
+          <a:prstGeom prst="rect">
+            <a:avLst/>
+          </a:prstGeom>
+        </p:spPr>
+      </p:pic>
+      <p:sp>
+        <p:nvSpPr>
+          <p:cNvPr id="6" name="TextBox 5"/>
+          <p:cNvSpPr txBox="1"/>
+          <p:nvPr/>
+        </p:nvSpPr>
+        <p:spPr>
+          <a:xfrm>
+            <a:off x="1154954" y="2789852"/>
+            <a:ext cx="5054585" cy="3539430"/>
+          </a:xfrm>
+          <a:prstGeom prst="rect">
+            <a:avLst/>
+          </a:prstGeom>
+          <a:noFill/>
+        </p:spPr>
+        <p:txBody>
+          <a:bodyPr wrap="square" rtlCol="0">
+            <a:spAutoFit/>
+          </a:bodyPr>
+          <a:lstStyle/>
+          <a:p>
+            <a:r>
+              <a:rPr lang="en-US" sz="2800" dirty="0" smtClean="0">
+                <a:latin typeface="Arial" panose="020B0604020202020204" pitchFamily="34" charset="0"/>
+                <a:cs typeface="Arial" panose="020B0604020202020204" pitchFamily="34" charset="0"/>
+              </a:rPr>
+              <a:t>The </a:t>
+            </a:r>
+            <a:r>
+              <a:rPr lang="en-US" sz="2800" dirty="0" smtClean="0">
+                <a:solidFill>
+                  <a:srgbClr val="00B050"/>
+                </a:solidFill>
+                <a:latin typeface="Arial" panose="020B0604020202020204" pitchFamily="34" charset="0"/>
+                <a:cs typeface="Arial" panose="020B0604020202020204" pitchFamily="34" charset="0"/>
+              </a:rPr>
+              <a:t>do/while</a:t>
+            </a:r>
+            <a:r>
+              <a:rPr lang="en-US" sz="2800" dirty="0" smtClean="0">
+                <a:latin typeface="Arial" panose="020B0604020202020204" pitchFamily="34" charset="0"/>
+                <a:cs typeface="Arial" panose="020B0604020202020204" pitchFamily="34" charset="0"/>
+              </a:rPr>
+              <a:t> loop is a variant of while loop. This loop will execute the code for sure at least only once, before checking if the condition is </a:t>
+            </a:r>
+            <a:r>
+              <a:rPr lang="en-US" sz="2800" dirty="0" smtClean="0">
+                <a:solidFill>
+                  <a:srgbClr val="002060"/>
+                </a:solidFill>
+                <a:latin typeface="Arial" panose="020B0604020202020204" pitchFamily="34" charset="0"/>
+                <a:cs typeface="Arial" panose="020B0604020202020204" pitchFamily="34" charset="0"/>
+              </a:rPr>
+              <a:t>True</a:t>
+            </a:r>
+            <a:r>
+              <a:rPr lang="en-US" sz="2800" dirty="0" smtClean="0">
+                <a:latin typeface="Arial" panose="020B0604020202020204" pitchFamily="34" charset="0"/>
+                <a:cs typeface="Arial" panose="020B0604020202020204" pitchFamily="34" charset="0"/>
+              </a:rPr>
+              <a:t>, then it will repeat the loop as long as the condition is true.</a:t>
+            </a:r>
+            <a:endParaRPr lang="en-US" sz="2800" dirty="0">
+              <a:latin typeface="Arial" panose="020B0604020202020204" pitchFamily="34" charset="0"/>
+              <a:cs typeface="Arial" panose="020B0604020202020204" pitchFamily="34" charset="0"/>
+            </a:endParaRPr>
+          </a:p>
+        </p:txBody>
+      </p:sp>
+    </p:spTree>
+    <p:extLst>
+      <p:ext uri="{BB962C8B-B14F-4D97-AF65-F5344CB8AC3E}">
+        <p14:creationId xmlns:p14="http://schemas.microsoft.com/office/powerpoint/2010/main" val="902789663"/>
+      </p:ext>
+    </p:extLst>
+  </p:cSld>
+  <p:clrMapOvr>
+    <a:masterClrMapping/>
+  </p:clrMapOvr>
+  <p:timing>
+    <p:tnLst>
+      <p:par>
+        <p:cTn id="1" dur="indefinite" restart="never" nodeType="tmRoot"/>
+      </p:par>
+    </p:tnLst>
+  </p:timing>
+</p:sld>
+</file>
+
+<file path=ppt/slides/slide21.xml><?xml version="1.0" encoding="utf-8"?>
+<p:sld xmlns:a="http://schemas.openxmlformats.org/drawingml/2006/main" xmlns:r="http://schemas.openxmlformats.org/officeDocument/2006/relationships" xmlns:p="http://schemas.openxmlformats.org/presentationml/2006/main">
+  <p:cSld>
+    <p:spTree>
+      <p:nvGrpSpPr>
+        <p:cNvPr id="1" name=""/>
+        <p:cNvGrpSpPr/>
+        <p:nvPr/>
+      </p:nvGrpSpPr>
+      <p:grpSpPr>
+        <a:xfrm>
+          <a:off x="0" y="0"/>
+          <a:ext cx="0" cy="0"/>
+          <a:chOff x="0" y="0"/>
+          <a:chExt cx="0" cy="0"/>
+        </a:xfrm>
+      </p:grpSpPr>
+      <p:sp>
+        <p:nvSpPr>
+          <p:cNvPr id="2" name="Title 1"/>
+          <p:cNvSpPr>
+            <a:spLocks noGrp="1"/>
+          </p:cNvSpPr>
+          <p:nvPr>
+            <p:ph type="title"/>
+          </p:nvPr>
+        </p:nvSpPr>
+        <p:spPr/>
+        <p:txBody>
+          <a:bodyPr/>
+          <a:lstStyle/>
+          <a:p>
+            <a:pPr algn="ctr"/>
+            <a:r>
+              <a:rPr lang="en-US" dirty="0" smtClean="0">
+                <a:latin typeface="Arial" panose="020B0604020202020204" pitchFamily="34" charset="0"/>
+                <a:cs typeface="Arial" panose="020B0604020202020204" pitchFamily="34" charset="0"/>
+              </a:rPr>
+              <a:t>Loops(nested </a:t>
+            </a:r>
+            <a:r>
+              <a:rPr lang="en-US" dirty="0" smtClean="0">
+                <a:solidFill>
+                  <a:srgbClr val="FFFF00"/>
+                </a:solidFill>
+                <a:latin typeface="Arial" panose="020B0604020202020204" pitchFamily="34" charset="0"/>
+                <a:cs typeface="Arial" panose="020B0604020202020204" pitchFamily="34" charset="0"/>
+              </a:rPr>
+              <a:t>for</a:t>
+            </a:r>
+            <a:r>
+              <a:rPr lang="en-US" dirty="0" smtClean="0">
+                <a:latin typeface="Arial" panose="020B0604020202020204" pitchFamily="34" charset="0"/>
+                <a:cs typeface="Arial" panose="020B0604020202020204" pitchFamily="34" charset="0"/>
+              </a:rPr>
+              <a:t> loops)</a:t>
+            </a:r>
+            <a:endParaRPr lang="en-US" dirty="0">
+              <a:latin typeface="Arial" panose="020B0604020202020204" pitchFamily="34" charset="0"/>
+              <a:cs typeface="Arial" panose="020B0604020202020204" pitchFamily="34" charset="0"/>
+            </a:endParaRPr>
+          </a:p>
+        </p:txBody>
+      </p:sp>
+      <p:pic>
+        <p:nvPicPr>
+          <p:cNvPr id="4" name="Content Placeholder 3"/>
+          <p:cNvPicPr>
+            <a:picLocks noGrp="1" noChangeAspect="1"/>
+          </p:cNvPicPr>
+          <p:nvPr>
+            <p:ph idx="1"/>
+          </p:nvPr>
+        </p:nvPicPr>
+        <p:blipFill>
+          <a:blip r:embed="rId2">
+            <a:extLst>
+              <a:ext uri="{28A0092B-C50C-407E-A947-70E740481C1C}">
+                <a14:useLocalDpi xmlns:a14="http://schemas.microsoft.com/office/drawing/2010/main" val="0"/>
+              </a:ext>
+            </a:extLst>
+          </a:blip>
+          <a:stretch>
+            <a:fillRect/>
+          </a:stretch>
+        </p:blipFill>
+        <p:spPr>
+          <a:xfrm>
+            <a:off x="6469726" y="2496689"/>
+            <a:ext cx="5454796" cy="4135255"/>
+          </a:xfrm>
+        </p:spPr>
+      </p:pic>
+      <p:sp>
+        <p:nvSpPr>
+          <p:cNvPr id="5" name="TextBox 4"/>
+          <p:cNvSpPr txBox="1"/>
+          <p:nvPr/>
+        </p:nvSpPr>
+        <p:spPr>
+          <a:xfrm>
+            <a:off x="823701" y="3048194"/>
+            <a:ext cx="5054585" cy="2677656"/>
+          </a:xfrm>
+          <a:prstGeom prst="rect">
+            <a:avLst/>
+          </a:prstGeom>
+          <a:noFill/>
+        </p:spPr>
+        <p:txBody>
+          <a:bodyPr wrap="square" rtlCol="0">
+            <a:spAutoFit/>
+          </a:bodyPr>
+          <a:lstStyle/>
+          <a:p>
+            <a:r>
+              <a:rPr lang="en-US" sz="2800" dirty="0" smtClean="0">
+                <a:latin typeface="Arial" panose="020B0604020202020204" pitchFamily="34" charset="0"/>
+                <a:cs typeface="Arial" panose="020B0604020202020204" pitchFamily="34" charset="0"/>
+              </a:rPr>
+              <a:t>It is very important to know that after first iteration of </a:t>
+            </a:r>
+            <a:r>
+              <a:rPr lang="en-US" sz="2800" dirty="0" smtClean="0">
+                <a:solidFill>
+                  <a:srgbClr val="00B050"/>
+                </a:solidFill>
+                <a:latin typeface="Arial" panose="020B0604020202020204" pitchFamily="34" charset="0"/>
+                <a:cs typeface="Arial" panose="020B0604020202020204" pitchFamily="34" charset="0"/>
+              </a:rPr>
+              <a:t>outer</a:t>
+            </a:r>
+            <a:r>
+              <a:rPr lang="en-US" sz="2800" dirty="0" smtClean="0">
+                <a:latin typeface="Arial" panose="020B0604020202020204" pitchFamily="34" charset="0"/>
+                <a:cs typeface="Arial" panose="020B0604020202020204" pitchFamily="34" charset="0"/>
+              </a:rPr>
+              <a:t> loop, the </a:t>
+            </a:r>
+            <a:r>
+              <a:rPr lang="en-US" sz="2800" dirty="0" smtClean="0">
+                <a:solidFill>
+                  <a:srgbClr val="00B050"/>
+                </a:solidFill>
+                <a:latin typeface="Arial" panose="020B0604020202020204" pitchFamily="34" charset="0"/>
+                <a:cs typeface="Arial" panose="020B0604020202020204" pitchFamily="34" charset="0"/>
+              </a:rPr>
+              <a:t>inner</a:t>
+            </a:r>
+            <a:r>
+              <a:rPr lang="en-US" sz="2800" dirty="0" smtClean="0">
+                <a:latin typeface="Arial" panose="020B0604020202020204" pitchFamily="34" charset="0"/>
+                <a:cs typeface="Arial" panose="020B0604020202020204" pitchFamily="34" charset="0"/>
+              </a:rPr>
+              <a:t> loop has to complete. After that again the program goes to outer loop for second iteration, etc.</a:t>
+            </a:r>
+            <a:endParaRPr lang="en-US" sz="2800" dirty="0">
+              <a:latin typeface="Arial" panose="020B0604020202020204" pitchFamily="34" charset="0"/>
+              <a:cs typeface="Arial" panose="020B0604020202020204" pitchFamily="34" charset="0"/>
+            </a:endParaRPr>
+          </a:p>
+        </p:txBody>
+      </p:sp>
+    </p:spTree>
+    <p:extLst>
+      <p:ext uri="{BB962C8B-B14F-4D97-AF65-F5344CB8AC3E}">
+        <p14:creationId xmlns:p14="http://schemas.microsoft.com/office/powerpoint/2010/main" val="4081519577"/>
+      </p:ext>
+    </p:extLst>
+  </p:cSld>
+  <p:clrMapOvr>
+    <a:masterClrMapping/>
+  </p:clrMapOvr>
+  <p:timing>
+    <p:tnLst>
+      <p:par>
+        <p:cTn id="1" dur="indefinite" restart="never" nodeType="tmRoot"/>
+      </p:par>
+    </p:tnLst>
+  </p:timing>
+</p:sld>
+</file>
+
+<file path=ppt/slides/slide22.xml><?xml version="1.0" encoding="utf-8"?>
 <p:sld xmlns:a="http://schemas.openxmlformats.org/drawingml/2006/main" xmlns:r="http://schemas.openxmlformats.org/officeDocument/2006/relationships" xmlns:p="http://schemas.openxmlformats.org/presentationml/2006/main">
   <p:cSld>
     <p:spTree>
@@ -15402,10 +16875,17 @@
   <p:clrMapOvr>
     <a:masterClrMapping/>
   </p:clrMapOvr>
+  <p:timing>
+    <p:tnLst>
+      <p:par>
+        <p:cTn id="1" dur="indefinite" restart="never" nodeType="tmRoot"/>
+      </p:par>
+    </p:tnLst>
+  </p:timing>
 </p:sld>
 </file>
 
-<file path=ppt/slides/slide2.xml><?xml version="1.0" encoding="utf-8"?>
+<file path=ppt/slides/slide23.xml><?xml version="1.0" encoding="utf-8"?>
 <p:sld xmlns:a="http://schemas.openxmlformats.org/drawingml/2006/main" xmlns:r="http://schemas.openxmlformats.org/officeDocument/2006/relationships" xmlns:p="http://schemas.openxmlformats.org/presentationml/2006/main">
   <p:cSld>
     <p:spTree>
@@ -15437,12 +16917,30 @@
           <a:bodyPr/>
           <a:lstStyle/>
           <a:p>
+            <a:pPr algn="ctr"/>
             <a:r>
               <a:rPr lang="en-US" dirty="0" smtClean="0">
                 <a:latin typeface="Arial" panose="020B0604020202020204" pitchFamily="34" charset="0"/>
                 <a:cs typeface="Arial" panose="020B0604020202020204" pitchFamily="34" charset="0"/>
               </a:rPr>
-              <a:t>Introduction to C# and .NET</a:t>
+              <a:t>Using of “</a:t>
+            </a:r>
+            <a:r>
+              <a:rPr lang="en-US" dirty="0" smtClean="0">
+                <a:solidFill>
+                  <a:srgbClr val="FFFF00"/>
+                </a:solidFill>
+                <a:latin typeface="Arial" panose="020B0604020202020204" pitchFamily="34" charset="0"/>
+                <a:cs typeface="Arial" panose="020B0604020202020204" pitchFamily="34" charset="0"/>
+              </a:rPr>
+              <a:t>continue</a:t>
+            </a:r>
+            <a:r>
+              <a:rPr lang="en-US" dirty="0" smtClean="0">
+                <a:latin typeface="Arial" panose="020B0604020202020204" pitchFamily="34" charset="0"/>
+                <a:cs typeface="Arial" panose="020B0604020202020204" pitchFamily="34" charset="0"/>
+              </a:rPr>
+              <a:t>”</a:t>
             </a:r>
             <a:endParaRPr lang="en-US" dirty="0">
               <a:latin typeface="Arial" panose="020B0604020202020204" pitchFamily="34" charset="0"/>
@@ -15451,294 +16949,85 @@
           </a:p>
         </p:txBody>
       </p:sp>
+      <p:pic>
+        <p:nvPicPr>
+          <p:cNvPr id="5" name="Content Placeholder 4"/>
+          <p:cNvPicPr>
+            <a:picLocks noGrp="1" noChangeAspect="1"/>
+          </p:cNvPicPr>
+          <p:nvPr>
+            <p:ph idx="1"/>
+          </p:nvPr>
+        </p:nvPicPr>
+        <p:blipFill>
+          <a:blip r:embed="rId2">
+            <a:extLst>
+              <a:ext uri="{28A0092B-C50C-407E-A947-70E740481C1C}">
+                <a14:useLocalDpi xmlns:a14="http://schemas.microsoft.com/office/drawing/2010/main" val="0"/>
+              </a:ext>
+            </a:extLst>
+          </a:blip>
+          <a:stretch>
+            <a:fillRect/>
+          </a:stretch>
+        </p:blipFill>
+        <p:spPr>
+          <a:xfrm>
+            <a:off x="6774025" y="2300622"/>
+            <a:ext cx="4142791" cy="4471184"/>
+          </a:xfrm>
+        </p:spPr>
+      </p:pic>
       <p:sp>
         <p:nvSpPr>
-          <p:cNvPr id="7" name="Content Placeholder 3"/>
-          <p:cNvSpPr>
-            <a:spLocks noGrp="1"/>
-          </p:cNvSpPr>
-          <p:nvPr>
-            <p:ph sz="half" idx="2"/>
-          </p:nvPr>
+          <p:cNvPr id="6" name="TextBox 5"/>
+          <p:cNvSpPr txBox="1"/>
+          <p:nvPr/>
         </p:nvSpPr>
         <p:spPr>
           <a:xfrm>
-            <a:off x="6196902" y="2327563"/>
-            <a:ext cx="4535753" cy="4054763"/>
+            <a:off x="1038304" y="3610946"/>
+            <a:ext cx="5054585" cy="1384995"/>
           </a:xfrm>
+          <a:prstGeom prst="rect">
+            <a:avLst/>
+          </a:prstGeom>
+          <a:noFill/>
         </p:spPr>
         <p:txBody>
-          <a:bodyPr>
-            <a:normAutofit/>
+          <a:bodyPr wrap="square" rtlCol="0">
+            <a:spAutoFit/>
           </a:bodyPr>
           <a:lstStyle/>
           <a:p>
-            <a:pPr marL="0" indent="0">
-              <a:buNone/>
-            </a:pPr>
-            <a:endParaRPr lang="en-US" sz="1600" dirty="0">
-              <a:latin typeface="Arial" panose="020B0604020202020204" pitchFamily="34" charset="0"/>
-              <a:cs typeface="Arial" panose="020B0604020202020204" pitchFamily="34" charset="0"/>
-            </a:endParaRPr>
-          </a:p>
-          <a:p>
-            <a:endParaRPr lang="en-US" sz="1600" dirty="0">
-              <a:latin typeface="Arial" panose="020B0604020202020204" pitchFamily="34" charset="0"/>
-              <a:cs typeface="Arial" panose="020B0604020202020204" pitchFamily="34" charset="0"/>
-            </a:endParaRPr>
-          </a:p>
-          <a:p>
-            <a:endParaRPr lang="en-US" sz="1600" dirty="0">
-              <a:latin typeface="Arial" panose="020B0604020202020204" pitchFamily="34" charset="0"/>
-              <a:cs typeface="Arial" panose="020B0604020202020204" pitchFamily="34" charset="0"/>
-            </a:endParaRPr>
-          </a:p>
-          <a:p>
-            <a:endParaRPr lang="en-US" dirty="0">
-              <a:latin typeface="Arial" panose="020B0604020202020204" pitchFamily="34" charset="0"/>
-              <a:cs typeface="Arial" panose="020B0604020202020204" pitchFamily="34" charset="0"/>
-            </a:endParaRPr>
-          </a:p>
-          <a:p>
-            <a:endParaRPr lang="en-US" dirty="0">
-              <a:latin typeface="Arial" panose="020B0604020202020204" pitchFamily="34" charset="0"/>
-              <a:cs typeface="Arial" panose="020B0604020202020204" pitchFamily="34" charset="0"/>
-            </a:endParaRPr>
-          </a:p>
-          <a:p>
-            <a:endParaRPr lang="en-US" dirty="0">
-              <a:latin typeface="Arial" panose="020B0604020202020204" pitchFamily="34" charset="0"/>
-              <a:cs typeface="Arial" panose="020B0604020202020204" pitchFamily="34" charset="0"/>
-            </a:endParaRPr>
-          </a:p>
-          <a:p>
-            <a:endParaRPr lang="en-US" dirty="0">
-              <a:latin typeface="Arial" panose="020B0604020202020204" pitchFamily="34" charset="0"/>
-              <a:cs typeface="Arial" panose="020B0604020202020204" pitchFamily="34" charset="0"/>
-            </a:endParaRPr>
-          </a:p>
-          <a:p>
-            <a:endParaRPr lang="en-US" dirty="0"/>
-          </a:p>
-          <a:p>
-            <a:endParaRPr lang="en-US" dirty="0"/>
-          </a:p>
-        </p:txBody>
-      </p:sp>
-      <p:sp>
-        <p:nvSpPr>
-          <p:cNvPr id="4" name="Content Placeholder 3"/>
-          <p:cNvSpPr>
-            <a:spLocks noGrp="1"/>
-          </p:cNvSpPr>
-          <p:nvPr>
-            <p:ph sz="half" idx="2"/>
-          </p:nvPr>
-        </p:nvSpPr>
-        <p:spPr>
-          <a:xfrm>
-            <a:off x="782192" y="2771700"/>
-            <a:ext cx="10927726" cy="3713076"/>
-          </a:xfrm>
-        </p:spPr>
-        <p:txBody>
-          <a:bodyPr>
-            <a:normAutofit lnSpcReduction="10000"/>
-          </a:bodyPr>
-          <a:lstStyle/>
-          <a:p>
-            <a:r>
-              <a:rPr lang="en-US" sz="2000" dirty="0" smtClean="0">
-                <a:latin typeface="Arial" panose="020B0604020202020204" pitchFamily="34" charset="0"/>
-                <a:cs typeface="Arial" panose="020B0604020202020204" pitchFamily="34" charset="0"/>
-              </a:rPr>
-              <a:t>C# is designed by Anders Hejlsberg from Microsoft in 2000</a:t>
-            </a:r>
-          </a:p>
-          <a:p>
-            <a:r>
-              <a:rPr lang="en-US" sz="2000" dirty="0" smtClean="0">
-                <a:latin typeface="Arial" panose="020B0604020202020204" pitchFamily="34" charset="0"/>
-                <a:cs typeface="Arial" panose="020B0604020202020204" pitchFamily="34" charset="0"/>
-              </a:rPr>
-              <a:t>C# is general purpose programming language</a:t>
-            </a:r>
-          </a:p>
-          <a:p>
-            <a:r>
-              <a:rPr lang="en-US" sz="2000" dirty="0" smtClean="0">
-                <a:latin typeface="Arial" panose="020B0604020202020204" pitchFamily="34" charset="0"/>
-                <a:cs typeface="Arial" panose="020B0604020202020204" pitchFamily="34" charset="0"/>
-              </a:rPr>
-              <a:t>C# is object oriented (class-based) programming language</a:t>
-            </a:r>
-          </a:p>
-          <a:p>
-            <a:r>
-              <a:rPr lang="en-US" sz="2000" dirty="0" smtClean="0">
-                <a:latin typeface="Arial" panose="020B0604020202020204" pitchFamily="34" charset="0"/>
-                <a:cs typeface="Arial" panose="020B0604020202020204" pitchFamily="34" charset="0"/>
-              </a:rPr>
-              <a:t>C# is used on .NET platform /.NET 6 is the latest version/</a:t>
-            </a:r>
-          </a:p>
-          <a:p>
-            <a:r>
-              <a:rPr lang="en-US" sz="2000" dirty="0" smtClean="0">
-                <a:latin typeface="Arial" panose="020B0604020202020204" pitchFamily="34" charset="0"/>
-                <a:cs typeface="Arial" panose="020B0604020202020204" pitchFamily="34" charset="0"/>
-              </a:rPr>
-              <a:t>C# can be used for writing of Console, Desktop, Widows Services, Web apps, Mobile apps, Games and </a:t>
-            </a:r>
-            <a:r>
-              <a:rPr lang="en-US" sz="2000" dirty="0" err="1" smtClean="0">
-                <a:latin typeface="Arial" panose="020B0604020202020204" pitchFamily="34" charset="0"/>
-                <a:cs typeface="Arial" panose="020B0604020202020204" pitchFamily="34" charset="0"/>
-              </a:rPr>
-              <a:t>IoT</a:t>
-            </a:r>
-            <a:endParaRPr lang="en-US" sz="2000" dirty="0" smtClean="0">
-              <a:latin typeface="Arial" panose="020B0604020202020204" pitchFamily="34" charset="0"/>
-              <a:cs typeface="Arial" panose="020B0604020202020204" pitchFamily="34" charset="0"/>
-            </a:endParaRPr>
-          </a:p>
-          <a:p>
-            <a:r>
-              <a:rPr lang="en-US" sz="2000" dirty="0" smtClean="0">
-                <a:latin typeface="Arial" panose="020B0604020202020204" pitchFamily="34" charset="0"/>
-                <a:cs typeface="Arial" panose="020B0604020202020204" pitchFamily="34" charset="0"/>
-              </a:rPr>
-              <a:t>C# supports static typing, functional programming, generics and more </a:t>
-            </a:r>
-            <a:r>
-              <a:rPr lang="en-US" sz="2000" dirty="0" smtClean="0">
-                <a:latin typeface="Arial" panose="020B0604020202020204" pitchFamily="34" charset="0"/>
-                <a:cs typeface="Arial" panose="020B0604020202020204" pitchFamily="34" charset="0"/>
-              </a:rPr>
-              <a:t>features</a:t>
-            </a:r>
-            <a:endParaRPr lang="bg-BG" sz="2000" dirty="0" smtClean="0">
-              <a:latin typeface="Arial" panose="020B0604020202020204" pitchFamily="34" charset="0"/>
-              <a:cs typeface="Arial" panose="020B0604020202020204" pitchFamily="34" charset="0"/>
-            </a:endParaRPr>
-          </a:p>
-          <a:p>
-            <a:r>
-              <a:rPr lang="en-US" sz="2000" dirty="0" smtClean="0">
-                <a:latin typeface="Arial" panose="020B0604020202020204" pitchFamily="34" charset="0"/>
-                <a:cs typeface="Arial" panose="020B0604020202020204" pitchFamily="34" charset="0"/>
-              </a:rPr>
-              <a:t>C# and Microsoft documentation are generally quite good</a:t>
-            </a:r>
-          </a:p>
-          <a:p>
-            <a:r>
-              <a:rPr lang="en-US" sz="2000" dirty="0" smtClean="0">
-                <a:latin typeface="Arial" panose="020B0604020202020204" pitchFamily="34" charset="0"/>
-                <a:cs typeface="Arial" panose="020B0604020202020204" pitchFamily="34" charset="0"/>
-              </a:rPr>
-              <a:t>C# documentation</a:t>
-            </a:r>
-            <a:r>
-              <a:rPr lang="en-US" sz="2000" dirty="0">
-                <a:latin typeface="Arial" panose="020B0604020202020204" pitchFamily="34" charset="0"/>
-                <a:cs typeface="Arial" panose="020B0604020202020204" pitchFamily="34" charset="0"/>
-              </a:rPr>
-              <a:t>: </a:t>
-            </a:r>
-            <a:r>
-              <a:rPr lang="en-US" sz="2000" dirty="0">
+            <a:r>
+              <a:rPr lang="en-US" sz="2800" dirty="0" smtClean="0">
                 <a:solidFill>
-                  <a:srgbClr val="0070C0"/>
+                  <a:srgbClr val="002060"/>
                 </a:solidFill>
                 <a:latin typeface="Arial" panose="020B0604020202020204" pitchFamily="34" charset="0"/>
                 <a:cs typeface="Arial" panose="020B0604020202020204" pitchFamily="34" charset="0"/>
               </a:rPr>
-              <a:t>https://docs.microsoft.com/en-us/dotnet/csharp/</a:t>
-            </a:r>
-            <a:endParaRPr lang="en-US" sz="2000" dirty="0" smtClean="0">
-              <a:solidFill>
-                <a:srgbClr val="0070C0"/>
-              </a:solidFill>
+              <a:t>Continue</a:t>
+            </a:r>
+            <a:r>
+              <a:rPr lang="en-US" sz="2800" dirty="0" smtClean="0">
+                <a:latin typeface="Arial" panose="020B0604020202020204" pitchFamily="34" charset="0"/>
+                <a:cs typeface="Arial" panose="020B0604020202020204" pitchFamily="34" charset="0"/>
+              </a:rPr>
+              <a:t> just continue to the next loop iteration if the condition is satisfied.</a:t>
+            </a:r>
+            <a:endParaRPr lang="en-US" sz="2800" dirty="0">
               <a:latin typeface="Arial" panose="020B0604020202020204" pitchFamily="34" charset="0"/>
               <a:cs typeface="Arial" panose="020B0604020202020204" pitchFamily="34" charset="0"/>
             </a:endParaRPr>
-          </a:p>
-          <a:p>
-            <a:endParaRPr lang="en-US" sz="2000" dirty="0" smtClean="0">
-              <a:latin typeface="Arial" panose="020B0604020202020204" pitchFamily="34" charset="0"/>
-              <a:cs typeface="Arial" panose="020B0604020202020204" pitchFamily="34" charset="0"/>
-            </a:endParaRPr>
-          </a:p>
-          <a:p>
-            <a:endParaRPr lang="en-US" sz="2000" dirty="0">
-              <a:latin typeface="Arial" panose="020B0604020202020204" pitchFamily="34" charset="0"/>
-              <a:cs typeface="Arial" panose="020B0604020202020204" pitchFamily="34" charset="0"/>
-            </a:endParaRPr>
-          </a:p>
-          <a:p>
-            <a:endParaRPr lang="en-US" sz="2000" dirty="0">
-              <a:latin typeface="Arial" panose="020B0604020202020204" pitchFamily="34" charset="0"/>
-              <a:cs typeface="Arial" panose="020B0604020202020204" pitchFamily="34" charset="0"/>
-            </a:endParaRPr>
-          </a:p>
-          <a:p>
-            <a:pPr marL="0" indent="0">
-              <a:buNone/>
-            </a:pPr>
-            <a:endParaRPr lang="en-US" sz="1600" dirty="0">
-              <a:latin typeface="Arial" panose="020B0604020202020204" pitchFamily="34" charset="0"/>
-              <a:cs typeface="Arial" panose="020B0604020202020204" pitchFamily="34" charset="0"/>
-            </a:endParaRPr>
-          </a:p>
-          <a:p>
-            <a:endParaRPr lang="en-US" sz="1600" dirty="0">
-              <a:latin typeface="Arial" panose="020B0604020202020204" pitchFamily="34" charset="0"/>
-              <a:cs typeface="Arial" panose="020B0604020202020204" pitchFamily="34" charset="0"/>
-            </a:endParaRPr>
-          </a:p>
-          <a:p>
-            <a:endParaRPr lang="en-US" sz="1600" dirty="0">
-              <a:latin typeface="Arial" panose="020B0604020202020204" pitchFamily="34" charset="0"/>
-              <a:cs typeface="Arial" panose="020B0604020202020204" pitchFamily="34" charset="0"/>
-            </a:endParaRPr>
-          </a:p>
-          <a:p>
-            <a:endParaRPr lang="en-US" dirty="0">
-              <a:latin typeface="Arial" panose="020B0604020202020204" pitchFamily="34" charset="0"/>
-              <a:cs typeface="Arial" panose="020B0604020202020204" pitchFamily="34" charset="0"/>
-            </a:endParaRPr>
-          </a:p>
-          <a:p>
-            <a:endParaRPr lang="en-US" dirty="0">
-              <a:latin typeface="Arial" panose="020B0604020202020204" pitchFamily="34" charset="0"/>
-              <a:cs typeface="Arial" panose="020B0604020202020204" pitchFamily="34" charset="0"/>
-            </a:endParaRPr>
-          </a:p>
-          <a:p>
-            <a:endParaRPr lang="en-US" dirty="0">
-              <a:latin typeface="Arial" panose="020B0604020202020204" pitchFamily="34" charset="0"/>
-              <a:cs typeface="Arial" panose="020B0604020202020204" pitchFamily="34" charset="0"/>
-            </a:endParaRPr>
-          </a:p>
-          <a:p>
-            <a:endParaRPr lang="en-US" dirty="0">
-              <a:latin typeface="Arial" panose="020B0604020202020204" pitchFamily="34" charset="0"/>
-              <a:cs typeface="Arial" panose="020B0604020202020204" pitchFamily="34" charset="0"/>
-            </a:endParaRPr>
-          </a:p>
-          <a:p>
-            <a:endParaRPr lang="en-US" dirty="0"/>
-          </a:p>
-          <a:p>
-            <a:endParaRPr lang="en-US" dirty="0"/>
           </a:p>
         </p:txBody>
       </p:sp>
     </p:spTree>
     <p:extLst>
       <p:ext uri="{BB962C8B-B14F-4D97-AF65-F5344CB8AC3E}">
-        <p14:creationId xmlns:p14="http://schemas.microsoft.com/office/powerpoint/2010/main" val="927372469"/>
+        <p14:creationId xmlns:p14="http://schemas.microsoft.com/office/powerpoint/2010/main" val="2923579647"/>
       </p:ext>
     </p:extLst>
   </p:cSld>
@@ -15955,107 +17244,6 @@
 </file>
 
 <file path=ppt/slides/slide4.xml><?xml version="1.0" encoding="utf-8"?>
-<p:sld xmlns:a="http://schemas.openxmlformats.org/drawingml/2006/main" xmlns:r="http://schemas.openxmlformats.org/officeDocument/2006/relationships" xmlns:p="http://schemas.openxmlformats.org/presentationml/2006/main">
-  <p:cSld>
-    <p:spTree>
-      <p:nvGrpSpPr>
-        <p:cNvPr id="1" name=""/>
-        <p:cNvGrpSpPr/>
-        <p:nvPr/>
-      </p:nvGrpSpPr>
-      <p:grpSpPr>
-        <a:xfrm>
-          <a:off x="0" y="0"/>
-          <a:ext cx="0" cy="0"/>
-          <a:chOff x="0" y="0"/>
-          <a:chExt cx="0" cy="0"/>
-        </a:xfrm>
-      </p:grpSpPr>
-      <p:sp>
-        <p:nvSpPr>
-          <p:cNvPr id="2" name="Title 1"/>
-          <p:cNvSpPr>
-            <a:spLocks noGrp="1"/>
-          </p:cNvSpPr>
-          <p:nvPr>
-            <p:ph type="title"/>
-          </p:nvPr>
-        </p:nvSpPr>
-        <p:spPr>
-          <a:xfrm>
-            <a:off x="1599405" y="693748"/>
-            <a:ext cx="8761413" cy="1172373"/>
-          </a:xfrm>
-        </p:spPr>
-        <p:txBody>
-          <a:bodyPr/>
-          <a:lstStyle/>
-          <a:p>
-            <a:pPr algn="ctr"/>
-            <a:r>
-              <a:rPr lang="en-US" dirty="0" smtClean="0">
-                <a:latin typeface="Arial" panose="020B0604020202020204" pitchFamily="34" charset="0"/>
-                <a:cs typeface="Arial" panose="020B0604020202020204" pitchFamily="34" charset="0"/>
-              </a:rPr>
-              <a:t>C# is object oriented programming language</a:t>
-            </a:r>
-            <a:endParaRPr lang="en-US" dirty="0">
-              <a:latin typeface="Arial" panose="020B0604020202020204" pitchFamily="34" charset="0"/>
-              <a:cs typeface="Arial" panose="020B0604020202020204" pitchFamily="34" charset="0"/>
-            </a:endParaRPr>
-          </a:p>
-        </p:txBody>
-      </p:sp>
-      <p:pic>
-        <p:nvPicPr>
-          <p:cNvPr id="4" name="Content Placeholder 3"/>
-          <p:cNvPicPr>
-            <a:picLocks noGrp="1" noChangeAspect="1"/>
-          </p:cNvPicPr>
-          <p:nvPr>
-            <p:ph sz="half" idx="2"/>
-          </p:nvPr>
-        </p:nvPicPr>
-        <p:blipFill>
-          <a:blip r:embed="rId2">
-            <a:extLst>
-              <a:ext uri="{28A0092B-C50C-407E-A947-70E740481C1C}">
-                <a14:useLocalDpi xmlns:a14="http://schemas.microsoft.com/office/drawing/2010/main" val="0"/>
-              </a:ext>
-            </a:extLst>
-          </a:blip>
-          <a:stretch>
-            <a:fillRect/>
-          </a:stretch>
-        </p:blipFill>
-        <p:spPr>
-          <a:xfrm>
-            <a:off x="3293707" y="2510194"/>
-            <a:ext cx="4890660" cy="3993216"/>
-          </a:xfrm>
-        </p:spPr>
-      </p:pic>
-    </p:spTree>
-    <p:extLst>
-      <p:ext uri="{BB962C8B-B14F-4D97-AF65-F5344CB8AC3E}">
-        <p14:creationId xmlns:p14="http://schemas.microsoft.com/office/powerpoint/2010/main" val="3952090778"/>
-      </p:ext>
-    </p:extLst>
-  </p:cSld>
-  <p:clrMapOvr>
-    <a:masterClrMapping/>
-  </p:clrMapOvr>
-  <p:timing>
-    <p:tnLst>
-      <p:par>
-        <p:cTn id="1" dur="indefinite" restart="never" nodeType="tmRoot"/>
-      </p:par>
-    </p:tnLst>
-  </p:timing>
-</p:sld>
-</file>
-
-<file path=ppt/slides/slide5.xml><?xml version="1.0" encoding="utf-8"?>
 <p:sld xmlns:a="http://schemas.openxmlformats.org/drawingml/2006/main" xmlns:r="http://schemas.openxmlformats.org/officeDocument/2006/relationships" xmlns:p="http://schemas.openxmlformats.org/presentationml/2006/main">
   <p:cSld>
     <p:spTree>
@@ -16400,7 +17588,7 @@
 </p:sld>
 </file>
 
-<file path=ppt/slides/slide6.xml><?xml version="1.0" encoding="utf-8"?>
+<file path=ppt/slides/slide5.xml><?xml version="1.0" encoding="utf-8"?>
 <p:sld xmlns:a="http://schemas.openxmlformats.org/drawingml/2006/main" xmlns:r="http://schemas.openxmlformats.org/officeDocument/2006/relationships" xmlns:p="http://schemas.openxmlformats.org/presentationml/2006/main">
   <p:cSld>
     <p:spTree>
@@ -16470,22 +17658,34 @@
           <a:lstStyle/>
           <a:p>
             <a:r>
-              <a:rPr lang="en-US" sz="3200" dirty="0" smtClean="0"/>
+              <a:rPr lang="en-US" sz="3200" dirty="0" smtClean="0">
+                <a:latin typeface="Arial" panose="020B0604020202020204" pitchFamily="34" charset="0"/>
+                <a:cs typeface="Arial" panose="020B0604020202020204" pitchFamily="34" charset="0"/>
+              </a:rPr>
               <a:t>Languages</a:t>
             </a:r>
           </a:p>
           <a:p>
             <a:r>
-              <a:rPr lang="en-US" sz="3200" dirty="0" smtClean="0"/>
+              <a:rPr lang="en-US" sz="3200" dirty="0" smtClean="0">
+                <a:latin typeface="Arial" panose="020B0604020202020204" pitchFamily="34" charset="0"/>
+                <a:cs typeface="Arial" panose="020B0604020202020204" pitchFamily="34" charset="0"/>
+              </a:rPr>
               <a:t>Runtimes</a:t>
             </a:r>
           </a:p>
           <a:p>
             <a:r>
-              <a:rPr lang="en-US" sz="3200" dirty="0" smtClean="0"/>
+              <a:rPr lang="en-US" sz="3200" dirty="0" smtClean="0">
+                <a:latin typeface="Arial" panose="020B0604020202020204" pitchFamily="34" charset="0"/>
+                <a:cs typeface="Arial" panose="020B0604020202020204" pitchFamily="34" charset="0"/>
+              </a:rPr>
               <a:t>Libraries</a:t>
             </a:r>
-            <a:endParaRPr lang="en-US" sz="3200" dirty="0"/>
+            <a:endParaRPr lang="en-US" sz="3200" dirty="0">
+              <a:latin typeface="Arial" panose="020B0604020202020204" pitchFamily="34" charset="0"/>
+              <a:cs typeface="Arial" panose="020B0604020202020204" pitchFamily="34" charset="0"/>
+            </a:endParaRPr>
           </a:p>
         </p:txBody>
       </p:sp>
@@ -16563,7 +17763,7 @@
 </p:sld>
 </file>
 
-<file path=ppt/slides/slide7.xml><?xml version="1.0" encoding="utf-8"?>
+<file path=ppt/slides/slide6.xml><?xml version="1.0" encoding="utf-8"?>
 <p:sld xmlns:a="http://schemas.openxmlformats.org/drawingml/2006/main" xmlns:r="http://schemas.openxmlformats.org/officeDocument/2006/relationships" xmlns:p="http://schemas.openxmlformats.org/presentationml/2006/main">
   <p:cSld>
     <p:spTree>
@@ -16634,7 +17834,7 @@
         </p:blipFill>
         <p:spPr>
           <a:xfrm>
-            <a:off x="1370303" y="2325996"/>
+            <a:off x="1258336" y="2186037"/>
             <a:ext cx="9117304" cy="4308069"/>
           </a:xfrm>
           <a:prstGeom prst="roundRect">
@@ -16686,7 +17886,7 @@
 </p:sld>
 </file>
 
-<file path=ppt/slides/slide8.xml><?xml version="1.0" encoding="utf-8"?>
+<file path=ppt/slides/slide7.xml><?xml version="1.0" encoding="utf-8"?>
 <p:sld xmlns:a="http://schemas.openxmlformats.org/drawingml/2006/main" xmlns:r="http://schemas.openxmlformats.org/officeDocument/2006/relationships" xmlns:p="http://schemas.openxmlformats.org/presentationml/2006/main">
   <p:cSld>
     <p:spTree>
@@ -16782,7 +17982,7 @@
 </p:sld>
 </file>
 
-<file path=ppt/slides/slide9.xml><?xml version="1.0" encoding="utf-8"?>
+<file path=ppt/slides/slide8.xml><?xml version="1.0" encoding="utf-8"?>
 <p:sld xmlns:a="http://schemas.openxmlformats.org/drawingml/2006/main" xmlns:r="http://schemas.openxmlformats.org/officeDocument/2006/relationships" xmlns:p="http://schemas.openxmlformats.org/presentationml/2006/main">
   <p:cSld>
     <p:spTree>
@@ -16856,6 +18056,179 @@
     <p:extLst>
       <p:ext uri="{BB962C8B-B14F-4D97-AF65-F5344CB8AC3E}">
         <p14:creationId xmlns:p14="http://schemas.microsoft.com/office/powerpoint/2010/main" val="1234884613"/>
+      </p:ext>
+    </p:extLst>
+  </p:cSld>
+  <p:clrMapOvr>
+    <a:masterClrMapping/>
+  </p:clrMapOvr>
+  <p:timing>
+    <p:tnLst>
+      <p:par>
+        <p:cTn id="1" dur="indefinite" restart="never" nodeType="tmRoot"/>
+      </p:par>
+    </p:tnLst>
+  </p:timing>
+</p:sld>
+</file>
+
+<file path=ppt/slides/slide9.xml><?xml version="1.0" encoding="utf-8"?>
+<p:sld xmlns:a="http://schemas.openxmlformats.org/drawingml/2006/main" xmlns:r="http://schemas.openxmlformats.org/officeDocument/2006/relationships" xmlns:p="http://schemas.openxmlformats.org/presentationml/2006/main">
+  <p:cSld>
+    <p:spTree>
+      <p:nvGrpSpPr>
+        <p:cNvPr id="1" name=""/>
+        <p:cNvGrpSpPr/>
+        <p:nvPr/>
+      </p:nvGrpSpPr>
+      <p:grpSpPr>
+        <a:xfrm>
+          <a:off x="0" y="0"/>
+          <a:ext cx="0" cy="0"/>
+          <a:chOff x="0" y="0"/>
+          <a:chExt cx="0" cy="0"/>
+        </a:xfrm>
+      </p:grpSpPr>
+      <p:sp>
+        <p:nvSpPr>
+          <p:cNvPr id="2" name="Title 1"/>
+          <p:cNvSpPr>
+            <a:spLocks noGrp="1"/>
+          </p:cNvSpPr>
+          <p:nvPr>
+            <p:ph type="title"/>
+          </p:nvPr>
+        </p:nvSpPr>
+        <p:spPr/>
+        <p:txBody>
+          <a:bodyPr/>
+          <a:lstStyle/>
+          <a:p>
+            <a:pPr algn="ctr"/>
+            <a:r>
+              <a:rPr lang="en-US" dirty="0" smtClean="0">
+                <a:latin typeface="Arial" panose="020B0604020202020204" pitchFamily="34" charset="0"/>
+                <a:cs typeface="Arial" panose="020B0604020202020204" pitchFamily="34" charset="0"/>
+              </a:rPr>
+              <a:t>What is compiler?</a:t>
+            </a:r>
+            <a:endParaRPr lang="en-US" dirty="0">
+              <a:latin typeface="Arial" panose="020B0604020202020204" pitchFamily="34" charset="0"/>
+              <a:cs typeface="Arial" panose="020B0604020202020204" pitchFamily="34" charset="0"/>
+            </a:endParaRPr>
+          </a:p>
+        </p:txBody>
+      </p:sp>
+      <p:sp>
+        <p:nvSpPr>
+          <p:cNvPr id="3" name="Content Placeholder 2"/>
+          <p:cNvSpPr>
+            <a:spLocks noGrp="1"/>
+          </p:cNvSpPr>
+          <p:nvPr>
+            <p:ph idx="1"/>
+          </p:nvPr>
+        </p:nvSpPr>
+        <p:spPr>
+          <a:xfrm>
+            <a:off x="1546839" y="2603499"/>
+            <a:ext cx="8825659" cy="4021235"/>
+          </a:xfrm>
+        </p:spPr>
+        <p:txBody>
+          <a:bodyPr/>
+          <a:lstStyle/>
+          <a:p>
+            <a:r>
+              <a:rPr lang="en-US" dirty="0">
+                <a:latin typeface="Arial" panose="020B0604020202020204" pitchFamily="34" charset="0"/>
+                <a:cs typeface="Arial" panose="020B0604020202020204" pitchFamily="34" charset="0"/>
+              </a:rPr>
+              <a:t>A compiler is a special program that translates a programming language's </a:t>
+            </a:r>
+            <a:r>
+              <a:rPr lang="en-US" dirty="0" smtClean="0">
+                <a:latin typeface="Arial" panose="020B0604020202020204" pitchFamily="34" charset="0"/>
+                <a:cs typeface="Arial" panose="020B0604020202020204" pitchFamily="34" charset="0"/>
+              </a:rPr>
+              <a:t>source code into </a:t>
+            </a:r>
+            <a:r>
+              <a:rPr lang="en-US" dirty="0">
+                <a:latin typeface="Arial" panose="020B0604020202020204" pitchFamily="34" charset="0"/>
+                <a:cs typeface="Arial" panose="020B0604020202020204" pitchFamily="34" charset="0"/>
+              </a:rPr>
+              <a:t>machine code, bytecode or another programming language. The source code is typically written in a high-level, human-readable language such as </a:t>
+            </a:r>
+            <a:r>
+              <a:rPr lang="en-US" b="1" dirty="0" smtClean="0">
+                <a:latin typeface="Arial" panose="020B0604020202020204" pitchFamily="34" charset="0"/>
+                <a:cs typeface="Arial" panose="020B0604020202020204" pitchFamily="34" charset="0"/>
+              </a:rPr>
+              <a:t>C#</a:t>
+            </a:r>
+            <a:r>
+              <a:rPr lang="en-US" dirty="0" smtClean="0">
+                <a:latin typeface="Arial" panose="020B0604020202020204" pitchFamily="34" charset="0"/>
+                <a:cs typeface="Arial" panose="020B0604020202020204" pitchFamily="34" charset="0"/>
+              </a:rPr>
+              <a:t>, </a:t>
+            </a:r>
+            <a:r>
+              <a:rPr lang="en-US" b="1" dirty="0" smtClean="0">
+                <a:latin typeface="Arial" panose="020B0604020202020204" pitchFamily="34" charset="0"/>
+                <a:cs typeface="Arial" panose="020B0604020202020204" pitchFamily="34" charset="0"/>
+              </a:rPr>
+              <a:t>Java, C++, etc</a:t>
+            </a:r>
+            <a:r>
+              <a:rPr lang="en-US" dirty="0" smtClean="0">
+                <a:latin typeface="Arial" panose="020B0604020202020204" pitchFamily="34" charset="0"/>
+                <a:cs typeface="Arial" panose="020B0604020202020204" pitchFamily="34" charset="0"/>
+              </a:rPr>
+              <a:t>.</a:t>
+            </a:r>
+            <a:endParaRPr lang="en-US" dirty="0">
+              <a:latin typeface="Arial" panose="020B0604020202020204" pitchFamily="34" charset="0"/>
+              <a:cs typeface="Arial" panose="020B0604020202020204" pitchFamily="34" charset="0"/>
+            </a:endParaRPr>
+          </a:p>
+        </p:txBody>
+      </p:sp>
+      <p:pic>
+        <p:nvPicPr>
+          <p:cNvPr id="5" name="Picture 4"/>
+          <p:cNvPicPr>
+            <a:picLocks noChangeAspect="1"/>
+          </p:cNvPicPr>
+          <p:nvPr/>
+        </p:nvPicPr>
+        <p:blipFill>
+          <a:blip r:embed="rId2">
+            <a:extLst>
+              <a:ext uri="{28A0092B-C50C-407E-A947-70E740481C1C}">
+                <a14:useLocalDpi xmlns:a14="http://schemas.microsoft.com/office/drawing/2010/main" val="0"/>
+              </a:ext>
+            </a:extLst>
+          </a:blip>
+          <a:stretch>
+            <a:fillRect/>
+          </a:stretch>
+        </p:blipFill>
+        <p:spPr>
+          <a:xfrm>
+            <a:off x="1905842" y="3948209"/>
+            <a:ext cx="8010525" cy="2676525"/>
+          </a:xfrm>
+          <a:prstGeom prst="rect">
+            <a:avLst/>
+          </a:prstGeom>
+        </p:spPr>
+      </p:pic>
+    </p:spTree>
+    <p:extLst>
+      <p:ext uri="{BB962C8B-B14F-4D97-AF65-F5344CB8AC3E}">
+        <p14:creationId xmlns:p14="http://schemas.microsoft.com/office/powerpoint/2010/main" val="525679394"/>
       </p:ext>
     </p:extLst>
   </p:cSld>

</xml_diff>

<commit_message>
Fixing of slide text (for C# compiler)
</commit_message>
<xml_diff>
--- a/C# Basics.pptx
+++ b/C# Basics.pptx
@@ -230,7 +230,7 @@
           <a:p>
             <a:fld id="{068E3771-71AF-4AE2-9E86-BE935DBF2B0E}" type="datetimeFigureOut">
               <a:rPr lang="en-US" smtClean="0"/>
-              <a:t>10/10/2022</a:t>
+              <a:t>10/12/2022</a:t>
             </a:fld>
             <a:endParaRPr lang="en-US"/>
           </a:p>
@@ -832,7 +832,7 @@
           <a:p>
             <a:fld id="{C0A3DACC-474D-44ED-8DF0-6B6BA2CE3243}" type="datetimeFigureOut">
               <a:rPr lang="en-US" smtClean="0"/>
-              <a:t>10/10/2022</a:t>
+              <a:t>10/12/2022</a:t>
             </a:fld>
             <a:endParaRPr lang="en-US"/>
           </a:p>
@@ -1920,7 +1920,7 @@
           <a:p>
             <a:fld id="{C0A3DACC-474D-44ED-8DF0-6B6BA2CE3243}" type="datetimeFigureOut">
               <a:rPr lang="en-US" smtClean="0"/>
-              <a:t>10/10/2022</a:t>
+              <a:t>10/12/2022</a:t>
             </a:fld>
             <a:endParaRPr lang="en-US"/>
           </a:p>
@@ -2900,7 +2900,7 @@
           <a:p>
             <a:fld id="{C0A3DACC-474D-44ED-8DF0-6B6BA2CE3243}" type="datetimeFigureOut">
               <a:rPr lang="en-US" smtClean="0"/>
-              <a:t>10/10/2022</a:t>
+              <a:t>10/12/2022</a:t>
             </a:fld>
             <a:endParaRPr lang="en-US"/>
           </a:p>
@@ -4034,7 +4034,7 @@
           <a:p>
             <a:fld id="{C0A3DACC-474D-44ED-8DF0-6B6BA2CE3243}" type="datetimeFigureOut">
               <a:rPr lang="en-US" smtClean="0"/>
-              <a:t>10/10/2022</a:t>
+              <a:t>10/12/2022</a:t>
             </a:fld>
             <a:endParaRPr lang="en-US"/>
           </a:p>
@@ -5067,7 +5067,7 @@
           <a:p>
             <a:fld id="{C0A3DACC-474D-44ED-8DF0-6B6BA2CE3243}" type="datetimeFigureOut">
               <a:rPr lang="en-US" smtClean="0"/>
-              <a:t>10/10/2022</a:t>
+              <a:t>10/12/2022</a:t>
             </a:fld>
             <a:endParaRPr lang="en-US"/>
           </a:p>
@@ -5727,7 +5727,7 @@
           <a:p>
             <a:fld id="{C0A3DACC-474D-44ED-8DF0-6B6BA2CE3243}" type="datetimeFigureOut">
               <a:rPr lang="en-US" smtClean="0"/>
-              <a:t>10/10/2022</a:t>
+              <a:t>10/12/2022</a:t>
             </a:fld>
             <a:endParaRPr lang="en-US"/>
           </a:p>
@@ -6588,7 +6588,7 @@
           <a:p>
             <a:fld id="{C0A3DACC-474D-44ED-8DF0-6B6BA2CE3243}" type="datetimeFigureOut">
               <a:rPr lang="en-US" smtClean="0"/>
-              <a:t>10/10/2022</a:t>
+              <a:t>10/12/2022</a:t>
             </a:fld>
             <a:endParaRPr lang="en-US"/>
           </a:p>
@@ -6778,7 +6778,7 @@
           <a:p>
             <a:fld id="{C0A3DACC-474D-44ED-8DF0-6B6BA2CE3243}" type="datetimeFigureOut">
               <a:rPr lang="en-US" smtClean="0"/>
-              <a:t>10/10/2022</a:t>
+              <a:t>10/12/2022</a:t>
             </a:fld>
             <a:endParaRPr lang="en-US"/>
           </a:p>
@@ -7750,7 +7750,7 @@
           <a:p>
             <a:fld id="{C0A3DACC-474D-44ED-8DF0-6B6BA2CE3243}" type="datetimeFigureOut">
               <a:rPr lang="en-US" smtClean="0"/>
-              <a:t>10/10/2022</a:t>
+              <a:t>10/12/2022</a:t>
             </a:fld>
             <a:endParaRPr lang="en-US"/>
           </a:p>
@@ -7961,7 +7961,7 @@
           <a:p>
             <a:fld id="{C0A3DACC-474D-44ED-8DF0-6B6BA2CE3243}" type="datetimeFigureOut">
               <a:rPr lang="en-US" smtClean="0"/>
-              <a:t>10/10/2022</a:t>
+              <a:t>10/12/2022</a:t>
             </a:fld>
             <a:endParaRPr lang="en-US"/>
           </a:p>
@@ -8995,7 +8995,7 @@
           <a:p>
             <a:fld id="{C0A3DACC-474D-44ED-8DF0-6B6BA2CE3243}" type="datetimeFigureOut">
               <a:rPr lang="en-US" smtClean="0"/>
-              <a:t>10/10/2022</a:t>
+              <a:t>10/12/2022</a:t>
             </a:fld>
             <a:endParaRPr lang="en-US"/>
           </a:p>
@@ -9267,7 +9267,7 @@
           <a:p>
             <a:fld id="{C0A3DACC-474D-44ED-8DF0-6B6BA2CE3243}" type="datetimeFigureOut">
               <a:rPr lang="en-US" smtClean="0"/>
-              <a:t>10/10/2022</a:t>
+              <a:t>10/12/2022</a:t>
             </a:fld>
             <a:endParaRPr lang="en-US"/>
           </a:p>
@@ -9677,7 +9677,7 @@
           <a:p>
             <a:fld id="{C0A3DACC-474D-44ED-8DF0-6B6BA2CE3243}" type="datetimeFigureOut">
               <a:rPr lang="en-US" smtClean="0"/>
-              <a:t>10/10/2022</a:t>
+              <a:t>10/12/2022</a:t>
             </a:fld>
             <a:endParaRPr lang="en-US"/>
           </a:p>
@@ -9804,7 +9804,7 @@
           <a:p>
             <a:fld id="{C0A3DACC-474D-44ED-8DF0-6B6BA2CE3243}" type="datetimeFigureOut">
               <a:rPr lang="en-US" smtClean="0"/>
-              <a:t>10/10/2022</a:t>
+              <a:t>10/12/2022</a:t>
             </a:fld>
             <a:endParaRPr lang="en-US"/>
           </a:p>
@@ -9899,7 +9899,7 @@
           <a:p>
             <a:fld id="{C0A3DACC-474D-44ED-8DF0-6B6BA2CE3243}" type="datetimeFigureOut">
               <a:rPr lang="en-US" smtClean="0"/>
-              <a:t>10/10/2022</a:t>
+              <a:t>10/12/2022</a:t>
             </a:fld>
             <a:endParaRPr lang="en-US"/>
           </a:p>
@@ -10980,7 +10980,7 @@
           <a:p>
             <a:fld id="{C0A3DACC-474D-44ED-8DF0-6B6BA2CE3243}" type="datetimeFigureOut">
               <a:rPr lang="en-US" smtClean="0"/>
-              <a:t>10/10/2022</a:t>
+              <a:t>10/12/2022</a:t>
             </a:fld>
             <a:endParaRPr lang="en-US"/>
           </a:p>
@@ -12088,7 +12088,7 @@
           <a:p>
             <a:fld id="{C0A3DACC-474D-44ED-8DF0-6B6BA2CE3243}" type="datetimeFigureOut">
               <a:rPr lang="en-US" smtClean="0"/>
-              <a:t>10/10/2022</a:t>
+              <a:t>10/12/2022</a:t>
             </a:fld>
             <a:endParaRPr lang="en-US"/>
           </a:p>
@@ -13085,7 +13085,7 @@
           <a:p>
             <a:fld id="{C0A3DACC-474D-44ED-8DF0-6B6BA2CE3243}" type="datetimeFigureOut">
               <a:rPr lang="en-US" smtClean="0"/>
-              <a:t>10/10/2022</a:t>
+              <a:t>10/12/2022</a:t>
             </a:fld>
             <a:endParaRPr lang="en-US"/>
           </a:p>
@@ -22700,7 +22700,14 @@
                 <a:latin typeface="Arial" panose="020B0604020202020204" pitchFamily="34" charset="0"/>
                 <a:cs typeface="Arial" panose="020B0604020202020204" pitchFamily="34" charset="0"/>
               </a:rPr>
-              <a:t> е специална компютърна програма, която транслира нашият програмен код в машинен код или байткод. Сорс кодът на програмата ни е написан най-често на програмен език от високо ниво, който е разбираем за човек, като </a:t>
+              <a:t> </a:t>
+            </a:r>
+            <a:r>
+              <a:rPr lang="bg-BG" b="1" dirty="0">
+                <a:latin typeface="Arial" panose="020B0604020202020204" pitchFamily="34" charset="0"/>
+                <a:cs typeface="Arial" panose="020B0604020202020204" pitchFamily="34" charset="0"/>
+              </a:rPr>
+              <a:t>в </a:t>
             </a:r>
             <a:r>
               <a:rPr lang="en-US" b="1" dirty="0">
@@ -22714,35 +22721,126 @@
                 <a:latin typeface="Arial" panose="020B0604020202020204" pitchFamily="34" charset="0"/>
                 <a:cs typeface="Arial" panose="020B0604020202020204" pitchFamily="34" charset="0"/>
               </a:rPr>
-              <a:t>, </a:t>
+              <a:t> </a:t>
+            </a:r>
+            <a:r>
+              <a:rPr lang="bg-BG" dirty="0">
+                <a:latin typeface="Arial" panose="020B0604020202020204" pitchFamily="34" charset="0"/>
+                <a:cs typeface="Arial" panose="020B0604020202020204" pitchFamily="34" charset="0"/>
+              </a:rPr>
+              <a:t>за разлика от нормалния компилатор, транслира нашият програмен код в </a:t>
             </a:r>
             <a:r>
               <a:rPr lang="en-US" b="1" dirty="0">
                 <a:latin typeface="Arial" panose="020B0604020202020204" pitchFamily="34" charset="0"/>
                 <a:cs typeface="Arial" panose="020B0604020202020204" pitchFamily="34" charset="0"/>
               </a:rPr>
-              <a:t>Java</a:t>
+              <a:t>intermediate language</a:t>
+            </a:r>
+            <a:r>
+              <a:rPr lang="bg-BG" b="1" dirty="0">
+                <a:latin typeface="Arial" panose="020B0604020202020204" pitchFamily="34" charset="0"/>
+                <a:cs typeface="Arial" panose="020B0604020202020204" pitchFamily="34" charset="0"/>
+              </a:rPr>
+              <a:t> </a:t>
+            </a:r>
+            <a:r>
+              <a:rPr lang="en-US" b="1" dirty="0">
+                <a:latin typeface="Arial" panose="020B0604020202020204" pitchFamily="34" charset="0"/>
+                <a:cs typeface="Arial" panose="020B0604020202020204" pitchFamily="34" charset="0"/>
+              </a:rPr>
+              <a:t>IL </a:t>
             </a:r>
             <a:r>
               <a:rPr lang="en-US" dirty="0">
                 <a:latin typeface="Arial" panose="020B0604020202020204" pitchFamily="34" charset="0"/>
                 <a:cs typeface="Arial" panose="020B0604020202020204" pitchFamily="34" charset="0"/>
               </a:rPr>
-              <a:t>, </a:t>
+              <a:t>(</a:t>
+            </a:r>
+            <a:r>
+              <a:rPr lang="bg-BG" dirty="0">
+                <a:latin typeface="Arial" panose="020B0604020202020204" pitchFamily="34" charset="0"/>
+                <a:cs typeface="Arial" panose="020B0604020202020204" pitchFamily="34" charset="0"/>
+              </a:rPr>
+              <a:t>или междинен код/език</a:t>
+            </a:r>
+            <a:r>
+              <a:rPr lang="en-US" dirty="0">
+                <a:latin typeface="Arial" panose="020B0604020202020204" pitchFamily="34" charset="0"/>
+                <a:cs typeface="Arial" panose="020B0604020202020204" pitchFamily="34" charset="0"/>
+              </a:rPr>
+              <a:t>)</a:t>
+            </a:r>
+            <a:r>
+              <a:rPr lang="bg-BG" dirty="0">
+                <a:latin typeface="Arial" panose="020B0604020202020204" pitchFamily="34" charset="0"/>
+                <a:cs typeface="Arial" panose="020B0604020202020204" pitchFamily="34" charset="0"/>
+              </a:rPr>
+              <a:t>. След което </a:t>
             </a:r>
             <a:r>
               <a:rPr lang="en-US" b="1" dirty="0">
                 <a:latin typeface="Arial" panose="020B0604020202020204" pitchFamily="34" charset="0"/>
                 <a:cs typeface="Arial" panose="020B0604020202020204" pitchFamily="34" charset="0"/>
               </a:rPr>
-              <a:t>C++ </a:t>
+              <a:t>JIT </a:t>
+            </a:r>
+            <a:r>
+              <a:rPr lang="bg-BG" b="1" dirty="0">
+                <a:latin typeface="Arial" panose="020B0604020202020204" pitchFamily="34" charset="0"/>
+                <a:cs typeface="Arial" panose="020B0604020202020204" pitchFamily="34" charset="0"/>
+              </a:rPr>
+              <a:t>компилатора </a:t>
             </a:r>
             <a:r>
               <a:rPr lang="bg-BG" dirty="0">
                 <a:latin typeface="Arial" panose="020B0604020202020204" pitchFamily="34" charset="0"/>
                 <a:cs typeface="Arial" panose="020B0604020202020204" pitchFamily="34" charset="0"/>
               </a:rPr>
-              <a:t>и т.н.</a:t>
+              <a:t>(</a:t>
+            </a:r>
+            <a:r>
+              <a:rPr lang="en-US" dirty="0">
+                <a:latin typeface="Arial" panose="020B0604020202020204" pitchFamily="34" charset="0"/>
+                <a:cs typeface="Arial" panose="020B0604020202020204" pitchFamily="34" charset="0"/>
+              </a:rPr>
+              <a:t>Just-In-Time</a:t>
+            </a:r>
+            <a:r>
+              <a:rPr lang="bg-BG" dirty="0">
+                <a:latin typeface="Arial" panose="020B0604020202020204" pitchFamily="34" charset="0"/>
+                <a:cs typeface="Arial" panose="020B0604020202020204" pitchFamily="34" charset="0"/>
+              </a:rPr>
+              <a:t>)</a:t>
+            </a:r>
+            <a:r>
+              <a:rPr lang="en-US" dirty="0">
+                <a:latin typeface="Arial" panose="020B0604020202020204" pitchFamily="34" charset="0"/>
+                <a:cs typeface="Arial" panose="020B0604020202020204" pitchFamily="34" charset="0"/>
+              </a:rPr>
+              <a:t> </a:t>
+            </a:r>
+            <a:r>
+              <a:rPr lang="bg-BG" dirty="0">
+                <a:latin typeface="Arial" panose="020B0604020202020204" pitchFamily="34" charset="0"/>
+                <a:cs typeface="Arial" panose="020B0604020202020204" pitchFamily="34" charset="0"/>
+              </a:rPr>
+              <a:t>компилира нашият междинен код до машинен за съответната </a:t>
+            </a:r>
+            <a:r>
+              <a:rPr lang="bg-BG" dirty="0" err="1">
+                <a:latin typeface="Arial" panose="020B0604020202020204" pitchFamily="34" charset="0"/>
+                <a:cs typeface="Arial" panose="020B0604020202020204" pitchFamily="34" charset="0"/>
+              </a:rPr>
+              <a:t>процесорна</a:t>
+            </a:r>
+            <a:r>
+              <a:rPr lang="bg-BG" dirty="0">
+                <a:latin typeface="Arial" panose="020B0604020202020204" pitchFamily="34" charset="0"/>
+                <a:cs typeface="Arial" panose="020B0604020202020204" pitchFamily="34" charset="0"/>
+              </a:rPr>
+              <a:t> архитектура.</a:t>
             </a:r>
             <a:endParaRPr lang="en-US" dirty="0">
               <a:latin typeface="Arial" panose="020B0604020202020204" pitchFamily="34" charset="0"/>

</xml_diff>

<commit_message>
Making of Tasks for the latest video
</commit_message>
<xml_diff>
--- a/C# Basics.pptx
+++ b/C# Basics.pptx
@@ -5,7 +5,7 @@
     <p:sldMasterId id="2147483707" r:id="rId1"/>
   </p:sldMasterIdLst>
   <p:notesMasterIdLst>
-    <p:notesMasterId r:id="rId54"/>
+    <p:notesMasterId r:id="rId60"/>
   </p:notesMasterIdLst>
   <p:sldIdLst>
     <p:sldId id="256" r:id="rId2"/>
@@ -60,6 +60,12 @@
     <p:sldId id="282" r:id="rId51"/>
     <p:sldId id="294" r:id="rId52"/>
     <p:sldId id="314" r:id="rId53"/>
+    <p:sldId id="315" r:id="rId54"/>
+    <p:sldId id="316" r:id="rId55"/>
+    <p:sldId id="317" r:id="rId56"/>
+    <p:sldId id="318" r:id="rId57"/>
+    <p:sldId id="319" r:id="rId58"/>
+    <p:sldId id="320" r:id="rId59"/>
   </p:sldIdLst>
   <p:sldSz cx="12192000" cy="6858000"/>
   <p:notesSz cx="6858000" cy="9144000"/>
@@ -248,7 +254,7 @@
           <a:p>
             <a:fld id="{068E3771-71AF-4AE2-9E86-BE935DBF2B0E}" type="datetimeFigureOut">
               <a:rPr lang="en-US" smtClean="0"/>
-              <a:t>11/3/2022</a:t>
+              <a:t>11/8/2022</a:t>
             </a:fld>
             <a:endParaRPr lang="en-US"/>
           </a:p>
@@ -850,7 +856,7 @@
           <a:p>
             <a:fld id="{C0A3DACC-474D-44ED-8DF0-6B6BA2CE3243}" type="datetimeFigureOut">
               <a:rPr lang="en-US" smtClean="0"/>
-              <a:t>11/3/2022</a:t>
+              <a:t>11/8/2022</a:t>
             </a:fld>
             <a:endParaRPr lang="en-US"/>
           </a:p>
@@ -1938,7 +1944,7 @@
           <a:p>
             <a:fld id="{C0A3DACC-474D-44ED-8DF0-6B6BA2CE3243}" type="datetimeFigureOut">
               <a:rPr lang="en-US" smtClean="0"/>
-              <a:t>11/3/2022</a:t>
+              <a:t>11/8/2022</a:t>
             </a:fld>
             <a:endParaRPr lang="en-US"/>
           </a:p>
@@ -2918,7 +2924,7 @@
           <a:p>
             <a:fld id="{C0A3DACC-474D-44ED-8DF0-6B6BA2CE3243}" type="datetimeFigureOut">
               <a:rPr lang="en-US" smtClean="0"/>
-              <a:t>11/3/2022</a:t>
+              <a:t>11/8/2022</a:t>
             </a:fld>
             <a:endParaRPr lang="en-US"/>
           </a:p>
@@ -4052,7 +4058,7 @@
           <a:p>
             <a:fld id="{C0A3DACC-474D-44ED-8DF0-6B6BA2CE3243}" type="datetimeFigureOut">
               <a:rPr lang="en-US" smtClean="0"/>
-              <a:t>11/3/2022</a:t>
+              <a:t>11/8/2022</a:t>
             </a:fld>
             <a:endParaRPr lang="en-US"/>
           </a:p>
@@ -5085,7 +5091,7 @@
           <a:p>
             <a:fld id="{C0A3DACC-474D-44ED-8DF0-6B6BA2CE3243}" type="datetimeFigureOut">
               <a:rPr lang="en-US" smtClean="0"/>
-              <a:t>11/3/2022</a:t>
+              <a:t>11/8/2022</a:t>
             </a:fld>
             <a:endParaRPr lang="en-US"/>
           </a:p>
@@ -5745,7 +5751,7 @@
           <a:p>
             <a:fld id="{C0A3DACC-474D-44ED-8DF0-6B6BA2CE3243}" type="datetimeFigureOut">
               <a:rPr lang="en-US" smtClean="0"/>
-              <a:t>11/3/2022</a:t>
+              <a:t>11/8/2022</a:t>
             </a:fld>
             <a:endParaRPr lang="en-US"/>
           </a:p>
@@ -6606,7 +6612,7 @@
           <a:p>
             <a:fld id="{C0A3DACC-474D-44ED-8DF0-6B6BA2CE3243}" type="datetimeFigureOut">
               <a:rPr lang="en-US" smtClean="0"/>
-              <a:t>11/3/2022</a:t>
+              <a:t>11/8/2022</a:t>
             </a:fld>
             <a:endParaRPr lang="en-US"/>
           </a:p>
@@ -6796,7 +6802,7 @@
           <a:p>
             <a:fld id="{C0A3DACC-474D-44ED-8DF0-6B6BA2CE3243}" type="datetimeFigureOut">
               <a:rPr lang="en-US" smtClean="0"/>
-              <a:t>11/3/2022</a:t>
+              <a:t>11/8/2022</a:t>
             </a:fld>
             <a:endParaRPr lang="en-US"/>
           </a:p>
@@ -7768,7 +7774,7 @@
           <a:p>
             <a:fld id="{C0A3DACC-474D-44ED-8DF0-6B6BA2CE3243}" type="datetimeFigureOut">
               <a:rPr lang="en-US" smtClean="0"/>
-              <a:t>11/3/2022</a:t>
+              <a:t>11/8/2022</a:t>
             </a:fld>
             <a:endParaRPr lang="en-US"/>
           </a:p>
@@ -7979,7 +7985,7 @@
           <a:p>
             <a:fld id="{C0A3DACC-474D-44ED-8DF0-6B6BA2CE3243}" type="datetimeFigureOut">
               <a:rPr lang="en-US" smtClean="0"/>
-              <a:t>11/3/2022</a:t>
+              <a:t>11/8/2022</a:t>
             </a:fld>
             <a:endParaRPr lang="en-US"/>
           </a:p>
@@ -9013,7 +9019,7 @@
           <a:p>
             <a:fld id="{C0A3DACC-474D-44ED-8DF0-6B6BA2CE3243}" type="datetimeFigureOut">
               <a:rPr lang="en-US" smtClean="0"/>
-              <a:t>11/3/2022</a:t>
+              <a:t>11/8/2022</a:t>
             </a:fld>
             <a:endParaRPr lang="en-US"/>
           </a:p>
@@ -9285,7 +9291,7 @@
           <a:p>
             <a:fld id="{C0A3DACC-474D-44ED-8DF0-6B6BA2CE3243}" type="datetimeFigureOut">
               <a:rPr lang="en-US" smtClean="0"/>
-              <a:t>11/3/2022</a:t>
+              <a:t>11/8/2022</a:t>
             </a:fld>
             <a:endParaRPr lang="en-US"/>
           </a:p>
@@ -9695,7 +9701,7 @@
           <a:p>
             <a:fld id="{C0A3DACC-474D-44ED-8DF0-6B6BA2CE3243}" type="datetimeFigureOut">
               <a:rPr lang="en-US" smtClean="0"/>
-              <a:t>11/3/2022</a:t>
+              <a:t>11/8/2022</a:t>
             </a:fld>
             <a:endParaRPr lang="en-US"/>
           </a:p>
@@ -9822,7 +9828,7 @@
           <a:p>
             <a:fld id="{C0A3DACC-474D-44ED-8DF0-6B6BA2CE3243}" type="datetimeFigureOut">
               <a:rPr lang="en-US" smtClean="0"/>
-              <a:t>11/3/2022</a:t>
+              <a:t>11/8/2022</a:t>
             </a:fld>
             <a:endParaRPr lang="en-US"/>
           </a:p>
@@ -9917,7 +9923,7 @@
           <a:p>
             <a:fld id="{C0A3DACC-474D-44ED-8DF0-6B6BA2CE3243}" type="datetimeFigureOut">
               <a:rPr lang="en-US" smtClean="0"/>
-              <a:t>11/3/2022</a:t>
+              <a:t>11/8/2022</a:t>
             </a:fld>
             <a:endParaRPr lang="en-US"/>
           </a:p>
@@ -10998,7 +11004,7 @@
           <a:p>
             <a:fld id="{C0A3DACC-474D-44ED-8DF0-6B6BA2CE3243}" type="datetimeFigureOut">
               <a:rPr lang="en-US" smtClean="0"/>
-              <a:t>11/3/2022</a:t>
+              <a:t>11/8/2022</a:t>
             </a:fld>
             <a:endParaRPr lang="en-US"/>
           </a:p>
@@ -12106,7 +12112,7 @@
           <a:p>
             <a:fld id="{C0A3DACC-474D-44ED-8DF0-6B6BA2CE3243}" type="datetimeFigureOut">
               <a:rPr lang="en-US" smtClean="0"/>
-              <a:t>11/3/2022</a:t>
+              <a:t>11/8/2022</a:t>
             </a:fld>
             <a:endParaRPr lang="en-US"/>
           </a:p>
@@ -13103,7 +13109,7 @@
           <a:p>
             <a:fld id="{C0A3DACC-474D-44ED-8DF0-6B6BA2CE3243}" type="datetimeFigureOut">
               <a:rPr lang="en-US" smtClean="0"/>
-              <a:t>11/3/2022</a:t>
+              <a:t>11/8/2022</a:t>
             </a:fld>
             <a:endParaRPr lang="en-US"/>
           </a:p>
@@ -26527,6 +26533,1875 @@
 </p:sld>
 </file>
 
+<file path=ppt/slides/slide53.xml><?xml version="1.0" encoding="utf-8"?>
+<p:sld xmlns:a="http://schemas.openxmlformats.org/drawingml/2006/main" xmlns:r="http://schemas.openxmlformats.org/officeDocument/2006/relationships" xmlns:p="http://schemas.openxmlformats.org/presentationml/2006/main">
+  <p:cSld>
+    <p:spTree>
+      <p:nvGrpSpPr>
+        <p:cNvPr id="1" name=""/>
+        <p:cNvGrpSpPr/>
+        <p:nvPr/>
+      </p:nvGrpSpPr>
+      <p:grpSpPr>
+        <a:xfrm>
+          <a:off x="0" y="0"/>
+          <a:ext cx="0" cy="0"/>
+          <a:chOff x="0" y="0"/>
+          <a:chExt cx="0" cy="0"/>
+        </a:xfrm>
+      </p:grpSpPr>
+      <p:sp>
+        <p:nvSpPr>
+          <p:cNvPr id="2" name="Title 1">
+            <a:extLst>
+              <a:ext uri="{FF2B5EF4-FFF2-40B4-BE49-F238E27FC236}">
+                <a16:creationId xmlns:a16="http://schemas.microsoft.com/office/drawing/2014/main" id="{0D5226AE-1E9B-94E1-4DD1-A44A97BC0A33}"/>
+              </a:ext>
+            </a:extLst>
+          </p:cNvPr>
+          <p:cNvSpPr>
+            <a:spLocks noGrp="1"/>
+          </p:cNvSpPr>
+          <p:nvPr>
+            <p:ph type="title"/>
+          </p:nvPr>
+        </p:nvSpPr>
+        <p:spPr/>
+        <p:txBody>
+          <a:bodyPr/>
+          <a:lstStyle/>
+          <a:p>
+            <a:pPr algn="ctr"/>
+            <a:r>
+              <a:rPr lang="bg-BG" dirty="0">
+                <a:latin typeface="Arial" panose="020B0604020202020204" pitchFamily="34" charset="0"/>
+                <a:cs typeface="Arial" panose="020B0604020202020204" pitchFamily="34" charset="0"/>
+              </a:rPr>
+              <a:t>Задача 1:</a:t>
+            </a:r>
+          </a:p>
+        </p:txBody>
+      </p:sp>
+      <p:sp>
+        <p:nvSpPr>
+          <p:cNvPr id="3" name="Content Placeholder 2">
+            <a:extLst>
+              <a:ext uri="{FF2B5EF4-FFF2-40B4-BE49-F238E27FC236}">
+                <a16:creationId xmlns:a16="http://schemas.microsoft.com/office/drawing/2014/main" id="{6F7386F1-3598-E2E7-96E9-E71EAE822B60}"/>
+              </a:ext>
+            </a:extLst>
+          </p:cNvPr>
+          <p:cNvSpPr>
+            <a:spLocks noGrp="1"/>
+          </p:cNvSpPr>
+          <p:nvPr>
+            <p:ph idx="1"/>
+          </p:nvPr>
+        </p:nvSpPr>
+        <p:spPr/>
+        <p:txBody>
+          <a:bodyPr>
+            <a:normAutofit lnSpcReduction="10000"/>
+          </a:bodyPr>
+          <a:lstStyle/>
+          <a:p>
+            <a:r>
+              <a:rPr lang="bg-BG" sz="2400" i="1" dirty="0">
+                <a:latin typeface="Arial" panose="020B0604020202020204" pitchFamily="34" charset="0"/>
+                <a:cs typeface="Arial" panose="020B0604020202020204" pitchFamily="34" charset="0"/>
+              </a:rPr>
+              <a:t>Да се намери лицето на окръжност по зададен радиус от потребителя и да се изведе на екрана. Използвайте тип данни, който поддържа десетична запетая.</a:t>
+            </a:r>
+          </a:p>
+          <a:p>
+            <a:r>
+              <a:rPr lang="bg-BG" sz="2400" dirty="0">
+                <a:latin typeface="Arial" panose="020B0604020202020204" pitchFamily="34" charset="0"/>
+                <a:cs typeface="Arial" panose="020B0604020202020204" pitchFamily="34" charset="0"/>
+              </a:rPr>
+              <a:t>Изходът от програмата трябва да изглежда така:</a:t>
+            </a:r>
+          </a:p>
+          <a:p>
+            <a:pPr marL="400050" lvl="1" indent="0">
+              <a:buNone/>
+            </a:pPr>
+            <a:r>
+              <a:rPr lang="bg-BG" sz="2400" b="1" i="1" u="sng" dirty="0">
+                <a:latin typeface="Arial" panose="020B0604020202020204" pitchFamily="34" charset="0"/>
+                <a:cs typeface="Arial" panose="020B0604020202020204" pitchFamily="34" charset="0"/>
+              </a:rPr>
+              <a:t>Пример</a:t>
+            </a:r>
+            <a:r>
+              <a:rPr lang="bg-BG" sz="2600" dirty="0">
+                <a:latin typeface="Arial" panose="020B0604020202020204" pitchFamily="34" charset="0"/>
+                <a:cs typeface="Arial" panose="020B0604020202020204" pitchFamily="34" charset="0"/>
+              </a:rPr>
+              <a:t>:</a:t>
+            </a:r>
+          </a:p>
+          <a:p>
+            <a:pPr marL="457200" lvl="1" indent="0">
+              <a:buNone/>
+            </a:pPr>
+            <a:r>
+              <a:rPr lang="en-US" sz="1800" dirty="0">
+                <a:solidFill>
+                  <a:srgbClr val="A31515"/>
+                </a:solidFill>
+                <a:latin typeface="Cascadia Mono" panose="020B0609020000020004" pitchFamily="49" charset="0"/>
+              </a:rPr>
+              <a:t>The area of circle is:</a:t>
+            </a:r>
+            <a:r>
+              <a:rPr lang="bg-BG" sz="1800" dirty="0">
+                <a:solidFill>
+                  <a:srgbClr val="A31515"/>
+                </a:solidFill>
+                <a:latin typeface="Cascadia Mono" panose="020B0609020000020004" pitchFamily="49" charset="0"/>
+              </a:rPr>
+              <a:t> 25.0</a:t>
+            </a:r>
+            <a:endParaRPr lang="en-US" sz="1800" dirty="0">
+              <a:solidFill>
+                <a:srgbClr val="A31515"/>
+              </a:solidFill>
+              <a:latin typeface="Cascadia Mono" panose="020B0609020000020004" pitchFamily="49" charset="0"/>
+            </a:endParaRPr>
+          </a:p>
+          <a:p>
+            <a:pPr marL="457200" lvl="1" indent="0">
+              <a:buNone/>
+            </a:pPr>
+            <a:endParaRPr lang="bg-BG" sz="1800" dirty="0">
+              <a:solidFill>
+                <a:srgbClr val="A31515"/>
+              </a:solidFill>
+              <a:latin typeface="Cascadia Mono" panose="020B0609020000020004" pitchFamily="49" charset="0"/>
+            </a:endParaRPr>
+          </a:p>
+          <a:p>
+            <a:pPr marL="457200" lvl="1" indent="0">
+              <a:buNone/>
+            </a:pPr>
+            <a:r>
+              <a:rPr lang="bg-BG" sz="2400" b="1" i="1" u="sng" dirty="0">
+                <a:solidFill>
+                  <a:schemeClr val="tx1"/>
+                </a:solidFill>
+                <a:latin typeface="Arial" panose="020B0604020202020204" pitchFamily="34" charset="0"/>
+                <a:cs typeface="Arial" panose="020B0604020202020204" pitchFamily="34" charset="0"/>
+              </a:rPr>
+              <a:t>Бонус упътване</a:t>
+            </a:r>
+            <a:r>
+              <a:rPr lang="bg-BG" sz="2400" i="1" u="sng" dirty="0">
+                <a:solidFill>
+                  <a:schemeClr val="tx1"/>
+                </a:solidFill>
+                <a:latin typeface="Arial" panose="020B0604020202020204" pitchFamily="34" charset="0"/>
+                <a:cs typeface="Arial" panose="020B0604020202020204" pitchFamily="34" charset="0"/>
+              </a:rPr>
+              <a:t>:</a:t>
+            </a:r>
+            <a:r>
+              <a:rPr lang="bg-BG" sz="2400" dirty="0">
+                <a:solidFill>
+                  <a:schemeClr val="tx1"/>
+                </a:solidFill>
+                <a:latin typeface="Arial" panose="020B0604020202020204" pitchFamily="34" charset="0"/>
+                <a:cs typeface="Arial" panose="020B0604020202020204" pitchFamily="34" charset="0"/>
+              </a:rPr>
+              <a:t> Вижте как се работи с класа </a:t>
+            </a:r>
+            <a:r>
+              <a:rPr lang="en-US" sz="2400" b="1" dirty="0">
+                <a:solidFill>
+                  <a:schemeClr val="tx1"/>
+                </a:solidFill>
+                <a:latin typeface="Arial" panose="020B0604020202020204" pitchFamily="34" charset="0"/>
+                <a:cs typeface="Arial" panose="020B0604020202020204" pitchFamily="34" charset="0"/>
+              </a:rPr>
+              <a:t>Math</a:t>
+            </a:r>
+            <a:r>
+              <a:rPr lang="en-US" sz="2400" dirty="0">
+                <a:solidFill>
+                  <a:schemeClr val="tx1"/>
+                </a:solidFill>
+                <a:latin typeface="Arial" panose="020B0604020202020204" pitchFamily="34" charset="0"/>
+                <a:cs typeface="Arial" panose="020B0604020202020204" pitchFamily="34" charset="0"/>
+              </a:rPr>
+              <a:t>.</a:t>
+            </a:r>
+            <a:endParaRPr lang="bg-BG" sz="2400" dirty="0">
+              <a:solidFill>
+                <a:schemeClr val="tx1"/>
+              </a:solidFill>
+              <a:latin typeface="Arial" panose="020B0604020202020204" pitchFamily="34" charset="0"/>
+              <a:cs typeface="Arial" panose="020B0604020202020204" pitchFamily="34" charset="0"/>
+            </a:endParaRPr>
+          </a:p>
+        </p:txBody>
+      </p:sp>
+    </p:spTree>
+    <p:extLst>
+      <p:ext uri="{BB962C8B-B14F-4D97-AF65-F5344CB8AC3E}">
+        <p14:creationId xmlns:p14="http://schemas.microsoft.com/office/powerpoint/2010/main" val="3343338538"/>
+      </p:ext>
+    </p:extLst>
+  </p:cSld>
+  <p:clrMapOvr>
+    <a:masterClrMapping/>
+  </p:clrMapOvr>
+</p:sld>
+</file>
+
+<file path=ppt/slides/slide54.xml><?xml version="1.0" encoding="utf-8"?>
+<p:sld xmlns:a="http://schemas.openxmlformats.org/drawingml/2006/main" xmlns:r="http://schemas.openxmlformats.org/officeDocument/2006/relationships" xmlns:p="http://schemas.openxmlformats.org/presentationml/2006/main">
+  <p:cSld>
+    <p:spTree>
+      <p:nvGrpSpPr>
+        <p:cNvPr id="1" name=""/>
+        <p:cNvGrpSpPr/>
+        <p:nvPr/>
+      </p:nvGrpSpPr>
+      <p:grpSpPr>
+        <a:xfrm>
+          <a:off x="0" y="0"/>
+          <a:ext cx="0" cy="0"/>
+          <a:chOff x="0" y="0"/>
+          <a:chExt cx="0" cy="0"/>
+        </a:xfrm>
+      </p:grpSpPr>
+      <p:sp>
+        <p:nvSpPr>
+          <p:cNvPr id="2" name="Title 1">
+            <a:extLst>
+              <a:ext uri="{FF2B5EF4-FFF2-40B4-BE49-F238E27FC236}">
+                <a16:creationId xmlns:a16="http://schemas.microsoft.com/office/drawing/2014/main" id="{0D5226AE-1E9B-94E1-4DD1-A44A97BC0A33}"/>
+              </a:ext>
+            </a:extLst>
+          </p:cNvPr>
+          <p:cNvSpPr>
+            <a:spLocks noGrp="1"/>
+          </p:cNvSpPr>
+          <p:nvPr>
+            <p:ph type="title"/>
+          </p:nvPr>
+        </p:nvSpPr>
+        <p:spPr/>
+        <p:txBody>
+          <a:bodyPr/>
+          <a:lstStyle/>
+          <a:p>
+            <a:pPr algn="ctr"/>
+            <a:r>
+              <a:rPr lang="bg-BG" dirty="0">
+                <a:latin typeface="Arial" panose="020B0604020202020204" pitchFamily="34" charset="0"/>
+                <a:cs typeface="Arial" panose="020B0604020202020204" pitchFamily="34" charset="0"/>
+              </a:rPr>
+              <a:t>Задача 2:</a:t>
+            </a:r>
+          </a:p>
+        </p:txBody>
+      </p:sp>
+      <p:sp>
+        <p:nvSpPr>
+          <p:cNvPr id="3" name="Content Placeholder 2">
+            <a:extLst>
+              <a:ext uri="{FF2B5EF4-FFF2-40B4-BE49-F238E27FC236}">
+                <a16:creationId xmlns:a16="http://schemas.microsoft.com/office/drawing/2014/main" id="{6F7386F1-3598-E2E7-96E9-E71EAE822B60}"/>
+              </a:ext>
+            </a:extLst>
+          </p:cNvPr>
+          <p:cNvSpPr>
+            <a:spLocks noGrp="1"/>
+          </p:cNvSpPr>
+          <p:nvPr>
+            <p:ph idx="1"/>
+          </p:nvPr>
+        </p:nvSpPr>
+        <p:spPr>
+          <a:xfrm>
+            <a:off x="1154954" y="2603499"/>
+            <a:ext cx="8825659" cy="4064719"/>
+          </a:xfrm>
+        </p:spPr>
+        <p:txBody>
+          <a:bodyPr>
+            <a:normAutofit fontScale="92500" lnSpcReduction="20000"/>
+          </a:bodyPr>
+          <a:lstStyle/>
+          <a:p>
+            <a:r>
+              <a:rPr lang="bg-BG" sz="2400" i="1" dirty="0">
+                <a:latin typeface="Arial" panose="020B0604020202020204" pitchFamily="34" charset="0"/>
+                <a:cs typeface="Arial" panose="020B0604020202020204" pitchFamily="34" charset="0"/>
+              </a:rPr>
+              <a:t>Да се направи калкулатор, който поддържа събиране, изваждане, умножение и деление. Входът ще се състои от три части. Първите две са числата, които ще участват в операцията, а третият вход е самата операция, която въвеждаме като </a:t>
+            </a:r>
+            <a:r>
+              <a:rPr lang="en-US" sz="2400" b="1" i="1" dirty="0">
+                <a:latin typeface="Arial" panose="020B0604020202020204" pitchFamily="34" charset="0"/>
+                <a:cs typeface="Arial" panose="020B0604020202020204" pitchFamily="34" charset="0"/>
+              </a:rPr>
+              <a:t>char</a:t>
+            </a:r>
+            <a:r>
+              <a:rPr lang="en-US" sz="2400" i="1" dirty="0">
+                <a:latin typeface="Arial" panose="020B0604020202020204" pitchFamily="34" charset="0"/>
+                <a:cs typeface="Arial" panose="020B0604020202020204" pitchFamily="34" charset="0"/>
+              </a:rPr>
+              <a:t>.</a:t>
+            </a:r>
+            <a:r>
+              <a:rPr lang="bg-BG" sz="2400" i="1" dirty="0">
+                <a:latin typeface="Arial" panose="020B0604020202020204" pitchFamily="34" charset="0"/>
+                <a:cs typeface="Arial" panose="020B0604020202020204" pitchFamily="34" charset="0"/>
+              </a:rPr>
+              <a:t> Числата, които въвеждаме трябва да са </a:t>
+            </a:r>
+            <a:r>
+              <a:rPr lang="en-US" sz="2400" b="1" i="1" dirty="0">
+                <a:latin typeface="Arial" panose="020B0604020202020204" pitchFamily="34" charset="0"/>
+                <a:cs typeface="Arial" panose="020B0604020202020204" pitchFamily="34" charset="0"/>
+              </a:rPr>
+              <a:t>double</a:t>
+            </a:r>
+            <a:r>
+              <a:rPr lang="en-US" sz="2400" i="1" dirty="0">
+                <a:latin typeface="Arial" panose="020B0604020202020204" pitchFamily="34" charset="0"/>
+                <a:cs typeface="Arial" panose="020B0604020202020204" pitchFamily="34" charset="0"/>
+              </a:rPr>
+              <a:t>.</a:t>
+            </a:r>
+            <a:endParaRPr lang="bg-BG" sz="2400" i="1" dirty="0">
+              <a:latin typeface="Arial" panose="020B0604020202020204" pitchFamily="34" charset="0"/>
+              <a:cs typeface="Arial" panose="020B0604020202020204" pitchFamily="34" charset="0"/>
+            </a:endParaRPr>
+          </a:p>
+          <a:p>
+            <a:r>
+              <a:rPr lang="bg-BG" sz="2400" dirty="0">
+                <a:latin typeface="Arial" panose="020B0604020202020204" pitchFamily="34" charset="0"/>
+                <a:cs typeface="Arial" panose="020B0604020202020204" pitchFamily="34" charset="0"/>
+              </a:rPr>
+              <a:t>Изходът от програмата трябва да изглежда така:</a:t>
+            </a:r>
+          </a:p>
+          <a:p>
+            <a:pPr marL="400050" lvl="1" indent="0">
+              <a:buNone/>
+            </a:pPr>
+            <a:r>
+              <a:rPr lang="bg-BG" sz="2400" b="1" i="1" u="sng" dirty="0">
+                <a:latin typeface="Arial" panose="020B0604020202020204" pitchFamily="34" charset="0"/>
+                <a:cs typeface="Arial" panose="020B0604020202020204" pitchFamily="34" charset="0"/>
+              </a:rPr>
+              <a:t>Пример</a:t>
+            </a:r>
+            <a:r>
+              <a:rPr lang="bg-BG" sz="2600" dirty="0">
+                <a:latin typeface="Arial" panose="020B0604020202020204" pitchFamily="34" charset="0"/>
+                <a:cs typeface="Arial" panose="020B0604020202020204" pitchFamily="34" charset="0"/>
+              </a:rPr>
+              <a:t>:</a:t>
+            </a:r>
+          </a:p>
+          <a:p>
+            <a:pPr marL="457200" lvl="1" indent="0">
+              <a:buNone/>
+            </a:pPr>
+            <a:r>
+              <a:rPr lang="en-US" sz="1800" dirty="0">
+                <a:solidFill>
+                  <a:srgbClr val="A31515"/>
+                </a:solidFill>
+                <a:latin typeface="Cascadia Mono" panose="020B0609020000020004" pitchFamily="49" charset="0"/>
+              </a:rPr>
+              <a:t>The sum of numbers is:</a:t>
+            </a:r>
+            <a:r>
+              <a:rPr lang="bg-BG" sz="1800" dirty="0">
+                <a:solidFill>
+                  <a:srgbClr val="A31515"/>
+                </a:solidFill>
+                <a:latin typeface="Cascadia Mono" panose="020B0609020000020004" pitchFamily="49" charset="0"/>
+              </a:rPr>
+              <a:t> 26.7</a:t>
+            </a:r>
+            <a:r>
+              <a:rPr lang="en-US" sz="1800" dirty="0">
+                <a:solidFill>
+                  <a:srgbClr val="A31515"/>
+                </a:solidFill>
+                <a:latin typeface="Cascadia Mono" panose="020B0609020000020004" pitchFamily="49" charset="0"/>
+              </a:rPr>
+              <a:t>.</a:t>
+            </a:r>
+            <a:r>
+              <a:rPr lang="en-US" sz="1800" dirty="0">
+                <a:solidFill>
+                  <a:schemeClr val="tx1"/>
+                </a:solidFill>
+                <a:latin typeface="Cascadia Mono" panose="020B0609020000020004" pitchFamily="49" charset="0"/>
+              </a:rPr>
+              <a:t>-&gt; </a:t>
+            </a:r>
+            <a:r>
+              <a:rPr lang="bg-BG" sz="1800" dirty="0">
+                <a:solidFill>
+                  <a:schemeClr val="tx1"/>
+                </a:solidFill>
+                <a:latin typeface="Cascadia Mono" panose="020B0609020000020004" pitchFamily="49" charset="0"/>
+              </a:rPr>
+              <a:t>за събиране</a:t>
+            </a:r>
+            <a:endParaRPr lang="en-US" sz="1800" dirty="0">
+              <a:solidFill>
+                <a:schemeClr val="tx1"/>
+              </a:solidFill>
+              <a:latin typeface="Cascadia Mono" panose="020B0609020000020004" pitchFamily="49" charset="0"/>
+            </a:endParaRPr>
+          </a:p>
+          <a:p>
+            <a:pPr marL="457200" lvl="1" indent="0">
+              <a:buNone/>
+            </a:pPr>
+            <a:r>
+              <a:rPr lang="en-US" sz="1800" dirty="0">
+                <a:solidFill>
+                  <a:srgbClr val="A31515"/>
+                </a:solidFill>
+                <a:latin typeface="Cascadia Mono" panose="020B0609020000020004" pitchFamily="49" charset="0"/>
+              </a:rPr>
+              <a:t>The product of numbers is:</a:t>
+            </a:r>
+            <a:r>
+              <a:rPr lang="bg-BG" sz="1800" dirty="0">
+                <a:solidFill>
+                  <a:srgbClr val="A31515"/>
+                </a:solidFill>
+                <a:latin typeface="Cascadia Mono" panose="020B0609020000020004" pitchFamily="49" charset="0"/>
+              </a:rPr>
+              <a:t> 64.0</a:t>
+            </a:r>
+            <a:r>
+              <a:rPr lang="en-US" sz="1800" dirty="0">
+                <a:solidFill>
+                  <a:srgbClr val="A31515"/>
+                </a:solidFill>
+                <a:latin typeface="Cascadia Mono" panose="020B0609020000020004" pitchFamily="49" charset="0"/>
+              </a:rPr>
+              <a:t>. </a:t>
+            </a:r>
+            <a:r>
+              <a:rPr lang="en-US" sz="1800" dirty="0">
+                <a:solidFill>
+                  <a:schemeClr val="tx1"/>
+                </a:solidFill>
+                <a:latin typeface="Cascadia Mono" panose="020B0609020000020004" pitchFamily="49" charset="0"/>
+              </a:rPr>
+              <a:t>-&gt; </a:t>
+            </a:r>
+            <a:r>
+              <a:rPr lang="bg-BG" sz="1800" dirty="0">
+                <a:solidFill>
+                  <a:schemeClr val="tx1"/>
+                </a:solidFill>
+                <a:latin typeface="Cascadia Mono" panose="020B0609020000020004" pitchFamily="49" charset="0"/>
+              </a:rPr>
+              <a:t>за умножение</a:t>
+            </a:r>
+            <a:endParaRPr lang="en-US" sz="1800" dirty="0">
+              <a:solidFill>
+                <a:schemeClr val="tx1"/>
+              </a:solidFill>
+              <a:latin typeface="Cascadia Mono" panose="020B0609020000020004" pitchFamily="49" charset="0"/>
+            </a:endParaRPr>
+          </a:p>
+          <a:p>
+            <a:pPr marL="457200" lvl="1" indent="0">
+              <a:buNone/>
+            </a:pPr>
+            <a:r>
+              <a:rPr lang="en-US" sz="1800" dirty="0">
+                <a:solidFill>
+                  <a:srgbClr val="A31515"/>
+                </a:solidFill>
+                <a:latin typeface="Cascadia Mono" panose="020B0609020000020004" pitchFamily="49" charset="0"/>
+              </a:rPr>
+              <a:t>The difference of numbers is:</a:t>
+            </a:r>
+            <a:r>
+              <a:rPr lang="bg-BG" sz="1800" dirty="0">
+                <a:solidFill>
+                  <a:srgbClr val="A31515"/>
+                </a:solidFill>
+                <a:latin typeface="Cascadia Mono" panose="020B0609020000020004" pitchFamily="49" charset="0"/>
+              </a:rPr>
+              <a:t> 72.6</a:t>
+            </a:r>
+            <a:r>
+              <a:rPr lang="en-US" sz="1800" dirty="0">
+                <a:solidFill>
+                  <a:srgbClr val="A31515"/>
+                </a:solidFill>
+                <a:latin typeface="Cascadia Mono" panose="020B0609020000020004" pitchFamily="49" charset="0"/>
+              </a:rPr>
+              <a:t>. </a:t>
+            </a:r>
+            <a:r>
+              <a:rPr lang="en-US" sz="1800" dirty="0">
+                <a:solidFill>
+                  <a:schemeClr val="tx1"/>
+                </a:solidFill>
+                <a:latin typeface="Cascadia Mono" panose="020B0609020000020004" pitchFamily="49" charset="0"/>
+              </a:rPr>
+              <a:t>-&gt; </a:t>
+            </a:r>
+            <a:r>
+              <a:rPr lang="bg-BG" sz="1800" dirty="0">
+                <a:solidFill>
+                  <a:schemeClr val="tx1"/>
+                </a:solidFill>
+                <a:latin typeface="Cascadia Mono" panose="020B0609020000020004" pitchFamily="49" charset="0"/>
+              </a:rPr>
+              <a:t>за изваждане</a:t>
+            </a:r>
+            <a:endParaRPr lang="en-US" sz="1800" dirty="0">
+              <a:solidFill>
+                <a:schemeClr val="tx1"/>
+              </a:solidFill>
+              <a:latin typeface="Cascadia Mono" panose="020B0609020000020004" pitchFamily="49" charset="0"/>
+            </a:endParaRPr>
+          </a:p>
+          <a:p>
+            <a:pPr marL="457200" lvl="1" indent="0">
+              <a:buNone/>
+            </a:pPr>
+            <a:r>
+              <a:rPr lang="en-US" sz="1800" dirty="0">
+                <a:solidFill>
+                  <a:srgbClr val="A31515"/>
+                </a:solidFill>
+                <a:latin typeface="Cascadia Mono" panose="020B0609020000020004" pitchFamily="49" charset="0"/>
+              </a:rPr>
+              <a:t>The division of numbers is:</a:t>
+            </a:r>
+            <a:r>
+              <a:rPr lang="bg-BG" sz="1800" dirty="0">
+                <a:solidFill>
+                  <a:srgbClr val="A31515"/>
+                </a:solidFill>
+                <a:latin typeface="Cascadia Mono" panose="020B0609020000020004" pitchFamily="49" charset="0"/>
+              </a:rPr>
+              <a:t> 5.2</a:t>
+            </a:r>
+            <a:r>
+              <a:rPr lang="en-US" sz="1800" dirty="0">
+                <a:solidFill>
+                  <a:srgbClr val="A31515"/>
+                </a:solidFill>
+                <a:latin typeface="Cascadia Mono" panose="020B0609020000020004" pitchFamily="49" charset="0"/>
+              </a:rPr>
+              <a:t>. </a:t>
+            </a:r>
+            <a:r>
+              <a:rPr lang="en-US" sz="1800" dirty="0">
+                <a:solidFill>
+                  <a:schemeClr val="tx1"/>
+                </a:solidFill>
+                <a:latin typeface="Cascadia Mono" panose="020B0609020000020004" pitchFamily="49" charset="0"/>
+              </a:rPr>
+              <a:t>-&gt; </a:t>
+            </a:r>
+            <a:r>
+              <a:rPr lang="bg-BG" sz="1800" dirty="0">
+                <a:solidFill>
+                  <a:schemeClr val="tx1"/>
+                </a:solidFill>
+                <a:latin typeface="Cascadia Mono" panose="020B0609020000020004" pitchFamily="49" charset="0"/>
+              </a:rPr>
+              <a:t>за деление</a:t>
+            </a:r>
+            <a:endParaRPr lang="en-US" sz="1800" dirty="0">
+              <a:solidFill>
+                <a:schemeClr val="tx1"/>
+              </a:solidFill>
+              <a:latin typeface="Cascadia Mono" panose="020B0609020000020004" pitchFamily="49" charset="0"/>
+            </a:endParaRPr>
+          </a:p>
+          <a:p>
+            <a:pPr marL="457200" lvl="1" indent="0">
+              <a:buNone/>
+            </a:pPr>
+            <a:endParaRPr lang="en-US" sz="1800" dirty="0">
+              <a:solidFill>
+                <a:schemeClr val="tx1"/>
+              </a:solidFill>
+              <a:latin typeface="Cascadia Mono" panose="020B0609020000020004" pitchFamily="49" charset="0"/>
+            </a:endParaRPr>
+          </a:p>
+          <a:p>
+            <a:pPr marL="457200" lvl="1" indent="0">
+              <a:buNone/>
+            </a:pPr>
+            <a:endParaRPr lang="en-US" sz="1800" dirty="0">
+              <a:solidFill>
+                <a:schemeClr val="tx1"/>
+              </a:solidFill>
+              <a:latin typeface="Cascadia Mono" panose="020B0609020000020004" pitchFamily="49" charset="0"/>
+            </a:endParaRPr>
+          </a:p>
+          <a:p>
+            <a:pPr marL="457200" lvl="1" indent="0">
+              <a:buNone/>
+            </a:pPr>
+            <a:endParaRPr lang="en-US" sz="1800" dirty="0">
+              <a:solidFill>
+                <a:schemeClr val="tx1"/>
+              </a:solidFill>
+              <a:latin typeface="Cascadia Mono" panose="020B0609020000020004" pitchFamily="49" charset="0"/>
+            </a:endParaRPr>
+          </a:p>
+          <a:p>
+            <a:pPr marL="457200" lvl="1" indent="0">
+              <a:buNone/>
+            </a:pPr>
+            <a:endParaRPr lang="bg-BG" sz="1800" dirty="0">
+              <a:solidFill>
+                <a:srgbClr val="A31515"/>
+              </a:solidFill>
+              <a:latin typeface="Cascadia Mono" panose="020B0609020000020004" pitchFamily="49" charset="0"/>
+            </a:endParaRPr>
+          </a:p>
+        </p:txBody>
+      </p:sp>
+    </p:spTree>
+    <p:extLst>
+      <p:ext uri="{BB962C8B-B14F-4D97-AF65-F5344CB8AC3E}">
+        <p14:creationId xmlns:p14="http://schemas.microsoft.com/office/powerpoint/2010/main" val="528386793"/>
+      </p:ext>
+    </p:extLst>
+  </p:cSld>
+  <p:clrMapOvr>
+    <a:masterClrMapping/>
+  </p:clrMapOvr>
+</p:sld>
+</file>
+
+<file path=ppt/slides/slide55.xml><?xml version="1.0" encoding="utf-8"?>
+<p:sld xmlns:a="http://schemas.openxmlformats.org/drawingml/2006/main" xmlns:r="http://schemas.openxmlformats.org/officeDocument/2006/relationships" xmlns:p="http://schemas.openxmlformats.org/presentationml/2006/main">
+  <p:cSld>
+    <p:spTree>
+      <p:nvGrpSpPr>
+        <p:cNvPr id="1" name=""/>
+        <p:cNvGrpSpPr/>
+        <p:nvPr/>
+      </p:nvGrpSpPr>
+      <p:grpSpPr>
+        <a:xfrm>
+          <a:off x="0" y="0"/>
+          <a:ext cx="0" cy="0"/>
+          <a:chOff x="0" y="0"/>
+          <a:chExt cx="0" cy="0"/>
+        </a:xfrm>
+      </p:grpSpPr>
+      <p:sp>
+        <p:nvSpPr>
+          <p:cNvPr id="2" name="Title 1">
+            <a:extLst>
+              <a:ext uri="{FF2B5EF4-FFF2-40B4-BE49-F238E27FC236}">
+                <a16:creationId xmlns:a16="http://schemas.microsoft.com/office/drawing/2014/main" id="{0D5226AE-1E9B-94E1-4DD1-A44A97BC0A33}"/>
+              </a:ext>
+            </a:extLst>
+          </p:cNvPr>
+          <p:cNvSpPr>
+            <a:spLocks noGrp="1"/>
+          </p:cNvSpPr>
+          <p:nvPr>
+            <p:ph type="title"/>
+          </p:nvPr>
+        </p:nvSpPr>
+        <p:spPr/>
+        <p:txBody>
+          <a:bodyPr/>
+          <a:lstStyle/>
+          <a:p>
+            <a:pPr algn="ctr"/>
+            <a:r>
+              <a:rPr lang="bg-BG" dirty="0">
+                <a:latin typeface="Arial" panose="020B0604020202020204" pitchFamily="34" charset="0"/>
+                <a:cs typeface="Arial" panose="020B0604020202020204" pitchFamily="34" charset="0"/>
+              </a:rPr>
+              <a:t>Задача 3:</a:t>
+            </a:r>
+          </a:p>
+        </p:txBody>
+      </p:sp>
+      <p:sp>
+        <p:nvSpPr>
+          <p:cNvPr id="3" name="Content Placeholder 2">
+            <a:extLst>
+              <a:ext uri="{FF2B5EF4-FFF2-40B4-BE49-F238E27FC236}">
+                <a16:creationId xmlns:a16="http://schemas.microsoft.com/office/drawing/2014/main" id="{6F7386F1-3598-E2E7-96E9-E71EAE822B60}"/>
+              </a:ext>
+            </a:extLst>
+          </p:cNvPr>
+          <p:cNvSpPr>
+            <a:spLocks noGrp="1"/>
+          </p:cNvSpPr>
+          <p:nvPr>
+            <p:ph idx="1"/>
+          </p:nvPr>
+        </p:nvSpPr>
+        <p:spPr>
+          <a:xfrm>
+            <a:off x="1154954" y="2603499"/>
+            <a:ext cx="8825659" cy="4064719"/>
+          </a:xfrm>
+        </p:spPr>
+        <p:txBody>
+          <a:bodyPr>
+            <a:normAutofit fontScale="92500" lnSpcReduction="20000"/>
+          </a:bodyPr>
+          <a:lstStyle/>
+          <a:p>
+            <a:r>
+              <a:rPr lang="bg-BG" sz="2400" i="1" dirty="0">
+                <a:latin typeface="Arial" panose="020B0604020202020204" pitchFamily="34" charset="0"/>
+                <a:cs typeface="Arial" panose="020B0604020202020204" pitchFamily="34" charset="0"/>
+              </a:rPr>
+              <a:t>Да се направи програма, която принтира само четните числа в зададен интервал</a:t>
+            </a:r>
+            <a:r>
+              <a:rPr lang="en-US" sz="2400" i="1" dirty="0">
+                <a:latin typeface="Arial" panose="020B0604020202020204" pitchFamily="34" charset="0"/>
+                <a:cs typeface="Arial" panose="020B0604020202020204" pitchFamily="34" charset="0"/>
+              </a:rPr>
+              <a:t>.</a:t>
+            </a:r>
+            <a:r>
+              <a:rPr lang="bg-BG" sz="2400" i="1" dirty="0">
+                <a:latin typeface="Arial" panose="020B0604020202020204" pitchFamily="34" charset="0"/>
+                <a:cs typeface="Arial" panose="020B0604020202020204" pitchFamily="34" charset="0"/>
+              </a:rPr>
+              <a:t> Интервалът се задава от потребителя. Входът от потребителя са две </a:t>
+            </a:r>
+            <a:r>
+              <a:rPr lang="en-US" sz="2400" b="1" i="1" dirty="0">
+                <a:latin typeface="Arial" panose="020B0604020202020204" pitchFamily="34" charset="0"/>
+                <a:cs typeface="Arial" panose="020B0604020202020204" pitchFamily="34" charset="0"/>
+              </a:rPr>
+              <a:t>int</a:t>
+            </a:r>
+            <a:r>
+              <a:rPr lang="en-US" sz="2400" i="1" dirty="0">
+                <a:latin typeface="Arial" panose="020B0604020202020204" pitchFamily="34" charset="0"/>
+                <a:cs typeface="Arial" panose="020B0604020202020204" pitchFamily="34" charset="0"/>
+              </a:rPr>
+              <a:t> </a:t>
+            </a:r>
+            <a:r>
+              <a:rPr lang="bg-BG" sz="2400" i="1" dirty="0">
+                <a:latin typeface="Arial" panose="020B0604020202020204" pitchFamily="34" charset="0"/>
+                <a:cs typeface="Arial" panose="020B0604020202020204" pitchFamily="34" charset="0"/>
+              </a:rPr>
+              <a:t>числа, които представляват началото и края на интервала. Двете граници също влизат в съответния интервал</a:t>
+            </a:r>
+            <a:r>
+              <a:rPr lang="en-US" sz="2400" i="1" dirty="0">
+                <a:latin typeface="Arial" panose="020B0604020202020204" pitchFamily="34" charset="0"/>
+                <a:cs typeface="Arial" panose="020B0604020202020204" pitchFamily="34" charset="0"/>
+              </a:rPr>
+              <a:t>, </a:t>
+            </a:r>
+            <a:r>
+              <a:rPr lang="bg-BG" sz="2400" i="1" dirty="0">
+                <a:latin typeface="Arial" panose="020B0604020202020204" pitchFamily="34" charset="0"/>
+                <a:cs typeface="Arial" panose="020B0604020202020204" pitchFamily="34" charset="0"/>
+              </a:rPr>
+              <a:t>когато извеждаме числата на конзолата.</a:t>
+            </a:r>
+          </a:p>
+          <a:p>
+            <a:r>
+              <a:rPr lang="bg-BG" sz="2400" dirty="0">
+                <a:latin typeface="Arial" panose="020B0604020202020204" pitchFamily="34" charset="0"/>
+                <a:cs typeface="Arial" panose="020B0604020202020204" pitchFamily="34" charset="0"/>
+              </a:rPr>
+              <a:t>Изходът от програмата трябва да изглежда така</a:t>
+            </a:r>
+            <a:r>
+              <a:rPr lang="en-US" sz="2400" dirty="0">
+                <a:latin typeface="Arial" panose="020B0604020202020204" pitchFamily="34" charset="0"/>
+                <a:cs typeface="Arial" panose="020B0604020202020204" pitchFamily="34" charset="0"/>
+              </a:rPr>
+              <a:t> (</a:t>
+            </a:r>
+            <a:r>
+              <a:rPr lang="bg-BG" sz="2400" dirty="0">
+                <a:latin typeface="Arial" panose="020B0604020202020204" pitchFamily="34" charset="0"/>
+                <a:cs typeface="Arial" panose="020B0604020202020204" pitchFamily="34" charset="0"/>
+              </a:rPr>
+              <a:t>при зададени </a:t>
+            </a:r>
+            <a:r>
+              <a:rPr lang="bg-BG" sz="2400" b="1" dirty="0">
+                <a:latin typeface="Arial" panose="020B0604020202020204" pitchFamily="34" charset="0"/>
+                <a:cs typeface="Arial" panose="020B0604020202020204" pitchFamily="34" charset="0"/>
+              </a:rPr>
+              <a:t>2</a:t>
+            </a:r>
+            <a:r>
+              <a:rPr lang="bg-BG" sz="2400" dirty="0">
+                <a:latin typeface="Arial" panose="020B0604020202020204" pitchFamily="34" charset="0"/>
+                <a:cs typeface="Arial" panose="020B0604020202020204" pitchFamily="34" charset="0"/>
+              </a:rPr>
+              <a:t> и  </a:t>
+            </a:r>
+            <a:r>
+              <a:rPr lang="bg-BG" sz="2400" b="1" dirty="0">
+                <a:latin typeface="Arial" panose="020B0604020202020204" pitchFamily="34" charset="0"/>
+                <a:cs typeface="Arial" panose="020B0604020202020204" pitchFamily="34" charset="0"/>
+              </a:rPr>
+              <a:t>6 </a:t>
+            </a:r>
+            <a:r>
+              <a:rPr lang="bg-BG" sz="2400" dirty="0">
+                <a:latin typeface="Arial" panose="020B0604020202020204" pitchFamily="34" charset="0"/>
+                <a:cs typeface="Arial" panose="020B0604020202020204" pitchFamily="34" charset="0"/>
+              </a:rPr>
+              <a:t>за граници</a:t>
+            </a:r>
+            <a:r>
+              <a:rPr lang="en-US" sz="2400" dirty="0">
+                <a:latin typeface="Arial" panose="020B0604020202020204" pitchFamily="34" charset="0"/>
+                <a:cs typeface="Arial" panose="020B0604020202020204" pitchFamily="34" charset="0"/>
+              </a:rPr>
+              <a:t>)</a:t>
+            </a:r>
+            <a:r>
+              <a:rPr lang="bg-BG" sz="2400" dirty="0">
+                <a:latin typeface="Arial" panose="020B0604020202020204" pitchFamily="34" charset="0"/>
+                <a:cs typeface="Arial" panose="020B0604020202020204" pitchFamily="34" charset="0"/>
+              </a:rPr>
+              <a:t>:</a:t>
+            </a:r>
+          </a:p>
+          <a:p>
+            <a:pPr marL="400050" lvl="1" indent="0">
+              <a:buNone/>
+            </a:pPr>
+            <a:r>
+              <a:rPr lang="bg-BG" sz="2400" b="1" i="1" u="sng" dirty="0">
+                <a:latin typeface="Arial" panose="020B0604020202020204" pitchFamily="34" charset="0"/>
+                <a:cs typeface="Arial" panose="020B0604020202020204" pitchFamily="34" charset="0"/>
+              </a:rPr>
+              <a:t>Пример</a:t>
+            </a:r>
+            <a:r>
+              <a:rPr lang="bg-BG" sz="2600" dirty="0">
+                <a:latin typeface="Arial" panose="020B0604020202020204" pitchFamily="34" charset="0"/>
+                <a:cs typeface="Arial" panose="020B0604020202020204" pitchFamily="34" charset="0"/>
+              </a:rPr>
+              <a:t>:</a:t>
+            </a:r>
+          </a:p>
+          <a:p>
+            <a:pPr marL="457200" lvl="1" indent="0">
+              <a:buNone/>
+            </a:pPr>
+            <a:r>
+              <a:rPr lang="bg-BG" sz="1800" dirty="0">
+                <a:solidFill>
+                  <a:srgbClr val="A31515"/>
+                </a:solidFill>
+                <a:latin typeface="Cascadia Mono" panose="020B0609020000020004" pitchFamily="49" charset="0"/>
+              </a:rPr>
+              <a:t>2</a:t>
+            </a:r>
+          </a:p>
+          <a:p>
+            <a:pPr marL="457200" lvl="1" indent="0">
+              <a:buNone/>
+            </a:pPr>
+            <a:r>
+              <a:rPr lang="bg-BG" sz="1800" dirty="0">
+                <a:solidFill>
+                  <a:srgbClr val="A31515"/>
+                </a:solidFill>
+                <a:latin typeface="Cascadia Mono" panose="020B0609020000020004" pitchFamily="49" charset="0"/>
+              </a:rPr>
+              <a:t>4</a:t>
+            </a:r>
+          </a:p>
+          <a:p>
+            <a:pPr marL="457200" lvl="1" indent="0">
+              <a:buNone/>
+            </a:pPr>
+            <a:r>
+              <a:rPr lang="bg-BG" sz="1800" dirty="0">
+                <a:solidFill>
+                  <a:srgbClr val="A31515"/>
+                </a:solidFill>
+                <a:latin typeface="Cascadia Mono" panose="020B0609020000020004" pitchFamily="49" charset="0"/>
+              </a:rPr>
+              <a:t>6</a:t>
+            </a:r>
+            <a:r>
+              <a:rPr lang="en-US" sz="1800" dirty="0">
+                <a:solidFill>
+                  <a:srgbClr val="A31515"/>
+                </a:solidFill>
+                <a:latin typeface="Cascadia Mono" panose="020B0609020000020004" pitchFamily="49" charset="0"/>
+              </a:rPr>
+              <a:t> </a:t>
+            </a:r>
+            <a:endParaRPr lang="en-US" sz="1800" dirty="0">
+              <a:solidFill>
+                <a:schemeClr val="tx1"/>
+              </a:solidFill>
+              <a:latin typeface="Cascadia Mono" panose="020B0609020000020004" pitchFamily="49" charset="0"/>
+            </a:endParaRPr>
+          </a:p>
+          <a:p>
+            <a:pPr marL="457200" lvl="1" indent="0">
+              <a:buNone/>
+            </a:pPr>
+            <a:endParaRPr lang="en-US" sz="1800" dirty="0">
+              <a:solidFill>
+                <a:schemeClr val="tx1"/>
+              </a:solidFill>
+              <a:latin typeface="Cascadia Mono" panose="020B0609020000020004" pitchFamily="49" charset="0"/>
+            </a:endParaRPr>
+          </a:p>
+          <a:p>
+            <a:pPr marL="457200" lvl="1" indent="0">
+              <a:buNone/>
+            </a:pPr>
+            <a:endParaRPr lang="en-US" sz="1800" dirty="0">
+              <a:solidFill>
+                <a:schemeClr val="tx1"/>
+              </a:solidFill>
+              <a:latin typeface="Cascadia Mono" panose="020B0609020000020004" pitchFamily="49" charset="0"/>
+            </a:endParaRPr>
+          </a:p>
+          <a:p>
+            <a:pPr marL="457200" lvl="1" indent="0">
+              <a:buNone/>
+            </a:pPr>
+            <a:endParaRPr lang="en-US" sz="1800" dirty="0">
+              <a:solidFill>
+                <a:schemeClr val="tx1"/>
+              </a:solidFill>
+              <a:latin typeface="Cascadia Mono" panose="020B0609020000020004" pitchFamily="49" charset="0"/>
+            </a:endParaRPr>
+          </a:p>
+          <a:p>
+            <a:pPr marL="457200" lvl="1" indent="0">
+              <a:buNone/>
+            </a:pPr>
+            <a:endParaRPr lang="bg-BG" sz="1800" dirty="0">
+              <a:solidFill>
+                <a:srgbClr val="A31515"/>
+              </a:solidFill>
+              <a:latin typeface="Cascadia Mono" panose="020B0609020000020004" pitchFamily="49" charset="0"/>
+            </a:endParaRPr>
+          </a:p>
+        </p:txBody>
+      </p:sp>
+    </p:spTree>
+    <p:extLst>
+      <p:ext uri="{BB962C8B-B14F-4D97-AF65-F5344CB8AC3E}">
+        <p14:creationId xmlns:p14="http://schemas.microsoft.com/office/powerpoint/2010/main" val="1033659939"/>
+      </p:ext>
+    </p:extLst>
+  </p:cSld>
+  <p:clrMapOvr>
+    <a:masterClrMapping/>
+  </p:clrMapOvr>
+</p:sld>
+</file>
+
+<file path=ppt/slides/slide56.xml><?xml version="1.0" encoding="utf-8"?>
+<p:sld xmlns:a="http://schemas.openxmlformats.org/drawingml/2006/main" xmlns:r="http://schemas.openxmlformats.org/officeDocument/2006/relationships" xmlns:p="http://schemas.openxmlformats.org/presentationml/2006/main">
+  <p:cSld>
+    <p:spTree>
+      <p:nvGrpSpPr>
+        <p:cNvPr id="1" name=""/>
+        <p:cNvGrpSpPr/>
+        <p:nvPr/>
+      </p:nvGrpSpPr>
+      <p:grpSpPr>
+        <a:xfrm>
+          <a:off x="0" y="0"/>
+          <a:ext cx="0" cy="0"/>
+          <a:chOff x="0" y="0"/>
+          <a:chExt cx="0" cy="0"/>
+        </a:xfrm>
+      </p:grpSpPr>
+      <p:sp>
+        <p:nvSpPr>
+          <p:cNvPr id="2" name="Title 1">
+            <a:extLst>
+              <a:ext uri="{FF2B5EF4-FFF2-40B4-BE49-F238E27FC236}">
+                <a16:creationId xmlns:a16="http://schemas.microsoft.com/office/drawing/2014/main" id="{0D5226AE-1E9B-94E1-4DD1-A44A97BC0A33}"/>
+              </a:ext>
+            </a:extLst>
+          </p:cNvPr>
+          <p:cNvSpPr>
+            <a:spLocks noGrp="1"/>
+          </p:cNvSpPr>
+          <p:nvPr>
+            <p:ph type="title"/>
+          </p:nvPr>
+        </p:nvSpPr>
+        <p:spPr/>
+        <p:txBody>
+          <a:bodyPr/>
+          <a:lstStyle/>
+          <a:p>
+            <a:pPr algn="ctr"/>
+            <a:r>
+              <a:rPr lang="bg-BG" dirty="0">
+                <a:latin typeface="Arial" panose="020B0604020202020204" pitchFamily="34" charset="0"/>
+                <a:cs typeface="Arial" panose="020B0604020202020204" pitchFamily="34" charset="0"/>
+              </a:rPr>
+              <a:t>Задача </a:t>
+            </a:r>
+            <a:r>
+              <a:rPr lang="en-US" dirty="0">
+                <a:latin typeface="Arial" panose="020B0604020202020204" pitchFamily="34" charset="0"/>
+                <a:cs typeface="Arial" panose="020B0604020202020204" pitchFamily="34" charset="0"/>
+              </a:rPr>
+              <a:t>4</a:t>
+            </a:r>
+            <a:r>
+              <a:rPr lang="bg-BG" dirty="0">
+                <a:latin typeface="Arial" panose="020B0604020202020204" pitchFamily="34" charset="0"/>
+                <a:cs typeface="Arial" panose="020B0604020202020204" pitchFamily="34" charset="0"/>
+              </a:rPr>
+              <a:t>:</a:t>
+            </a:r>
+          </a:p>
+        </p:txBody>
+      </p:sp>
+      <p:sp>
+        <p:nvSpPr>
+          <p:cNvPr id="3" name="Content Placeholder 2">
+            <a:extLst>
+              <a:ext uri="{FF2B5EF4-FFF2-40B4-BE49-F238E27FC236}">
+                <a16:creationId xmlns:a16="http://schemas.microsoft.com/office/drawing/2014/main" id="{6F7386F1-3598-E2E7-96E9-E71EAE822B60}"/>
+              </a:ext>
+            </a:extLst>
+          </p:cNvPr>
+          <p:cNvSpPr>
+            <a:spLocks noGrp="1"/>
+          </p:cNvSpPr>
+          <p:nvPr>
+            <p:ph idx="1"/>
+          </p:nvPr>
+        </p:nvSpPr>
+        <p:spPr>
+          <a:xfrm>
+            <a:off x="1154954" y="2603499"/>
+            <a:ext cx="8825659" cy="4160994"/>
+          </a:xfrm>
+        </p:spPr>
+        <p:txBody>
+          <a:bodyPr>
+            <a:normAutofit/>
+          </a:bodyPr>
+          <a:lstStyle/>
+          <a:p>
+            <a:r>
+              <a:rPr lang="bg-BG" sz="2400" i="1" dirty="0">
+                <a:latin typeface="Arial" panose="020B0604020202020204" pitchFamily="34" charset="0"/>
+                <a:cs typeface="Arial" panose="020B0604020202020204" pitchFamily="34" charset="0"/>
+              </a:rPr>
+              <a:t>Да се направи програма, която по зададен символ, изобразява обърната пирамида (от съответния символ). Единственият вход е </a:t>
+            </a:r>
+            <a:r>
+              <a:rPr lang="en-US" sz="2400" b="1" i="1" dirty="0">
+                <a:latin typeface="Arial" panose="020B0604020202020204" pitchFamily="34" charset="0"/>
+                <a:cs typeface="Arial" panose="020B0604020202020204" pitchFamily="34" charset="0"/>
+              </a:rPr>
+              <a:t>char</a:t>
+            </a:r>
+            <a:r>
+              <a:rPr lang="bg-BG" sz="2400" i="1" dirty="0">
+                <a:latin typeface="Arial" panose="020B0604020202020204" pitchFamily="34" charset="0"/>
+                <a:cs typeface="Arial" panose="020B0604020202020204" pitchFamily="34" charset="0"/>
+              </a:rPr>
+              <a:t>, който представлява символът, който искаме да използваме при рисуването.</a:t>
+            </a:r>
+            <a:endParaRPr lang="en-US" sz="2400" i="1" dirty="0">
+              <a:latin typeface="Arial" panose="020B0604020202020204" pitchFamily="34" charset="0"/>
+              <a:cs typeface="Arial" panose="020B0604020202020204" pitchFamily="34" charset="0"/>
+            </a:endParaRPr>
+          </a:p>
+          <a:p>
+            <a:r>
+              <a:rPr lang="bg-BG" sz="2400" dirty="0">
+                <a:latin typeface="Arial" panose="020B0604020202020204" pitchFamily="34" charset="0"/>
+                <a:cs typeface="Arial" panose="020B0604020202020204" pitchFamily="34" charset="0"/>
+              </a:rPr>
+              <a:t>Изход от програмата</a:t>
+            </a:r>
+            <a:r>
+              <a:rPr lang="en-US" sz="2400" dirty="0">
+                <a:latin typeface="Arial" panose="020B0604020202020204" pitchFamily="34" charset="0"/>
+                <a:cs typeface="Arial" panose="020B0604020202020204" pitchFamily="34" charset="0"/>
+              </a:rPr>
+              <a:t>:</a:t>
+            </a:r>
+            <a:endParaRPr lang="bg-BG" sz="2400" dirty="0">
+              <a:latin typeface="Arial" panose="020B0604020202020204" pitchFamily="34" charset="0"/>
+              <a:cs typeface="Arial" panose="020B0604020202020204" pitchFamily="34" charset="0"/>
+            </a:endParaRPr>
+          </a:p>
+          <a:p>
+            <a:pPr marL="400050" lvl="1" indent="0">
+              <a:buNone/>
+            </a:pPr>
+            <a:r>
+              <a:rPr lang="bg-BG" sz="2400" b="1" i="1" u="sng" dirty="0">
+                <a:latin typeface="Arial" panose="020B0604020202020204" pitchFamily="34" charset="0"/>
+                <a:cs typeface="Arial" panose="020B0604020202020204" pitchFamily="34" charset="0"/>
+              </a:rPr>
+              <a:t>Пример</a:t>
+            </a:r>
+            <a:r>
+              <a:rPr lang="bg-BG" sz="2600" dirty="0">
+                <a:latin typeface="Arial" panose="020B0604020202020204" pitchFamily="34" charset="0"/>
+                <a:cs typeface="Arial" panose="020B0604020202020204" pitchFamily="34" charset="0"/>
+              </a:rPr>
+              <a:t>:</a:t>
+            </a:r>
+          </a:p>
+          <a:p>
+            <a:pPr marL="457200" lvl="1" indent="0">
+              <a:buNone/>
+            </a:pPr>
+            <a:endParaRPr lang="en-US" sz="1800" dirty="0">
+              <a:solidFill>
+                <a:schemeClr val="tx1"/>
+              </a:solidFill>
+              <a:latin typeface="Cascadia Mono" panose="020B0609020000020004" pitchFamily="49" charset="0"/>
+            </a:endParaRPr>
+          </a:p>
+          <a:p>
+            <a:pPr marL="457200" lvl="1" indent="0">
+              <a:buNone/>
+            </a:pPr>
+            <a:endParaRPr lang="en-US" sz="1800" dirty="0">
+              <a:solidFill>
+                <a:schemeClr val="tx1"/>
+              </a:solidFill>
+              <a:latin typeface="Cascadia Mono" panose="020B0609020000020004" pitchFamily="49" charset="0"/>
+            </a:endParaRPr>
+          </a:p>
+          <a:p>
+            <a:pPr marL="457200" lvl="1" indent="0">
+              <a:buNone/>
+            </a:pPr>
+            <a:endParaRPr lang="en-US" sz="1800" dirty="0">
+              <a:solidFill>
+                <a:schemeClr val="tx1"/>
+              </a:solidFill>
+              <a:latin typeface="Cascadia Mono" panose="020B0609020000020004" pitchFamily="49" charset="0"/>
+            </a:endParaRPr>
+          </a:p>
+          <a:p>
+            <a:pPr marL="457200" lvl="1" indent="0">
+              <a:buNone/>
+            </a:pPr>
+            <a:endParaRPr lang="bg-BG" sz="1800" dirty="0">
+              <a:solidFill>
+                <a:srgbClr val="A31515"/>
+              </a:solidFill>
+              <a:latin typeface="Cascadia Mono" panose="020B0609020000020004" pitchFamily="49" charset="0"/>
+            </a:endParaRPr>
+          </a:p>
+        </p:txBody>
+      </p:sp>
+      <p:pic>
+        <p:nvPicPr>
+          <p:cNvPr id="7" name="Picture 6" descr="A picture containing text&#10;&#10;Description automatically generated">
+            <a:extLst>
+              <a:ext uri="{FF2B5EF4-FFF2-40B4-BE49-F238E27FC236}">
+                <a16:creationId xmlns:a16="http://schemas.microsoft.com/office/drawing/2014/main" id="{E950EFED-1B3B-4BDC-CA46-37ED4E252661}"/>
+              </a:ext>
+            </a:extLst>
+          </p:cNvPr>
+          <p:cNvPicPr>
+            <a:picLocks noChangeAspect="1"/>
+          </p:cNvPicPr>
+          <p:nvPr/>
+        </p:nvPicPr>
+        <p:blipFill>
+          <a:blip r:embed="rId2">
+            <a:extLst>
+              <a:ext uri="{28A0092B-C50C-407E-A947-70E740481C1C}">
+                <a14:useLocalDpi xmlns:a14="http://schemas.microsoft.com/office/drawing/2010/main" val="0"/>
+              </a:ext>
+            </a:extLst>
+          </a:blip>
+          <a:stretch>
+            <a:fillRect/>
+          </a:stretch>
+        </p:blipFill>
+        <p:spPr>
+          <a:xfrm>
+            <a:off x="4878173" y="4333264"/>
+            <a:ext cx="1379220" cy="2263140"/>
+          </a:xfrm>
+          <a:prstGeom prst="rect">
+            <a:avLst/>
+          </a:prstGeom>
+        </p:spPr>
+      </p:pic>
+    </p:spTree>
+    <p:extLst>
+      <p:ext uri="{BB962C8B-B14F-4D97-AF65-F5344CB8AC3E}">
+        <p14:creationId xmlns:p14="http://schemas.microsoft.com/office/powerpoint/2010/main" val="3987513233"/>
+      </p:ext>
+    </p:extLst>
+  </p:cSld>
+  <p:clrMapOvr>
+    <a:masterClrMapping/>
+  </p:clrMapOvr>
+</p:sld>
+</file>
+
+<file path=ppt/slides/slide57.xml><?xml version="1.0" encoding="utf-8"?>
+<p:sld xmlns:a="http://schemas.openxmlformats.org/drawingml/2006/main" xmlns:r="http://schemas.openxmlformats.org/officeDocument/2006/relationships" xmlns:p="http://schemas.openxmlformats.org/presentationml/2006/main">
+  <p:cSld>
+    <p:spTree>
+      <p:nvGrpSpPr>
+        <p:cNvPr id="1" name=""/>
+        <p:cNvGrpSpPr/>
+        <p:nvPr/>
+      </p:nvGrpSpPr>
+      <p:grpSpPr>
+        <a:xfrm>
+          <a:off x="0" y="0"/>
+          <a:ext cx="0" cy="0"/>
+          <a:chOff x="0" y="0"/>
+          <a:chExt cx="0" cy="0"/>
+        </a:xfrm>
+      </p:grpSpPr>
+      <p:sp>
+        <p:nvSpPr>
+          <p:cNvPr id="2" name="Title 1">
+            <a:extLst>
+              <a:ext uri="{FF2B5EF4-FFF2-40B4-BE49-F238E27FC236}">
+                <a16:creationId xmlns:a16="http://schemas.microsoft.com/office/drawing/2014/main" id="{0D5226AE-1E9B-94E1-4DD1-A44A97BC0A33}"/>
+              </a:ext>
+            </a:extLst>
+          </p:cNvPr>
+          <p:cNvSpPr>
+            <a:spLocks noGrp="1"/>
+          </p:cNvSpPr>
+          <p:nvPr>
+            <p:ph type="title"/>
+          </p:nvPr>
+        </p:nvSpPr>
+        <p:spPr/>
+        <p:txBody>
+          <a:bodyPr/>
+          <a:lstStyle/>
+          <a:p>
+            <a:pPr algn="ctr"/>
+            <a:r>
+              <a:rPr lang="bg-BG" dirty="0">
+                <a:latin typeface="Arial" panose="020B0604020202020204" pitchFamily="34" charset="0"/>
+                <a:cs typeface="Arial" panose="020B0604020202020204" pitchFamily="34" charset="0"/>
+              </a:rPr>
+              <a:t>Задача </a:t>
+            </a:r>
+            <a:r>
+              <a:rPr lang="en-US" dirty="0">
+                <a:latin typeface="Arial" panose="020B0604020202020204" pitchFamily="34" charset="0"/>
+                <a:cs typeface="Arial" panose="020B0604020202020204" pitchFamily="34" charset="0"/>
+              </a:rPr>
+              <a:t>5</a:t>
+            </a:r>
+            <a:r>
+              <a:rPr lang="bg-BG" dirty="0">
+                <a:latin typeface="Arial" panose="020B0604020202020204" pitchFamily="34" charset="0"/>
+                <a:cs typeface="Arial" panose="020B0604020202020204" pitchFamily="34" charset="0"/>
+              </a:rPr>
+              <a:t>:</a:t>
+            </a:r>
+          </a:p>
+        </p:txBody>
+      </p:sp>
+      <p:sp>
+        <p:nvSpPr>
+          <p:cNvPr id="3" name="Content Placeholder 2">
+            <a:extLst>
+              <a:ext uri="{FF2B5EF4-FFF2-40B4-BE49-F238E27FC236}">
+                <a16:creationId xmlns:a16="http://schemas.microsoft.com/office/drawing/2014/main" id="{6F7386F1-3598-E2E7-96E9-E71EAE822B60}"/>
+              </a:ext>
+            </a:extLst>
+          </p:cNvPr>
+          <p:cNvSpPr>
+            <a:spLocks noGrp="1"/>
+          </p:cNvSpPr>
+          <p:nvPr>
+            <p:ph idx="1"/>
+          </p:nvPr>
+        </p:nvSpPr>
+        <p:spPr>
+          <a:xfrm>
+            <a:off x="1154954" y="2603499"/>
+            <a:ext cx="8825659" cy="4064719"/>
+          </a:xfrm>
+        </p:spPr>
+        <p:txBody>
+          <a:bodyPr>
+            <a:normAutofit/>
+          </a:bodyPr>
+          <a:lstStyle/>
+          <a:p>
+            <a:r>
+              <a:rPr lang="bg-BG" sz="2400" i="1" dirty="0">
+                <a:latin typeface="Arial" panose="020B0604020202020204" pitchFamily="34" charset="0"/>
+                <a:cs typeface="Arial" panose="020B0604020202020204" pitchFamily="34" charset="0"/>
+              </a:rPr>
+              <a:t>Да се направи програма, която по зададен символ рисува правоъгълник от съответния символ. Трябва да се изгради меню, което да включва 5 опции. В зависимост от опцията (1 до 5) фигурата ще бъде различна.:</a:t>
+            </a:r>
+          </a:p>
+          <a:p>
+            <a:pPr marL="400050" lvl="1" indent="0">
+              <a:buNone/>
+            </a:pPr>
+            <a:r>
+              <a:rPr lang="bg-BG" sz="2400" b="1" i="1" u="sng" dirty="0">
+                <a:latin typeface="Arial" panose="020B0604020202020204" pitchFamily="34" charset="0"/>
+                <a:cs typeface="Arial" panose="020B0604020202020204" pitchFamily="34" charset="0"/>
+              </a:rPr>
+              <a:t>Пример</a:t>
+            </a:r>
+            <a:r>
+              <a:rPr lang="bg-BG" sz="2600" dirty="0">
+                <a:latin typeface="Arial" panose="020B0604020202020204" pitchFamily="34" charset="0"/>
+                <a:cs typeface="Arial" panose="020B0604020202020204" pitchFamily="34" charset="0"/>
+              </a:rPr>
+              <a:t>:  </a:t>
+            </a:r>
+          </a:p>
+          <a:p>
+            <a:pPr marL="400050" lvl="1" indent="0">
+              <a:buNone/>
+            </a:pPr>
+            <a:r>
+              <a:rPr lang="bg-BG" sz="2600" dirty="0">
+                <a:latin typeface="Arial" panose="020B0604020202020204" pitchFamily="34" charset="0"/>
+                <a:cs typeface="Arial" panose="020B0604020202020204" pitchFamily="34" charset="0"/>
+              </a:rPr>
+              <a:t>1.При символ </a:t>
+            </a:r>
+            <a:r>
+              <a:rPr lang="bg-BG" sz="2600" b="1" dirty="0">
+                <a:latin typeface="Arial" panose="020B0604020202020204" pitchFamily="34" charset="0"/>
+                <a:cs typeface="Arial" panose="020B0604020202020204" pitchFamily="34" charset="0"/>
+              </a:rPr>
+              <a:t>*</a:t>
+            </a:r>
+            <a:r>
+              <a:rPr lang="bg-BG" sz="2600" dirty="0">
+                <a:latin typeface="Arial" panose="020B0604020202020204" pitchFamily="34" charset="0"/>
+                <a:cs typeface="Arial" panose="020B0604020202020204" pitchFamily="34" charset="0"/>
+              </a:rPr>
+              <a:t> и опция </a:t>
+            </a:r>
+            <a:r>
+              <a:rPr lang="bg-BG" sz="2600" b="1" dirty="0">
+                <a:latin typeface="Arial" panose="020B0604020202020204" pitchFamily="34" charset="0"/>
+                <a:cs typeface="Arial" panose="020B0604020202020204" pitchFamily="34" charset="0"/>
+              </a:rPr>
+              <a:t>5</a:t>
+            </a:r>
+            <a:r>
+              <a:rPr lang="bg-BG" sz="2600" dirty="0">
+                <a:latin typeface="Arial" panose="020B0604020202020204" pitchFamily="34" charset="0"/>
+                <a:cs typeface="Arial" panose="020B0604020202020204" pitchFamily="34" charset="0"/>
+              </a:rPr>
+              <a:t>   2. При символ </a:t>
+            </a:r>
+            <a:r>
+              <a:rPr lang="en-US" sz="2600" b="1" dirty="0">
+                <a:latin typeface="Arial" panose="020B0604020202020204" pitchFamily="34" charset="0"/>
+                <a:cs typeface="Arial" panose="020B0604020202020204" pitchFamily="34" charset="0"/>
+              </a:rPr>
+              <a:t>&amp;</a:t>
+            </a:r>
+            <a:r>
+              <a:rPr lang="bg-BG" sz="2600" dirty="0">
+                <a:latin typeface="Arial" panose="020B0604020202020204" pitchFamily="34" charset="0"/>
+                <a:cs typeface="Arial" panose="020B0604020202020204" pitchFamily="34" charset="0"/>
+              </a:rPr>
+              <a:t> и опция </a:t>
+            </a:r>
+            <a:r>
+              <a:rPr lang="bg-BG" sz="2600" b="1" dirty="0">
+                <a:latin typeface="Arial" panose="020B0604020202020204" pitchFamily="34" charset="0"/>
+                <a:cs typeface="Arial" panose="020B0604020202020204" pitchFamily="34" charset="0"/>
+              </a:rPr>
+              <a:t>3</a:t>
+            </a:r>
+            <a:r>
+              <a:rPr lang="bg-BG" sz="2600" dirty="0">
+                <a:latin typeface="Arial" panose="020B0604020202020204" pitchFamily="34" charset="0"/>
+                <a:cs typeface="Arial" panose="020B0604020202020204" pitchFamily="34" charset="0"/>
+              </a:rPr>
+              <a:t> </a:t>
+            </a:r>
+          </a:p>
+          <a:p>
+            <a:pPr marL="400050" lvl="1" indent="0">
+              <a:buNone/>
+            </a:pPr>
+            <a:endParaRPr lang="bg-BG" sz="2600" dirty="0">
+              <a:latin typeface="Arial" panose="020B0604020202020204" pitchFamily="34" charset="0"/>
+              <a:cs typeface="Arial" panose="020B0604020202020204" pitchFamily="34" charset="0"/>
+            </a:endParaRPr>
+          </a:p>
+          <a:p>
+            <a:pPr marL="400050" lvl="1" indent="0">
+              <a:buNone/>
+            </a:pPr>
+            <a:endParaRPr lang="bg-BG" sz="2600" dirty="0">
+              <a:latin typeface="Arial" panose="020B0604020202020204" pitchFamily="34" charset="0"/>
+              <a:cs typeface="Arial" panose="020B0604020202020204" pitchFamily="34" charset="0"/>
+            </a:endParaRPr>
+          </a:p>
+          <a:p>
+            <a:pPr marL="457200" lvl="1" indent="0">
+              <a:buNone/>
+            </a:pPr>
+            <a:endParaRPr lang="bg-BG" sz="1800" dirty="0">
+              <a:solidFill>
+                <a:srgbClr val="A31515"/>
+              </a:solidFill>
+              <a:latin typeface="Cascadia Mono" panose="020B0609020000020004" pitchFamily="49" charset="0"/>
+            </a:endParaRPr>
+          </a:p>
+          <a:p>
+            <a:pPr marL="457200" lvl="1" indent="0">
+              <a:buNone/>
+            </a:pPr>
+            <a:endParaRPr lang="en-US" sz="1800" dirty="0">
+              <a:solidFill>
+                <a:schemeClr val="tx1"/>
+              </a:solidFill>
+              <a:latin typeface="Cascadia Mono" panose="020B0609020000020004" pitchFamily="49" charset="0"/>
+            </a:endParaRPr>
+          </a:p>
+          <a:p>
+            <a:pPr marL="457200" lvl="1" indent="0">
+              <a:buNone/>
+            </a:pPr>
+            <a:endParaRPr lang="en-US" sz="1800" dirty="0">
+              <a:solidFill>
+                <a:schemeClr val="tx1"/>
+              </a:solidFill>
+              <a:latin typeface="Cascadia Mono" panose="020B0609020000020004" pitchFamily="49" charset="0"/>
+            </a:endParaRPr>
+          </a:p>
+          <a:p>
+            <a:pPr marL="457200" lvl="1" indent="0">
+              <a:buNone/>
+            </a:pPr>
+            <a:endParaRPr lang="en-US" sz="1800" dirty="0">
+              <a:solidFill>
+                <a:schemeClr val="tx1"/>
+              </a:solidFill>
+              <a:latin typeface="Cascadia Mono" panose="020B0609020000020004" pitchFamily="49" charset="0"/>
+            </a:endParaRPr>
+          </a:p>
+          <a:p>
+            <a:pPr marL="457200" lvl="1" indent="0">
+              <a:buNone/>
+            </a:pPr>
+            <a:endParaRPr lang="bg-BG" sz="1800" dirty="0">
+              <a:solidFill>
+                <a:srgbClr val="A31515"/>
+              </a:solidFill>
+              <a:latin typeface="Cascadia Mono" panose="020B0609020000020004" pitchFamily="49" charset="0"/>
+            </a:endParaRPr>
+          </a:p>
+        </p:txBody>
+      </p:sp>
+      <p:pic>
+        <p:nvPicPr>
+          <p:cNvPr id="5" name="Picture 4" descr="Chart, scatter chart&#10;&#10;Description automatically generated">
+            <a:extLst>
+              <a:ext uri="{FF2B5EF4-FFF2-40B4-BE49-F238E27FC236}">
+                <a16:creationId xmlns:a16="http://schemas.microsoft.com/office/drawing/2014/main" id="{6490DF52-E175-D832-3AE6-703C5AF4008C}"/>
+              </a:ext>
+            </a:extLst>
+          </p:cNvPr>
+          <p:cNvPicPr>
+            <a:picLocks noChangeAspect="1"/>
+          </p:cNvPicPr>
+          <p:nvPr/>
+        </p:nvPicPr>
+        <p:blipFill>
+          <a:blip r:embed="rId2">
+            <a:extLst>
+              <a:ext uri="{28A0092B-C50C-407E-A947-70E740481C1C}">
+                <a14:useLocalDpi xmlns:a14="http://schemas.microsoft.com/office/drawing/2010/main" val="0"/>
+              </a:ext>
+            </a:extLst>
+          </a:blip>
+          <a:stretch>
+            <a:fillRect/>
+          </a:stretch>
+        </p:blipFill>
+        <p:spPr>
+          <a:xfrm>
+            <a:off x="1978957" y="5665581"/>
+            <a:ext cx="464860" cy="754445"/>
+          </a:xfrm>
+          <a:prstGeom prst="rect">
+            <a:avLst/>
+          </a:prstGeom>
+        </p:spPr>
+      </p:pic>
+      <p:pic>
+        <p:nvPicPr>
+          <p:cNvPr id="7" name="Picture 6">
+            <a:extLst>
+              <a:ext uri="{FF2B5EF4-FFF2-40B4-BE49-F238E27FC236}">
+                <a16:creationId xmlns:a16="http://schemas.microsoft.com/office/drawing/2014/main" id="{D8EDD0EE-787C-BD0A-78EA-9D3D458C1DFF}"/>
+              </a:ext>
+            </a:extLst>
+          </p:cNvPr>
+          <p:cNvPicPr>
+            <a:picLocks noChangeAspect="1"/>
+          </p:cNvPicPr>
+          <p:nvPr/>
+        </p:nvPicPr>
+        <p:blipFill>
+          <a:blip r:embed="rId3">
+            <a:extLst>
+              <a:ext uri="{28A0092B-C50C-407E-A947-70E740481C1C}">
+                <a14:useLocalDpi xmlns:a14="http://schemas.microsoft.com/office/drawing/2010/main" val="0"/>
+              </a:ext>
+            </a:extLst>
+          </a:blip>
+          <a:stretch>
+            <a:fillRect/>
+          </a:stretch>
+        </p:blipFill>
+        <p:spPr>
+          <a:xfrm>
+            <a:off x="7186795" y="5727571"/>
+            <a:ext cx="469083" cy="692455"/>
+          </a:xfrm>
+          <a:prstGeom prst="rect">
+            <a:avLst/>
+          </a:prstGeom>
+        </p:spPr>
+      </p:pic>
+    </p:spTree>
+    <p:extLst>
+      <p:ext uri="{BB962C8B-B14F-4D97-AF65-F5344CB8AC3E}">
+        <p14:creationId xmlns:p14="http://schemas.microsoft.com/office/powerpoint/2010/main" val="3585618132"/>
+      </p:ext>
+    </p:extLst>
+  </p:cSld>
+  <p:clrMapOvr>
+    <a:masterClrMapping/>
+  </p:clrMapOvr>
+</p:sld>
+</file>
+
+<file path=ppt/slides/slide58.xml><?xml version="1.0" encoding="utf-8"?>
+<p:sld xmlns:a="http://schemas.openxmlformats.org/drawingml/2006/main" xmlns:r="http://schemas.openxmlformats.org/officeDocument/2006/relationships" xmlns:p="http://schemas.openxmlformats.org/presentationml/2006/main">
+  <p:cSld>
+    <p:spTree>
+      <p:nvGrpSpPr>
+        <p:cNvPr id="1" name=""/>
+        <p:cNvGrpSpPr/>
+        <p:nvPr/>
+      </p:nvGrpSpPr>
+      <p:grpSpPr>
+        <a:xfrm>
+          <a:off x="0" y="0"/>
+          <a:ext cx="0" cy="0"/>
+          <a:chOff x="0" y="0"/>
+          <a:chExt cx="0" cy="0"/>
+        </a:xfrm>
+      </p:grpSpPr>
+      <p:sp>
+        <p:nvSpPr>
+          <p:cNvPr id="2" name="Title 1">
+            <a:extLst>
+              <a:ext uri="{FF2B5EF4-FFF2-40B4-BE49-F238E27FC236}">
+                <a16:creationId xmlns:a16="http://schemas.microsoft.com/office/drawing/2014/main" id="{0D5226AE-1E9B-94E1-4DD1-A44A97BC0A33}"/>
+              </a:ext>
+            </a:extLst>
+          </p:cNvPr>
+          <p:cNvSpPr>
+            <a:spLocks noGrp="1"/>
+          </p:cNvSpPr>
+          <p:nvPr>
+            <p:ph type="title"/>
+          </p:nvPr>
+        </p:nvSpPr>
+        <p:spPr/>
+        <p:txBody>
+          <a:bodyPr/>
+          <a:lstStyle/>
+          <a:p>
+            <a:pPr algn="ctr"/>
+            <a:r>
+              <a:rPr lang="bg-BG" dirty="0">
+                <a:latin typeface="Arial" panose="020B0604020202020204" pitchFamily="34" charset="0"/>
+                <a:cs typeface="Arial" panose="020B0604020202020204" pitchFamily="34" charset="0"/>
+              </a:rPr>
+              <a:t>Задача </a:t>
+            </a:r>
+            <a:r>
+              <a:rPr lang="en-US" dirty="0">
+                <a:latin typeface="Arial" panose="020B0604020202020204" pitchFamily="34" charset="0"/>
+                <a:cs typeface="Arial" panose="020B0604020202020204" pitchFamily="34" charset="0"/>
+              </a:rPr>
+              <a:t>5 /</a:t>
+            </a:r>
+            <a:r>
+              <a:rPr lang="bg-BG" dirty="0">
+                <a:latin typeface="Arial" panose="020B0604020202020204" pitchFamily="34" charset="0"/>
+                <a:cs typeface="Arial" panose="020B0604020202020204" pitchFamily="34" charset="0"/>
+              </a:rPr>
+              <a:t>продължение</a:t>
+            </a:r>
+            <a:r>
+              <a:rPr lang="en-US" dirty="0">
+                <a:latin typeface="Arial" panose="020B0604020202020204" pitchFamily="34" charset="0"/>
+                <a:cs typeface="Arial" panose="020B0604020202020204" pitchFamily="34" charset="0"/>
+              </a:rPr>
+              <a:t>/</a:t>
+            </a:r>
+            <a:r>
+              <a:rPr lang="bg-BG" dirty="0">
+                <a:latin typeface="Arial" panose="020B0604020202020204" pitchFamily="34" charset="0"/>
+                <a:cs typeface="Arial" panose="020B0604020202020204" pitchFamily="34" charset="0"/>
+              </a:rPr>
+              <a:t>:</a:t>
+            </a:r>
+          </a:p>
+        </p:txBody>
+      </p:sp>
+      <p:sp>
+        <p:nvSpPr>
+          <p:cNvPr id="3" name="Content Placeholder 2">
+            <a:extLst>
+              <a:ext uri="{FF2B5EF4-FFF2-40B4-BE49-F238E27FC236}">
+                <a16:creationId xmlns:a16="http://schemas.microsoft.com/office/drawing/2014/main" id="{6F7386F1-3598-E2E7-96E9-E71EAE822B60}"/>
+              </a:ext>
+            </a:extLst>
+          </p:cNvPr>
+          <p:cNvSpPr>
+            <a:spLocks noGrp="1"/>
+          </p:cNvSpPr>
+          <p:nvPr>
+            <p:ph idx="1"/>
+          </p:nvPr>
+        </p:nvSpPr>
+        <p:spPr>
+          <a:xfrm>
+            <a:off x="1154954" y="2379213"/>
+            <a:ext cx="8825659" cy="3505119"/>
+          </a:xfrm>
+        </p:spPr>
+        <p:txBody>
+          <a:bodyPr>
+            <a:normAutofit/>
+          </a:bodyPr>
+          <a:lstStyle/>
+          <a:p>
+            <a:r>
+              <a:rPr lang="bg-BG" sz="2400" i="1" dirty="0">
+                <a:latin typeface="Arial" panose="020B0604020202020204" pitchFamily="34" charset="0"/>
+                <a:cs typeface="Arial" panose="020B0604020202020204" pitchFamily="34" charset="0"/>
+              </a:rPr>
+              <a:t>Символът в началото се въвежда докато не е коректен. Коректните символи са: </a:t>
+            </a:r>
+            <a:r>
+              <a:rPr lang="en-US" sz="2400" b="1" i="1" dirty="0">
+                <a:latin typeface="Arial" panose="020B0604020202020204" pitchFamily="34" charset="0"/>
+                <a:cs typeface="Arial" panose="020B0604020202020204" pitchFamily="34" charset="0"/>
+              </a:rPr>
+              <a:t>*</a:t>
+            </a:r>
+            <a:r>
+              <a:rPr lang="en-US" sz="2400" i="1" dirty="0">
+                <a:latin typeface="Arial" panose="020B0604020202020204" pitchFamily="34" charset="0"/>
+                <a:cs typeface="Arial" panose="020B0604020202020204" pitchFamily="34" charset="0"/>
+              </a:rPr>
+              <a:t>, </a:t>
+            </a:r>
+            <a:r>
+              <a:rPr lang="en-US" sz="2400" b="1" i="1" dirty="0">
+                <a:latin typeface="Arial" panose="020B0604020202020204" pitchFamily="34" charset="0"/>
+                <a:cs typeface="Arial" panose="020B0604020202020204" pitchFamily="34" charset="0"/>
+              </a:rPr>
+              <a:t>&amp;</a:t>
+            </a:r>
+            <a:r>
+              <a:rPr lang="bg-BG" sz="2400" i="1" dirty="0">
+                <a:latin typeface="Arial" panose="020B0604020202020204" pitchFamily="34" charset="0"/>
+                <a:cs typeface="Arial" panose="020B0604020202020204" pitchFamily="34" charset="0"/>
+              </a:rPr>
+              <a:t>,</a:t>
+            </a:r>
+            <a:r>
+              <a:rPr lang="en-US" sz="2400" i="1" dirty="0">
+                <a:latin typeface="Arial" panose="020B0604020202020204" pitchFamily="34" charset="0"/>
+                <a:cs typeface="Arial" panose="020B0604020202020204" pitchFamily="34" charset="0"/>
+              </a:rPr>
+              <a:t> </a:t>
+            </a:r>
+            <a:r>
+              <a:rPr lang="en-US" sz="2400" b="1" i="1" dirty="0">
+                <a:latin typeface="Arial" panose="020B0604020202020204" pitchFamily="34" charset="0"/>
+                <a:cs typeface="Arial" panose="020B0604020202020204" pitchFamily="34" charset="0"/>
+              </a:rPr>
+              <a:t>%</a:t>
+            </a:r>
+            <a:r>
+              <a:rPr lang="en-US" sz="2400" i="1" dirty="0">
+                <a:latin typeface="Arial" panose="020B0604020202020204" pitchFamily="34" charset="0"/>
+                <a:cs typeface="Arial" panose="020B0604020202020204" pitchFamily="34" charset="0"/>
+              </a:rPr>
+              <a:t>, </a:t>
+            </a:r>
+            <a:r>
+              <a:rPr lang="en-US" sz="2400" b="1" i="1" dirty="0">
+                <a:latin typeface="Arial" panose="020B0604020202020204" pitchFamily="34" charset="0"/>
+                <a:cs typeface="Arial" panose="020B0604020202020204" pitchFamily="34" charset="0"/>
+              </a:rPr>
+              <a:t>#</a:t>
+            </a:r>
+            <a:r>
+              <a:rPr lang="bg-BG" sz="2400" i="1" dirty="0">
+                <a:latin typeface="Arial" panose="020B0604020202020204" pitchFamily="34" charset="0"/>
+                <a:cs typeface="Arial" panose="020B0604020202020204" pitchFamily="34" charset="0"/>
+              </a:rPr>
+              <a:t>. В случай на невалиден символ на екрана трябва да се появи съобщение, че символът е невалиден и да се опита отново.</a:t>
+            </a:r>
+            <a:r>
+              <a:rPr lang="en-US" sz="2400" i="1" dirty="0">
+                <a:latin typeface="Arial" panose="020B0604020202020204" pitchFamily="34" charset="0"/>
+                <a:cs typeface="Arial" panose="020B0604020202020204" pitchFamily="34" charset="0"/>
+              </a:rPr>
+              <a:t> </a:t>
+            </a:r>
+            <a:r>
+              <a:rPr lang="bg-BG" sz="2400" i="1" dirty="0">
+                <a:latin typeface="Arial" panose="020B0604020202020204" pitchFamily="34" charset="0"/>
+                <a:cs typeface="Arial" panose="020B0604020202020204" pitchFamily="34" charset="0"/>
+              </a:rPr>
+              <a:t>След като символът бъде въведен и се окаже правилен, то трябва да се покаже менюто и  да се изчака за избор на опция от потребителя. Опциите са 5. Няма изисквания как да изглежда менюто, просто да е удобно за потребителя.</a:t>
+            </a:r>
+          </a:p>
+          <a:p>
+            <a:pPr marL="400050" lvl="1" indent="0">
+              <a:buNone/>
+            </a:pPr>
+            <a:endParaRPr lang="bg-BG" sz="2600" dirty="0">
+              <a:latin typeface="Arial" panose="020B0604020202020204" pitchFamily="34" charset="0"/>
+              <a:cs typeface="Arial" panose="020B0604020202020204" pitchFamily="34" charset="0"/>
+            </a:endParaRPr>
+          </a:p>
+          <a:p>
+            <a:pPr marL="400050" lvl="1" indent="0">
+              <a:buNone/>
+            </a:pPr>
+            <a:endParaRPr lang="bg-BG" sz="2600" dirty="0">
+              <a:latin typeface="Arial" panose="020B0604020202020204" pitchFamily="34" charset="0"/>
+              <a:cs typeface="Arial" panose="020B0604020202020204" pitchFamily="34" charset="0"/>
+            </a:endParaRPr>
+          </a:p>
+          <a:p>
+            <a:pPr marL="457200" lvl="1" indent="0">
+              <a:buNone/>
+            </a:pPr>
+            <a:endParaRPr lang="bg-BG" sz="1800" dirty="0">
+              <a:solidFill>
+                <a:srgbClr val="A31515"/>
+              </a:solidFill>
+              <a:latin typeface="Cascadia Mono" panose="020B0609020000020004" pitchFamily="49" charset="0"/>
+            </a:endParaRPr>
+          </a:p>
+          <a:p>
+            <a:pPr marL="457200" lvl="1" indent="0">
+              <a:buNone/>
+            </a:pPr>
+            <a:endParaRPr lang="en-US" sz="1800" dirty="0">
+              <a:solidFill>
+                <a:schemeClr val="tx1"/>
+              </a:solidFill>
+              <a:latin typeface="Cascadia Mono" panose="020B0609020000020004" pitchFamily="49" charset="0"/>
+            </a:endParaRPr>
+          </a:p>
+          <a:p>
+            <a:pPr marL="457200" lvl="1" indent="0">
+              <a:buNone/>
+            </a:pPr>
+            <a:endParaRPr lang="en-US" sz="1800" dirty="0">
+              <a:solidFill>
+                <a:schemeClr val="tx1"/>
+              </a:solidFill>
+              <a:latin typeface="Cascadia Mono" panose="020B0609020000020004" pitchFamily="49" charset="0"/>
+            </a:endParaRPr>
+          </a:p>
+          <a:p>
+            <a:pPr marL="457200" lvl="1" indent="0">
+              <a:buNone/>
+            </a:pPr>
+            <a:endParaRPr lang="en-US" sz="1800" dirty="0">
+              <a:solidFill>
+                <a:schemeClr val="tx1"/>
+              </a:solidFill>
+              <a:latin typeface="Cascadia Mono" panose="020B0609020000020004" pitchFamily="49" charset="0"/>
+            </a:endParaRPr>
+          </a:p>
+          <a:p>
+            <a:pPr marL="457200" lvl="1" indent="0">
+              <a:buNone/>
+            </a:pPr>
+            <a:endParaRPr lang="bg-BG" sz="1800" dirty="0">
+              <a:solidFill>
+                <a:srgbClr val="A31515"/>
+              </a:solidFill>
+              <a:latin typeface="Cascadia Mono" panose="020B0609020000020004" pitchFamily="49" charset="0"/>
+            </a:endParaRPr>
+          </a:p>
+        </p:txBody>
+      </p:sp>
+    </p:spTree>
+    <p:extLst>
+      <p:ext uri="{BB962C8B-B14F-4D97-AF65-F5344CB8AC3E}">
+        <p14:creationId xmlns:p14="http://schemas.microsoft.com/office/powerpoint/2010/main" val="801558278"/>
+      </p:ext>
+    </p:extLst>
+  </p:cSld>
+  <p:clrMapOvr>
+    <a:masterClrMapping/>
+  </p:clrMapOvr>
+</p:sld>
+</file>
+
 <file path=ppt/slides/slide6.xml><?xml version="1.0" encoding="utf-8"?>
 <p:sld xmlns:a="http://schemas.openxmlformats.org/drawingml/2006/main" xmlns:r="http://schemas.openxmlformats.org/officeDocument/2006/relationships" xmlns:p="http://schemas.openxmlformats.org/presentationml/2006/main">
   <p:cSld>

</xml_diff>

<commit_message>
C# Basics Latest changes
</commit_message>
<xml_diff>
--- a/C# Basics.pptx
+++ b/C# Basics.pptx
@@ -254,7 +254,7 @@
           <a:p>
             <a:fld id="{068E3771-71AF-4AE2-9E86-BE935DBF2B0E}" type="datetimeFigureOut">
               <a:rPr lang="en-US" smtClean="0"/>
-              <a:t>11/8/2022</a:t>
+              <a:t>11/9/2022</a:t>
             </a:fld>
             <a:endParaRPr lang="en-US"/>
           </a:p>
@@ -856,7 +856,7 @@
           <a:p>
             <a:fld id="{C0A3DACC-474D-44ED-8DF0-6B6BA2CE3243}" type="datetimeFigureOut">
               <a:rPr lang="en-US" smtClean="0"/>
-              <a:t>11/8/2022</a:t>
+              <a:t>11/9/2022</a:t>
             </a:fld>
             <a:endParaRPr lang="en-US"/>
           </a:p>
@@ -1944,7 +1944,7 @@
           <a:p>
             <a:fld id="{C0A3DACC-474D-44ED-8DF0-6B6BA2CE3243}" type="datetimeFigureOut">
               <a:rPr lang="en-US" smtClean="0"/>
-              <a:t>11/8/2022</a:t>
+              <a:t>11/9/2022</a:t>
             </a:fld>
             <a:endParaRPr lang="en-US"/>
           </a:p>
@@ -2924,7 +2924,7 @@
           <a:p>
             <a:fld id="{C0A3DACC-474D-44ED-8DF0-6B6BA2CE3243}" type="datetimeFigureOut">
               <a:rPr lang="en-US" smtClean="0"/>
-              <a:t>11/8/2022</a:t>
+              <a:t>11/9/2022</a:t>
             </a:fld>
             <a:endParaRPr lang="en-US"/>
           </a:p>
@@ -4058,7 +4058,7 @@
           <a:p>
             <a:fld id="{C0A3DACC-474D-44ED-8DF0-6B6BA2CE3243}" type="datetimeFigureOut">
               <a:rPr lang="en-US" smtClean="0"/>
-              <a:t>11/8/2022</a:t>
+              <a:t>11/9/2022</a:t>
             </a:fld>
             <a:endParaRPr lang="en-US"/>
           </a:p>
@@ -5091,7 +5091,7 @@
           <a:p>
             <a:fld id="{C0A3DACC-474D-44ED-8DF0-6B6BA2CE3243}" type="datetimeFigureOut">
               <a:rPr lang="en-US" smtClean="0"/>
-              <a:t>11/8/2022</a:t>
+              <a:t>11/9/2022</a:t>
             </a:fld>
             <a:endParaRPr lang="en-US"/>
           </a:p>
@@ -5751,7 +5751,7 @@
           <a:p>
             <a:fld id="{C0A3DACC-474D-44ED-8DF0-6B6BA2CE3243}" type="datetimeFigureOut">
               <a:rPr lang="en-US" smtClean="0"/>
-              <a:t>11/8/2022</a:t>
+              <a:t>11/9/2022</a:t>
             </a:fld>
             <a:endParaRPr lang="en-US"/>
           </a:p>
@@ -6612,7 +6612,7 @@
           <a:p>
             <a:fld id="{C0A3DACC-474D-44ED-8DF0-6B6BA2CE3243}" type="datetimeFigureOut">
               <a:rPr lang="en-US" smtClean="0"/>
-              <a:t>11/8/2022</a:t>
+              <a:t>11/9/2022</a:t>
             </a:fld>
             <a:endParaRPr lang="en-US"/>
           </a:p>
@@ -6802,7 +6802,7 @@
           <a:p>
             <a:fld id="{C0A3DACC-474D-44ED-8DF0-6B6BA2CE3243}" type="datetimeFigureOut">
               <a:rPr lang="en-US" smtClean="0"/>
-              <a:t>11/8/2022</a:t>
+              <a:t>11/9/2022</a:t>
             </a:fld>
             <a:endParaRPr lang="en-US"/>
           </a:p>
@@ -7774,7 +7774,7 @@
           <a:p>
             <a:fld id="{C0A3DACC-474D-44ED-8DF0-6B6BA2CE3243}" type="datetimeFigureOut">
               <a:rPr lang="en-US" smtClean="0"/>
-              <a:t>11/8/2022</a:t>
+              <a:t>11/9/2022</a:t>
             </a:fld>
             <a:endParaRPr lang="en-US"/>
           </a:p>
@@ -7985,7 +7985,7 @@
           <a:p>
             <a:fld id="{C0A3DACC-474D-44ED-8DF0-6B6BA2CE3243}" type="datetimeFigureOut">
               <a:rPr lang="en-US" smtClean="0"/>
-              <a:t>11/8/2022</a:t>
+              <a:t>11/9/2022</a:t>
             </a:fld>
             <a:endParaRPr lang="en-US"/>
           </a:p>
@@ -9019,7 +9019,7 @@
           <a:p>
             <a:fld id="{C0A3DACC-474D-44ED-8DF0-6B6BA2CE3243}" type="datetimeFigureOut">
               <a:rPr lang="en-US" smtClean="0"/>
-              <a:t>11/8/2022</a:t>
+              <a:t>11/9/2022</a:t>
             </a:fld>
             <a:endParaRPr lang="en-US"/>
           </a:p>
@@ -9291,7 +9291,7 @@
           <a:p>
             <a:fld id="{C0A3DACC-474D-44ED-8DF0-6B6BA2CE3243}" type="datetimeFigureOut">
               <a:rPr lang="en-US" smtClean="0"/>
-              <a:t>11/8/2022</a:t>
+              <a:t>11/9/2022</a:t>
             </a:fld>
             <a:endParaRPr lang="en-US"/>
           </a:p>
@@ -9701,7 +9701,7 @@
           <a:p>
             <a:fld id="{C0A3DACC-474D-44ED-8DF0-6B6BA2CE3243}" type="datetimeFigureOut">
               <a:rPr lang="en-US" smtClean="0"/>
-              <a:t>11/8/2022</a:t>
+              <a:t>11/9/2022</a:t>
             </a:fld>
             <a:endParaRPr lang="en-US"/>
           </a:p>
@@ -9828,7 +9828,7 @@
           <a:p>
             <a:fld id="{C0A3DACC-474D-44ED-8DF0-6B6BA2CE3243}" type="datetimeFigureOut">
               <a:rPr lang="en-US" smtClean="0"/>
-              <a:t>11/8/2022</a:t>
+              <a:t>11/9/2022</a:t>
             </a:fld>
             <a:endParaRPr lang="en-US"/>
           </a:p>
@@ -9923,7 +9923,7 @@
           <a:p>
             <a:fld id="{C0A3DACC-474D-44ED-8DF0-6B6BA2CE3243}" type="datetimeFigureOut">
               <a:rPr lang="en-US" smtClean="0"/>
-              <a:t>11/8/2022</a:t>
+              <a:t>11/9/2022</a:t>
             </a:fld>
             <a:endParaRPr lang="en-US"/>
           </a:p>
@@ -11004,7 +11004,7 @@
           <a:p>
             <a:fld id="{C0A3DACC-474D-44ED-8DF0-6B6BA2CE3243}" type="datetimeFigureOut">
               <a:rPr lang="en-US" smtClean="0"/>
-              <a:t>11/8/2022</a:t>
+              <a:t>11/9/2022</a:t>
             </a:fld>
             <a:endParaRPr lang="en-US"/>
           </a:p>
@@ -12112,7 +12112,7 @@
           <a:p>
             <a:fld id="{C0A3DACC-474D-44ED-8DF0-6B6BA2CE3243}" type="datetimeFigureOut">
               <a:rPr lang="en-US" smtClean="0"/>
-              <a:t>11/8/2022</a:t>
+              <a:t>11/9/2022</a:t>
             </a:fld>
             <a:endParaRPr lang="en-US"/>
           </a:p>
@@ -13109,7 +13109,7 @@
           <a:p>
             <a:fld id="{C0A3DACC-474D-44ED-8DF0-6B6BA2CE3243}" type="datetimeFigureOut">
               <a:rPr lang="en-US" smtClean="0"/>
-              <a:t>11/8/2022</a:t>
+              <a:t>11/9/2022</a:t>
             </a:fld>
             <a:endParaRPr lang="en-US"/>
           </a:p>
@@ -26601,7 +26601,7 @@
         <p:spPr/>
         <p:txBody>
           <a:bodyPr>
-            <a:normAutofit lnSpcReduction="10000"/>
+            <a:normAutofit fontScale="92500" lnSpcReduction="20000"/>
           </a:bodyPr>
           <a:lstStyle/>
           <a:p>
@@ -26619,7 +26619,7 @@
                 <a:latin typeface="Arial" panose="020B0604020202020204" pitchFamily="34" charset="0"/>
                 <a:cs typeface="Arial" panose="020B0604020202020204" pitchFamily="34" charset="0"/>
               </a:rPr>
-              <a:t>Изходът от програмата трябва да изглежда така:</a:t>
+              <a:t>Изходът от програмата трябва да е форматиран до два знака след запетаята и да изглежда така:</a:t>
             </a:r>
           </a:p>
           <a:p>
@@ -26661,14 +26661,17 @@
                 </a:solidFill>
                 <a:latin typeface="Cascadia Mono" panose="020B0609020000020004" pitchFamily="49" charset="0"/>
               </a:rPr>
-              <a:t> 25.0</a:t>
-            </a:r>
-            <a:endParaRPr lang="en-US" sz="1800" dirty="0">
-              <a:solidFill>
-                <a:srgbClr val="A31515"/>
-              </a:solidFill>
-              <a:latin typeface="Cascadia Mono" panose="020B0609020000020004" pitchFamily="49" charset="0"/>
-            </a:endParaRPr>
+              <a:t> 25.</a:t>
+            </a:r>
+            <a:r>
+              <a:rPr lang="en-US" sz="1800" dirty="0">
+                <a:solidFill>
+                  <a:srgbClr val="A31515"/>
+                </a:solidFill>
+                <a:latin typeface="Cascadia Mono" panose="020B0609020000020004" pitchFamily="49" charset="0"/>
+              </a:rPr>
+              <a:t>12</a:t>
+            </a:r>
           </a:p>
           <a:p>
             <a:pPr marL="457200" lvl="1" indent="0">
@@ -26726,14 +26729,44 @@
               <a:t>Math</a:t>
             </a:r>
             <a:r>
-              <a:rPr lang="en-US" sz="2400" dirty="0">
+              <a:rPr lang="bg-BG" sz="2400" b="1" dirty="0">
                 <a:solidFill>
                   <a:schemeClr val="tx1"/>
                 </a:solidFill>
                 <a:latin typeface="Arial" panose="020B0604020202020204" pitchFamily="34" charset="0"/>
                 <a:cs typeface="Arial" panose="020B0604020202020204" pitchFamily="34" charset="0"/>
               </a:rPr>
-              <a:t>.</a:t>
+              <a:t> </a:t>
+            </a:r>
+            <a:r>
+              <a:rPr lang="bg-BG" sz="2400" dirty="0">
+                <a:solidFill>
+                  <a:schemeClr val="tx1"/>
+                </a:solidFill>
+                <a:latin typeface="Arial" panose="020B0604020202020204" pitchFamily="34" charset="0"/>
+                <a:cs typeface="Arial" panose="020B0604020202020204" pitchFamily="34" charset="0"/>
+              </a:rPr>
+              <a:t>и методът</a:t>
+            </a:r>
+            <a:r>
+              <a:rPr lang="bg-BG" sz="2400" b="1" dirty="0">
+                <a:solidFill>
+                  <a:schemeClr val="tx1"/>
+                </a:solidFill>
+                <a:latin typeface="Arial" panose="020B0604020202020204" pitchFamily="34" charset="0"/>
+                <a:cs typeface="Arial" panose="020B0604020202020204" pitchFamily="34" charset="0"/>
+              </a:rPr>
+              <a:t> </a:t>
+            </a:r>
+            <a:r>
+              <a:rPr lang="en-US" sz="2400" b="1" dirty="0">
+                <a:solidFill>
+                  <a:schemeClr val="tx1"/>
+                </a:solidFill>
+                <a:latin typeface="Arial" panose="020B0604020202020204" pitchFamily="34" charset="0"/>
+                <a:cs typeface="Arial" panose="020B0604020202020204" pitchFamily="34" charset="0"/>
+              </a:rPr>
+              <a:t>Pow</a:t>
             </a:r>
             <a:endParaRPr lang="bg-BG" sz="2400" dirty="0">
               <a:solidFill>

</xml_diff>